<commit_message>
Added one method for DGE (ad hoc), trying to add second method to visualize data.
</commit_message>
<xml_diff>
--- a/M5_Seurat_DGE_and_Exploratory/M5_Seurat_DGE_Exploratory.pptx
+++ b/M5_Seurat_DGE_and_Exploratory/M5_Seurat_DGE_Exploratory.pptx
@@ -3879,8 +3879,8 @@
         </p:nvSpPr>
         <p:spPr>
           <a:xfrm>
-            <a:off x="3962400" y="828675"/>
-            <a:ext cx="7191375" cy="646331"/>
+            <a:off x="3962400" y="694577"/>
+            <a:ext cx="7191375" cy="584775"/>
           </a:xfrm>
           <a:prstGeom prst="rect">
             <a:avLst/>
@@ -3894,8 +3894,18 @@
           <a:lstStyle/>
           <a:p>
             <a:r>
-              <a:rPr lang="en-US" dirty="0"/>
-              <a:t>No Statistical method to reveal differentially expressed genes between study groups in Seurat</a:t>
+              <a:rPr lang="en-US" sz="1600" dirty="0"/>
+              <a:t>No official statistical method to find DGE across conditions.</a:t>
+            </a:r>
+          </a:p>
+          <a:p>
+            <a:r>
+              <a:rPr lang="en-US" sz="1600" b="1" dirty="0"/>
+              <a:t>Option 2</a:t>
+            </a:r>
+            <a:r>
+              <a:rPr lang="en-US" sz="1600" dirty="0"/>
+              <a:t>: Qualitative Visualization</a:t>
             </a:r>
           </a:p>
         </p:txBody>

</xml_diff>

<commit_message>
Added code for pseudobulk DGE calculation.
</commit_message>
<xml_diff>
--- a/M5_Seurat_DGE_and_Exploratory/M5_Seurat_DGE_Exploratory.pptx
+++ b/M5_Seurat_DGE_and_Exploratory/M5_Seurat_DGE_Exploratory.pptx
@@ -5,13 +5,14 @@
     <p:sldMasterId id="2147483656" r:id="rId1"/>
   </p:sldMasterIdLst>
   <p:notesMasterIdLst>
-    <p:notesMasterId r:id="rId6"/>
+    <p:notesMasterId r:id="rId7"/>
   </p:notesMasterIdLst>
   <p:sldIdLst>
     <p:sldId id="256" r:id="rId2"/>
     <p:sldId id="261" r:id="rId3"/>
     <p:sldId id="262" r:id="rId4"/>
     <p:sldId id="263" r:id="rId5"/>
+    <p:sldId id="264" r:id="rId6"/>
   </p:sldIdLst>
   <p:sldSz cx="12192000" cy="6858000"/>
   <p:notesSz cx="6858000" cy="9144000"/>
@@ -2688,7 +2689,7 @@
         </p:blipFill>
         <p:spPr>
           <a:xfrm>
-            <a:off x="3244738" y="828432"/>
+            <a:off x="3391042" y="767073"/>
             <a:ext cx="6084048" cy="1813118"/>
           </a:xfrm>
           <a:prstGeom prst="rect">
@@ -2729,7 +2730,7 @@
         </p:blipFill>
         <p:spPr>
           <a:xfrm>
-            <a:off x="3257522" y="3998655"/>
+            <a:off x="3193514" y="2840175"/>
             <a:ext cx="4610924" cy="2707014"/>
           </a:xfrm>
           <a:prstGeom prst="rect">
@@ -3769,7 +3770,7 @@
         </p:blipFill>
         <p:spPr>
           <a:xfrm>
-            <a:off x="5594592" y="2249424"/>
+            <a:off x="5567160" y="2157984"/>
             <a:ext cx="6528523" cy="4608576"/>
           </a:xfrm>
           <a:prstGeom prst="rect">
@@ -3837,6 +3838,116 @@
           <a:chExt cx="0" cy="0"/>
         </a:xfrm>
       </p:grpSpPr>
+      <p:grpSp>
+        <p:nvGrpSpPr>
+          <p:cNvPr id="13" name="Group 12">
+            <a:extLst>
+              <a:ext uri="{FF2B5EF4-FFF2-40B4-BE49-F238E27FC236}">
+                <a16:creationId xmlns:a16="http://schemas.microsoft.com/office/drawing/2014/main" id="{1721B279-7B91-7F4D-B450-7078EB2462A7}"/>
+              </a:ext>
+            </a:extLst>
+          </p:cNvPr>
+          <p:cNvGrpSpPr>
+            <a:grpSpLocks noChangeAspect="1"/>
+          </p:cNvGrpSpPr>
+          <p:nvPr/>
+        </p:nvGrpSpPr>
+        <p:grpSpPr>
+          <a:xfrm>
+            <a:off x="3167868" y="3762009"/>
+            <a:ext cx="4072394" cy="1242486"/>
+            <a:chOff x="252542" y="3093864"/>
+            <a:chExt cx="3335559" cy="1017678"/>
+          </a:xfrm>
+        </p:grpSpPr>
+        <p:pic>
+          <p:nvPicPr>
+            <p:cNvPr id="8" name="Picture 7">
+              <a:extLst>
+                <a:ext uri="{FF2B5EF4-FFF2-40B4-BE49-F238E27FC236}">
+                  <a16:creationId xmlns:a16="http://schemas.microsoft.com/office/drawing/2014/main" id="{21DEBBE7-25DD-EC61-F339-162584FE3361}"/>
+                </a:ext>
+              </a:extLst>
+            </p:cNvPr>
+            <p:cNvPicPr>
+              <a:picLocks noChangeAspect="1"/>
+            </p:cNvPicPr>
+            <p:nvPr/>
+          </p:nvPicPr>
+          <p:blipFill rotWithShape="1">
+            <a:blip r:embed="rId2"/>
+            <a:srcRect b="85917"/>
+            <a:stretch/>
+          </p:blipFill>
+          <p:spPr>
+            <a:xfrm>
+              <a:off x="252542" y="3093864"/>
+              <a:ext cx="3335559" cy="143112"/>
+            </a:xfrm>
+            <a:prstGeom prst="rect">
+              <a:avLst/>
+            </a:prstGeom>
+          </p:spPr>
+        </p:pic>
+        <p:pic>
+          <p:nvPicPr>
+            <p:cNvPr id="11" name="Picture 10">
+              <a:extLst>
+                <a:ext uri="{FF2B5EF4-FFF2-40B4-BE49-F238E27FC236}">
+                  <a16:creationId xmlns:a16="http://schemas.microsoft.com/office/drawing/2014/main" id="{D1BDA474-B5CD-EB3B-EFF2-768E0B0A7795}"/>
+                </a:ext>
+              </a:extLst>
+            </p:cNvPr>
+            <p:cNvPicPr>
+              <a:picLocks noChangeAspect="1"/>
+            </p:cNvPicPr>
+            <p:nvPr/>
+          </p:nvPicPr>
+          <p:blipFill rotWithShape="1">
+            <a:blip r:embed="rId2"/>
+            <a:srcRect t="13936" r="62339"/>
+            <a:stretch/>
+          </p:blipFill>
+          <p:spPr>
+            <a:xfrm>
+              <a:off x="536007" y="3236976"/>
+              <a:ext cx="1256218" cy="874566"/>
+            </a:xfrm>
+            <a:prstGeom prst="rect">
+              <a:avLst/>
+            </a:prstGeom>
+          </p:spPr>
+        </p:pic>
+        <p:pic>
+          <p:nvPicPr>
+            <p:cNvPr id="12" name="Picture 11">
+              <a:extLst>
+                <a:ext uri="{FF2B5EF4-FFF2-40B4-BE49-F238E27FC236}">
+                  <a16:creationId xmlns:a16="http://schemas.microsoft.com/office/drawing/2014/main" id="{64CE8D20-E1BA-B6D3-57CD-0644480E9B72}"/>
+                </a:ext>
+              </a:extLst>
+            </p:cNvPr>
+            <p:cNvPicPr>
+              <a:picLocks noChangeAspect="1"/>
+            </p:cNvPicPr>
+            <p:nvPr/>
+          </p:nvPicPr>
+          <p:blipFill rotWithShape="1">
+            <a:blip r:embed="rId2"/>
+            <a:srcRect l="80365" t="13936"/>
+            <a:stretch/>
+          </p:blipFill>
+          <p:spPr>
+            <a:xfrm>
+              <a:off x="1876323" y="3236976"/>
+              <a:ext cx="654924" cy="874566"/>
+            </a:xfrm>
+            <a:prstGeom prst="rect">
+              <a:avLst/>
+            </a:prstGeom>
+          </p:spPr>
+        </p:pic>
+      </p:grpSp>
       <p:sp>
         <p:nvSpPr>
           <p:cNvPr id="2" name="Title 1">
@@ -3860,17 +3971,17 @@
           <a:p>
             <a:r>
               <a:rPr lang="en-US" dirty="0"/>
-              <a:t>Differential Gene Expression Analysis</a:t>
+              <a:t>Differential Gene Expression Analysis: Naïve 1</a:t>
             </a:r>
           </a:p>
         </p:txBody>
       </p:sp>
       <p:sp>
         <p:nvSpPr>
-          <p:cNvPr id="3" name="TextBox 2">
-            <a:extLst>
-              <a:ext uri="{FF2B5EF4-FFF2-40B4-BE49-F238E27FC236}">
-                <a16:creationId xmlns:a16="http://schemas.microsoft.com/office/drawing/2014/main" id="{02FCCC1F-E135-0926-EFE7-F51FE0663BA5}"/>
+          <p:cNvPr id="5" name="TextBox 4">
+            <a:extLst>
+              <a:ext uri="{FF2B5EF4-FFF2-40B4-BE49-F238E27FC236}">
+                <a16:creationId xmlns:a16="http://schemas.microsoft.com/office/drawing/2014/main" id="{6F82BFE8-5A21-5AC5-E19E-6908D588F08C}"/>
               </a:ext>
             </a:extLst>
           </p:cNvPr>
@@ -3879,8 +3990,8 @@
         </p:nvSpPr>
         <p:spPr>
           <a:xfrm>
-            <a:off x="3962400" y="694577"/>
-            <a:ext cx="7191375" cy="584775"/>
+            <a:off x="3430557" y="5652633"/>
+            <a:ext cx="2665443" cy="938719"/>
           </a:xfrm>
           <a:prstGeom prst="rect">
             <a:avLst/>
@@ -3888,32 +3999,361 @@
           <a:noFill/>
         </p:spPr>
         <p:txBody>
-          <a:bodyPr wrap="square" rtlCol="0">
+          <a:bodyPr wrap="square">
             <a:spAutoFit/>
           </a:bodyPr>
           <a:lstStyle/>
           <a:p>
             <a:r>
-              <a:rPr lang="en-US" sz="1600" dirty="0"/>
-              <a:t>No official statistical method to find DGE across conditions.</a:t>
-            </a:r>
-          </a:p>
-          <a:p>
-            <a:r>
-              <a:rPr lang="en-US" sz="1600" b="1" dirty="0"/>
-              <a:t>Option 2</a:t>
-            </a:r>
-            <a:r>
-              <a:rPr lang="en-US" sz="1600" dirty="0"/>
-              <a:t>: Qualitative Visualization</a:t>
-            </a:r>
+              <a:rPr lang="en-US" sz="1100" b="1" i="0" dirty="0">
+                <a:solidFill>
+                  <a:srgbClr val="2C3E50"/>
+                </a:solidFill>
+                <a:effectLst/>
+                <a:latin typeface="Lato" panose="020F0502020204030203" pitchFamily="34" charset="0"/>
+              </a:rPr>
+              <a:t>Caution</a:t>
+            </a:r>
+            <a:r>
+              <a:rPr lang="en-US" sz="1100" b="0" i="0" dirty="0">
+                <a:solidFill>
+                  <a:srgbClr val="2C3E50"/>
+                </a:solidFill>
+                <a:effectLst/>
+                <a:latin typeface="Lato" panose="020F0502020204030203" pitchFamily="34" charset="0"/>
+              </a:rPr>
+              <a:t>: This </a:t>
+            </a:r>
+            <a:r>
+              <a:rPr lang="en-US" sz="1100" dirty="0">
+                <a:solidFill>
+                  <a:srgbClr val="2C3E50"/>
+                </a:solidFill>
+                <a:latin typeface="Lato" panose="020F0502020204030203" pitchFamily="34" charset="0"/>
+              </a:rPr>
+              <a:t>t</a:t>
+            </a:r>
+            <a:r>
+              <a:rPr lang="en-US" sz="1100" b="0" i="0" dirty="0">
+                <a:solidFill>
+                  <a:srgbClr val="2C3E50"/>
+                </a:solidFill>
+                <a:effectLst/>
+                <a:latin typeface="Lato" panose="020F0502020204030203" pitchFamily="34" charset="0"/>
+              </a:rPr>
+              <a:t>est treats each cell as an </a:t>
+            </a:r>
+            <a:r>
+              <a:rPr lang="en-US" sz="1100" b="1" i="0" dirty="0">
+                <a:solidFill>
+                  <a:srgbClr val="FF0000"/>
+                </a:solidFill>
+                <a:effectLst/>
+                <a:latin typeface="Lato" panose="020F0502020204030203" pitchFamily="34" charset="0"/>
+              </a:rPr>
+              <a:t>independent replicate</a:t>
+            </a:r>
+            <a:r>
+              <a:rPr lang="en-US" sz="1100" b="0" i="0" dirty="0">
+                <a:solidFill>
+                  <a:srgbClr val="FF0000"/>
+                </a:solidFill>
+                <a:effectLst/>
+                <a:latin typeface="Lato" panose="020F0502020204030203" pitchFamily="34" charset="0"/>
+              </a:rPr>
+              <a:t> </a:t>
+            </a:r>
+            <a:r>
+              <a:rPr lang="en-US" sz="1100" b="0" i="0" dirty="0">
+                <a:solidFill>
+                  <a:srgbClr val="2C3E50"/>
+                </a:solidFill>
+                <a:effectLst/>
+                <a:latin typeface="Lato" panose="020F0502020204030203" pitchFamily="34" charset="0"/>
+              </a:rPr>
+              <a:t>and </a:t>
+            </a:r>
+            <a:r>
+              <a:rPr lang="en-US" sz="1100" b="1" i="0" dirty="0">
+                <a:solidFill>
+                  <a:srgbClr val="FF0000"/>
+                </a:solidFill>
+                <a:effectLst/>
+                <a:latin typeface="Lato" panose="020F0502020204030203" pitchFamily="34" charset="0"/>
+              </a:rPr>
+              <a:t>ignores inherent correlations</a:t>
+            </a:r>
+            <a:r>
+              <a:rPr lang="en-US" sz="1100" b="0" i="0" dirty="0">
+                <a:solidFill>
+                  <a:srgbClr val="2C3E50"/>
+                </a:solidFill>
+                <a:effectLst/>
+                <a:latin typeface="Lato" panose="020F0502020204030203" pitchFamily="34" charset="0"/>
+              </a:rPr>
+              <a:t> between cells originating from the same sample</a:t>
+            </a:r>
+            <a:r>
+              <a:rPr lang="en-US" sz="1100" dirty="0">
+                <a:solidFill>
+                  <a:srgbClr val="2C3E50"/>
+                </a:solidFill>
+                <a:latin typeface="Lato" panose="020F0502020204030203" pitchFamily="34" charset="0"/>
+              </a:rPr>
+              <a:t> (false positives).</a:t>
+            </a:r>
+            <a:endParaRPr lang="en-US" sz="1100" dirty="0"/>
           </a:p>
         </p:txBody>
       </p:sp>
+      <p:pic>
+        <p:nvPicPr>
+          <p:cNvPr id="6" name="Picture 5">
+            <a:extLst>
+              <a:ext uri="{FF2B5EF4-FFF2-40B4-BE49-F238E27FC236}">
+                <a16:creationId xmlns:a16="http://schemas.microsoft.com/office/drawing/2014/main" id="{791351A1-660D-6C11-B0E7-702ABE9C2B19}"/>
+              </a:ext>
+            </a:extLst>
+          </p:cNvPr>
+          <p:cNvPicPr>
+            <a:picLocks noChangeAspect="1"/>
+          </p:cNvPicPr>
+          <p:nvPr/>
+        </p:nvPicPr>
+        <p:blipFill>
+          <a:blip r:embed="rId3"/>
+          <a:stretch>
+            <a:fillRect/>
+          </a:stretch>
+        </p:blipFill>
+        <p:spPr>
+          <a:xfrm>
+            <a:off x="3251262" y="665373"/>
+            <a:ext cx="6154009" cy="2238687"/>
+          </a:xfrm>
+          <a:prstGeom prst="rect">
+            <a:avLst/>
+          </a:prstGeom>
+        </p:spPr>
+      </p:pic>
+      <p:pic>
+        <p:nvPicPr>
+          <p:cNvPr id="10" name="Picture 9">
+            <a:extLst>
+              <a:ext uri="{FF2B5EF4-FFF2-40B4-BE49-F238E27FC236}">
+                <a16:creationId xmlns:a16="http://schemas.microsoft.com/office/drawing/2014/main" id="{52D5A4B8-46F1-FCB9-D9D5-0EC085AEF2F3}"/>
+              </a:ext>
+            </a:extLst>
+          </p:cNvPr>
+          <p:cNvPicPr>
+            <a:picLocks noChangeAspect="1"/>
+          </p:cNvPicPr>
+          <p:nvPr/>
+        </p:nvPicPr>
+        <p:blipFill>
+          <a:blip r:embed="rId4"/>
+          <a:stretch>
+            <a:fillRect/>
+          </a:stretch>
+        </p:blipFill>
+        <p:spPr>
+          <a:xfrm>
+            <a:off x="6639534" y="2916904"/>
+            <a:ext cx="5531475" cy="3941096"/>
+          </a:xfrm>
+          <a:prstGeom prst="rect">
+            <a:avLst/>
+          </a:prstGeom>
+        </p:spPr>
+      </p:pic>
     </p:spTree>
     <p:extLst>
       <p:ext uri="{BB962C8B-B14F-4D97-AF65-F5344CB8AC3E}">
         <p14:creationId xmlns:p14="http://schemas.microsoft.com/office/powerpoint/2010/main" val="4178376172"/>
+      </p:ext>
+    </p:extLst>
+  </p:cSld>
+  <p:clrMapOvr>
+    <a:masterClrMapping/>
+  </p:clrMapOvr>
+</p:sld>
+</file>
+
+<file path=ppt/slides/slide5.xml><?xml version="1.0" encoding="utf-8"?>
+<p:sld xmlns:a="http://schemas.openxmlformats.org/drawingml/2006/main" xmlns:r="http://schemas.openxmlformats.org/officeDocument/2006/relationships" xmlns:p="http://schemas.openxmlformats.org/presentationml/2006/main">
+  <p:cSld>
+    <p:spTree>
+      <p:nvGrpSpPr>
+        <p:cNvPr id="1" name=""/>
+        <p:cNvGrpSpPr/>
+        <p:nvPr/>
+      </p:nvGrpSpPr>
+      <p:grpSpPr>
+        <a:xfrm>
+          <a:off x="0" y="0"/>
+          <a:ext cx="0" cy="0"/>
+          <a:chOff x="0" y="0"/>
+          <a:chExt cx="0" cy="0"/>
+        </a:xfrm>
+      </p:grpSpPr>
+      <p:sp>
+        <p:nvSpPr>
+          <p:cNvPr id="2" name="Title 1">
+            <a:extLst>
+              <a:ext uri="{FF2B5EF4-FFF2-40B4-BE49-F238E27FC236}">
+                <a16:creationId xmlns:a16="http://schemas.microsoft.com/office/drawing/2014/main" id="{B9029C10-9787-A161-989E-4C635B029311}"/>
+              </a:ext>
+            </a:extLst>
+          </p:cNvPr>
+          <p:cNvSpPr>
+            <a:spLocks noGrp="1"/>
+          </p:cNvSpPr>
+          <p:nvPr>
+            <p:ph type="title"/>
+          </p:nvPr>
+        </p:nvSpPr>
+        <p:spPr/>
+        <p:txBody>
+          <a:bodyPr/>
+          <a:lstStyle/>
+          <a:p>
+            <a:r>
+              <a:rPr lang="en-US" dirty="0"/>
+              <a:t>Differential Gene Expression Analysis: </a:t>
+            </a:r>
+            <a:r>
+              <a:rPr lang="en-US"/>
+              <a:t>Pseudobulk</a:t>
+            </a:r>
+            <a:endParaRPr lang="en-US" dirty="0"/>
+          </a:p>
+        </p:txBody>
+      </p:sp>
+      <p:sp>
+        <p:nvSpPr>
+          <p:cNvPr id="8" name="TextBox 7">
+            <a:extLst>
+              <a:ext uri="{FF2B5EF4-FFF2-40B4-BE49-F238E27FC236}">
+                <a16:creationId xmlns:a16="http://schemas.microsoft.com/office/drawing/2014/main" id="{16EA22E4-AAE9-2CEE-8127-CAF196DC5D3B}"/>
+              </a:ext>
+            </a:extLst>
+          </p:cNvPr>
+          <p:cNvSpPr txBox="1"/>
+          <p:nvPr/>
+        </p:nvSpPr>
+        <p:spPr>
+          <a:xfrm>
+            <a:off x="3804084" y="5579158"/>
+            <a:ext cx="7671629" cy="923330"/>
+          </a:xfrm>
+          <a:prstGeom prst="rect">
+            <a:avLst/>
+          </a:prstGeom>
+          <a:noFill/>
+        </p:spPr>
+        <p:txBody>
+          <a:bodyPr wrap="square">
+            <a:spAutoFit/>
+          </a:bodyPr>
+          <a:lstStyle/>
+          <a:p>
+            <a:r>
+              <a:rPr lang="en-US" b="1" dirty="0" err="1"/>
+              <a:t>Pseudobulk</a:t>
+            </a:r>
+            <a:r>
+              <a:rPr lang="en-US" dirty="0"/>
+              <a:t>: gene expression aggregated per sample and cell type. </a:t>
+            </a:r>
+          </a:p>
+          <a:p>
+            <a:r>
+              <a:rPr lang="en-US" dirty="0"/>
+              <a:t>independent observations = </a:t>
+            </a:r>
+            <a:r>
+              <a:rPr lang="en-US" b="1" dirty="0"/>
+              <a:t>samples</a:t>
+            </a:r>
+            <a:r>
+              <a:rPr lang="en-US" dirty="0"/>
+              <a:t>, rather than the </a:t>
+            </a:r>
+            <a:r>
+              <a:rPr lang="en-US" i="1" dirty="0"/>
+              <a:t>individual cells </a:t>
+            </a:r>
+            <a:r>
+              <a:rPr lang="en-US" dirty="0"/>
+              <a:t>(therefore accounts for within-sample correlation).</a:t>
+            </a:r>
+          </a:p>
+        </p:txBody>
+      </p:sp>
+      <p:pic>
+        <p:nvPicPr>
+          <p:cNvPr id="6" name="Picture 5">
+            <a:extLst>
+              <a:ext uri="{FF2B5EF4-FFF2-40B4-BE49-F238E27FC236}">
+                <a16:creationId xmlns:a16="http://schemas.microsoft.com/office/drawing/2014/main" id="{85580228-524C-D981-EB68-FAD8BACF4D10}"/>
+              </a:ext>
+            </a:extLst>
+          </p:cNvPr>
+          <p:cNvPicPr>
+            <a:picLocks noChangeAspect="1"/>
+          </p:cNvPicPr>
+          <p:nvPr/>
+        </p:nvPicPr>
+        <p:blipFill>
+          <a:blip r:embed="rId2"/>
+          <a:stretch>
+            <a:fillRect/>
+          </a:stretch>
+        </p:blipFill>
+        <p:spPr>
+          <a:xfrm>
+            <a:off x="3604059" y="731452"/>
+            <a:ext cx="6144482" cy="3705742"/>
+          </a:xfrm>
+          <a:prstGeom prst="rect">
+            <a:avLst/>
+          </a:prstGeom>
+        </p:spPr>
+      </p:pic>
+      <p:pic>
+        <p:nvPicPr>
+          <p:cNvPr id="4" name="Picture 3">
+            <a:extLst>
+              <a:ext uri="{FF2B5EF4-FFF2-40B4-BE49-F238E27FC236}">
+                <a16:creationId xmlns:a16="http://schemas.microsoft.com/office/drawing/2014/main" id="{937188EB-39D5-8C4D-AEB8-CD3B34439492}"/>
+              </a:ext>
+            </a:extLst>
+          </p:cNvPr>
+          <p:cNvPicPr>
+            <a:picLocks noChangeAspect="1"/>
+          </p:cNvPicPr>
+          <p:nvPr/>
+        </p:nvPicPr>
+        <p:blipFill>
+          <a:blip r:embed="rId3"/>
+          <a:stretch>
+            <a:fillRect/>
+          </a:stretch>
+        </p:blipFill>
+        <p:spPr>
+          <a:xfrm>
+            <a:off x="8801518" y="4020014"/>
+            <a:ext cx="3304757" cy="1462150"/>
+          </a:xfrm>
+          <a:prstGeom prst="rect">
+            <a:avLst/>
+          </a:prstGeom>
+        </p:spPr>
+      </p:pic>
+    </p:spTree>
+    <p:extLst>
+      <p:ext uri="{BB962C8B-B14F-4D97-AF65-F5344CB8AC3E}">
+        <p14:creationId xmlns:p14="http://schemas.microsoft.com/office/powerpoint/2010/main" val="1762789551"/>
       </p:ext>
     </p:extLst>
   </p:cSld>

</xml_diff>

<commit_message>
Finished differential pseudobulk code and slides.
</commit_message>
<xml_diff>
--- a/M5_Seurat_DGE_and_Exploratory/M5_Seurat_DGE_Exploratory.pptx
+++ b/M5_Seurat_DGE_and_Exploratory/M5_Seurat_DGE_Exploratory.pptx
@@ -5,14 +5,17 @@
     <p:sldMasterId id="2147483656" r:id="rId1"/>
   </p:sldMasterIdLst>
   <p:notesMasterIdLst>
-    <p:notesMasterId r:id="rId7"/>
+    <p:notesMasterId r:id="rId10"/>
   </p:notesMasterIdLst>
   <p:sldIdLst>
     <p:sldId id="256" r:id="rId2"/>
-    <p:sldId id="261" r:id="rId3"/>
-    <p:sldId id="262" r:id="rId4"/>
-    <p:sldId id="263" r:id="rId5"/>
-    <p:sldId id="264" r:id="rId6"/>
+    <p:sldId id="267" r:id="rId3"/>
+    <p:sldId id="261" r:id="rId4"/>
+    <p:sldId id="262" r:id="rId5"/>
+    <p:sldId id="263" r:id="rId6"/>
+    <p:sldId id="264" r:id="rId7"/>
+    <p:sldId id="266" r:id="rId8"/>
+    <p:sldId id="265" r:id="rId9"/>
   </p:sldIdLst>
   <p:sldSz cx="12192000" cy="6858000"/>
   <p:notesSz cx="6858000" cy="9144000"/>
@@ -201,7 +204,7 @@
           <a:p>
             <a:fld id="{FF40CFF0-3E11-4AF6-9747-7919C58FBC48}" type="datetimeFigureOut">
               <a:rPr lang="en-US" smtClean="0"/>
-              <a:t>3/4/2024</a:t>
+              <a:t>3/5/2024</a:t>
             </a:fld>
             <a:endParaRPr lang="en-US"/>
           </a:p>
@@ -473,6 +476,129 @@
   <p:cSld>
     <p:spTree>
       <p:nvGrpSpPr>
+        <p:cNvPr id="1" name="">
+          <a:extLst>
+            <a:ext uri="{FF2B5EF4-FFF2-40B4-BE49-F238E27FC236}">
+              <a16:creationId xmlns:a16="http://schemas.microsoft.com/office/drawing/2014/main" id="{47873F71-3FD8-654D-84BC-400E2B3D8D8A}"/>
+            </a:ext>
+          </a:extLst>
+        </p:cNvPr>
+        <p:cNvGrpSpPr/>
+        <p:nvPr/>
+      </p:nvGrpSpPr>
+      <p:grpSpPr>
+        <a:xfrm>
+          <a:off x="0" y="0"/>
+          <a:ext cx="0" cy="0"/>
+          <a:chOff x="0" y="0"/>
+          <a:chExt cx="0" cy="0"/>
+        </a:xfrm>
+      </p:grpSpPr>
+      <p:sp>
+        <p:nvSpPr>
+          <p:cNvPr id="2" name="Slide Image Placeholder 1">
+            <a:extLst>
+              <a:ext uri="{FF2B5EF4-FFF2-40B4-BE49-F238E27FC236}">
+                <a16:creationId xmlns:a16="http://schemas.microsoft.com/office/drawing/2014/main" id="{0F797249-0521-97FF-F0E8-B7E67BAA3371}"/>
+              </a:ext>
+            </a:extLst>
+          </p:cNvPr>
+          <p:cNvSpPr>
+            <a:spLocks noGrp="1" noRot="1" noChangeAspect="1"/>
+          </p:cNvSpPr>
+          <p:nvPr>
+            <p:ph type="sldImg"/>
+          </p:nvPr>
+        </p:nvSpPr>
+        <p:spPr/>
+      </p:sp>
+      <p:sp>
+        <p:nvSpPr>
+          <p:cNvPr id="3" name="Notes Placeholder 2">
+            <a:extLst>
+              <a:ext uri="{FF2B5EF4-FFF2-40B4-BE49-F238E27FC236}">
+                <a16:creationId xmlns:a16="http://schemas.microsoft.com/office/drawing/2014/main" id="{03FF7138-4A8D-CF89-9DC8-680895757EA3}"/>
+              </a:ext>
+            </a:extLst>
+          </p:cNvPr>
+          <p:cNvSpPr>
+            <a:spLocks noGrp="1"/>
+          </p:cNvSpPr>
+          <p:nvPr>
+            <p:ph type="body" idx="1"/>
+          </p:nvPr>
+        </p:nvSpPr>
+        <p:spPr/>
+        <p:txBody>
+          <a:bodyPr/>
+          <a:lstStyle/>
+          <a:p>
+            <a:endParaRPr lang="en-US" dirty="0"/>
+          </a:p>
+          <a:p>
+            <a:endParaRPr lang="en-US" dirty="0"/>
+          </a:p>
+          <a:p>
+            <a:endParaRPr lang="en-US" dirty="0"/>
+          </a:p>
+          <a:p>
+            <a:endParaRPr lang="en-US" dirty="0"/>
+          </a:p>
+          <a:p>
+            <a:r>
+              <a:rPr lang="en-US" dirty="0"/>
+              <a:t>https://www.dreamstime.com/stock-illustration-dna-vector-illustration-human-structure-image49975743</a:t>
+            </a:r>
+          </a:p>
+        </p:txBody>
+      </p:sp>
+      <p:sp>
+        <p:nvSpPr>
+          <p:cNvPr id="4" name="Slide Number Placeholder 3">
+            <a:extLst>
+              <a:ext uri="{FF2B5EF4-FFF2-40B4-BE49-F238E27FC236}">
+                <a16:creationId xmlns:a16="http://schemas.microsoft.com/office/drawing/2014/main" id="{CDA1F3B0-682E-E98A-6A66-2AB1193A5312}"/>
+              </a:ext>
+            </a:extLst>
+          </p:cNvPr>
+          <p:cNvSpPr>
+            <a:spLocks noGrp="1"/>
+          </p:cNvSpPr>
+          <p:nvPr>
+            <p:ph type="sldNum" sz="quarter" idx="5"/>
+          </p:nvPr>
+        </p:nvSpPr>
+        <p:spPr/>
+        <p:txBody>
+          <a:bodyPr/>
+          <a:lstStyle/>
+          <a:p>
+            <a:fld id="{121E9C32-9AD5-4F50-8DB4-01491388DC2B}" type="slidenum">
+              <a:rPr lang="en-US" smtClean="0"/>
+              <a:t>2</a:t>
+            </a:fld>
+            <a:endParaRPr lang="en-US"/>
+          </a:p>
+        </p:txBody>
+      </p:sp>
+    </p:spTree>
+    <p:extLst>
+      <p:ext uri="{BB962C8B-B14F-4D97-AF65-F5344CB8AC3E}">
+        <p14:creationId xmlns:p14="http://schemas.microsoft.com/office/powerpoint/2010/main" val="3359084998"/>
+      </p:ext>
+    </p:extLst>
+  </p:cSld>
+  <p:clrMapOvr>
+    <a:masterClrMapping/>
+  </p:clrMapOvr>
+</p:notes>
+</file>
+
+<file path=ppt/notesSlides/notesSlide2.xml><?xml version="1.0" encoding="utf-8"?>
+<p:notes xmlns:a="http://schemas.openxmlformats.org/drawingml/2006/main" xmlns:r="http://schemas.openxmlformats.org/officeDocument/2006/relationships" xmlns:p="http://schemas.openxmlformats.org/presentationml/2006/main">
+  <p:cSld>
+    <p:spTree>
+      <p:nvGrpSpPr>
         <p:cNvPr id="1" name=""/>
         <p:cNvGrpSpPr/>
         <p:nvPr/>
@@ -548,7 +674,7 @@
           <a:p>
             <a:fld id="{121E9C32-9AD5-4F50-8DB4-01491388DC2B}" type="slidenum">
               <a:rPr lang="en-US" smtClean="0"/>
-              <a:t>2</a:t>
+              <a:t>3</a:t>
             </a:fld>
             <a:endParaRPr lang="en-US"/>
           </a:p>
@@ -724,7 +850,7 @@
           <a:p>
             <a:fld id="{9F69634C-F75C-45F7-A87A-C5E2AF3ECA41}" type="datetimeFigureOut">
               <a:rPr lang="en-US" smtClean="0"/>
-              <a:t>3/4/2024</a:t>
+              <a:t>3/5/2024</a:t>
             </a:fld>
             <a:endParaRPr lang="en-US"/>
           </a:p>
@@ -889,7 +1015,7 @@
           <a:p>
             <a:fld id="{9F69634C-F75C-45F7-A87A-C5E2AF3ECA41}" type="datetimeFigureOut">
               <a:rPr lang="en-US" smtClean="0"/>
-              <a:t>3/4/2024</a:t>
+              <a:t>3/5/2024</a:t>
             </a:fld>
             <a:endParaRPr lang="en-US"/>
           </a:p>
@@ -968,6 +1094,1256 @@
 </file>
 
 <file path=ppt/slideLayouts/slideLayout3.xml><?xml version="1.0" encoding="utf-8"?>
+<p:sldLayout xmlns:a="http://schemas.openxmlformats.org/drawingml/2006/main" xmlns:r="http://schemas.openxmlformats.org/officeDocument/2006/relationships" xmlns:p="http://schemas.openxmlformats.org/presentationml/2006/main" type="titleOnly" preserve="1">
+  <p:cSld name="1_Title Only">
+    <p:spTree>
+      <p:nvGrpSpPr>
+        <p:cNvPr id="1" name=""/>
+        <p:cNvGrpSpPr/>
+        <p:nvPr/>
+      </p:nvGrpSpPr>
+      <p:grpSpPr>
+        <a:xfrm>
+          <a:off x="0" y="0"/>
+          <a:ext cx="0" cy="0"/>
+          <a:chOff x="0" y="0"/>
+          <a:chExt cx="0" cy="0"/>
+        </a:xfrm>
+      </p:grpSpPr>
+      <p:sp>
+        <p:nvSpPr>
+          <p:cNvPr id="2" name="Title 1">
+            <a:extLst>
+              <a:ext uri="{FF2B5EF4-FFF2-40B4-BE49-F238E27FC236}">
+                <a16:creationId xmlns:a16="http://schemas.microsoft.com/office/drawing/2014/main" id="{BD9F4D80-0A90-4E53-A15F-BEE0809AFF99}"/>
+              </a:ext>
+            </a:extLst>
+          </p:cNvPr>
+          <p:cNvSpPr>
+            <a:spLocks noGrp="1"/>
+          </p:cNvSpPr>
+          <p:nvPr>
+            <p:ph type="title"/>
+          </p:nvPr>
+        </p:nvSpPr>
+        <p:spPr>
+          <a:xfrm>
+            <a:off x="0" y="0"/>
+            <a:ext cx="12192000" cy="629173"/>
+          </a:xfrm>
+          <a:solidFill>
+            <a:srgbClr val="A50021"/>
+          </a:solidFill>
+        </p:spPr>
+        <p:txBody>
+          <a:bodyPr>
+            <a:normAutofit/>
+          </a:bodyPr>
+          <a:lstStyle>
+            <a:lvl1pPr>
+              <a:defRPr sz="3600">
+                <a:solidFill>
+                  <a:schemeClr val="bg1"/>
+                </a:solidFill>
+              </a:defRPr>
+            </a:lvl1pPr>
+          </a:lstStyle>
+          <a:p>
+            <a:r>
+              <a:rPr lang="en-US"/>
+              <a:t>Click to edit Master title style</a:t>
+            </a:r>
+            <a:endParaRPr lang="en-US" dirty="0"/>
+          </a:p>
+        </p:txBody>
+      </p:sp>
+      <p:sp>
+        <p:nvSpPr>
+          <p:cNvPr id="3" name="Date Placeholder 2">
+            <a:extLst>
+              <a:ext uri="{FF2B5EF4-FFF2-40B4-BE49-F238E27FC236}">
+                <a16:creationId xmlns:a16="http://schemas.microsoft.com/office/drawing/2014/main" id="{C91A227F-3F03-F1D8-30CC-FF2A86391070}"/>
+              </a:ext>
+            </a:extLst>
+          </p:cNvPr>
+          <p:cNvSpPr>
+            <a:spLocks noGrp="1"/>
+          </p:cNvSpPr>
+          <p:nvPr>
+            <p:ph type="dt" sz="half" idx="10"/>
+          </p:nvPr>
+        </p:nvSpPr>
+        <p:spPr/>
+        <p:txBody>
+          <a:bodyPr/>
+          <a:lstStyle/>
+          <a:p>
+            <a:fld id="{9F69634C-F75C-45F7-A87A-C5E2AF3ECA41}" type="datetimeFigureOut">
+              <a:rPr lang="en-US" smtClean="0"/>
+              <a:t>3/5/2024</a:t>
+            </a:fld>
+            <a:endParaRPr lang="en-US"/>
+          </a:p>
+        </p:txBody>
+      </p:sp>
+      <p:sp>
+        <p:nvSpPr>
+          <p:cNvPr id="4" name="Footer Placeholder 3">
+            <a:extLst>
+              <a:ext uri="{FF2B5EF4-FFF2-40B4-BE49-F238E27FC236}">
+                <a16:creationId xmlns:a16="http://schemas.microsoft.com/office/drawing/2014/main" id="{C9759D64-3DF8-C889-315D-FE22B2817527}"/>
+              </a:ext>
+            </a:extLst>
+          </p:cNvPr>
+          <p:cNvSpPr>
+            <a:spLocks noGrp="1"/>
+          </p:cNvSpPr>
+          <p:nvPr>
+            <p:ph type="ftr" sz="quarter" idx="11"/>
+          </p:nvPr>
+        </p:nvSpPr>
+        <p:spPr/>
+        <p:txBody>
+          <a:bodyPr/>
+          <a:lstStyle/>
+          <a:p>
+            <a:endParaRPr lang="en-US"/>
+          </a:p>
+        </p:txBody>
+      </p:sp>
+      <p:sp>
+        <p:nvSpPr>
+          <p:cNvPr id="5" name="Slide Number Placeholder 4">
+            <a:extLst>
+              <a:ext uri="{FF2B5EF4-FFF2-40B4-BE49-F238E27FC236}">
+                <a16:creationId xmlns:a16="http://schemas.microsoft.com/office/drawing/2014/main" id="{A71BEE87-EA54-6D9E-CF3E-4E95D81E9096}"/>
+              </a:ext>
+            </a:extLst>
+          </p:cNvPr>
+          <p:cNvSpPr>
+            <a:spLocks noGrp="1"/>
+          </p:cNvSpPr>
+          <p:nvPr>
+            <p:ph type="sldNum" sz="quarter" idx="12"/>
+          </p:nvPr>
+        </p:nvSpPr>
+        <p:spPr>
+          <a:xfrm>
+            <a:off x="7499058" y="6356350"/>
+            <a:ext cx="2743200" cy="365125"/>
+          </a:xfrm>
+        </p:spPr>
+        <p:txBody>
+          <a:bodyPr/>
+          <a:lstStyle/>
+          <a:p>
+            <a:fld id="{76816BD1-AAA5-426D-8624-AA09EE36D028}" type="slidenum">
+              <a:rPr lang="en-US" smtClean="0"/>
+              <a:t>‹#›</a:t>
+            </a:fld>
+            <a:endParaRPr lang="en-US"/>
+          </a:p>
+        </p:txBody>
+      </p:sp>
+      <p:sp>
+        <p:nvSpPr>
+          <p:cNvPr id="6" name="Arrow: Down 24">
+            <a:extLst>
+              <a:ext uri="{FF2B5EF4-FFF2-40B4-BE49-F238E27FC236}">
+                <a16:creationId xmlns:a16="http://schemas.microsoft.com/office/drawing/2014/main" id="{C171BBE9-2CC8-397D-8B0D-9538AFF6D05B}"/>
+              </a:ext>
+            </a:extLst>
+          </p:cNvPr>
+          <p:cNvSpPr/>
+          <p:nvPr userDrawn="1"/>
+        </p:nvSpPr>
+        <p:spPr>
+          <a:xfrm>
+            <a:off x="111919" y="2316460"/>
+            <a:ext cx="92306" cy="3700166"/>
+          </a:xfrm>
+          <a:custGeom>
+            <a:avLst/>
+            <a:gdLst>
+              <a:gd name="connsiteX0" fmla="*/ 0 w 284999"/>
+              <a:gd name="connsiteY0" fmla="*/ 2678255 h 2820754"/>
+              <a:gd name="connsiteX1" fmla="*/ 71250 w 284999"/>
+              <a:gd name="connsiteY1" fmla="*/ 2678255 h 2820754"/>
+              <a:gd name="connsiteX2" fmla="*/ 71250 w 284999"/>
+              <a:gd name="connsiteY2" fmla="*/ 0 h 2820754"/>
+              <a:gd name="connsiteX3" fmla="*/ 213749 w 284999"/>
+              <a:gd name="connsiteY3" fmla="*/ 0 h 2820754"/>
+              <a:gd name="connsiteX4" fmla="*/ 213749 w 284999"/>
+              <a:gd name="connsiteY4" fmla="*/ 2678255 h 2820754"/>
+              <a:gd name="connsiteX5" fmla="*/ 284999 w 284999"/>
+              <a:gd name="connsiteY5" fmla="*/ 2678255 h 2820754"/>
+              <a:gd name="connsiteX6" fmla="*/ 142500 w 284999"/>
+              <a:gd name="connsiteY6" fmla="*/ 2820754 h 2820754"/>
+              <a:gd name="connsiteX7" fmla="*/ 0 w 284999"/>
+              <a:gd name="connsiteY7" fmla="*/ 2678255 h 2820754"/>
+              <a:gd name="connsiteX0" fmla="*/ 71250 w 213749"/>
+              <a:gd name="connsiteY0" fmla="*/ 2820754 h 2820754"/>
+              <a:gd name="connsiteX1" fmla="*/ 0 w 213749"/>
+              <a:gd name="connsiteY1" fmla="*/ 2678255 h 2820754"/>
+              <a:gd name="connsiteX2" fmla="*/ 0 w 213749"/>
+              <a:gd name="connsiteY2" fmla="*/ 0 h 2820754"/>
+              <a:gd name="connsiteX3" fmla="*/ 142499 w 213749"/>
+              <a:gd name="connsiteY3" fmla="*/ 0 h 2820754"/>
+              <a:gd name="connsiteX4" fmla="*/ 142499 w 213749"/>
+              <a:gd name="connsiteY4" fmla="*/ 2678255 h 2820754"/>
+              <a:gd name="connsiteX5" fmla="*/ 213749 w 213749"/>
+              <a:gd name="connsiteY5" fmla="*/ 2678255 h 2820754"/>
+              <a:gd name="connsiteX6" fmla="*/ 71250 w 213749"/>
+              <a:gd name="connsiteY6" fmla="*/ 2820754 h 2820754"/>
+              <a:gd name="connsiteX0" fmla="*/ 213749 w 213749"/>
+              <a:gd name="connsiteY0" fmla="*/ 2678255 h 2678255"/>
+              <a:gd name="connsiteX1" fmla="*/ 0 w 213749"/>
+              <a:gd name="connsiteY1" fmla="*/ 2678255 h 2678255"/>
+              <a:gd name="connsiteX2" fmla="*/ 0 w 213749"/>
+              <a:gd name="connsiteY2" fmla="*/ 0 h 2678255"/>
+              <a:gd name="connsiteX3" fmla="*/ 142499 w 213749"/>
+              <a:gd name="connsiteY3" fmla="*/ 0 h 2678255"/>
+              <a:gd name="connsiteX4" fmla="*/ 142499 w 213749"/>
+              <a:gd name="connsiteY4" fmla="*/ 2678255 h 2678255"/>
+              <a:gd name="connsiteX5" fmla="*/ 213749 w 213749"/>
+              <a:gd name="connsiteY5" fmla="*/ 2678255 h 2678255"/>
+              <a:gd name="connsiteX0" fmla="*/ 142499 w 142499"/>
+              <a:gd name="connsiteY0" fmla="*/ 2678255 h 2678255"/>
+              <a:gd name="connsiteX1" fmla="*/ 0 w 142499"/>
+              <a:gd name="connsiteY1" fmla="*/ 2678255 h 2678255"/>
+              <a:gd name="connsiteX2" fmla="*/ 0 w 142499"/>
+              <a:gd name="connsiteY2" fmla="*/ 0 h 2678255"/>
+              <a:gd name="connsiteX3" fmla="*/ 142499 w 142499"/>
+              <a:gd name="connsiteY3" fmla="*/ 0 h 2678255"/>
+              <a:gd name="connsiteX4" fmla="*/ 142499 w 142499"/>
+              <a:gd name="connsiteY4" fmla="*/ 2678255 h 2678255"/>
+            </a:gdLst>
+            <a:ahLst/>
+            <a:cxnLst>
+              <a:cxn ang="0">
+                <a:pos x="connsiteX0" y="connsiteY0"/>
+              </a:cxn>
+              <a:cxn ang="0">
+                <a:pos x="connsiteX1" y="connsiteY1"/>
+              </a:cxn>
+              <a:cxn ang="0">
+                <a:pos x="connsiteX2" y="connsiteY2"/>
+              </a:cxn>
+              <a:cxn ang="0">
+                <a:pos x="connsiteX3" y="connsiteY3"/>
+              </a:cxn>
+              <a:cxn ang="0">
+                <a:pos x="connsiteX4" y="connsiteY4"/>
+              </a:cxn>
+            </a:cxnLst>
+            <a:rect l="l" t="t" r="r" b="b"/>
+            <a:pathLst>
+              <a:path w="142499" h="2678255">
+                <a:moveTo>
+                  <a:pt x="142499" y="2678255"/>
+                </a:moveTo>
+                <a:lnTo>
+                  <a:pt x="0" y="2678255"/>
+                </a:lnTo>
+                <a:lnTo>
+                  <a:pt x="0" y="0"/>
+                </a:lnTo>
+                <a:lnTo>
+                  <a:pt x="142499" y="0"/>
+                </a:lnTo>
+                <a:lnTo>
+                  <a:pt x="142499" y="2678255"/>
+                </a:lnTo>
+                <a:close/>
+              </a:path>
+            </a:pathLst>
+          </a:custGeom>
+          <a:solidFill>
+            <a:schemeClr val="bg1">
+              <a:lumMod val="85000"/>
+            </a:schemeClr>
+          </a:solidFill>
+          <a:ln>
+            <a:noFill/>
+          </a:ln>
+        </p:spPr>
+        <p:style>
+          <a:lnRef idx="2">
+            <a:schemeClr val="accent1">
+              <a:shade val="15000"/>
+            </a:schemeClr>
+          </a:lnRef>
+          <a:fillRef idx="1">
+            <a:schemeClr val="accent1"/>
+          </a:fillRef>
+          <a:effectRef idx="0">
+            <a:schemeClr val="accent1"/>
+          </a:effectRef>
+          <a:fontRef idx="minor">
+            <a:schemeClr val="lt1"/>
+          </a:fontRef>
+        </p:style>
+        <p:txBody>
+          <a:bodyPr rtlCol="0" anchor="ctr"/>
+          <a:lstStyle/>
+          <a:p>
+            <a:pPr algn="ctr"/>
+            <a:endParaRPr lang="en-US" dirty="0"/>
+          </a:p>
+        </p:txBody>
+      </p:sp>
+      <p:grpSp>
+        <p:nvGrpSpPr>
+          <p:cNvPr id="7" name="Group 6">
+            <a:extLst>
+              <a:ext uri="{FF2B5EF4-FFF2-40B4-BE49-F238E27FC236}">
+                <a16:creationId xmlns:a16="http://schemas.microsoft.com/office/drawing/2014/main" id="{7013F435-230C-E707-C2F4-C444627EE8B3}"/>
+              </a:ext>
+            </a:extLst>
+          </p:cNvPr>
+          <p:cNvGrpSpPr/>
+          <p:nvPr userDrawn="1"/>
+        </p:nvGrpSpPr>
+        <p:grpSpPr>
+          <a:xfrm>
+            <a:off x="374443" y="4672323"/>
+            <a:ext cx="1377642" cy="646331"/>
+            <a:chOff x="533013" y="5497497"/>
+            <a:chExt cx="1377642" cy="646331"/>
+          </a:xfrm>
+        </p:grpSpPr>
+        <p:sp>
+          <p:nvSpPr>
+            <p:cNvPr id="8" name="TextBox 7">
+              <a:extLst>
+                <a:ext uri="{FF2B5EF4-FFF2-40B4-BE49-F238E27FC236}">
+                  <a16:creationId xmlns:a16="http://schemas.microsoft.com/office/drawing/2014/main" id="{869D5E7C-1ED8-B83A-C761-C1BC0C7925DD}"/>
+                </a:ext>
+              </a:extLst>
+            </p:cNvPr>
+            <p:cNvSpPr txBox="1"/>
+            <p:nvPr/>
+          </p:nvSpPr>
+          <p:spPr>
+            <a:xfrm>
+              <a:off x="600503" y="5497497"/>
+              <a:ext cx="1234312" cy="646331"/>
+            </a:xfrm>
+            <a:prstGeom prst="rect">
+              <a:avLst/>
+            </a:prstGeom>
+            <a:noFill/>
+          </p:spPr>
+          <p:txBody>
+            <a:bodyPr wrap="none" rtlCol="0">
+              <a:spAutoFit/>
+            </a:bodyPr>
+            <a:lstStyle/>
+            <a:p>
+              <a:pPr algn="ctr"/>
+              <a:r>
+                <a:rPr lang="en-US" dirty="0"/>
+                <a:t>Differential</a:t>
+              </a:r>
+            </a:p>
+            <a:p>
+              <a:pPr algn="ctr"/>
+              <a:r>
+                <a:rPr lang="en-US" dirty="0"/>
+                <a:t>Markers</a:t>
+              </a:r>
+            </a:p>
+          </p:txBody>
+        </p:sp>
+        <p:sp>
+          <p:nvSpPr>
+            <p:cNvPr id="9" name="Rectangle 8">
+              <a:extLst>
+                <a:ext uri="{FF2B5EF4-FFF2-40B4-BE49-F238E27FC236}">
+                  <a16:creationId xmlns:a16="http://schemas.microsoft.com/office/drawing/2014/main" id="{4062A80E-D93B-994D-7473-2CAD8F3D9F2C}"/>
+                </a:ext>
+              </a:extLst>
+            </p:cNvPr>
+            <p:cNvSpPr/>
+            <p:nvPr/>
+          </p:nvSpPr>
+          <p:spPr>
+            <a:xfrm>
+              <a:off x="533013" y="5511800"/>
+              <a:ext cx="1377642" cy="609600"/>
+            </a:xfrm>
+            <a:prstGeom prst="rect">
+              <a:avLst/>
+            </a:prstGeom>
+            <a:noFill/>
+            <a:ln>
+              <a:solidFill>
+                <a:schemeClr val="tx1"/>
+              </a:solidFill>
+            </a:ln>
+          </p:spPr>
+          <p:style>
+            <a:lnRef idx="2">
+              <a:schemeClr val="accent1">
+                <a:shade val="15000"/>
+              </a:schemeClr>
+            </a:lnRef>
+            <a:fillRef idx="1">
+              <a:schemeClr val="accent1"/>
+            </a:fillRef>
+            <a:effectRef idx="0">
+              <a:schemeClr val="accent1"/>
+            </a:effectRef>
+            <a:fontRef idx="minor">
+              <a:schemeClr val="lt1"/>
+            </a:fontRef>
+          </p:style>
+          <p:txBody>
+            <a:bodyPr rtlCol="0" anchor="ctr"/>
+            <a:lstStyle/>
+            <a:p>
+              <a:pPr algn="ctr"/>
+              <a:endParaRPr lang="en-US"/>
+            </a:p>
+          </p:txBody>
+        </p:sp>
+      </p:grpSp>
+      <p:grpSp>
+        <p:nvGrpSpPr>
+          <p:cNvPr id="10" name="Group 9">
+            <a:extLst>
+              <a:ext uri="{FF2B5EF4-FFF2-40B4-BE49-F238E27FC236}">
+                <a16:creationId xmlns:a16="http://schemas.microsoft.com/office/drawing/2014/main" id="{3079A547-A8F8-34BE-1C8B-E343510C29DF}"/>
+              </a:ext>
+            </a:extLst>
+          </p:cNvPr>
+          <p:cNvGrpSpPr/>
+          <p:nvPr userDrawn="1"/>
+        </p:nvGrpSpPr>
+        <p:grpSpPr>
+          <a:xfrm>
+            <a:off x="374443" y="3696895"/>
+            <a:ext cx="1377642" cy="646331"/>
+            <a:chOff x="533013" y="4490993"/>
+            <a:chExt cx="1377642" cy="646331"/>
+          </a:xfrm>
+        </p:grpSpPr>
+        <p:sp>
+          <p:nvSpPr>
+            <p:cNvPr id="11" name="TextBox 10">
+              <a:extLst>
+                <a:ext uri="{FF2B5EF4-FFF2-40B4-BE49-F238E27FC236}">
+                  <a16:creationId xmlns:a16="http://schemas.microsoft.com/office/drawing/2014/main" id="{7CF1EC6D-541A-4272-C352-DE1D909049BA}"/>
+                </a:ext>
+              </a:extLst>
+            </p:cNvPr>
+            <p:cNvSpPr txBox="1"/>
+            <p:nvPr/>
+          </p:nvSpPr>
+          <p:spPr>
+            <a:xfrm>
+              <a:off x="600503" y="4490993"/>
+              <a:ext cx="1234312" cy="646331"/>
+            </a:xfrm>
+            <a:prstGeom prst="rect">
+              <a:avLst/>
+            </a:prstGeom>
+            <a:noFill/>
+          </p:spPr>
+          <p:txBody>
+            <a:bodyPr wrap="square" rtlCol="0">
+              <a:spAutoFit/>
+            </a:bodyPr>
+            <a:lstStyle/>
+            <a:p>
+              <a:pPr algn="ctr"/>
+              <a:r>
+                <a:rPr lang="en-US" dirty="0"/>
+                <a:t>Conserved Markers</a:t>
+              </a:r>
+            </a:p>
+          </p:txBody>
+        </p:sp>
+        <p:sp>
+          <p:nvSpPr>
+            <p:cNvPr id="12" name="Rectangle 11">
+              <a:extLst>
+                <a:ext uri="{FF2B5EF4-FFF2-40B4-BE49-F238E27FC236}">
+                  <a16:creationId xmlns:a16="http://schemas.microsoft.com/office/drawing/2014/main" id="{42D51C37-DD6D-A674-7A9A-341F715676B8}"/>
+                </a:ext>
+              </a:extLst>
+            </p:cNvPr>
+            <p:cNvSpPr/>
+            <p:nvPr/>
+          </p:nvSpPr>
+          <p:spPr>
+            <a:xfrm>
+              <a:off x="533013" y="4498013"/>
+              <a:ext cx="1377642" cy="609600"/>
+            </a:xfrm>
+            <a:prstGeom prst="rect">
+              <a:avLst/>
+            </a:prstGeom>
+            <a:noFill/>
+            <a:ln>
+              <a:solidFill>
+                <a:schemeClr val="tx1"/>
+              </a:solidFill>
+            </a:ln>
+          </p:spPr>
+          <p:style>
+            <a:lnRef idx="2">
+              <a:schemeClr val="accent1">
+                <a:shade val="15000"/>
+              </a:schemeClr>
+            </a:lnRef>
+            <a:fillRef idx="1">
+              <a:schemeClr val="accent1"/>
+            </a:fillRef>
+            <a:effectRef idx="0">
+              <a:schemeClr val="accent1"/>
+            </a:effectRef>
+            <a:fontRef idx="minor">
+              <a:schemeClr val="lt1"/>
+            </a:fontRef>
+          </p:style>
+          <p:txBody>
+            <a:bodyPr rtlCol="0" anchor="ctr"/>
+            <a:lstStyle/>
+            <a:p>
+              <a:pPr algn="ctr"/>
+              <a:endParaRPr lang="en-US"/>
+            </a:p>
+          </p:txBody>
+        </p:sp>
+      </p:grpSp>
+      <p:grpSp>
+        <p:nvGrpSpPr>
+          <p:cNvPr id="13" name="Group 12">
+            <a:extLst>
+              <a:ext uri="{FF2B5EF4-FFF2-40B4-BE49-F238E27FC236}">
+                <a16:creationId xmlns:a16="http://schemas.microsoft.com/office/drawing/2014/main" id="{0F5EBC89-29BA-501B-E0A6-3873FAA0750D}"/>
+              </a:ext>
+            </a:extLst>
+          </p:cNvPr>
+          <p:cNvGrpSpPr/>
+          <p:nvPr userDrawn="1"/>
+        </p:nvGrpSpPr>
+        <p:grpSpPr>
+          <a:xfrm>
+            <a:off x="261180" y="2721467"/>
+            <a:ext cx="1604168" cy="646331"/>
+            <a:chOff x="415575" y="3595307"/>
+            <a:chExt cx="1604168" cy="646331"/>
+          </a:xfrm>
+        </p:grpSpPr>
+        <p:sp>
+          <p:nvSpPr>
+            <p:cNvPr id="14" name="TextBox 13">
+              <a:extLst>
+                <a:ext uri="{FF2B5EF4-FFF2-40B4-BE49-F238E27FC236}">
+                  <a16:creationId xmlns:a16="http://schemas.microsoft.com/office/drawing/2014/main" id="{D7BCD2A7-5F25-5CBB-59D5-024608C3AC3B}"/>
+                </a:ext>
+              </a:extLst>
+            </p:cNvPr>
+            <p:cNvSpPr txBox="1"/>
+            <p:nvPr/>
+          </p:nvSpPr>
+          <p:spPr>
+            <a:xfrm>
+              <a:off x="415575" y="3595307"/>
+              <a:ext cx="1604168" cy="646331"/>
+            </a:xfrm>
+            <a:prstGeom prst="rect">
+              <a:avLst/>
+            </a:prstGeom>
+            <a:noFill/>
+          </p:spPr>
+          <p:txBody>
+            <a:bodyPr wrap="square" rtlCol="0">
+              <a:spAutoFit/>
+            </a:bodyPr>
+            <a:lstStyle/>
+            <a:p>
+              <a:pPr algn="ctr"/>
+              <a:r>
+                <a:rPr lang="en-US" dirty="0"/>
+                <a:t>Single Group, Pairwise </a:t>
+              </a:r>
+            </a:p>
+          </p:txBody>
+        </p:sp>
+        <p:sp>
+          <p:nvSpPr>
+            <p:cNvPr id="15" name="Rectangle 14">
+              <a:extLst>
+                <a:ext uri="{FF2B5EF4-FFF2-40B4-BE49-F238E27FC236}">
+                  <a16:creationId xmlns:a16="http://schemas.microsoft.com/office/drawing/2014/main" id="{9AC1B210-65C6-B64F-9687-F68D663EABAC}"/>
+                </a:ext>
+              </a:extLst>
+            </p:cNvPr>
+            <p:cNvSpPr/>
+            <p:nvPr/>
+          </p:nvSpPr>
+          <p:spPr>
+            <a:xfrm>
+              <a:off x="533013" y="3595307"/>
+              <a:ext cx="1381125" cy="609600"/>
+            </a:xfrm>
+            <a:prstGeom prst="rect">
+              <a:avLst/>
+            </a:prstGeom>
+            <a:noFill/>
+            <a:ln>
+              <a:solidFill>
+                <a:schemeClr val="tx1"/>
+              </a:solidFill>
+            </a:ln>
+          </p:spPr>
+          <p:style>
+            <a:lnRef idx="2">
+              <a:schemeClr val="accent1">
+                <a:shade val="15000"/>
+              </a:schemeClr>
+            </a:lnRef>
+            <a:fillRef idx="1">
+              <a:schemeClr val="accent1"/>
+            </a:fillRef>
+            <a:effectRef idx="0">
+              <a:schemeClr val="accent1"/>
+            </a:effectRef>
+            <a:fontRef idx="minor">
+              <a:schemeClr val="lt1"/>
+            </a:fontRef>
+          </p:style>
+          <p:txBody>
+            <a:bodyPr rtlCol="0" anchor="ctr"/>
+            <a:lstStyle/>
+            <a:p>
+              <a:pPr algn="ctr"/>
+              <a:endParaRPr lang="en-US"/>
+            </a:p>
+          </p:txBody>
+        </p:sp>
+      </p:grpSp>
+      <p:grpSp>
+        <p:nvGrpSpPr>
+          <p:cNvPr id="16" name="Group 15">
+            <a:extLst>
+              <a:ext uri="{FF2B5EF4-FFF2-40B4-BE49-F238E27FC236}">
+                <a16:creationId xmlns:a16="http://schemas.microsoft.com/office/drawing/2014/main" id="{5DECC87B-605B-FFD3-0BA3-636001FA7C1E}"/>
+              </a:ext>
+            </a:extLst>
+          </p:cNvPr>
+          <p:cNvGrpSpPr/>
+          <p:nvPr userDrawn="1"/>
+        </p:nvGrpSpPr>
+        <p:grpSpPr>
+          <a:xfrm>
+            <a:off x="111919" y="1947128"/>
+            <a:ext cx="1657350" cy="369332"/>
+            <a:chOff x="210979" y="1462714"/>
+            <a:chExt cx="1624632" cy="369332"/>
+          </a:xfrm>
+        </p:grpSpPr>
+        <p:sp>
+          <p:nvSpPr>
+            <p:cNvPr id="17" name="TextBox 16">
+              <a:extLst>
+                <a:ext uri="{FF2B5EF4-FFF2-40B4-BE49-F238E27FC236}">
+                  <a16:creationId xmlns:a16="http://schemas.microsoft.com/office/drawing/2014/main" id="{65071578-5E26-6E99-DB48-3BB45A687C50}"/>
+                </a:ext>
+              </a:extLst>
+            </p:cNvPr>
+            <p:cNvSpPr txBox="1"/>
+            <p:nvPr/>
+          </p:nvSpPr>
+          <p:spPr>
+            <a:xfrm>
+              <a:off x="219010" y="1462714"/>
+              <a:ext cx="1593258" cy="369332"/>
+            </a:xfrm>
+            <a:prstGeom prst="rect">
+              <a:avLst/>
+            </a:prstGeom>
+            <a:noFill/>
+          </p:spPr>
+          <p:txBody>
+            <a:bodyPr wrap="none" rtlCol="0">
+              <a:spAutoFit/>
+            </a:bodyPr>
+            <a:lstStyle/>
+            <a:p>
+              <a:pPr algn="ctr"/>
+              <a:r>
+                <a:rPr lang="en-US" dirty="0"/>
+                <a:t>Seurat Pipeline</a:t>
+              </a:r>
+            </a:p>
+          </p:txBody>
+        </p:sp>
+        <p:sp>
+          <p:nvSpPr>
+            <p:cNvPr id="18" name="Rectangle 17">
+              <a:extLst>
+                <a:ext uri="{FF2B5EF4-FFF2-40B4-BE49-F238E27FC236}">
+                  <a16:creationId xmlns:a16="http://schemas.microsoft.com/office/drawing/2014/main" id="{C0F12E18-CED9-7CD0-204A-53324EA41C43}"/>
+                </a:ext>
+              </a:extLst>
+            </p:cNvPr>
+            <p:cNvSpPr/>
+            <p:nvPr/>
+          </p:nvSpPr>
+          <p:spPr>
+            <a:xfrm>
+              <a:off x="210979" y="1462714"/>
+              <a:ext cx="1624632" cy="369332"/>
+            </a:xfrm>
+            <a:prstGeom prst="rect">
+              <a:avLst/>
+            </a:prstGeom>
+            <a:noFill/>
+            <a:ln>
+              <a:solidFill>
+                <a:schemeClr val="tx1"/>
+              </a:solidFill>
+            </a:ln>
+          </p:spPr>
+          <p:style>
+            <a:lnRef idx="2">
+              <a:schemeClr val="accent1">
+                <a:shade val="15000"/>
+              </a:schemeClr>
+            </a:lnRef>
+            <a:fillRef idx="1">
+              <a:schemeClr val="accent1"/>
+            </a:fillRef>
+            <a:effectRef idx="0">
+              <a:schemeClr val="accent1"/>
+            </a:effectRef>
+            <a:fontRef idx="minor">
+              <a:schemeClr val="lt1"/>
+            </a:fontRef>
+          </p:style>
+          <p:txBody>
+            <a:bodyPr rtlCol="0" anchor="ctr"/>
+            <a:lstStyle/>
+            <a:p>
+              <a:pPr algn="ctr"/>
+              <a:endParaRPr lang="en-US"/>
+            </a:p>
+          </p:txBody>
+        </p:sp>
+      </p:grpSp>
+      <p:grpSp>
+        <p:nvGrpSpPr>
+          <p:cNvPr id="19" name="Group 18">
+            <a:extLst>
+              <a:ext uri="{FF2B5EF4-FFF2-40B4-BE49-F238E27FC236}">
+                <a16:creationId xmlns:a16="http://schemas.microsoft.com/office/drawing/2014/main" id="{0F1539A3-A28A-9F44-830D-73194891710D}"/>
+              </a:ext>
+            </a:extLst>
+          </p:cNvPr>
+          <p:cNvGrpSpPr/>
+          <p:nvPr userDrawn="1"/>
+        </p:nvGrpSpPr>
+        <p:grpSpPr>
+          <a:xfrm>
+            <a:off x="120112" y="889495"/>
+            <a:ext cx="1649157" cy="387698"/>
+            <a:chOff x="186787" y="841870"/>
+            <a:chExt cx="1649157" cy="387698"/>
+          </a:xfrm>
+        </p:grpSpPr>
+        <p:sp>
+          <p:nvSpPr>
+            <p:cNvPr id="20" name="TextBox 19">
+              <a:extLst>
+                <a:ext uri="{FF2B5EF4-FFF2-40B4-BE49-F238E27FC236}">
+                  <a16:creationId xmlns:a16="http://schemas.microsoft.com/office/drawing/2014/main" id="{6A82683E-DDD9-B998-0268-84218D9301BA}"/>
+                </a:ext>
+              </a:extLst>
+            </p:cNvPr>
+            <p:cNvSpPr txBox="1"/>
+            <p:nvPr/>
+          </p:nvSpPr>
+          <p:spPr>
+            <a:xfrm>
+              <a:off x="238824" y="841870"/>
+              <a:ext cx="1553631" cy="369332"/>
+            </a:xfrm>
+            <a:prstGeom prst="rect">
+              <a:avLst/>
+            </a:prstGeom>
+            <a:noFill/>
+          </p:spPr>
+          <p:txBody>
+            <a:bodyPr wrap="square" rtlCol="0">
+              <a:spAutoFit/>
+            </a:bodyPr>
+            <a:lstStyle/>
+            <a:p>
+              <a:pPr algn="ctr"/>
+              <a:r>
+                <a:rPr lang="en-US" dirty="0"/>
+                <a:t>Data Import</a:t>
+              </a:r>
+            </a:p>
+          </p:txBody>
+        </p:sp>
+        <p:sp>
+          <p:nvSpPr>
+            <p:cNvPr id="21" name="Rectangle 20">
+              <a:extLst>
+                <a:ext uri="{FF2B5EF4-FFF2-40B4-BE49-F238E27FC236}">
+                  <a16:creationId xmlns:a16="http://schemas.microsoft.com/office/drawing/2014/main" id="{048CD4EC-4CF5-B752-46DC-9A5E7D6A4BCF}"/>
+                </a:ext>
+              </a:extLst>
+            </p:cNvPr>
+            <p:cNvSpPr/>
+            <p:nvPr/>
+          </p:nvSpPr>
+          <p:spPr>
+            <a:xfrm>
+              <a:off x="186787" y="860236"/>
+              <a:ext cx="1649157" cy="369332"/>
+            </a:xfrm>
+            <a:prstGeom prst="rect">
+              <a:avLst/>
+            </a:prstGeom>
+            <a:noFill/>
+            <a:ln>
+              <a:solidFill>
+                <a:schemeClr val="tx1"/>
+              </a:solidFill>
+            </a:ln>
+          </p:spPr>
+          <p:style>
+            <a:lnRef idx="2">
+              <a:schemeClr val="accent1">
+                <a:shade val="15000"/>
+              </a:schemeClr>
+            </a:lnRef>
+            <a:fillRef idx="1">
+              <a:schemeClr val="accent1"/>
+            </a:fillRef>
+            <a:effectRef idx="0">
+              <a:schemeClr val="accent1"/>
+            </a:effectRef>
+            <a:fontRef idx="minor">
+              <a:schemeClr val="lt1"/>
+            </a:fontRef>
+          </p:style>
+          <p:txBody>
+            <a:bodyPr rtlCol="0" anchor="ctr"/>
+            <a:lstStyle/>
+            <a:p>
+              <a:pPr algn="ctr"/>
+              <a:endParaRPr lang="en-US"/>
+            </a:p>
+          </p:txBody>
+        </p:sp>
+      </p:grpSp>
+      <p:sp>
+        <p:nvSpPr>
+          <p:cNvPr id="22" name="Arrow: Down 21">
+            <a:extLst>
+              <a:ext uri="{FF2B5EF4-FFF2-40B4-BE49-F238E27FC236}">
+                <a16:creationId xmlns:a16="http://schemas.microsoft.com/office/drawing/2014/main" id="{ED76657E-CB1B-1259-A75C-0CFB009235C3}"/>
+              </a:ext>
+            </a:extLst>
+          </p:cNvPr>
+          <p:cNvSpPr/>
+          <p:nvPr userDrawn="1"/>
+        </p:nvSpPr>
+        <p:spPr>
+          <a:xfrm>
+            <a:off x="758464" y="1373983"/>
+            <a:ext cx="381000" cy="518529"/>
+          </a:xfrm>
+          <a:prstGeom prst="downArrow">
+            <a:avLst/>
+          </a:prstGeom>
+          <a:solidFill>
+            <a:schemeClr val="bg1">
+              <a:lumMod val="85000"/>
+            </a:schemeClr>
+          </a:solidFill>
+          <a:ln>
+            <a:noFill/>
+          </a:ln>
+        </p:spPr>
+        <p:style>
+          <a:lnRef idx="2">
+            <a:schemeClr val="accent1">
+              <a:shade val="15000"/>
+            </a:schemeClr>
+          </a:lnRef>
+          <a:fillRef idx="1">
+            <a:schemeClr val="accent1"/>
+          </a:fillRef>
+          <a:effectRef idx="0">
+            <a:schemeClr val="accent1"/>
+          </a:effectRef>
+          <a:fontRef idx="minor">
+            <a:schemeClr val="lt1"/>
+          </a:fontRef>
+        </p:style>
+        <p:txBody>
+          <a:bodyPr rtlCol="0" anchor="ctr"/>
+          <a:lstStyle/>
+          <a:p>
+            <a:pPr algn="ctr"/>
+            <a:endParaRPr lang="en-US" dirty="0"/>
+          </a:p>
+        </p:txBody>
+      </p:sp>
+      <p:sp>
+        <p:nvSpPr>
+          <p:cNvPr id="23" name="Arrow: Down 22">
+            <a:extLst>
+              <a:ext uri="{FF2B5EF4-FFF2-40B4-BE49-F238E27FC236}">
+                <a16:creationId xmlns:a16="http://schemas.microsoft.com/office/drawing/2014/main" id="{3B3DBAB7-5C53-4BF6-B9EF-73E93378866D}"/>
+              </a:ext>
+            </a:extLst>
+          </p:cNvPr>
+          <p:cNvSpPr/>
+          <p:nvPr userDrawn="1"/>
+        </p:nvSpPr>
+        <p:spPr>
+          <a:xfrm rot="16200000">
+            <a:off x="146543" y="4875890"/>
+            <a:ext cx="186335" cy="239197"/>
+          </a:xfrm>
+          <a:prstGeom prst="downArrow">
+            <a:avLst/>
+          </a:prstGeom>
+          <a:solidFill>
+            <a:schemeClr val="bg1">
+              <a:lumMod val="85000"/>
+            </a:schemeClr>
+          </a:solidFill>
+          <a:ln>
+            <a:noFill/>
+          </a:ln>
+        </p:spPr>
+        <p:style>
+          <a:lnRef idx="2">
+            <a:schemeClr val="accent1">
+              <a:shade val="15000"/>
+            </a:schemeClr>
+          </a:lnRef>
+          <a:fillRef idx="1">
+            <a:schemeClr val="accent1"/>
+          </a:fillRef>
+          <a:effectRef idx="0">
+            <a:schemeClr val="accent1"/>
+          </a:effectRef>
+          <a:fontRef idx="minor">
+            <a:schemeClr val="lt1"/>
+          </a:fontRef>
+        </p:style>
+        <p:txBody>
+          <a:bodyPr rtlCol="0" anchor="ctr"/>
+          <a:lstStyle/>
+          <a:p>
+            <a:pPr algn="ctr"/>
+            <a:endParaRPr lang="en-US" dirty="0"/>
+          </a:p>
+        </p:txBody>
+      </p:sp>
+      <p:sp>
+        <p:nvSpPr>
+          <p:cNvPr id="24" name="Arrow: Down 23">
+            <a:extLst>
+              <a:ext uri="{FF2B5EF4-FFF2-40B4-BE49-F238E27FC236}">
+                <a16:creationId xmlns:a16="http://schemas.microsoft.com/office/drawing/2014/main" id="{BCD45900-68B6-80F0-743F-C22E850CFB5B}"/>
+              </a:ext>
+            </a:extLst>
+          </p:cNvPr>
+          <p:cNvSpPr/>
+          <p:nvPr userDrawn="1"/>
+        </p:nvSpPr>
+        <p:spPr>
+          <a:xfrm rot="16200000">
+            <a:off x="139250" y="3900462"/>
+            <a:ext cx="186335" cy="239197"/>
+          </a:xfrm>
+          <a:prstGeom prst="downArrow">
+            <a:avLst/>
+          </a:prstGeom>
+          <a:solidFill>
+            <a:schemeClr val="bg1">
+              <a:lumMod val="85000"/>
+            </a:schemeClr>
+          </a:solidFill>
+          <a:ln>
+            <a:noFill/>
+          </a:ln>
+        </p:spPr>
+        <p:style>
+          <a:lnRef idx="2">
+            <a:schemeClr val="accent1">
+              <a:shade val="15000"/>
+            </a:schemeClr>
+          </a:lnRef>
+          <a:fillRef idx="1">
+            <a:schemeClr val="accent1"/>
+          </a:fillRef>
+          <a:effectRef idx="0">
+            <a:schemeClr val="accent1"/>
+          </a:effectRef>
+          <a:fontRef idx="minor">
+            <a:schemeClr val="lt1"/>
+          </a:fontRef>
+        </p:style>
+        <p:txBody>
+          <a:bodyPr rtlCol="0" anchor="ctr"/>
+          <a:lstStyle/>
+          <a:p>
+            <a:pPr algn="ctr"/>
+            <a:endParaRPr lang="en-US" dirty="0"/>
+          </a:p>
+        </p:txBody>
+      </p:sp>
+      <p:sp>
+        <p:nvSpPr>
+          <p:cNvPr id="25" name="Arrow: Down 24">
+            <a:extLst>
+              <a:ext uri="{FF2B5EF4-FFF2-40B4-BE49-F238E27FC236}">
+                <a16:creationId xmlns:a16="http://schemas.microsoft.com/office/drawing/2014/main" id="{454C9CA6-17B1-406F-4897-B88D2961E2F9}"/>
+              </a:ext>
+            </a:extLst>
+          </p:cNvPr>
+          <p:cNvSpPr/>
+          <p:nvPr userDrawn="1"/>
+        </p:nvSpPr>
+        <p:spPr>
+          <a:xfrm rot="16200000">
+            <a:off x="139535" y="2925034"/>
+            <a:ext cx="186335" cy="239197"/>
+          </a:xfrm>
+          <a:prstGeom prst="downArrow">
+            <a:avLst/>
+          </a:prstGeom>
+          <a:solidFill>
+            <a:schemeClr val="bg1">
+              <a:lumMod val="85000"/>
+            </a:schemeClr>
+          </a:solidFill>
+          <a:ln>
+            <a:noFill/>
+          </a:ln>
+        </p:spPr>
+        <p:style>
+          <a:lnRef idx="2">
+            <a:schemeClr val="accent1">
+              <a:shade val="15000"/>
+            </a:schemeClr>
+          </a:lnRef>
+          <a:fillRef idx="1">
+            <a:schemeClr val="accent1"/>
+          </a:fillRef>
+          <a:effectRef idx="0">
+            <a:schemeClr val="accent1"/>
+          </a:effectRef>
+          <a:fontRef idx="minor">
+            <a:schemeClr val="lt1"/>
+          </a:fontRef>
+        </p:style>
+        <p:txBody>
+          <a:bodyPr rtlCol="0" anchor="ctr"/>
+          <a:lstStyle/>
+          <a:p>
+            <a:pPr algn="ctr"/>
+            <a:endParaRPr lang="en-US" dirty="0"/>
+          </a:p>
+        </p:txBody>
+      </p:sp>
+      <p:grpSp>
+        <p:nvGrpSpPr>
+          <p:cNvPr id="26" name="Group 25">
+            <a:extLst>
+              <a:ext uri="{FF2B5EF4-FFF2-40B4-BE49-F238E27FC236}">
+                <a16:creationId xmlns:a16="http://schemas.microsoft.com/office/drawing/2014/main" id="{FA9D300E-EB2F-D1E2-BECC-A09496308AFF}"/>
+              </a:ext>
+            </a:extLst>
+          </p:cNvPr>
+          <p:cNvGrpSpPr/>
+          <p:nvPr userDrawn="1"/>
+        </p:nvGrpSpPr>
+        <p:grpSpPr>
+          <a:xfrm>
+            <a:off x="374443" y="5647752"/>
+            <a:ext cx="1377642" cy="646331"/>
+            <a:chOff x="533013" y="5497497"/>
+            <a:chExt cx="1377642" cy="646331"/>
+          </a:xfrm>
+        </p:grpSpPr>
+        <p:sp>
+          <p:nvSpPr>
+            <p:cNvPr id="27" name="TextBox 26">
+              <a:extLst>
+                <a:ext uri="{FF2B5EF4-FFF2-40B4-BE49-F238E27FC236}">
+                  <a16:creationId xmlns:a16="http://schemas.microsoft.com/office/drawing/2014/main" id="{5A5C4475-61A7-2EF8-6FEB-F5A5221C63F3}"/>
+                </a:ext>
+              </a:extLst>
+            </p:cNvPr>
+            <p:cNvSpPr txBox="1"/>
+            <p:nvPr/>
+          </p:nvSpPr>
+          <p:spPr>
+            <a:xfrm>
+              <a:off x="747210" y="5497497"/>
+              <a:ext cx="940899" cy="646331"/>
+            </a:xfrm>
+            <a:prstGeom prst="rect">
+              <a:avLst/>
+            </a:prstGeom>
+            <a:noFill/>
+          </p:spPr>
+          <p:txBody>
+            <a:bodyPr wrap="none" rtlCol="0">
+              <a:spAutoFit/>
+            </a:bodyPr>
+            <a:lstStyle/>
+            <a:p>
+              <a:pPr algn="ctr"/>
+              <a:r>
+                <a:rPr lang="en-US" dirty="0"/>
+                <a:t>Pseudo-</a:t>
+              </a:r>
+            </a:p>
+            <a:p>
+              <a:pPr algn="ctr"/>
+              <a:r>
+                <a:rPr lang="en-US" dirty="0"/>
+                <a:t>Bulk</a:t>
+              </a:r>
+            </a:p>
+          </p:txBody>
+        </p:sp>
+        <p:sp>
+          <p:nvSpPr>
+            <p:cNvPr id="28" name="Rectangle 27">
+              <a:extLst>
+                <a:ext uri="{FF2B5EF4-FFF2-40B4-BE49-F238E27FC236}">
+                  <a16:creationId xmlns:a16="http://schemas.microsoft.com/office/drawing/2014/main" id="{3D31FD39-D385-957B-5FBD-03F0367B2BBA}"/>
+                </a:ext>
+              </a:extLst>
+            </p:cNvPr>
+            <p:cNvSpPr/>
+            <p:nvPr/>
+          </p:nvSpPr>
+          <p:spPr>
+            <a:xfrm>
+              <a:off x="533013" y="5511800"/>
+              <a:ext cx="1377642" cy="609600"/>
+            </a:xfrm>
+            <a:prstGeom prst="rect">
+              <a:avLst/>
+            </a:prstGeom>
+            <a:noFill/>
+            <a:ln>
+              <a:solidFill>
+                <a:schemeClr val="tx1"/>
+              </a:solidFill>
+            </a:ln>
+          </p:spPr>
+          <p:style>
+            <a:lnRef idx="2">
+              <a:schemeClr val="accent1">
+                <a:shade val="15000"/>
+              </a:schemeClr>
+            </a:lnRef>
+            <a:fillRef idx="1">
+              <a:schemeClr val="accent1"/>
+            </a:fillRef>
+            <a:effectRef idx="0">
+              <a:schemeClr val="accent1"/>
+            </a:effectRef>
+            <a:fontRef idx="minor">
+              <a:schemeClr val="lt1"/>
+            </a:fontRef>
+          </p:style>
+          <p:txBody>
+            <a:bodyPr rtlCol="0" anchor="ctr"/>
+            <a:lstStyle/>
+            <a:p>
+              <a:pPr algn="ctr"/>
+              <a:endParaRPr lang="en-US"/>
+            </a:p>
+          </p:txBody>
+        </p:sp>
+      </p:grpSp>
+      <p:sp>
+        <p:nvSpPr>
+          <p:cNvPr id="29" name="Arrow: Down 28">
+            <a:extLst>
+              <a:ext uri="{FF2B5EF4-FFF2-40B4-BE49-F238E27FC236}">
+                <a16:creationId xmlns:a16="http://schemas.microsoft.com/office/drawing/2014/main" id="{8BCB6071-7162-0039-E9B2-9E4AEFE9D6EB}"/>
+              </a:ext>
+            </a:extLst>
+          </p:cNvPr>
+          <p:cNvSpPr/>
+          <p:nvPr userDrawn="1"/>
+        </p:nvSpPr>
+        <p:spPr>
+          <a:xfrm rot="16200000">
+            <a:off x="148924" y="5851319"/>
+            <a:ext cx="186335" cy="239197"/>
+          </a:xfrm>
+          <a:prstGeom prst="downArrow">
+            <a:avLst/>
+          </a:prstGeom>
+          <a:solidFill>
+            <a:schemeClr val="bg1">
+              <a:lumMod val="85000"/>
+            </a:schemeClr>
+          </a:solidFill>
+          <a:ln>
+            <a:noFill/>
+          </a:ln>
+        </p:spPr>
+        <p:style>
+          <a:lnRef idx="2">
+            <a:schemeClr val="accent1">
+              <a:shade val="15000"/>
+            </a:schemeClr>
+          </a:lnRef>
+          <a:fillRef idx="1">
+            <a:schemeClr val="accent1"/>
+          </a:fillRef>
+          <a:effectRef idx="0">
+            <a:schemeClr val="accent1"/>
+          </a:effectRef>
+          <a:fontRef idx="minor">
+            <a:schemeClr val="lt1"/>
+          </a:fontRef>
+        </p:style>
+        <p:txBody>
+          <a:bodyPr rtlCol="0" anchor="ctr"/>
+          <a:lstStyle/>
+          <a:p>
+            <a:pPr algn="ctr"/>
+            <a:endParaRPr lang="en-US" dirty="0"/>
+          </a:p>
+        </p:txBody>
+      </p:sp>
+    </p:spTree>
+    <p:extLst>
+      <p:ext uri="{BB962C8B-B14F-4D97-AF65-F5344CB8AC3E}">
+        <p14:creationId xmlns:p14="http://schemas.microsoft.com/office/powerpoint/2010/main" val="3892231411"/>
+      </p:ext>
+    </p:extLst>
+  </p:cSld>
+  <p:clrMapOvr>
+    <a:masterClrMapping/>
+  </p:clrMapOvr>
+</p:sldLayout>
+</file>
+
+<file path=ppt/slideLayouts/slideLayout4.xml><?xml version="1.0" encoding="utf-8"?>
 <p:sldLayout xmlns:a="http://schemas.openxmlformats.org/drawingml/2006/main" xmlns:r="http://schemas.openxmlformats.org/officeDocument/2006/relationships" xmlns:p="http://schemas.openxmlformats.org/presentationml/2006/main" type="obj" preserve="1">
   <p:cSld name="Title and Content">
     <p:spTree>
@@ -1092,7 +2468,7 @@
           <a:p>
             <a:fld id="{9F69634C-F75C-45F7-A87A-C5E2AF3ECA41}" type="datetimeFigureOut">
               <a:rPr lang="en-US" smtClean="0"/>
-              <a:t>3/4/2024</a:t>
+              <a:t>3/5/2024</a:t>
             </a:fld>
             <a:endParaRPr lang="en-US"/>
           </a:p>
@@ -1165,7 +2541,7 @@
 </p:sldLayout>
 </file>
 
-<file path=ppt/slideLayouts/slideLayout4.xml><?xml version="1.0" encoding="utf-8"?>
+<file path=ppt/slideLayouts/slideLayout5.xml><?xml version="1.0" encoding="utf-8"?>
 <p:sldLayout xmlns:a="http://schemas.openxmlformats.org/drawingml/2006/main" xmlns:r="http://schemas.openxmlformats.org/officeDocument/2006/relationships" xmlns:p="http://schemas.openxmlformats.org/presentationml/2006/main" type="twoObj" preserve="1">
   <p:cSld name="Two Content">
     <p:spTree>
@@ -1357,7 +2733,7 @@
           <a:p>
             <a:fld id="{9F69634C-F75C-45F7-A87A-C5E2AF3ECA41}" type="datetimeFigureOut">
               <a:rPr lang="en-US" smtClean="0"/>
-              <a:t>3/4/2024</a:t>
+              <a:t>3/5/2024</a:t>
             </a:fld>
             <a:endParaRPr lang="en-US"/>
           </a:p>
@@ -1430,7 +2806,7 @@
 </p:sldLayout>
 </file>
 
-<file path=ppt/slideLayouts/slideLayout5.xml><?xml version="1.0" encoding="utf-8"?>
+<file path=ppt/slideLayouts/slideLayout6.xml><?xml version="1.0" encoding="utf-8"?>
 <p:sldLayout xmlns:a="http://schemas.openxmlformats.org/drawingml/2006/main" xmlns:r="http://schemas.openxmlformats.org/officeDocument/2006/relationships" xmlns:p="http://schemas.openxmlformats.org/presentationml/2006/main" type="blank" preserve="1">
   <p:cSld name="Blank">
     <p:spTree>
@@ -1470,7 +2846,7 @@
           <a:p>
             <a:fld id="{9F69634C-F75C-45F7-A87A-C5E2AF3ECA41}" type="datetimeFigureOut">
               <a:rPr lang="en-US" smtClean="0"/>
-              <a:t>3/4/2024</a:t>
+              <a:t>3/5/2024</a:t>
             </a:fld>
             <a:endParaRPr lang="en-US"/>
           </a:p>
@@ -1712,7 +3088,7 @@
           <a:p>
             <a:fld id="{9F69634C-F75C-45F7-A87A-C5E2AF3ECA41}" type="datetimeFigureOut">
               <a:rPr lang="en-US" smtClean="0"/>
-              <a:t>3/4/2024</a:t>
+              <a:t>3/5/2024</a:t>
             </a:fld>
             <a:endParaRPr lang="en-US"/>
           </a:p>
@@ -1823,7 +3199,7 @@
           <p:nvPr/>
         </p:nvPicPr>
         <p:blipFill rotWithShape="1">
-          <a:blip r:embed="rId7">
+          <a:blip r:embed="rId8">
             <a:extLst>
               <a:ext uri="{28A0092B-C50C-407E-A947-70E740481C1C}">
                 <a14:useLocalDpi xmlns:a14="http://schemas.microsoft.com/office/drawing/2010/main" val="0"/>
@@ -1913,7 +3289,7 @@
           <p:nvPr/>
         </p:nvPicPr>
         <p:blipFill>
-          <a:blip r:embed="rId8">
+          <a:blip r:embed="rId9">
             <a:extLst>
               <a:ext uri="{28A0092B-C50C-407E-A947-70E740481C1C}">
                 <a14:useLocalDpi xmlns:a14="http://schemas.microsoft.com/office/drawing/2010/main" val="0"/>
@@ -2204,9 +3580,10 @@
   <p:sldLayoutIdLst>
     <p:sldLayoutId id="2147483657" r:id="rId1"/>
     <p:sldLayoutId id="2147483658" r:id="rId2"/>
-    <p:sldLayoutId id="2147483659" r:id="rId3"/>
-    <p:sldLayoutId id="2147483660" r:id="rId4"/>
-    <p:sldLayoutId id="2147483661" r:id="rId5"/>
+    <p:sldLayoutId id="2147483662" r:id="rId3"/>
+    <p:sldLayoutId id="2147483659" r:id="rId4"/>
+    <p:sldLayoutId id="2147483660" r:id="rId5"/>
+    <p:sldLayoutId id="2147483661" r:id="rId6"/>
   </p:sldLayoutIdLst>
   <p:txStyles>
     <p:titleStyle>
@@ -2598,6 +3975,306 @@
   <p:cSld>
     <p:spTree>
       <p:nvGrpSpPr>
+        <p:cNvPr id="1" name="">
+          <a:extLst>
+            <a:ext uri="{FF2B5EF4-FFF2-40B4-BE49-F238E27FC236}">
+              <a16:creationId xmlns:a16="http://schemas.microsoft.com/office/drawing/2014/main" id="{AB40F070-75F0-F6A3-26DF-8D3CB353B75A}"/>
+            </a:ext>
+          </a:extLst>
+        </p:cNvPr>
+        <p:cNvGrpSpPr/>
+        <p:nvPr/>
+      </p:nvGrpSpPr>
+      <p:grpSpPr>
+        <a:xfrm>
+          <a:off x="0" y="0"/>
+          <a:ext cx="0" cy="0"/>
+          <a:chOff x="0" y="0"/>
+          <a:chExt cx="0" cy="0"/>
+        </a:xfrm>
+      </p:grpSpPr>
+      <p:sp>
+        <p:nvSpPr>
+          <p:cNvPr id="2" name="Title 1">
+            <a:extLst>
+              <a:ext uri="{FF2B5EF4-FFF2-40B4-BE49-F238E27FC236}">
+                <a16:creationId xmlns:a16="http://schemas.microsoft.com/office/drawing/2014/main" id="{A5A55A3C-BAFD-DD08-C99E-87095299242B}"/>
+              </a:ext>
+            </a:extLst>
+          </p:cNvPr>
+          <p:cNvSpPr>
+            <a:spLocks noGrp="1"/>
+          </p:cNvSpPr>
+          <p:nvPr>
+            <p:ph type="title"/>
+          </p:nvPr>
+        </p:nvSpPr>
+        <p:spPr/>
+        <p:txBody>
+          <a:bodyPr/>
+          <a:lstStyle/>
+          <a:p>
+            <a:r>
+              <a:rPr lang="en-US" dirty="0"/>
+              <a:t>Conserved Marker Analysis</a:t>
+            </a:r>
+          </a:p>
+        </p:txBody>
+      </p:sp>
+      <p:sp>
+        <p:nvSpPr>
+          <p:cNvPr id="3" name="TextBox 2">
+            <a:extLst>
+              <a:ext uri="{FF2B5EF4-FFF2-40B4-BE49-F238E27FC236}">
+                <a16:creationId xmlns:a16="http://schemas.microsoft.com/office/drawing/2014/main" id="{9A85F3D2-E6F9-F31D-A85B-DBA7DA27F6E0}"/>
+              </a:ext>
+            </a:extLst>
+          </p:cNvPr>
+          <p:cNvSpPr txBox="1"/>
+          <p:nvPr/>
+        </p:nvSpPr>
+        <p:spPr>
+          <a:xfrm>
+            <a:off x="2603501" y="2782669"/>
+            <a:ext cx="8178800" cy="646331"/>
+          </a:xfrm>
+          <a:prstGeom prst="rect">
+            <a:avLst/>
+          </a:prstGeom>
+          <a:noFill/>
+        </p:spPr>
+        <p:txBody>
+          <a:bodyPr wrap="square" rtlCol="0">
+            <a:spAutoFit/>
+          </a:bodyPr>
+          <a:lstStyle/>
+          <a:p>
+            <a:r>
+              <a:rPr lang="en-US" dirty="0"/>
+              <a:t>For a </a:t>
+            </a:r>
+            <a:r>
+              <a:rPr lang="en-US" b="1" dirty="0"/>
+              <a:t>single study group</a:t>
+            </a:r>
+            <a:r>
+              <a:rPr lang="en-US" dirty="0"/>
+              <a:t>, identify </a:t>
+            </a:r>
+            <a:r>
+              <a:rPr lang="en-US" b="1" dirty="0"/>
+              <a:t>differentially expressed genes </a:t>
+            </a:r>
+            <a:r>
+              <a:rPr lang="en-US" dirty="0"/>
+              <a:t>for each cluster in </a:t>
+            </a:r>
+            <a:r>
+              <a:rPr lang="en-US" i="1" dirty="0"/>
+              <a:t>pairwise fashion</a:t>
+            </a:r>
+            <a:r>
+              <a:rPr lang="en-US" dirty="0"/>
+              <a:t>.</a:t>
+            </a:r>
+          </a:p>
+        </p:txBody>
+      </p:sp>
+      <p:sp>
+        <p:nvSpPr>
+          <p:cNvPr id="5" name="TextBox 4">
+            <a:extLst>
+              <a:ext uri="{FF2B5EF4-FFF2-40B4-BE49-F238E27FC236}">
+                <a16:creationId xmlns:a16="http://schemas.microsoft.com/office/drawing/2014/main" id="{2B5AE349-C007-8353-C028-9285AF8FC73E}"/>
+              </a:ext>
+            </a:extLst>
+          </p:cNvPr>
+          <p:cNvSpPr txBox="1"/>
+          <p:nvPr/>
+        </p:nvSpPr>
+        <p:spPr>
+          <a:xfrm>
+            <a:off x="2603501" y="3657600"/>
+            <a:ext cx="8178800" cy="646331"/>
+          </a:xfrm>
+          <a:prstGeom prst="rect">
+            <a:avLst/>
+          </a:prstGeom>
+          <a:noFill/>
+        </p:spPr>
+        <p:txBody>
+          <a:bodyPr wrap="square" rtlCol="0">
+            <a:spAutoFit/>
+          </a:bodyPr>
+          <a:lstStyle/>
+          <a:p>
+            <a:r>
+              <a:rPr lang="en-US" dirty="0"/>
+              <a:t>For a </a:t>
+            </a:r>
+            <a:r>
+              <a:rPr lang="en-US" b="1" dirty="0"/>
+              <a:t>single study group</a:t>
+            </a:r>
+            <a:r>
+              <a:rPr lang="en-US" dirty="0"/>
+              <a:t>, identify </a:t>
+            </a:r>
+            <a:r>
+              <a:rPr lang="en-US" b="1" dirty="0"/>
+              <a:t>conserved genes </a:t>
+            </a:r>
+            <a:r>
+              <a:rPr lang="en-US" dirty="0"/>
+              <a:t>for each cluster in </a:t>
+            </a:r>
+            <a:r>
+              <a:rPr lang="en-US" i="1" dirty="0"/>
+              <a:t>pairwise fashion</a:t>
+            </a:r>
+            <a:r>
+              <a:rPr lang="en-US" dirty="0"/>
+              <a:t>.</a:t>
+            </a:r>
+          </a:p>
+        </p:txBody>
+      </p:sp>
+      <p:sp>
+        <p:nvSpPr>
+          <p:cNvPr id="6" name="TextBox 5">
+            <a:extLst>
+              <a:ext uri="{FF2B5EF4-FFF2-40B4-BE49-F238E27FC236}">
+                <a16:creationId xmlns:a16="http://schemas.microsoft.com/office/drawing/2014/main" id="{07696F73-F340-FD4A-59D9-1F38666F1EFD}"/>
+              </a:ext>
+            </a:extLst>
+          </p:cNvPr>
+          <p:cNvSpPr txBox="1"/>
+          <p:nvPr/>
+        </p:nvSpPr>
+        <p:spPr>
+          <a:xfrm>
+            <a:off x="2603501" y="4620048"/>
+            <a:ext cx="8178800" cy="646331"/>
+          </a:xfrm>
+          <a:prstGeom prst="rect">
+            <a:avLst/>
+          </a:prstGeom>
+          <a:noFill/>
+        </p:spPr>
+        <p:txBody>
+          <a:bodyPr wrap="square" rtlCol="0">
+            <a:spAutoFit/>
+          </a:bodyPr>
+          <a:lstStyle/>
+          <a:p>
+            <a:r>
+              <a:rPr lang="en-US" dirty="0"/>
+              <a:t>For a </a:t>
+            </a:r>
+            <a:r>
+              <a:rPr lang="en-US" b="1" dirty="0"/>
+              <a:t>single study group</a:t>
+            </a:r>
+            <a:r>
+              <a:rPr lang="en-US" dirty="0"/>
+              <a:t>, identify </a:t>
+            </a:r>
+            <a:r>
+              <a:rPr lang="en-US" b="1" dirty="0"/>
+              <a:t>conserved genes </a:t>
+            </a:r>
+            <a:r>
+              <a:rPr lang="en-US" dirty="0"/>
+              <a:t>for each cluster in </a:t>
+            </a:r>
+            <a:r>
+              <a:rPr lang="en-US" i="1" dirty="0"/>
+              <a:t>pairwise fashion</a:t>
+            </a:r>
+            <a:r>
+              <a:rPr lang="en-US" dirty="0"/>
+              <a:t>.</a:t>
+            </a:r>
+          </a:p>
+        </p:txBody>
+      </p:sp>
+      <p:sp>
+        <p:nvSpPr>
+          <p:cNvPr id="7" name="TextBox 6">
+            <a:extLst>
+              <a:ext uri="{FF2B5EF4-FFF2-40B4-BE49-F238E27FC236}">
+                <a16:creationId xmlns:a16="http://schemas.microsoft.com/office/drawing/2014/main" id="{48E91854-E449-A907-EC73-6DB9A4FD9664}"/>
+              </a:ext>
+            </a:extLst>
+          </p:cNvPr>
+          <p:cNvSpPr txBox="1"/>
+          <p:nvPr/>
+        </p:nvSpPr>
+        <p:spPr>
+          <a:xfrm>
+            <a:off x="2603501" y="5582496"/>
+            <a:ext cx="8178800" cy="646331"/>
+          </a:xfrm>
+          <a:prstGeom prst="rect">
+            <a:avLst/>
+          </a:prstGeom>
+          <a:noFill/>
+        </p:spPr>
+        <p:txBody>
+          <a:bodyPr wrap="square" rtlCol="0">
+            <a:spAutoFit/>
+          </a:bodyPr>
+          <a:lstStyle/>
+          <a:p>
+            <a:r>
+              <a:rPr lang="en-US" dirty="0"/>
+              <a:t>For a </a:t>
+            </a:r>
+            <a:r>
+              <a:rPr lang="en-US" b="1" dirty="0"/>
+              <a:t>single study group</a:t>
+            </a:r>
+            <a:r>
+              <a:rPr lang="en-US" dirty="0"/>
+              <a:t>, identify </a:t>
+            </a:r>
+            <a:r>
+              <a:rPr lang="en-US" b="1" dirty="0"/>
+              <a:t>conserved genes </a:t>
+            </a:r>
+            <a:r>
+              <a:rPr lang="en-US" dirty="0"/>
+              <a:t>for each cluster in </a:t>
+            </a:r>
+            <a:r>
+              <a:rPr lang="en-US" i="1" dirty="0"/>
+              <a:t>pairwise fashion</a:t>
+            </a:r>
+            <a:r>
+              <a:rPr lang="en-US" dirty="0"/>
+              <a:t>.</a:t>
+            </a:r>
+          </a:p>
+        </p:txBody>
+      </p:sp>
+    </p:spTree>
+    <p:extLst>
+      <p:ext uri="{BB962C8B-B14F-4D97-AF65-F5344CB8AC3E}">
+        <p14:creationId xmlns:p14="http://schemas.microsoft.com/office/powerpoint/2010/main" val="1991630154"/>
+      </p:ext>
+    </p:extLst>
+  </p:cSld>
+  <p:clrMapOvr>
+    <a:masterClrMapping/>
+  </p:clrMapOvr>
+</p:sld>
+</file>
+
+<file path=ppt/slides/slide3.xml><?xml version="1.0" encoding="utf-8"?>
+<p:sld xmlns:a="http://schemas.openxmlformats.org/drawingml/2006/main" xmlns:r="http://schemas.openxmlformats.org/officeDocument/2006/relationships" xmlns:p="http://schemas.openxmlformats.org/presentationml/2006/main">
+  <p:cSld>
+    <p:spTree>
+      <p:nvGrpSpPr>
         <p:cNvPr id="1" name=""/>
         <p:cNvGrpSpPr/>
         <p:nvPr/>
@@ -2660,7 +4337,7 @@
         </p:blipFill>
         <p:spPr>
           <a:xfrm>
-            <a:off x="7738906" y="3379409"/>
+            <a:off x="7383979" y="2919479"/>
             <a:ext cx="4453094" cy="3443114"/>
           </a:xfrm>
           <a:prstGeom prst="rect">
@@ -2689,7 +4366,7 @@
         </p:blipFill>
         <p:spPr>
           <a:xfrm>
-            <a:off x="3391042" y="767073"/>
+            <a:off x="2684951" y="784062"/>
             <a:ext cx="6084048" cy="1813118"/>
           </a:xfrm>
           <a:prstGeom prst="rect">
@@ -2730,7 +4407,7 @@
         </p:blipFill>
         <p:spPr>
           <a:xfrm>
-            <a:off x="3193514" y="2840175"/>
+            <a:off x="2345209" y="3239367"/>
             <a:ext cx="4610924" cy="2707014"/>
           </a:xfrm>
           <a:prstGeom prst="rect">
@@ -2752,7 +4429,7 @@
         </p:nvSpPr>
         <p:spPr>
           <a:xfrm>
-            <a:off x="3934494" y="5061395"/>
+            <a:off x="3023819" y="4300815"/>
             <a:ext cx="643064" cy="485794"/>
           </a:xfrm>
           <a:custGeom>
@@ -3662,7 +5339,7 @@
         </p:nvSpPr>
         <p:spPr>
           <a:xfrm>
-            <a:off x="9080589" y="2718092"/>
+            <a:off x="8470037" y="2289149"/>
             <a:ext cx="2183226" cy="584775"/>
           </a:xfrm>
           <a:prstGeom prst="rect">
@@ -3688,6 +5365,114 @@
               <a:rPr lang="en-US" sz="1600" b="1" dirty="0"/>
               <a:t>Top Conserved Markers</a:t>
             </a:r>
+          </a:p>
+        </p:txBody>
+      </p:sp>
+      <p:sp>
+        <p:nvSpPr>
+          <p:cNvPr id="33" name="Rectangle 32">
+            <a:extLst>
+              <a:ext uri="{FF2B5EF4-FFF2-40B4-BE49-F238E27FC236}">
+                <a16:creationId xmlns:a16="http://schemas.microsoft.com/office/drawing/2014/main" id="{6FEEAE22-36CD-8A10-E127-004AAE44FC68}"/>
+              </a:ext>
+            </a:extLst>
+          </p:cNvPr>
+          <p:cNvSpPr/>
+          <p:nvPr/>
+        </p:nvSpPr>
+        <p:spPr>
+          <a:xfrm>
+            <a:off x="0" y="767072"/>
+            <a:ext cx="1892300" cy="2707013"/>
+          </a:xfrm>
+          <a:prstGeom prst="rect">
+            <a:avLst/>
+          </a:prstGeom>
+          <a:solidFill>
+            <a:srgbClr val="FFFFFF">
+              <a:alpha val="60000"/>
+            </a:srgbClr>
+          </a:solidFill>
+          <a:ln>
+            <a:noFill/>
+          </a:ln>
+        </p:spPr>
+        <p:style>
+          <a:lnRef idx="2">
+            <a:schemeClr val="accent1">
+              <a:shade val="15000"/>
+            </a:schemeClr>
+          </a:lnRef>
+          <a:fillRef idx="1">
+            <a:schemeClr val="accent1"/>
+          </a:fillRef>
+          <a:effectRef idx="0">
+            <a:schemeClr val="accent1"/>
+          </a:effectRef>
+          <a:fontRef idx="minor">
+            <a:schemeClr val="lt1"/>
+          </a:fontRef>
+        </p:style>
+        <p:txBody>
+          <a:bodyPr rtlCol="0" anchor="ctr"/>
+          <a:lstStyle/>
+          <a:p>
+            <a:pPr algn="ctr"/>
+            <a:endParaRPr lang="en-US"/>
+          </a:p>
+        </p:txBody>
+      </p:sp>
+      <p:sp>
+        <p:nvSpPr>
+          <p:cNvPr id="34" name="Rectangle 33">
+            <a:extLst>
+              <a:ext uri="{FF2B5EF4-FFF2-40B4-BE49-F238E27FC236}">
+                <a16:creationId xmlns:a16="http://schemas.microsoft.com/office/drawing/2014/main" id="{60FE90E6-254F-A56C-39E2-2D704D2DB684}"/>
+              </a:ext>
+            </a:extLst>
+          </p:cNvPr>
+          <p:cNvSpPr/>
+          <p:nvPr/>
+        </p:nvSpPr>
+        <p:spPr>
+          <a:xfrm>
+            <a:off x="25063" y="4533900"/>
+            <a:ext cx="1892300" cy="2324099"/>
+          </a:xfrm>
+          <a:prstGeom prst="rect">
+            <a:avLst/>
+          </a:prstGeom>
+          <a:solidFill>
+            <a:srgbClr val="FFFFFF">
+              <a:alpha val="60000"/>
+            </a:srgbClr>
+          </a:solidFill>
+          <a:ln>
+            <a:noFill/>
+          </a:ln>
+        </p:spPr>
+        <p:style>
+          <a:lnRef idx="2">
+            <a:schemeClr val="accent1">
+              <a:shade val="15000"/>
+            </a:schemeClr>
+          </a:lnRef>
+          <a:fillRef idx="1">
+            <a:schemeClr val="accent1"/>
+          </a:fillRef>
+          <a:effectRef idx="0">
+            <a:schemeClr val="accent1"/>
+          </a:effectRef>
+          <a:fontRef idx="minor">
+            <a:schemeClr val="lt1"/>
+          </a:fontRef>
+        </p:style>
+        <p:txBody>
+          <a:bodyPr rtlCol="0" anchor="ctr"/>
+          <a:lstStyle/>
+          <a:p>
+            <a:pPr algn="ctr"/>
+            <a:endParaRPr lang="en-US"/>
           </a:p>
         </p:txBody>
       </p:sp>
@@ -3701,123 +5486,84 @@
   <p:clrMapOvr>
     <a:masterClrMapping/>
   </p:clrMapOvr>
-</p:sld>
-</file>
-
-<file path=ppt/slides/slide3.xml><?xml version="1.0" encoding="utf-8"?>
-<p:sld xmlns:a="http://schemas.openxmlformats.org/drawingml/2006/main" xmlns:r="http://schemas.openxmlformats.org/officeDocument/2006/relationships" xmlns:p="http://schemas.openxmlformats.org/presentationml/2006/main">
-  <p:cSld>
-    <p:spTree>
-      <p:nvGrpSpPr>
-        <p:cNvPr id="1" name=""/>
-        <p:cNvGrpSpPr/>
-        <p:nvPr/>
-      </p:nvGrpSpPr>
-      <p:grpSpPr>
-        <a:xfrm>
-          <a:off x="0" y="0"/>
-          <a:ext cx="0" cy="0"/>
-          <a:chOff x="0" y="0"/>
-          <a:chExt cx="0" cy="0"/>
-        </a:xfrm>
-      </p:grpSpPr>
-      <p:sp>
-        <p:nvSpPr>
-          <p:cNvPr id="2" name="Title 1">
-            <a:extLst>
-              <a:ext uri="{FF2B5EF4-FFF2-40B4-BE49-F238E27FC236}">
-                <a16:creationId xmlns:a16="http://schemas.microsoft.com/office/drawing/2014/main" id="{619F2689-C759-C3E1-4511-9C8A241B1636}"/>
-              </a:ext>
-            </a:extLst>
-          </p:cNvPr>
-          <p:cNvSpPr>
-            <a:spLocks noGrp="1"/>
-          </p:cNvSpPr>
-          <p:nvPr>
-            <p:ph type="title"/>
-          </p:nvPr>
-        </p:nvSpPr>
-        <p:spPr/>
-        <p:txBody>
-          <a:bodyPr/>
-          <a:lstStyle/>
-          <a:p>
-            <a:r>
-              <a:rPr lang="en-US" dirty="0"/>
-              <a:t>Visualizing Conserved Markers</a:t>
-            </a:r>
-          </a:p>
-        </p:txBody>
-      </p:sp>
-      <p:pic>
-        <p:nvPicPr>
-          <p:cNvPr id="4" name="Picture 3">
-            <a:extLst>
-              <a:ext uri="{FF2B5EF4-FFF2-40B4-BE49-F238E27FC236}">
-                <a16:creationId xmlns:a16="http://schemas.microsoft.com/office/drawing/2014/main" id="{B11B4E58-83B5-9566-CE32-4995D61A7D06}"/>
-              </a:ext>
-            </a:extLst>
-          </p:cNvPr>
-          <p:cNvPicPr>
-            <a:picLocks noChangeAspect="1"/>
-          </p:cNvPicPr>
-          <p:nvPr/>
-        </p:nvPicPr>
-        <p:blipFill rotWithShape="1">
-          <a:blip r:embed="rId2"/>
-          <a:srcRect t="787"/>
-          <a:stretch/>
-        </p:blipFill>
-        <p:spPr>
-          <a:xfrm>
-            <a:off x="5567160" y="2157984"/>
-            <a:ext cx="6528523" cy="4608576"/>
-          </a:xfrm>
-          <a:prstGeom prst="rect">
-            <a:avLst/>
-          </a:prstGeom>
-        </p:spPr>
-      </p:pic>
-      <p:pic>
-        <p:nvPicPr>
-          <p:cNvPr id="6" name="Picture 5">
-            <a:extLst>
-              <a:ext uri="{FF2B5EF4-FFF2-40B4-BE49-F238E27FC236}">
-                <a16:creationId xmlns:a16="http://schemas.microsoft.com/office/drawing/2014/main" id="{4B124AD2-C779-8E50-CDA8-E9D74457F10A}"/>
-              </a:ext>
-            </a:extLst>
-          </p:cNvPr>
-          <p:cNvPicPr>
-            <a:picLocks noChangeAspect="1"/>
-          </p:cNvPicPr>
-          <p:nvPr/>
-        </p:nvPicPr>
-        <p:blipFill>
-          <a:blip r:embed="rId3"/>
-          <a:stretch>
-            <a:fillRect/>
-          </a:stretch>
-        </p:blipFill>
-        <p:spPr>
-          <a:xfrm>
-            <a:off x="3828051" y="920127"/>
-            <a:ext cx="6125430" cy="847843"/>
-          </a:xfrm>
-          <a:prstGeom prst="rect">
-            <a:avLst/>
-          </a:prstGeom>
-        </p:spPr>
-      </p:pic>
-    </p:spTree>
-    <p:extLst>
-      <p:ext uri="{BB962C8B-B14F-4D97-AF65-F5344CB8AC3E}">
-        <p14:creationId xmlns:p14="http://schemas.microsoft.com/office/powerpoint/2010/main" val="2205134938"/>
-      </p:ext>
-    </p:extLst>
-  </p:cSld>
-  <p:clrMapOvr>
-    <a:masterClrMapping/>
-  </p:clrMapOvr>
+  <p:timing>
+    <p:tnLst>
+      <p:par>
+        <p:cTn id="1" dur="indefinite" restart="never" nodeType="tmRoot">
+          <p:childTnLst>
+            <p:seq concurrent="1" nextAc="seek">
+              <p:cTn id="2" dur="indefinite" nodeType="mainSeq">
+                <p:childTnLst>
+                  <p:par>
+                    <p:cTn id="3" fill="hold">
+                      <p:stCondLst>
+                        <p:cond delay="indefinite"/>
+                      </p:stCondLst>
+                      <p:childTnLst>
+                        <p:par>
+                          <p:cTn id="4" fill="hold">
+                            <p:stCondLst>
+                              <p:cond delay="0"/>
+                            </p:stCondLst>
+                            <p:childTnLst>
+                              <p:par>
+                                <p:cTn id="5" presetID="1" presetClass="entr" presetSubtype="0" fill="hold" grpId="0" nodeType="clickEffect">
+                                  <p:stCondLst>
+                                    <p:cond delay="0"/>
+                                  </p:stCondLst>
+                                  <p:childTnLst>
+                                    <p:set>
+                                      <p:cBhvr>
+                                        <p:cTn id="6" dur="1" fill="hold">
+                                          <p:stCondLst>
+                                            <p:cond delay="0"/>
+                                          </p:stCondLst>
+                                        </p:cTn>
+                                        <p:tgtEl>
+                                          <p:spTgt spid="12"/>
+                                        </p:tgtEl>
+                                        <p:attrNameLst>
+                                          <p:attrName>style.visibility</p:attrName>
+                                        </p:attrNameLst>
+                                      </p:cBhvr>
+                                      <p:to>
+                                        <p:strVal val="visible"/>
+                                      </p:to>
+                                    </p:set>
+                                  </p:childTnLst>
+                                </p:cTn>
+                              </p:par>
+                            </p:childTnLst>
+                          </p:cTn>
+                        </p:par>
+                      </p:childTnLst>
+                    </p:cTn>
+                  </p:par>
+                </p:childTnLst>
+              </p:cTn>
+              <p:prevCondLst>
+                <p:cond evt="onPrev" delay="0">
+                  <p:tgtEl>
+                    <p:sldTgt/>
+                  </p:tgtEl>
+                </p:cond>
+              </p:prevCondLst>
+              <p:nextCondLst>
+                <p:cond evt="onNext" delay="0">
+                  <p:tgtEl>
+                    <p:sldTgt/>
+                  </p:tgtEl>
+                </p:cond>
+              </p:nextCondLst>
+            </p:seq>
+          </p:childTnLst>
+        </p:cTn>
+      </p:par>
+    </p:tnLst>
+    <p:bldLst>
+      <p:bldP spid="12" grpId="0" animBg="1"/>
+    </p:bldLst>
+  </p:timing>
 </p:sld>
 </file>
 
@@ -3838,6 +5584,231 @@
           <a:chExt cx="0" cy="0"/>
         </a:xfrm>
       </p:grpSpPr>
+      <p:sp>
+        <p:nvSpPr>
+          <p:cNvPr id="2" name="Title 1">
+            <a:extLst>
+              <a:ext uri="{FF2B5EF4-FFF2-40B4-BE49-F238E27FC236}">
+                <a16:creationId xmlns:a16="http://schemas.microsoft.com/office/drawing/2014/main" id="{619F2689-C759-C3E1-4511-9C8A241B1636}"/>
+              </a:ext>
+            </a:extLst>
+          </p:cNvPr>
+          <p:cNvSpPr>
+            <a:spLocks noGrp="1"/>
+          </p:cNvSpPr>
+          <p:nvPr>
+            <p:ph type="title"/>
+          </p:nvPr>
+        </p:nvSpPr>
+        <p:spPr/>
+        <p:txBody>
+          <a:bodyPr/>
+          <a:lstStyle/>
+          <a:p>
+            <a:r>
+              <a:rPr lang="en-US" dirty="0"/>
+              <a:t>Visualizing Conserved Markers</a:t>
+            </a:r>
+          </a:p>
+        </p:txBody>
+      </p:sp>
+      <p:pic>
+        <p:nvPicPr>
+          <p:cNvPr id="4" name="Picture 3">
+            <a:extLst>
+              <a:ext uri="{FF2B5EF4-FFF2-40B4-BE49-F238E27FC236}">
+                <a16:creationId xmlns:a16="http://schemas.microsoft.com/office/drawing/2014/main" id="{B11B4E58-83B5-9566-CE32-4995D61A7D06}"/>
+              </a:ext>
+            </a:extLst>
+          </p:cNvPr>
+          <p:cNvPicPr>
+            <a:picLocks noChangeAspect="1"/>
+          </p:cNvPicPr>
+          <p:nvPr/>
+        </p:nvPicPr>
+        <p:blipFill rotWithShape="1">
+          <a:blip r:embed="rId2"/>
+          <a:srcRect t="787"/>
+          <a:stretch/>
+        </p:blipFill>
+        <p:spPr>
+          <a:xfrm>
+            <a:off x="3962038" y="1743837"/>
+            <a:ext cx="6528523" cy="4608576"/>
+          </a:xfrm>
+          <a:prstGeom prst="rect">
+            <a:avLst/>
+          </a:prstGeom>
+        </p:spPr>
+      </p:pic>
+      <p:pic>
+        <p:nvPicPr>
+          <p:cNvPr id="6" name="Picture 5">
+            <a:extLst>
+              <a:ext uri="{FF2B5EF4-FFF2-40B4-BE49-F238E27FC236}">
+                <a16:creationId xmlns:a16="http://schemas.microsoft.com/office/drawing/2014/main" id="{4B124AD2-C779-8E50-CDA8-E9D74457F10A}"/>
+              </a:ext>
+            </a:extLst>
+          </p:cNvPr>
+          <p:cNvPicPr>
+            <a:picLocks noChangeAspect="1"/>
+          </p:cNvPicPr>
+          <p:nvPr/>
+        </p:nvPicPr>
+        <p:blipFill>
+          <a:blip r:embed="rId3"/>
+          <a:stretch>
+            <a:fillRect/>
+          </a:stretch>
+        </p:blipFill>
+        <p:spPr>
+          <a:xfrm>
+            <a:off x="3033285" y="762583"/>
+            <a:ext cx="6125430" cy="847843"/>
+          </a:xfrm>
+          <a:prstGeom prst="rect">
+            <a:avLst/>
+          </a:prstGeom>
+        </p:spPr>
+      </p:pic>
+      <p:sp>
+        <p:nvSpPr>
+          <p:cNvPr id="3" name="Rectangle 2">
+            <a:extLst>
+              <a:ext uri="{FF2B5EF4-FFF2-40B4-BE49-F238E27FC236}">
+                <a16:creationId xmlns:a16="http://schemas.microsoft.com/office/drawing/2014/main" id="{732B2906-249A-CA90-2F59-F9091FEC85A5}"/>
+              </a:ext>
+            </a:extLst>
+          </p:cNvPr>
+          <p:cNvSpPr/>
+          <p:nvPr/>
+        </p:nvSpPr>
+        <p:spPr>
+          <a:xfrm>
+            <a:off x="0" y="767072"/>
+            <a:ext cx="1892300" cy="2707013"/>
+          </a:xfrm>
+          <a:prstGeom prst="rect">
+            <a:avLst/>
+          </a:prstGeom>
+          <a:solidFill>
+            <a:srgbClr val="FFFFFF">
+              <a:alpha val="60000"/>
+            </a:srgbClr>
+          </a:solidFill>
+          <a:ln>
+            <a:noFill/>
+          </a:ln>
+        </p:spPr>
+        <p:style>
+          <a:lnRef idx="2">
+            <a:schemeClr val="accent1">
+              <a:shade val="15000"/>
+            </a:schemeClr>
+          </a:lnRef>
+          <a:fillRef idx="1">
+            <a:schemeClr val="accent1"/>
+          </a:fillRef>
+          <a:effectRef idx="0">
+            <a:schemeClr val="accent1"/>
+          </a:effectRef>
+          <a:fontRef idx="minor">
+            <a:schemeClr val="lt1"/>
+          </a:fontRef>
+        </p:style>
+        <p:txBody>
+          <a:bodyPr rtlCol="0" anchor="ctr"/>
+          <a:lstStyle/>
+          <a:p>
+            <a:pPr algn="ctr"/>
+            <a:endParaRPr lang="en-US"/>
+          </a:p>
+        </p:txBody>
+      </p:sp>
+      <p:sp>
+        <p:nvSpPr>
+          <p:cNvPr id="5" name="Rectangle 4">
+            <a:extLst>
+              <a:ext uri="{FF2B5EF4-FFF2-40B4-BE49-F238E27FC236}">
+                <a16:creationId xmlns:a16="http://schemas.microsoft.com/office/drawing/2014/main" id="{7466BB79-B178-0759-F4CE-3DA1CA5DB078}"/>
+              </a:ext>
+            </a:extLst>
+          </p:cNvPr>
+          <p:cNvSpPr/>
+          <p:nvPr/>
+        </p:nvSpPr>
+        <p:spPr>
+          <a:xfrm>
+            <a:off x="25063" y="4533900"/>
+            <a:ext cx="1892300" cy="2324099"/>
+          </a:xfrm>
+          <a:prstGeom prst="rect">
+            <a:avLst/>
+          </a:prstGeom>
+          <a:solidFill>
+            <a:srgbClr val="FFFFFF">
+              <a:alpha val="60000"/>
+            </a:srgbClr>
+          </a:solidFill>
+          <a:ln>
+            <a:noFill/>
+          </a:ln>
+        </p:spPr>
+        <p:style>
+          <a:lnRef idx="2">
+            <a:schemeClr val="accent1">
+              <a:shade val="15000"/>
+            </a:schemeClr>
+          </a:lnRef>
+          <a:fillRef idx="1">
+            <a:schemeClr val="accent1"/>
+          </a:fillRef>
+          <a:effectRef idx="0">
+            <a:schemeClr val="accent1"/>
+          </a:effectRef>
+          <a:fontRef idx="minor">
+            <a:schemeClr val="lt1"/>
+          </a:fontRef>
+        </p:style>
+        <p:txBody>
+          <a:bodyPr rtlCol="0" anchor="ctr"/>
+          <a:lstStyle/>
+          <a:p>
+            <a:pPr algn="ctr"/>
+            <a:endParaRPr lang="en-US"/>
+          </a:p>
+        </p:txBody>
+      </p:sp>
+    </p:spTree>
+    <p:extLst>
+      <p:ext uri="{BB962C8B-B14F-4D97-AF65-F5344CB8AC3E}">
+        <p14:creationId xmlns:p14="http://schemas.microsoft.com/office/powerpoint/2010/main" val="2205134938"/>
+      </p:ext>
+    </p:extLst>
+  </p:cSld>
+  <p:clrMapOvr>
+    <a:masterClrMapping/>
+  </p:clrMapOvr>
+</p:sld>
+</file>
+
+<file path=ppt/slides/slide5.xml><?xml version="1.0" encoding="utf-8"?>
+<p:sld xmlns:a="http://schemas.openxmlformats.org/drawingml/2006/main" xmlns:r="http://schemas.openxmlformats.org/officeDocument/2006/relationships" xmlns:p="http://schemas.openxmlformats.org/presentationml/2006/main">
+  <p:cSld>
+    <p:spTree>
+      <p:nvGrpSpPr>
+        <p:cNvPr id="1" name=""/>
+        <p:cNvGrpSpPr/>
+        <p:nvPr/>
+      </p:nvGrpSpPr>
+      <p:grpSpPr>
+        <a:xfrm>
+          <a:off x="0" y="0"/>
+          <a:ext cx="0" cy="0"/>
+          <a:chOff x="0" y="0"/>
+          <a:chExt cx="0" cy="0"/>
+        </a:xfrm>
+      </p:grpSpPr>
       <p:grpSp>
         <p:nvGrpSpPr>
           <p:cNvPr id="13" name="Group 12">
@@ -3854,10 +5825,10 @@
         </p:nvGrpSpPr>
         <p:grpSpPr>
           <a:xfrm>
-            <a:off x="3167868" y="3762009"/>
-            <a:ext cx="4072394" cy="1242486"/>
+            <a:off x="8472640" y="3160600"/>
+            <a:ext cx="3649510" cy="1242486"/>
             <a:chOff x="252542" y="3093864"/>
-            <a:chExt cx="3335559" cy="1017678"/>
+            <a:chExt cx="2989189" cy="1017678"/>
           </a:xfrm>
         </p:grpSpPr>
         <p:pic>
@@ -3876,13 +5847,13 @@
           </p:nvPicPr>
           <p:blipFill rotWithShape="1">
             <a:blip r:embed="rId2"/>
-            <a:srcRect b="85917"/>
+            <a:srcRect r="10384" b="85917"/>
             <a:stretch/>
           </p:blipFill>
           <p:spPr>
             <a:xfrm>
               <a:off x="252542" y="3093864"/>
-              <a:ext cx="3335559" cy="143112"/>
+              <a:ext cx="2989189" cy="143112"/>
             </a:xfrm>
             <a:prstGeom prst="rect">
               <a:avLst/>
@@ -3971,7 +5942,7 @@
           <a:p>
             <a:r>
               <a:rPr lang="en-US" dirty="0"/>
-              <a:t>Differential Gene Expression Analysis: Naïve 1</a:t>
+              <a:t>Differential Gene Expression Analysis: Single Sample</a:t>
             </a:r>
           </a:p>
         </p:txBody>
@@ -3990,8 +5961,8 @@
         </p:nvSpPr>
         <p:spPr>
           <a:xfrm>
-            <a:off x="3430557" y="5652633"/>
-            <a:ext cx="2665443" cy="938719"/>
+            <a:off x="8472640" y="5237012"/>
+            <a:ext cx="3338360" cy="769441"/>
           </a:xfrm>
           <a:prstGeom prst="rect">
             <a:avLst/>
@@ -4128,7 +6099,7 @@
         </p:blipFill>
         <p:spPr>
           <a:xfrm>
-            <a:off x="3251262" y="665373"/>
+            <a:off x="2574678" y="652817"/>
             <a:ext cx="6154009" cy="2238687"/>
           </a:xfrm>
           <a:prstGeom prst="rect">
@@ -4158,7 +6129,7 @@
         </p:blipFill>
         <p:spPr>
           <a:xfrm>
-            <a:off x="6639534" y="2916904"/>
+            <a:off x="2574678" y="2891504"/>
             <a:ext cx="5531475" cy="3941096"/>
           </a:xfrm>
           <a:prstGeom prst="rect">
@@ -4166,6 +6137,114 @@
           </a:prstGeom>
         </p:spPr>
       </p:pic>
+      <p:sp>
+        <p:nvSpPr>
+          <p:cNvPr id="3" name="Rectangle 2">
+            <a:extLst>
+              <a:ext uri="{FF2B5EF4-FFF2-40B4-BE49-F238E27FC236}">
+                <a16:creationId xmlns:a16="http://schemas.microsoft.com/office/drawing/2014/main" id="{1B50DD50-B3A9-DDDB-DA4A-3EE90D95DC08}"/>
+              </a:ext>
+            </a:extLst>
+          </p:cNvPr>
+          <p:cNvSpPr/>
+          <p:nvPr/>
+        </p:nvSpPr>
+        <p:spPr>
+          <a:xfrm>
+            <a:off x="0" y="767072"/>
+            <a:ext cx="1892300" cy="3741428"/>
+          </a:xfrm>
+          <a:prstGeom prst="rect">
+            <a:avLst/>
+          </a:prstGeom>
+          <a:solidFill>
+            <a:srgbClr val="FFFFFF">
+              <a:alpha val="60000"/>
+            </a:srgbClr>
+          </a:solidFill>
+          <a:ln>
+            <a:noFill/>
+          </a:ln>
+        </p:spPr>
+        <p:style>
+          <a:lnRef idx="2">
+            <a:schemeClr val="accent1">
+              <a:shade val="15000"/>
+            </a:schemeClr>
+          </a:lnRef>
+          <a:fillRef idx="1">
+            <a:schemeClr val="accent1"/>
+          </a:fillRef>
+          <a:effectRef idx="0">
+            <a:schemeClr val="accent1"/>
+          </a:effectRef>
+          <a:fontRef idx="minor">
+            <a:schemeClr val="lt1"/>
+          </a:fontRef>
+        </p:style>
+        <p:txBody>
+          <a:bodyPr rtlCol="0" anchor="ctr"/>
+          <a:lstStyle/>
+          <a:p>
+            <a:pPr algn="ctr"/>
+            <a:endParaRPr lang="en-US"/>
+          </a:p>
+        </p:txBody>
+      </p:sp>
+      <p:sp>
+        <p:nvSpPr>
+          <p:cNvPr id="4" name="Rectangle 3">
+            <a:extLst>
+              <a:ext uri="{FF2B5EF4-FFF2-40B4-BE49-F238E27FC236}">
+                <a16:creationId xmlns:a16="http://schemas.microsoft.com/office/drawing/2014/main" id="{7618DD6E-55E4-2F93-3395-C32DB130001E}"/>
+              </a:ext>
+            </a:extLst>
+          </p:cNvPr>
+          <p:cNvSpPr/>
+          <p:nvPr/>
+        </p:nvSpPr>
+        <p:spPr>
+          <a:xfrm>
+            <a:off x="25063" y="5410200"/>
+            <a:ext cx="1892300" cy="1447799"/>
+          </a:xfrm>
+          <a:prstGeom prst="rect">
+            <a:avLst/>
+          </a:prstGeom>
+          <a:solidFill>
+            <a:srgbClr val="FFFFFF">
+              <a:alpha val="60000"/>
+            </a:srgbClr>
+          </a:solidFill>
+          <a:ln>
+            <a:noFill/>
+          </a:ln>
+        </p:spPr>
+        <p:style>
+          <a:lnRef idx="2">
+            <a:schemeClr val="accent1">
+              <a:shade val="15000"/>
+            </a:schemeClr>
+          </a:lnRef>
+          <a:fillRef idx="1">
+            <a:schemeClr val="accent1"/>
+          </a:fillRef>
+          <a:effectRef idx="0">
+            <a:schemeClr val="accent1"/>
+          </a:effectRef>
+          <a:fontRef idx="minor">
+            <a:schemeClr val="lt1"/>
+          </a:fontRef>
+        </p:style>
+        <p:txBody>
+          <a:bodyPr rtlCol="0" anchor="ctr"/>
+          <a:lstStyle/>
+          <a:p>
+            <a:pPr algn="ctr"/>
+            <a:endParaRPr lang="en-US"/>
+          </a:p>
+        </p:txBody>
+      </p:sp>
     </p:spTree>
     <p:extLst>
       <p:ext uri="{BB962C8B-B14F-4D97-AF65-F5344CB8AC3E}">
@@ -4179,7 +6258,7 @@
 </p:sld>
 </file>
 
-<file path=ppt/slides/slide5.xml><?xml version="1.0" encoding="utf-8"?>
+<file path=ppt/slides/slide6.xml><?xml version="1.0" encoding="utf-8"?>
 <p:sld xmlns:a="http://schemas.openxmlformats.org/drawingml/2006/main" xmlns:r="http://schemas.openxmlformats.org/officeDocument/2006/relationships" xmlns:p="http://schemas.openxmlformats.org/presentationml/2006/main">
   <p:cSld>
     <p:spTree>
@@ -4222,7 +6301,7 @@
               <a:t>Differential Gene Expression Analysis: </a:t>
             </a:r>
             <a:r>
-              <a:rPr lang="en-US"/>
+              <a:rPr lang="en-US" dirty="0" err="1"/>
               <a:t>Pseudobulk</a:t>
             </a:r>
             <a:endParaRPr lang="en-US" dirty="0"/>
@@ -4243,7 +6322,7 @@
         </p:nvSpPr>
         <p:spPr>
           <a:xfrm>
-            <a:off x="3804084" y="5579158"/>
+            <a:off x="2450685" y="932654"/>
             <a:ext cx="7671629" cy="923330"/>
           </a:xfrm>
           <a:prstGeom prst="rect">
@@ -4312,8 +6391,261 @@
         </p:blipFill>
         <p:spPr>
           <a:xfrm>
-            <a:off x="3604059" y="731452"/>
+            <a:off x="2539585" y="2159466"/>
             <a:ext cx="6144482" cy="3705742"/>
+          </a:xfrm>
+          <a:prstGeom prst="rect">
+            <a:avLst/>
+          </a:prstGeom>
+        </p:spPr>
+      </p:pic>
+      <p:sp>
+        <p:nvSpPr>
+          <p:cNvPr id="3" name="Rectangle 2">
+            <a:extLst>
+              <a:ext uri="{FF2B5EF4-FFF2-40B4-BE49-F238E27FC236}">
+                <a16:creationId xmlns:a16="http://schemas.microsoft.com/office/drawing/2014/main" id="{56A5E2E0-BABA-E742-16E7-6BFE68848EEA}"/>
+              </a:ext>
+            </a:extLst>
+          </p:cNvPr>
+          <p:cNvSpPr/>
+          <p:nvPr/>
+        </p:nvSpPr>
+        <p:spPr>
+          <a:xfrm>
+            <a:off x="0" y="767072"/>
+            <a:ext cx="1892300" cy="4744728"/>
+          </a:xfrm>
+          <a:prstGeom prst="rect">
+            <a:avLst/>
+          </a:prstGeom>
+          <a:solidFill>
+            <a:srgbClr val="FFFFFF">
+              <a:alpha val="60000"/>
+            </a:srgbClr>
+          </a:solidFill>
+          <a:ln>
+            <a:noFill/>
+          </a:ln>
+        </p:spPr>
+        <p:style>
+          <a:lnRef idx="2">
+            <a:schemeClr val="accent1">
+              <a:shade val="15000"/>
+            </a:schemeClr>
+          </a:lnRef>
+          <a:fillRef idx="1">
+            <a:schemeClr val="accent1"/>
+          </a:fillRef>
+          <a:effectRef idx="0">
+            <a:schemeClr val="accent1"/>
+          </a:effectRef>
+          <a:fontRef idx="minor">
+            <a:schemeClr val="lt1"/>
+          </a:fontRef>
+        </p:style>
+        <p:txBody>
+          <a:bodyPr rtlCol="0" anchor="ctr"/>
+          <a:lstStyle/>
+          <a:p>
+            <a:pPr algn="ctr"/>
+            <a:endParaRPr lang="en-US"/>
+          </a:p>
+        </p:txBody>
+      </p:sp>
+      <p:sp>
+        <p:nvSpPr>
+          <p:cNvPr id="5" name="Rectangle 4">
+            <a:extLst>
+              <a:ext uri="{FF2B5EF4-FFF2-40B4-BE49-F238E27FC236}">
+                <a16:creationId xmlns:a16="http://schemas.microsoft.com/office/drawing/2014/main" id="{5A4D94B0-3CA7-7645-0BEE-91D0C9A89891}"/>
+              </a:ext>
+            </a:extLst>
+          </p:cNvPr>
+          <p:cNvSpPr/>
+          <p:nvPr/>
+        </p:nvSpPr>
+        <p:spPr>
+          <a:xfrm>
+            <a:off x="25063" y="6400800"/>
+            <a:ext cx="1892300" cy="457199"/>
+          </a:xfrm>
+          <a:prstGeom prst="rect">
+            <a:avLst/>
+          </a:prstGeom>
+          <a:solidFill>
+            <a:srgbClr val="FFFFFF">
+              <a:alpha val="60000"/>
+            </a:srgbClr>
+          </a:solidFill>
+          <a:ln>
+            <a:noFill/>
+          </a:ln>
+        </p:spPr>
+        <p:style>
+          <a:lnRef idx="2">
+            <a:schemeClr val="accent1">
+              <a:shade val="15000"/>
+            </a:schemeClr>
+          </a:lnRef>
+          <a:fillRef idx="1">
+            <a:schemeClr val="accent1"/>
+          </a:fillRef>
+          <a:effectRef idx="0">
+            <a:schemeClr val="accent1"/>
+          </a:effectRef>
+          <a:fontRef idx="minor">
+            <a:schemeClr val="lt1"/>
+          </a:fontRef>
+        </p:style>
+        <p:txBody>
+          <a:bodyPr rtlCol="0" anchor="ctr"/>
+          <a:lstStyle/>
+          <a:p>
+            <a:pPr algn="ctr"/>
+            <a:endParaRPr lang="en-US"/>
+          </a:p>
+        </p:txBody>
+      </p:sp>
+    </p:spTree>
+    <p:extLst>
+      <p:ext uri="{BB962C8B-B14F-4D97-AF65-F5344CB8AC3E}">
+        <p14:creationId xmlns:p14="http://schemas.microsoft.com/office/powerpoint/2010/main" val="1762789551"/>
+      </p:ext>
+    </p:extLst>
+  </p:cSld>
+  <p:clrMapOvr>
+    <a:masterClrMapping/>
+  </p:clrMapOvr>
+</p:sld>
+</file>
+
+<file path=ppt/slides/slide7.xml><?xml version="1.0" encoding="utf-8"?>
+<p:sld xmlns:a="http://schemas.openxmlformats.org/drawingml/2006/main" xmlns:r="http://schemas.openxmlformats.org/officeDocument/2006/relationships" xmlns:p="http://schemas.openxmlformats.org/presentationml/2006/main">
+  <p:cSld>
+    <p:spTree>
+      <p:nvGrpSpPr>
+        <p:cNvPr id="1" name=""/>
+        <p:cNvGrpSpPr/>
+        <p:nvPr/>
+      </p:nvGrpSpPr>
+      <p:grpSpPr>
+        <a:xfrm>
+          <a:off x="0" y="0"/>
+          <a:ext cx="0" cy="0"/>
+          <a:chOff x="0" y="0"/>
+          <a:chExt cx="0" cy="0"/>
+        </a:xfrm>
+      </p:grpSpPr>
+      <p:sp>
+        <p:nvSpPr>
+          <p:cNvPr id="12" name="Rectangle 11">
+            <a:extLst>
+              <a:ext uri="{FF2B5EF4-FFF2-40B4-BE49-F238E27FC236}">
+                <a16:creationId xmlns:a16="http://schemas.microsoft.com/office/drawing/2014/main" id="{202FB805-1501-E356-D038-BC93C61C3699}"/>
+              </a:ext>
+            </a:extLst>
+          </p:cNvPr>
+          <p:cNvSpPr/>
+          <p:nvPr/>
+        </p:nvSpPr>
+        <p:spPr>
+          <a:xfrm>
+            <a:off x="9414252" y="6205018"/>
+            <a:ext cx="2777748" cy="629173"/>
+          </a:xfrm>
+          <a:prstGeom prst="rect">
+            <a:avLst/>
+          </a:prstGeom>
+          <a:solidFill>
+            <a:schemeClr val="bg1"/>
+          </a:solidFill>
+          <a:ln>
+            <a:noFill/>
+          </a:ln>
+        </p:spPr>
+        <p:style>
+          <a:lnRef idx="2">
+            <a:schemeClr val="accent1">
+              <a:shade val="15000"/>
+            </a:schemeClr>
+          </a:lnRef>
+          <a:fillRef idx="1">
+            <a:schemeClr val="accent1"/>
+          </a:fillRef>
+          <a:effectRef idx="0">
+            <a:schemeClr val="accent1"/>
+          </a:effectRef>
+          <a:fontRef idx="minor">
+            <a:schemeClr val="lt1"/>
+          </a:fontRef>
+        </p:style>
+        <p:txBody>
+          <a:bodyPr rtlCol="0" anchor="ctr"/>
+          <a:lstStyle/>
+          <a:p>
+            <a:pPr algn="ctr"/>
+            <a:endParaRPr lang="en-US"/>
+          </a:p>
+        </p:txBody>
+      </p:sp>
+      <p:sp>
+        <p:nvSpPr>
+          <p:cNvPr id="2" name="Title 1">
+            <a:extLst>
+              <a:ext uri="{FF2B5EF4-FFF2-40B4-BE49-F238E27FC236}">
+                <a16:creationId xmlns:a16="http://schemas.microsoft.com/office/drawing/2014/main" id="{84D990F1-793D-118D-7A05-F5FA2CA48C27}"/>
+              </a:ext>
+            </a:extLst>
+          </p:cNvPr>
+          <p:cNvSpPr>
+            <a:spLocks noGrp="1"/>
+          </p:cNvSpPr>
+          <p:nvPr>
+            <p:ph type="title"/>
+          </p:nvPr>
+        </p:nvSpPr>
+        <p:spPr/>
+        <p:txBody>
+          <a:bodyPr/>
+          <a:lstStyle/>
+          <a:p>
+            <a:r>
+              <a:rPr lang="en-US" dirty="0"/>
+              <a:t>Differential Gene Expression Analysis: </a:t>
+            </a:r>
+            <a:r>
+              <a:rPr lang="en-US" dirty="0" err="1"/>
+              <a:t>Pseudobulk</a:t>
+            </a:r>
+            <a:endParaRPr lang="en-US" dirty="0"/>
+          </a:p>
+        </p:txBody>
+      </p:sp>
+      <p:pic>
+        <p:nvPicPr>
+          <p:cNvPr id="4" name="Picture 3">
+            <a:extLst>
+              <a:ext uri="{FF2B5EF4-FFF2-40B4-BE49-F238E27FC236}">
+                <a16:creationId xmlns:a16="http://schemas.microsoft.com/office/drawing/2014/main" id="{911FB73A-7505-1887-DFA4-15CA106812B7}"/>
+              </a:ext>
+            </a:extLst>
+          </p:cNvPr>
+          <p:cNvPicPr>
+            <a:picLocks noChangeAspect="1"/>
+          </p:cNvPicPr>
+          <p:nvPr/>
+        </p:nvPicPr>
+        <p:blipFill>
+          <a:blip r:embed="rId2"/>
+          <a:stretch>
+            <a:fillRect/>
+          </a:stretch>
+        </p:blipFill>
+        <p:spPr>
+          <a:xfrm>
+            <a:off x="2444373" y="863596"/>
+            <a:ext cx="6154009" cy="962159"/>
           </a:xfrm>
           <a:prstGeom prst="rect">
             <a:avLst/>
@@ -4322,10 +6654,10 @@
       </p:pic>
       <p:pic>
         <p:nvPicPr>
-          <p:cNvPr id="4" name="Picture 3">
-            <a:extLst>
-              <a:ext uri="{FF2B5EF4-FFF2-40B4-BE49-F238E27FC236}">
-                <a16:creationId xmlns:a16="http://schemas.microsoft.com/office/drawing/2014/main" id="{937188EB-39D5-8C4D-AEB8-CD3B34439492}"/>
+          <p:cNvPr id="8" name="Picture 7">
+            <a:extLst>
+              <a:ext uri="{FF2B5EF4-FFF2-40B4-BE49-F238E27FC236}">
+                <a16:creationId xmlns:a16="http://schemas.microsoft.com/office/drawing/2014/main" id="{D3765482-0B09-C377-8EA2-F4A7F26010A3}"/>
               </a:ext>
             </a:extLst>
           </p:cNvPr>
@@ -4342,18 +6674,214 @@
         </p:blipFill>
         <p:spPr>
           <a:xfrm>
-            <a:off x="8801518" y="4020014"/>
-            <a:ext cx="3304757" cy="1462150"/>
+            <a:off x="2444373" y="1888616"/>
+            <a:ext cx="5797927" cy="4983476"/>
           </a:xfrm>
           <a:prstGeom prst="rect">
             <a:avLst/>
           </a:prstGeom>
         </p:spPr>
       </p:pic>
+      <p:pic>
+        <p:nvPicPr>
+          <p:cNvPr id="9" name="Picture 8">
+            <a:extLst>
+              <a:ext uri="{FF2B5EF4-FFF2-40B4-BE49-F238E27FC236}">
+                <a16:creationId xmlns:a16="http://schemas.microsoft.com/office/drawing/2014/main" id="{937188EB-39D5-8C4D-AEB8-CD3B34439492}"/>
+              </a:ext>
+            </a:extLst>
+          </p:cNvPr>
+          <p:cNvPicPr>
+            <a:picLocks noChangeAspect="1"/>
+          </p:cNvPicPr>
+          <p:nvPr/>
+        </p:nvPicPr>
+        <p:blipFill>
+          <a:blip r:embed="rId4"/>
+          <a:stretch>
+            <a:fillRect/>
+          </a:stretch>
+        </p:blipFill>
+        <p:spPr>
+          <a:xfrm>
+            <a:off x="7766001" y="4708022"/>
+            <a:ext cx="4041757" cy="1788227"/>
+          </a:xfrm>
+          <a:prstGeom prst="rect">
+            <a:avLst/>
+          </a:prstGeom>
+        </p:spPr>
+      </p:pic>
+      <p:sp>
+        <p:nvSpPr>
+          <p:cNvPr id="10" name="Rectangle 9">
+            <a:extLst>
+              <a:ext uri="{FF2B5EF4-FFF2-40B4-BE49-F238E27FC236}">
+                <a16:creationId xmlns:a16="http://schemas.microsoft.com/office/drawing/2014/main" id="{4F376D3B-A68C-CEDA-0ECA-CCF893DDBE0E}"/>
+              </a:ext>
+            </a:extLst>
+          </p:cNvPr>
+          <p:cNvSpPr/>
+          <p:nvPr/>
+        </p:nvSpPr>
+        <p:spPr>
+          <a:xfrm>
+            <a:off x="0" y="767072"/>
+            <a:ext cx="1892300" cy="4744728"/>
+          </a:xfrm>
+          <a:prstGeom prst="rect">
+            <a:avLst/>
+          </a:prstGeom>
+          <a:solidFill>
+            <a:srgbClr val="FFFFFF">
+              <a:alpha val="60000"/>
+            </a:srgbClr>
+          </a:solidFill>
+          <a:ln>
+            <a:noFill/>
+          </a:ln>
+        </p:spPr>
+        <p:style>
+          <a:lnRef idx="2">
+            <a:schemeClr val="accent1">
+              <a:shade val="15000"/>
+            </a:schemeClr>
+          </a:lnRef>
+          <a:fillRef idx="1">
+            <a:schemeClr val="accent1"/>
+          </a:fillRef>
+          <a:effectRef idx="0">
+            <a:schemeClr val="accent1"/>
+          </a:effectRef>
+          <a:fontRef idx="minor">
+            <a:schemeClr val="lt1"/>
+          </a:fontRef>
+        </p:style>
+        <p:txBody>
+          <a:bodyPr rtlCol="0" anchor="ctr"/>
+          <a:lstStyle/>
+          <a:p>
+            <a:pPr algn="ctr"/>
+            <a:endParaRPr lang="en-US"/>
+          </a:p>
+        </p:txBody>
+      </p:sp>
+      <p:sp>
+        <p:nvSpPr>
+          <p:cNvPr id="11" name="Rectangle 10">
+            <a:extLst>
+              <a:ext uri="{FF2B5EF4-FFF2-40B4-BE49-F238E27FC236}">
+                <a16:creationId xmlns:a16="http://schemas.microsoft.com/office/drawing/2014/main" id="{EB2B0ED3-774E-B285-6102-C57AD7C80B75}"/>
+              </a:ext>
+            </a:extLst>
+          </p:cNvPr>
+          <p:cNvSpPr/>
+          <p:nvPr/>
+        </p:nvSpPr>
+        <p:spPr>
+          <a:xfrm>
+            <a:off x="25063" y="6400800"/>
+            <a:ext cx="1892300" cy="457199"/>
+          </a:xfrm>
+          <a:prstGeom prst="rect">
+            <a:avLst/>
+          </a:prstGeom>
+          <a:solidFill>
+            <a:srgbClr val="FFFFFF">
+              <a:alpha val="60000"/>
+            </a:srgbClr>
+          </a:solidFill>
+          <a:ln>
+            <a:noFill/>
+          </a:ln>
+        </p:spPr>
+        <p:style>
+          <a:lnRef idx="2">
+            <a:schemeClr val="accent1">
+              <a:shade val="15000"/>
+            </a:schemeClr>
+          </a:lnRef>
+          <a:fillRef idx="1">
+            <a:schemeClr val="accent1"/>
+          </a:fillRef>
+          <a:effectRef idx="0">
+            <a:schemeClr val="accent1"/>
+          </a:effectRef>
+          <a:fontRef idx="minor">
+            <a:schemeClr val="lt1"/>
+          </a:fontRef>
+        </p:style>
+        <p:txBody>
+          <a:bodyPr rtlCol="0" anchor="ctr"/>
+          <a:lstStyle/>
+          <a:p>
+            <a:pPr algn="ctr"/>
+            <a:endParaRPr lang="en-US"/>
+          </a:p>
+        </p:txBody>
+      </p:sp>
     </p:spTree>
     <p:extLst>
       <p:ext uri="{BB962C8B-B14F-4D97-AF65-F5344CB8AC3E}">
-        <p14:creationId xmlns:p14="http://schemas.microsoft.com/office/powerpoint/2010/main" val="1762789551"/>
+        <p14:creationId xmlns:p14="http://schemas.microsoft.com/office/powerpoint/2010/main" val="3481777106"/>
+      </p:ext>
+    </p:extLst>
+  </p:cSld>
+  <p:clrMapOvr>
+    <a:masterClrMapping/>
+  </p:clrMapOvr>
+</p:sld>
+</file>
+
+<file path=ppt/slides/slide8.xml><?xml version="1.0" encoding="utf-8"?>
+<p:sld xmlns:a="http://schemas.openxmlformats.org/drawingml/2006/main" xmlns:r="http://schemas.openxmlformats.org/officeDocument/2006/relationships" xmlns:p="http://schemas.openxmlformats.org/presentationml/2006/main">
+  <p:cSld>
+    <p:spTree>
+      <p:nvGrpSpPr>
+        <p:cNvPr id="1" name=""/>
+        <p:cNvGrpSpPr/>
+        <p:nvPr/>
+      </p:nvGrpSpPr>
+      <p:grpSpPr>
+        <a:xfrm>
+          <a:off x="0" y="0"/>
+          <a:ext cx="0" cy="0"/>
+          <a:chOff x="0" y="0"/>
+          <a:chExt cx="0" cy="0"/>
+        </a:xfrm>
+      </p:grpSpPr>
+      <p:sp>
+        <p:nvSpPr>
+          <p:cNvPr id="2" name="Title 1">
+            <a:extLst>
+              <a:ext uri="{FF2B5EF4-FFF2-40B4-BE49-F238E27FC236}">
+                <a16:creationId xmlns:a16="http://schemas.microsoft.com/office/drawing/2014/main" id="{81C07A40-8DFE-BE6A-F4F0-6ECC768FE6AA}"/>
+              </a:ext>
+            </a:extLst>
+          </p:cNvPr>
+          <p:cNvSpPr>
+            <a:spLocks noGrp="1"/>
+          </p:cNvSpPr>
+          <p:nvPr>
+            <p:ph type="title"/>
+          </p:nvPr>
+        </p:nvSpPr>
+        <p:spPr/>
+        <p:txBody>
+          <a:bodyPr/>
+          <a:lstStyle/>
+          <a:p>
+            <a:r>
+              <a:rPr lang="en-US" dirty="0"/>
+              <a:t>PCA Loadings</a:t>
+            </a:r>
+          </a:p>
+        </p:txBody>
+      </p:sp>
+    </p:spTree>
+    <p:extLst>
+      <p:ext uri="{BB962C8B-B14F-4D97-AF65-F5344CB8AC3E}">
+        <p14:creationId xmlns:p14="http://schemas.microsoft.com/office/powerpoint/2010/main" val="2152222128"/>
       </p:ext>
     </p:extLst>
   </p:cSld>

</xml_diff>

<commit_message>
Continued updates for DGE visualization and formatting code for test_packages().
</commit_message>
<xml_diff>
--- a/M5_Seurat_DGE_and_Exploratory/M5_Seurat_DGE_Exploratory.pptx
+++ b/M5_Seurat_DGE_and_Exploratory/M5_Seurat_DGE_Exploratory.pptx
@@ -5,7 +5,7 @@
     <p:sldMasterId id="2147483656" r:id="rId1"/>
   </p:sldMasterIdLst>
   <p:notesMasterIdLst>
-    <p:notesMasterId r:id="rId17"/>
+    <p:notesMasterId r:id="rId19"/>
   </p:notesMasterIdLst>
   <p:sldIdLst>
     <p:sldId id="256" r:id="rId2"/>
@@ -13,16 +13,18 @@
     <p:sldId id="261" r:id="rId4"/>
     <p:sldId id="262" r:id="rId5"/>
     <p:sldId id="263" r:id="rId6"/>
-    <p:sldId id="264" r:id="rId7"/>
-    <p:sldId id="266" r:id="rId8"/>
-    <p:sldId id="268" r:id="rId9"/>
-    <p:sldId id="265" r:id="rId10"/>
-    <p:sldId id="269" r:id="rId11"/>
-    <p:sldId id="270" r:id="rId12"/>
-    <p:sldId id="271" r:id="rId13"/>
-    <p:sldId id="272" r:id="rId14"/>
-    <p:sldId id="273" r:id="rId15"/>
-    <p:sldId id="274" r:id="rId16"/>
+    <p:sldId id="276" r:id="rId7"/>
+    <p:sldId id="275" r:id="rId8"/>
+    <p:sldId id="264" r:id="rId9"/>
+    <p:sldId id="266" r:id="rId10"/>
+    <p:sldId id="268" r:id="rId11"/>
+    <p:sldId id="265" r:id="rId12"/>
+    <p:sldId id="269" r:id="rId13"/>
+    <p:sldId id="270" r:id="rId14"/>
+    <p:sldId id="271" r:id="rId15"/>
+    <p:sldId id="272" r:id="rId16"/>
+    <p:sldId id="273" r:id="rId17"/>
+    <p:sldId id="274" r:id="rId18"/>
   </p:sldIdLst>
   <p:sldSz cx="12192000" cy="6858000"/>
   <p:notesSz cx="6858000" cy="9144000"/>
@@ -7008,7 +7010,7 @@
           <p:cNvPr id="2" name="Title 1">
             <a:extLst>
               <a:ext uri="{FF2B5EF4-FFF2-40B4-BE49-F238E27FC236}">
-                <a16:creationId xmlns:a16="http://schemas.microsoft.com/office/drawing/2014/main" id="{7E35A846-4BFB-02A1-AF84-4918220DDC2E}"/>
+                <a16:creationId xmlns:a16="http://schemas.microsoft.com/office/drawing/2014/main" id="{4DB044FC-BD40-C353-8407-D77B973B4BB7}"/>
               </a:ext>
             </a:extLst>
           </p:cNvPr>
@@ -7024,19 +7026,16 @@
           <a:bodyPr/>
           <a:lstStyle/>
           <a:p>
-            <a:r>
-              <a:rPr lang="en-US" dirty="0"/>
-              <a:t>Visualize Highly Variable Features</a:t>
-            </a:r>
+            <a:endParaRPr lang="en-US" dirty="0"/>
           </a:p>
         </p:txBody>
       </p:sp>
       <p:sp>
         <p:nvSpPr>
-          <p:cNvPr id="4" name="TextBox 3">
-            <a:extLst>
-              <a:ext uri="{FF2B5EF4-FFF2-40B4-BE49-F238E27FC236}">
-                <a16:creationId xmlns:a16="http://schemas.microsoft.com/office/drawing/2014/main" id="{F7E9FFDF-3964-974A-F098-AF0BEF9B7ED3}"/>
+          <p:cNvPr id="5" name="TextBox 4">
+            <a:extLst>
+              <a:ext uri="{FF2B5EF4-FFF2-40B4-BE49-F238E27FC236}">
+                <a16:creationId xmlns:a16="http://schemas.microsoft.com/office/drawing/2014/main" id="{C6FDCB72-6AFB-E5C6-EE9A-34CF2FADD720}"/>
               </a:ext>
             </a:extLst>
           </p:cNvPr>
@@ -7045,8 +7044,8 @@
         </p:nvSpPr>
         <p:spPr>
           <a:xfrm>
-            <a:off x="1831086" y="937135"/>
-            <a:ext cx="6185916" cy="2862322"/>
+            <a:off x="2424108" y="4235272"/>
+            <a:ext cx="9239251" cy="923330"/>
           </a:xfrm>
           <a:prstGeom prst="rect">
             <a:avLst/>
@@ -7059,192 +7058,441 @@
           </a:bodyPr>
           <a:lstStyle/>
           <a:p>
-            <a:r>
-              <a:rPr lang="en-US" dirty="0" err="1"/>
-              <a:t>pbmc</a:t>
-            </a:r>
-            <a:r>
-              <a:rPr lang="en-US" dirty="0"/>
-              <a:t> &lt;- </a:t>
-            </a:r>
-            <a:r>
-              <a:rPr lang="en-US" dirty="0" err="1"/>
-              <a:t>FindVariableFeatures</a:t>
-            </a:r>
-            <a:r>
-              <a:rPr lang="en-US" dirty="0"/>
-              <a:t>(</a:t>
-            </a:r>
-            <a:r>
-              <a:rPr lang="en-US" dirty="0" err="1"/>
-              <a:t>pbmc</a:t>
-            </a:r>
-            <a:r>
-              <a:rPr lang="en-US" dirty="0"/>
-              <a:t>, </a:t>
-            </a:r>
-            <a:r>
-              <a:rPr lang="en-US" dirty="0" err="1"/>
-              <a:t>selection.method</a:t>
-            </a:r>
-            <a:r>
-              <a:rPr lang="en-US" dirty="0"/>
-              <a:t> = "</a:t>
-            </a:r>
-            <a:r>
-              <a:rPr lang="en-US" dirty="0" err="1"/>
-              <a:t>vst</a:t>
-            </a:r>
-            <a:r>
-              <a:rPr lang="en-US" dirty="0"/>
-              <a:t>", </a:t>
-            </a:r>
-            <a:r>
-              <a:rPr lang="en-US" dirty="0" err="1"/>
-              <a:t>nfeatures</a:t>
-            </a:r>
-            <a:r>
-              <a:rPr lang="en-US" dirty="0"/>
-              <a:t> = 2000)</a:t>
-            </a:r>
-          </a:p>
-          <a:p>
-            <a:endParaRPr lang="en-US" dirty="0"/>
-          </a:p>
-          <a:p>
-            <a:r>
-              <a:rPr lang="en-US" dirty="0"/>
-              <a:t># Identify the 10 most highly variable genes</a:t>
-            </a:r>
-          </a:p>
-          <a:p>
-            <a:r>
-              <a:rPr lang="en-US" dirty="0"/>
-              <a:t>top10 &lt;- head(</a:t>
-            </a:r>
-            <a:r>
-              <a:rPr lang="en-US" dirty="0" err="1"/>
-              <a:t>VariableFeatures</a:t>
-            </a:r>
-            <a:r>
-              <a:rPr lang="en-US" dirty="0"/>
-              <a:t>(</a:t>
-            </a:r>
-            <a:r>
-              <a:rPr lang="en-US" dirty="0" err="1"/>
-              <a:t>pbmc</a:t>
-            </a:r>
-            <a:r>
-              <a:rPr lang="en-US" dirty="0"/>
-              <a:t>), 10)</a:t>
-            </a:r>
-          </a:p>
-          <a:p>
-            <a:endParaRPr lang="en-US" dirty="0"/>
-          </a:p>
-          <a:p>
-            <a:r>
-              <a:rPr lang="en-US" dirty="0"/>
-              <a:t># plot variable features with and without labels</a:t>
-            </a:r>
-          </a:p>
-          <a:p>
-            <a:r>
-              <a:rPr lang="en-US" dirty="0"/>
-              <a:t>plot1 &lt;- </a:t>
-            </a:r>
-            <a:r>
-              <a:rPr lang="en-US" dirty="0" err="1"/>
-              <a:t>VariableFeaturePlot</a:t>
-            </a:r>
-            <a:r>
-              <a:rPr lang="en-US" dirty="0"/>
-              <a:t>(</a:t>
-            </a:r>
-            <a:r>
-              <a:rPr lang="en-US" dirty="0" err="1"/>
-              <a:t>pbmc</a:t>
-            </a:r>
-            <a:r>
-              <a:rPr lang="en-US" dirty="0"/>
-              <a:t>)</a:t>
-            </a:r>
-          </a:p>
-          <a:p>
-            <a:r>
-              <a:rPr lang="en-US" dirty="0"/>
-              <a:t>plot2 &lt;- </a:t>
-            </a:r>
-            <a:r>
-              <a:rPr lang="en-US" dirty="0" err="1"/>
-              <a:t>LabelPoints</a:t>
-            </a:r>
-            <a:r>
-              <a:rPr lang="en-US" dirty="0"/>
-              <a:t>(plot = plot1, points = top10, repel = TRUE)</a:t>
-            </a:r>
-          </a:p>
-          <a:p>
-            <a:r>
-              <a:rPr lang="en-US" dirty="0"/>
-              <a:t>plot1 + plot2</a:t>
-            </a:r>
+            <a:pPr marL="0" marR="0" lvl="0" indent="0" algn="l" defTabSz="914400" rtl="0" eaLnBrk="0" fontAlgn="base" latinLnBrk="0" hangingPunct="0">
+              <a:lnSpc>
+                <a:spcPct val="100000"/>
+              </a:lnSpc>
+              <a:spcBef>
+                <a:spcPct val="0"/>
+              </a:spcBef>
+              <a:spcAft>
+                <a:spcPct val="0"/>
+              </a:spcAft>
+              <a:buClrTx/>
+              <a:buSzTx/>
+              <a:buFontTx/>
+              <a:buNone/>
+              <a:tabLst/>
+            </a:pPr>
+            <a:r>
+              <a:rPr kumimoji="0" lang="en-US" altLang="en-US" sz="1800" b="1" i="0" u="none" strike="noStrike" cap="none" normalizeH="0" baseline="0" dirty="0" err="1">
+                <a:ln>
+                  <a:noFill/>
+                </a:ln>
+                <a:solidFill>
+                  <a:srgbClr val="000000"/>
+                </a:solidFill>
+                <a:effectLst/>
+                <a:latin typeface="Consolas" panose="020B0609020204030204" pitchFamily="49" charset="0"/>
+                <a:cs typeface="Arial" panose="020B0604020202020204" pitchFamily="34" charset="0"/>
+              </a:rPr>
+              <a:t>FindConservedMarkers</a:t>
+            </a:r>
+            <a:r>
+              <a:rPr kumimoji="0" lang="en-US" altLang="en-US" sz="1800" b="0" i="0" u="none" strike="noStrike" cap="none" normalizeH="0" baseline="0" dirty="0">
+                <a:ln>
+                  <a:noFill/>
+                </a:ln>
+                <a:solidFill>
+                  <a:srgbClr val="000000"/>
+                </a:solidFill>
+                <a:effectLst/>
+                <a:latin typeface="Consolas" panose="020B0609020204030204" pitchFamily="49" charset="0"/>
+                <a:cs typeface="Arial" panose="020B0604020202020204" pitchFamily="34" charset="0"/>
+              </a:rPr>
+              <a:t>:</a:t>
+            </a:r>
+            <a:r>
+              <a:rPr kumimoji="0" lang="en-US" altLang="en-US" sz="1800" b="0" i="0" u="none" strike="noStrike" cap="none" normalizeH="0" baseline="0" dirty="0">
+                <a:ln>
+                  <a:noFill/>
+                </a:ln>
+                <a:solidFill>
+                  <a:srgbClr val="333333"/>
+                </a:solidFill>
+                <a:effectLst/>
+                <a:latin typeface="Arial" panose="020B0604020202020204" pitchFamily="34" charset="0"/>
+                <a:cs typeface="Arial" panose="020B0604020202020204" pitchFamily="34" charset="0"/>
+              </a:rPr>
+              <a:t> will find markers that are conserved between two groups. It means they are differentially expressed compared to other groups, but have similar expression between the two groups you're actually comparing.</a:t>
+            </a:r>
+            <a:endParaRPr kumimoji="0" lang="en-US" altLang="en-US" sz="4000" b="0" i="0" u="none" strike="noStrike" cap="none" normalizeH="0" baseline="0" dirty="0">
+              <a:ln>
+                <a:noFill/>
+              </a:ln>
+              <a:solidFill>
+                <a:schemeClr val="tx1"/>
+              </a:solidFill>
+              <a:effectLst/>
+              <a:latin typeface="Arial" panose="020B0604020202020204" pitchFamily="34" charset="0"/>
+            </a:endParaRPr>
+          </a:p>
+        </p:txBody>
+      </p:sp>
+      <p:sp>
+        <p:nvSpPr>
+          <p:cNvPr id="7" name="TextBox 6">
+            <a:extLst>
+              <a:ext uri="{FF2B5EF4-FFF2-40B4-BE49-F238E27FC236}">
+                <a16:creationId xmlns:a16="http://schemas.microsoft.com/office/drawing/2014/main" id="{3DC427A8-7E77-42D6-2764-F48BDC531D18}"/>
+              </a:ext>
+            </a:extLst>
+          </p:cNvPr>
+          <p:cNvSpPr txBox="1"/>
+          <p:nvPr/>
+        </p:nvSpPr>
+        <p:spPr>
+          <a:xfrm>
+            <a:off x="2424108" y="2721720"/>
+            <a:ext cx="9239251" cy="923330"/>
+          </a:xfrm>
+          <a:prstGeom prst="rect">
+            <a:avLst/>
+          </a:prstGeom>
+          <a:noFill/>
+        </p:spPr>
+        <p:txBody>
+          <a:bodyPr wrap="square">
+            <a:spAutoFit/>
+          </a:bodyPr>
+          <a:lstStyle/>
+          <a:p>
+            <a:pPr marL="0" marR="0" lvl="0" indent="0" algn="l" defTabSz="914400" rtl="0" eaLnBrk="0" fontAlgn="base" latinLnBrk="0" hangingPunct="0">
+              <a:lnSpc>
+                <a:spcPct val="100000"/>
+              </a:lnSpc>
+              <a:spcBef>
+                <a:spcPct val="0"/>
+              </a:spcBef>
+              <a:spcAft>
+                <a:spcPct val="0"/>
+              </a:spcAft>
+              <a:buClrTx/>
+              <a:buSzTx/>
+              <a:buFontTx/>
+              <a:buNone/>
+              <a:tabLst/>
+            </a:pPr>
+            <a:r>
+              <a:rPr kumimoji="0" lang="en-US" altLang="en-US" sz="1800" b="1" i="0" u="none" strike="noStrike" cap="none" normalizeH="0" baseline="0" dirty="0" err="1">
+                <a:ln>
+                  <a:noFill/>
+                </a:ln>
+                <a:solidFill>
+                  <a:srgbClr val="000000"/>
+                </a:solidFill>
+                <a:effectLst/>
+                <a:latin typeface="Consolas" panose="020B0609020204030204" pitchFamily="49" charset="0"/>
+                <a:cs typeface="Arial" panose="020B0604020202020204" pitchFamily="34" charset="0"/>
+              </a:rPr>
+              <a:t>FindAllMarkers</a:t>
+            </a:r>
+            <a:r>
+              <a:rPr kumimoji="0" lang="en-US" altLang="en-US" sz="1800" b="0" i="0" u="none" strike="noStrike" cap="none" normalizeH="0" baseline="0" dirty="0">
+                <a:ln>
+                  <a:noFill/>
+                </a:ln>
+                <a:solidFill>
+                  <a:srgbClr val="000000"/>
+                </a:solidFill>
+                <a:effectLst/>
+                <a:latin typeface="Consolas" panose="020B0609020204030204" pitchFamily="49" charset="0"/>
+                <a:cs typeface="Arial" panose="020B0604020202020204" pitchFamily="34" charset="0"/>
+              </a:rPr>
+              <a:t>:</a:t>
+            </a:r>
+            <a:r>
+              <a:rPr kumimoji="0" lang="en-US" altLang="en-US" sz="1800" b="0" i="0" u="none" strike="noStrike" cap="none" normalizeH="0" baseline="0" dirty="0">
+                <a:ln>
+                  <a:noFill/>
+                </a:ln>
+                <a:solidFill>
+                  <a:srgbClr val="333333"/>
+                </a:solidFill>
+                <a:effectLst/>
+                <a:latin typeface="Arial" panose="020B0604020202020204" pitchFamily="34" charset="0"/>
+                <a:cs typeface="Arial" panose="020B0604020202020204" pitchFamily="34" charset="0"/>
+              </a:rPr>
+              <a:t> will find markers differentially expressed </a:t>
+            </a:r>
+            <a:r>
+              <a:rPr kumimoji="0" lang="en-US" altLang="en-US" sz="1800" b="1" i="0" u="none" strike="noStrike" cap="none" normalizeH="0" baseline="0" dirty="0">
+                <a:ln>
+                  <a:noFill/>
+                </a:ln>
+                <a:solidFill>
+                  <a:srgbClr val="333333"/>
+                </a:solidFill>
+                <a:effectLst/>
+                <a:latin typeface="Arial" panose="020B0604020202020204" pitchFamily="34" charset="0"/>
+                <a:cs typeface="Arial" panose="020B0604020202020204" pitchFamily="34" charset="0"/>
+              </a:rPr>
+              <a:t>in each identity group </a:t>
+            </a:r>
+            <a:r>
+              <a:rPr kumimoji="0" lang="en-US" altLang="en-US" sz="1800" b="0" i="0" u="none" strike="noStrike" cap="none" normalizeH="0" baseline="0" dirty="0">
+                <a:ln>
+                  <a:noFill/>
+                </a:ln>
+                <a:solidFill>
+                  <a:srgbClr val="333333"/>
+                </a:solidFill>
+                <a:effectLst/>
+                <a:latin typeface="Arial" panose="020B0604020202020204" pitchFamily="34" charset="0"/>
+                <a:cs typeface="Arial" panose="020B0604020202020204" pitchFamily="34" charset="0"/>
+              </a:rPr>
+              <a:t>by comparing it to </a:t>
+            </a:r>
+            <a:r>
+              <a:rPr kumimoji="0" lang="en-US" altLang="en-US" sz="1800" b="1" i="0" u="none" strike="noStrike" cap="none" normalizeH="0" baseline="0" dirty="0">
+                <a:ln>
+                  <a:noFill/>
+                </a:ln>
+                <a:solidFill>
+                  <a:srgbClr val="333333"/>
+                </a:solidFill>
+                <a:effectLst/>
+                <a:latin typeface="Arial" panose="020B0604020202020204" pitchFamily="34" charset="0"/>
+                <a:cs typeface="Arial" panose="020B0604020202020204" pitchFamily="34" charset="0"/>
+              </a:rPr>
+              <a:t>all of the others </a:t>
+            </a:r>
+            <a:r>
+              <a:rPr kumimoji="0" lang="en-US" altLang="en-US" sz="1800" b="0" i="0" u="none" strike="noStrike" cap="none" normalizeH="0" baseline="0" dirty="0">
+                <a:ln>
+                  <a:noFill/>
+                </a:ln>
+                <a:solidFill>
+                  <a:srgbClr val="333333"/>
+                </a:solidFill>
+                <a:effectLst/>
+                <a:latin typeface="Arial" panose="020B0604020202020204" pitchFamily="34" charset="0"/>
+                <a:cs typeface="Arial" panose="020B0604020202020204" pitchFamily="34" charset="0"/>
+              </a:rPr>
+              <a:t>- you don't have to manually define anything. </a:t>
+            </a:r>
+            <a:r>
+              <a:rPr lang="en-US" altLang="en-US" dirty="0">
+                <a:solidFill>
+                  <a:srgbClr val="333333"/>
+                </a:solidFill>
+                <a:latin typeface="Arial" panose="020B0604020202020204" pitchFamily="34" charset="0"/>
+                <a:cs typeface="Arial" panose="020B0604020202020204" pitchFamily="34" charset="0"/>
+              </a:rPr>
+              <a:t>Markers are not forced to be unique to only one group.</a:t>
+            </a:r>
+            <a:endParaRPr kumimoji="0" lang="en-US" altLang="en-US" sz="1800" b="0" i="0" u="none" strike="noStrike" cap="none" normalizeH="0" baseline="0" dirty="0">
+              <a:ln>
+                <a:noFill/>
+              </a:ln>
+              <a:solidFill>
+                <a:srgbClr val="333333"/>
+              </a:solidFill>
+              <a:effectLst/>
+              <a:latin typeface="Arial" panose="020B0604020202020204" pitchFamily="34" charset="0"/>
+              <a:cs typeface="Arial" panose="020B0604020202020204" pitchFamily="34" charset="0"/>
+            </a:endParaRPr>
+          </a:p>
+        </p:txBody>
+      </p:sp>
+      <p:sp>
+        <p:nvSpPr>
+          <p:cNvPr id="9" name="TextBox 8">
+            <a:extLst>
+              <a:ext uri="{FF2B5EF4-FFF2-40B4-BE49-F238E27FC236}">
+                <a16:creationId xmlns:a16="http://schemas.microsoft.com/office/drawing/2014/main" id="{DA45A9B8-78CD-A157-E38C-883001F7CDAB}"/>
+              </a:ext>
+            </a:extLst>
+          </p:cNvPr>
+          <p:cNvSpPr txBox="1"/>
+          <p:nvPr/>
+        </p:nvSpPr>
+        <p:spPr>
+          <a:xfrm>
+            <a:off x="2424108" y="1216068"/>
+            <a:ext cx="9363075" cy="646331"/>
+          </a:xfrm>
+          <a:prstGeom prst="rect">
+            <a:avLst/>
+          </a:prstGeom>
+          <a:noFill/>
+        </p:spPr>
+        <p:txBody>
+          <a:bodyPr wrap="square">
+            <a:spAutoFit/>
+          </a:bodyPr>
+          <a:lstStyle/>
+          <a:p>
+            <a:pPr marL="0" marR="0" lvl="0" indent="0" algn="l" defTabSz="914400" rtl="0" eaLnBrk="0" fontAlgn="base" latinLnBrk="0" hangingPunct="0">
+              <a:lnSpc>
+                <a:spcPct val="100000"/>
+              </a:lnSpc>
+              <a:spcBef>
+                <a:spcPct val="0"/>
+              </a:spcBef>
+              <a:spcAft>
+                <a:spcPct val="0"/>
+              </a:spcAft>
+              <a:buClrTx/>
+              <a:buSzTx/>
+              <a:buFontTx/>
+              <a:buNone/>
+              <a:tabLst/>
+            </a:pPr>
+            <a:r>
+              <a:rPr kumimoji="0" lang="en-US" altLang="en-US" sz="1800" b="1" i="0" u="none" strike="noStrike" cap="none" normalizeH="0" baseline="0" dirty="0" err="1">
+                <a:ln>
+                  <a:noFill/>
+                </a:ln>
+                <a:solidFill>
+                  <a:srgbClr val="000000"/>
+                </a:solidFill>
+                <a:effectLst/>
+                <a:latin typeface="Consolas" panose="020B0609020204030204" pitchFamily="49" charset="0"/>
+              </a:rPr>
+              <a:t>FindMarkers</a:t>
+            </a:r>
+            <a:r>
+              <a:rPr kumimoji="0" lang="en-US" altLang="en-US" sz="1800" b="0" i="0" u="none" strike="noStrike" cap="none" normalizeH="0" baseline="0" dirty="0">
+                <a:ln>
+                  <a:noFill/>
+                </a:ln>
+                <a:solidFill>
+                  <a:srgbClr val="000000"/>
+                </a:solidFill>
+                <a:effectLst/>
+                <a:latin typeface="Consolas" panose="020B0609020204030204" pitchFamily="49" charset="0"/>
+              </a:rPr>
+              <a:t>:</a:t>
+            </a:r>
+            <a:r>
+              <a:rPr kumimoji="0" lang="en-US" altLang="en-US" sz="1800" b="0" i="0" u="none" strike="noStrike" cap="none" normalizeH="0" baseline="0" dirty="0">
+                <a:ln>
+                  <a:noFill/>
+                </a:ln>
+                <a:solidFill>
+                  <a:srgbClr val="333333"/>
+                </a:solidFill>
+                <a:effectLst/>
+                <a:latin typeface="Arial" panose="020B0604020202020204" pitchFamily="34" charset="0"/>
+              </a:rPr>
+              <a:t> will find markers between </a:t>
+            </a:r>
+            <a:r>
+              <a:rPr kumimoji="0" lang="en-US" altLang="en-US" sz="1800" b="1" i="0" u="none" strike="noStrike" cap="none" normalizeH="0" baseline="0" dirty="0">
+                <a:ln>
+                  <a:noFill/>
+                </a:ln>
+                <a:solidFill>
+                  <a:srgbClr val="333333"/>
+                </a:solidFill>
+                <a:effectLst/>
+                <a:latin typeface="Arial" panose="020B0604020202020204" pitchFamily="34" charset="0"/>
+              </a:rPr>
+              <a:t>two different identity groups </a:t>
+            </a:r>
+            <a:r>
+              <a:rPr kumimoji="0" lang="en-US" altLang="en-US" sz="1800" b="0" i="0" u="none" strike="noStrike" cap="none" normalizeH="0" baseline="0" dirty="0">
+                <a:ln>
+                  <a:noFill/>
+                </a:ln>
+                <a:solidFill>
+                  <a:srgbClr val="333333"/>
+                </a:solidFill>
+                <a:effectLst/>
+                <a:latin typeface="Arial" panose="020B0604020202020204" pitchFamily="34" charset="0"/>
+              </a:rPr>
+              <a:t>- you have to specify both identity groups. </a:t>
+            </a:r>
+            <a:endParaRPr kumimoji="0" lang="en-US" altLang="en-US" sz="1400" b="0" i="0" u="none" strike="noStrike" cap="none" normalizeH="0" baseline="0" dirty="0">
+              <a:ln>
+                <a:noFill/>
+              </a:ln>
+              <a:solidFill>
+                <a:schemeClr val="tx1"/>
+              </a:solidFill>
+              <a:effectLst/>
+            </a:endParaRPr>
           </a:p>
         </p:txBody>
       </p:sp>
       <p:pic>
         <p:nvPicPr>
-          <p:cNvPr id="3074" name="Picture 2">
-            <a:extLst>
-              <a:ext uri="{FF2B5EF4-FFF2-40B4-BE49-F238E27FC236}">
-                <a16:creationId xmlns:a16="http://schemas.microsoft.com/office/drawing/2014/main" id="{2C1B91E3-4812-B952-FD69-02A35D1E95B6}"/>
+          <p:cNvPr id="11" name="Picture 10">
+            <a:extLst>
+              <a:ext uri="{FF2B5EF4-FFF2-40B4-BE49-F238E27FC236}">
+                <a16:creationId xmlns:a16="http://schemas.microsoft.com/office/drawing/2014/main" id="{1D735602-FEEC-ACC4-BF34-2844F8594267}"/>
               </a:ext>
             </a:extLst>
           </p:cNvPr>
           <p:cNvPicPr>
-            <a:picLocks noChangeAspect="1" noChangeArrowheads="1"/>
+            <a:picLocks noChangeAspect="1"/>
           </p:cNvPicPr>
           <p:nvPr/>
         </p:nvPicPr>
         <p:blipFill>
-          <a:blip r:embed="rId2">
-            <a:extLst>
-              <a:ext uri="{28A0092B-C50C-407E-A947-70E740481C1C}">
-                <a14:useLocalDpi xmlns:a14="http://schemas.microsoft.com/office/drawing/2010/main" val="0"/>
-              </a:ext>
-            </a:extLst>
-          </a:blip>
-          <a:srcRect/>
+          <a:blip r:embed="rId2"/>
           <a:stretch>
             <a:fillRect/>
           </a:stretch>
         </p:blipFill>
-        <p:spPr bwMode="auto">
+        <p:spPr>
           <a:xfrm>
-            <a:off x="6464808" y="3799457"/>
-            <a:ext cx="5413248" cy="2706624"/>
+            <a:off x="2803802" y="6074407"/>
+            <a:ext cx="579478" cy="604313"/>
+          </a:xfrm>
+          <a:prstGeom prst="rect">
+            <a:avLst/>
+          </a:prstGeom>
+        </p:spPr>
+      </p:pic>
+      <p:sp>
+        <p:nvSpPr>
+          <p:cNvPr id="13" name="TextBox 12">
+            <a:extLst>
+              <a:ext uri="{FF2B5EF4-FFF2-40B4-BE49-F238E27FC236}">
+                <a16:creationId xmlns:a16="http://schemas.microsoft.com/office/drawing/2014/main" id="{7651324D-B1B7-7079-FEB6-7EB996747620}"/>
+              </a:ext>
+            </a:extLst>
+          </p:cNvPr>
+          <p:cNvSpPr txBox="1"/>
+          <p:nvPr/>
+        </p:nvSpPr>
+        <p:spPr>
+          <a:xfrm>
+            <a:off x="3450812" y="6122918"/>
+            <a:ext cx="2407444" cy="400110"/>
           </a:xfrm>
           <a:prstGeom prst="rect">
             <a:avLst/>
           </a:prstGeom>
           <a:noFill/>
-          <a:extLst>
-            <a:ext uri="{909E8E84-426E-40DD-AFC4-6F175D3DCCD1}">
-              <a14:hiddenFill xmlns:a14="http://schemas.microsoft.com/office/drawing/2010/main">
-                <a:solidFill>
-                  <a:srgbClr val="FFFFFF"/>
-                </a:solidFill>
-              </a14:hiddenFill>
-            </a:ext>
-          </a:extLst>
         </p:spPr>
-      </p:pic>
+        <p:txBody>
+          <a:bodyPr wrap="square">
+            <a:spAutoFit/>
+          </a:bodyPr>
+          <a:lstStyle/>
+          <a:p>
+            <a:r>
+              <a:rPr lang="en-US" sz="1000" dirty="0"/>
+              <a:t>Source</a:t>
+            </a:r>
+          </a:p>
+          <a:p>
+            <a:r>
+              <a:rPr lang="en-US" sz="1000" dirty="0"/>
+              <a:t>https://www.biostars.org/p/409790/</a:t>
+            </a:r>
+          </a:p>
+        </p:txBody>
+      </p:sp>
       <p:sp>
         <p:nvSpPr>
-          <p:cNvPr id="5" name="Rectangle 4">
-            <a:extLst>
-              <a:ext uri="{FF2B5EF4-FFF2-40B4-BE49-F238E27FC236}">
-                <a16:creationId xmlns:a16="http://schemas.microsoft.com/office/drawing/2014/main" id="{1CE315ED-3843-C54E-CCEF-629047456D2D}"/>
+          <p:cNvPr id="14" name="Rectangle 13">
+            <a:extLst>
+              <a:ext uri="{FF2B5EF4-FFF2-40B4-BE49-F238E27FC236}">
+                <a16:creationId xmlns:a16="http://schemas.microsoft.com/office/drawing/2014/main" id="{97A82735-4B5A-4290-2931-A310DED028A0}"/>
               </a:ext>
             </a:extLst>
           </p:cNvPr>
@@ -7253,8 +7501,8 @@
         </p:nvSpPr>
         <p:spPr>
           <a:xfrm>
-            <a:off x="0" y="629173"/>
-            <a:ext cx="1704975" cy="1720327"/>
+            <a:off x="0" y="767072"/>
+            <a:ext cx="1892300" cy="5755956"/>
           </a:xfrm>
           <a:prstGeom prst="rect">
             <a:avLst/>
@@ -7289,16 +7537,371 @@
           <a:lstStyle/>
           <a:p>
             <a:pPr algn="ctr"/>
-            <a:endParaRPr lang="en-US" dirty="0"/>
+            <a:endParaRPr lang="en-US"/>
+          </a:p>
+        </p:txBody>
+      </p:sp>
+    </p:spTree>
+    <p:extLst>
+      <p:ext uri="{BB962C8B-B14F-4D97-AF65-F5344CB8AC3E}">
+        <p14:creationId xmlns:p14="http://schemas.microsoft.com/office/powerpoint/2010/main" val="972860526"/>
+      </p:ext>
+    </p:extLst>
+  </p:cSld>
+  <p:clrMapOvr>
+    <a:masterClrMapping/>
+  </p:clrMapOvr>
+</p:sld>
+</file>
+
+<file path=ppt/slides/slide11.xml><?xml version="1.0" encoding="utf-8"?>
+<p:sld xmlns:a="http://schemas.openxmlformats.org/drawingml/2006/main" xmlns:r="http://schemas.openxmlformats.org/officeDocument/2006/relationships" xmlns:p="http://schemas.openxmlformats.org/presentationml/2006/main">
+  <p:cSld>
+    <p:spTree>
+      <p:nvGrpSpPr>
+        <p:cNvPr id="1" name=""/>
+        <p:cNvGrpSpPr/>
+        <p:nvPr/>
+      </p:nvGrpSpPr>
+      <p:grpSpPr>
+        <a:xfrm>
+          <a:off x="0" y="0"/>
+          <a:ext cx="0" cy="0"/>
+          <a:chOff x="0" y="0"/>
+          <a:chExt cx="0" cy="0"/>
+        </a:xfrm>
+      </p:grpSpPr>
+      <p:sp>
+        <p:nvSpPr>
+          <p:cNvPr id="2" name="Title 1">
+            <a:extLst>
+              <a:ext uri="{FF2B5EF4-FFF2-40B4-BE49-F238E27FC236}">
+                <a16:creationId xmlns:a16="http://schemas.microsoft.com/office/drawing/2014/main" id="{81C07A40-8DFE-BE6A-F4F0-6ECC768FE6AA}"/>
+              </a:ext>
+            </a:extLst>
+          </p:cNvPr>
+          <p:cNvSpPr>
+            <a:spLocks noGrp="1"/>
+          </p:cNvSpPr>
+          <p:nvPr>
+            <p:ph type="title"/>
+          </p:nvPr>
+        </p:nvSpPr>
+        <p:spPr/>
+        <p:txBody>
+          <a:bodyPr/>
+          <a:lstStyle/>
+          <a:p>
+            <a:r>
+              <a:rPr lang="en-US" dirty="0"/>
+              <a:t>Visualizing Data import thresholds</a:t>
+            </a:r>
+          </a:p>
+        </p:txBody>
+      </p:sp>
+      <p:pic>
+        <p:nvPicPr>
+          <p:cNvPr id="2050" name="Picture 2">
+            <a:extLst>
+              <a:ext uri="{FF2B5EF4-FFF2-40B4-BE49-F238E27FC236}">
+                <a16:creationId xmlns:a16="http://schemas.microsoft.com/office/drawing/2014/main" id="{477B77B6-0B3C-8223-2AFA-1AD5B37F4E90}"/>
+              </a:ext>
+            </a:extLst>
+          </p:cNvPr>
+          <p:cNvPicPr>
+            <a:picLocks noChangeAspect="1" noChangeArrowheads="1"/>
+          </p:cNvPicPr>
+          <p:nvPr/>
+        </p:nvPicPr>
+        <p:blipFill>
+          <a:blip r:embed="rId2">
+            <a:extLst>
+              <a:ext uri="{28A0092B-C50C-407E-A947-70E740481C1C}">
+                <a14:useLocalDpi xmlns:a14="http://schemas.microsoft.com/office/drawing/2010/main" val="0"/>
+              </a:ext>
+            </a:extLst>
+          </a:blip>
+          <a:srcRect/>
+          <a:stretch>
+            <a:fillRect/>
+          </a:stretch>
+        </p:blipFill>
+        <p:spPr bwMode="auto">
+          <a:xfrm>
+            <a:off x="7212819" y="1114951"/>
+            <a:ext cx="4700016" cy="2530542"/>
+          </a:xfrm>
+          <a:prstGeom prst="rect">
+            <a:avLst/>
+          </a:prstGeom>
+          <a:noFill/>
+          <a:extLst>
+            <a:ext uri="{909E8E84-426E-40DD-AFC4-6F175D3DCCD1}">
+              <a14:hiddenFill xmlns:a14="http://schemas.microsoft.com/office/drawing/2010/main">
+                <a:solidFill>
+                  <a:srgbClr val="FFFFFF"/>
+                </a:solidFill>
+              </a14:hiddenFill>
+            </a:ext>
+          </a:extLst>
+        </p:spPr>
+      </p:pic>
+      <p:sp>
+        <p:nvSpPr>
+          <p:cNvPr id="5" name="TextBox 4">
+            <a:extLst>
+              <a:ext uri="{FF2B5EF4-FFF2-40B4-BE49-F238E27FC236}">
+                <a16:creationId xmlns:a16="http://schemas.microsoft.com/office/drawing/2014/main" id="{A61B3F3D-639B-D96B-896F-4975C6A1A6BE}"/>
+              </a:ext>
+            </a:extLst>
+          </p:cNvPr>
+          <p:cNvSpPr txBox="1"/>
+          <p:nvPr/>
+        </p:nvSpPr>
+        <p:spPr>
+          <a:xfrm>
+            <a:off x="2289630" y="1689695"/>
+            <a:ext cx="6185916" cy="923330"/>
+          </a:xfrm>
+          <a:prstGeom prst="rect">
+            <a:avLst/>
+          </a:prstGeom>
+          <a:noFill/>
+        </p:spPr>
+        <p:txBody>
+          <a:bodyPr wrap="square">
+            <a:spAutoFit/>
+          </a:bodyPr>
+          <a:lstStyle/>
+          <a:p>
+            <a:r>
+              <a:rPr lang="en-US" dirty="0"/>
+              <a:t># Visualize QC metrics as a violin plot</a:t>
+            </a:r>
+          </a:p>
+          <a:p>
+            <a:r>
+              <a:rPr lang="en-US" dirty="0" err="1"/>
+              <a:t>VlnPlot</a:t>
+            </a:r>
+            <a:r>
+              <a:rPr lang="en-US" dirty="0"/>
+              <a:t>(</a:t>
+            </a:r>
+            <a:r>
+              <a:rPr lang="en-US" dirty="0" err="1"/>
+              <a:t>pbmc</a:t>
+            </a:r>
+            <a:r>
+              <a:rPr lang="en-US" dirty="0"/>
+              <a:t>, features = c("</a:t>
+            </a:r>
+            <a:r>
+              <a:rPr lang="en-US" dirty="0" err="1"/>
+              <a:t>nFeature_RNA</a:t>
+            </a:r>
+            <a:r>
+              <a:rPr lang="en-US" dirty="0"/>
+              <a:t>", "</a:t>
+            </a:r>
+            <a:r>
+              <a:rPr lang="en-US" dirty="0" err="1"/>
+              <a:t>nCount_RNA</a:t>
+            </a:r>
+            <a:r>
+              <a:rPr lang="en-US" dirty="0"/>
+              <a:t>", "percent.mt"), </a:t>
+            </a:r>
+            <a:r>
+              <a:rPr lang="en-US" dirty="0" err="1"/>
+              <a:t>ncol</a:t>
+            </a:r>
+            <a:r>
+              <a:rPr lang="en-US" dirty="0"/>
+              <a:t> = 3)</a:t>
+            </a:r>
           </a:p>
         </p:txBody>
       </p:sp>
       <p:sp>
         <p:nvSpPr>
-          <p:cNvPr id="6" name="Rectangle 5">
-            <a:extLst>
-              <a:ext uri="{FF2B5EF4-FFF2-40B4-BE49-F238E27FC236}">
-                <a16:creationId xmlns:a16="http://schemas.microsoft.com/office/drawing/2014/main" id="{D4509E47-F905-B044-5629-2F5F3EF59AEF}"/>
+          <p:cNvPr id="7" name="TextBox 6">
+            <a:extLst>
+              <a:ext uri="{FF2B5EF4-FFF2-40B4-BE49-F238E27FC236}">
+                <a16:creationId xmlns:a16="http://schemas.microsoft.com/office/drawing/2014/main" id="{6BB589B6-9E1D-A435-5ED0-C2E5F7B5EF5F}"/>
+              </a:ext>
+            </a:extLst>
+          </p:cNvPr>
+          <p:cNvSpPr txBox="1"/>
+          <p:nvPr/>
+        </p:nvSpPr>
+        <p:spPr>
+          <a:xfrm>
+            <a:off x="7212819" y="4727386"/>
+            <a:ext cx="5218938" cy="1015663"/>
+          </a:xfrm>
+          <a:prstGeom prst="rect">
+            <a:avLst/>
+          </a:prstGeom>
+          <a:noFill/>
+        </p:spPr>
+        <p:txBody>
+          <a:bodyPr wrap="square">
+            <a:spAutoFit/>
+          </a:bodyPr>
+          <a:lstStyle/>
+          <a:p>
+            <a:r>
+              <a:rPr lang="en-US" sz="1000" dirty="0"/>
+              <a:t># </a:t>
+            </a:r>
+            <a:r>
+              <a:rPr lang="en-US" sz="1000" dirty="0" err="1"/>
+              <a:t>FeatureScatter</a:t>
+            </a:r>
+            <a:r>
+              <a:rPr lang="en-US" sz="1000" dirty="0"/>
+              <a:t> is typically used to visualize feature-feature relationships, but can be used</a:t>
+            </a:r>
+          </a:p>
+          <a:p>
+            <a:r>
+              <a:rPr lang="en-US" sz="1000" dirty="0"/>
+              <a:t># for anything calculated by the object, i.e. columns in object metadata, PC scores etc.</a:t>
+            </a:r>
+          </a:p>
+          <a:p>
+            <a:endParaRPr lang="en-US" sz="1000" dirty="0"/>
+          </a:p>
+          <a:p>
+            <a:r>
+              <a:rPr lang="en-US" sz="1000" dirty="0"/>
+              <a:t>plot1 &lt;- </a:t>
+            </a:r>
+            <a:r>
+              <a:rPr lang="en-US" sz="1000" dirty="0" err="1"/>
+              <a:t>FeatureScatter</a:t>
+            </a:r>
+            <a:r>
+              <a:rPr lang="en-US" sz="1000" dirty="0"/>
+              <a:t>(</a:t>
+            </a:r>
+            <a:r>
+              <a:rPr lang="en-US" sz="1000" dirty="0" err="1"/>
+              <a:t>pbmc</a:t>
+            </a:r>
+            <a:r>
+              <a:rPr lang="en-US" sz="1000" dirty="0"/>
+              <a:t>, feature1 = "</a:t>
+            </a:r>
+            <a:r>
+              <a:rPr lang="en-US" sz="1000" dirty="0" err="1"/>
+              <a:t>nCount_RNA</a:t>
+            </a:r>
+            <a:r>
+              <a:rPr lang="en-US" sz="1000" dirty="0"/>
+              <a:t>", feature2 = "percent.mt")</a:t>
+            </a:r>
+          </a:p>
+          <a:p>
+            <a:r>
+              <a:rPr lang="en-US" sz="1000" dirty="0"/>
+              <a:t>plot2 &lt;- </a:t>
+            </a:r>
+            <a:r>
+              <a:rPr lang="en-US" sz="1000" dirty="0" err="1"/>
+              <a:t>FeatureScatter</a:t>
+            </a:r>
+            <a:r>
+              <a:rPr lang="en-US" sz="1000" dirty="0"/>
+              <a:t>(</a:t>
+            </a:r>
+            <a:r>
+              <a:rPr lang="en-US" sz="1000" dirty="0" err="1"/>
+              <a:t>pbmc</a:t>
+            </a:r>
+            <a:r>
+              <a:rPr lang="en-US" sz="1000" dirty="0"/>
+              <a:t>, feature1 = "</a:t>
+            </a:r>
+            <a:r>
+              <a:rPr lang="en-US" sz="1000" dirty="0" err="1"/>
+              <a:t>nCount_RNA</a:t>
+            </a:r>
+            <a:r>
+              <a:rPr lang="en-US" sz="1000" dirty="0"/>
+              <a:t>", feature2 = "</a:t>
+            </a:r>
+            <a:r>
+              <a:rPr lang="en-US" sz="1000" dirty="0" err="1"/>
+              <a:t>nFeature_RNA</a:t>
+            </a:r>
+            <a:r>
+              <a:rPr lang="en-US" sz="1000" dirty="0"/>
+              <a:t>")</a:t>
+            </a:r>
+          </a:p>
+          <a:p>
+            <a:r>
+              <a:rPr lang="en-US" sz="1000" dirty="0"/>
+              <a:t>plot1 + plot2</a:t>
+            </a:r>
+          </a:p>
+        </p:txBody>
+      </p:sp>
+      <p:pic>
+        <p:nvPicPr>
+          <p:cNvPr id="2053" name="Picture 5">
+            <a:extLst>
+              <a:ext uri="{FF2B5EF4-FFF2-40B4-BE49-F238E27FC236}">
+                <a16:creationId xmlns:a16="http://schemas.microsoft.com/office/drawing/2014/main" id="{B2D4F5CE-A525-503E-BBD7-77BC62C9FC9B}"/>
+              </a:ext>
+            </a:extLst>
+          </p:cNvPr>
+          <p:cNvPicPr>
+            <a:picLocks noChangeAspect="1" noChangeArrowheads="1"/>
+          </p:cNvPicPr>
+          <p:nvPr/>
+        </p:nvPicPr>
+        <p:blipFill>
+          <a:blip r:embed="rId3">
+            <a:extLst>
+              <a:ext uri="{28A0092B-C50C-407E-A947-70E740481C1C}">
+                <a14:useLocalDpi xmlns:a14="http://schemas.microsoft.com/office/drawing/2010/main" val="0"/>
+              </a:ext>
+            </a:extLst>
+          </a:blip>
+          <a:srcRect/>
+          <a:stretch>
+            <a:fillRect/>
+          </a:stretch>
+        </p:blipFill>
+        <p:spPr bwMode="auto">
+          <a:xfrm>
+            <a:off x="2083525" y="4244975"/>
+            <a:ext cx="4750743" cy="2557854"/>
+          </a:xfrm>
+          <a:prstGeom prst="rect">
+            <a:avLst/>
+          </a:prstGeom>
+          <a:noFill/>
+          <a:extLst>
+            <a:ext uri="{909E8E84-426E-40DD-AFC4-6F175D3DCCD1}">
+              <a14:hiddenFill xmlns:a14="http://schemas.microsoft.com/office/drawing/2010/main">
+                <a:solidFill>
+                  <a:srgbClr val="FFFFFF"/>
+                </a:solidFill>
+              </a14:hiddenFill>
+            </a:ext>
+          </a:extLst>
+        </p:spPr>
+      </p:pic>
+      <p:sp>
+        <p:nvSpPr>
+          <p:cNvPr id="8" name="Rectangle 7">
+            <a:extLst>
+              <a:ext uri="{FF2B5EF4-FFF2-40B4-BE49-F238E27FC236}">
+                <a16:creationId xmlns:a16="http://schemas.microsoft.com/office/drawing/2014/main" id="{CE09C42A-37E6-3768-369D-BA1252B05C75}"/>
               </a:ext>
             </a:extLst>
           </p:cNvPr>
@@ -7307,8 +7910,8 @@
         </p:nvSpPr>
         <p:spPr>
           <a:xfrm>
-            <a:off x="-1" y="2946400"/>
-            <a:ext cx="1704975" cy="3911600"/>
+            <a:off x="0" y="629173"/>
+            <a:ext cx="1704975" cy="1021827"/>
           </a:xfrm>
           <a:prstGeom prst="rect">
             <a:avLst/>
@@ -7343,181 +7946,19 @@
           <a:lstStyle/>
           <a:p>
             <a:pPr algn="ctr"/>
-            <a:endParaRPr lang="en-US"/>
-          </a:p>
-        </p:txBody>
-      </p:sp>
-    </p:spTree>
-    <p:extLst>
-      <p:ext uri="{BB962C8B-B14F-4D97-AF65-F5344CB8AC3E}">
-        <p14:creationId xmlns:p14="http://schemas.microsoft.com/office/powerpoint/2010/main" val="747342893"/>
-      </p:ext>
-    </p:extLst>
-  </p:cSld>
-  <p:clrMapOvr>
-    <a:masterClrMapping/>
-  </p:clrMapOvr>
-</p:sld>
-</file>
-
-<file path=ppt/slides/slide11.xml><?xml version="1.0" encoding="utf-8"?>
-<p:sld xmlns:a="http://schemas.openxmlformats.org/drawingml/2006/main" xmlns:r="http://schemas.openxmlformats.org/officeDocument/2006/relationships" xmlns:p="http://schemas.openxmlformats.org/presentationml/2006/main">
-  <p:cSld>
-    <p:spTree>
-      <p:nvGrpSpPr>
-        <p:cNvPr id="1" name=""/>
-        <p:cNvGrpSpPr/>
-        <p:nvPr/>
-      </p:nvGrpSpPr>
-      <p:grpSpPr>
-        <a:xfrm>
-          <a:off x="0" y="0"/>
-          <a:ext cx="0" cy="0"/>
-          <a:chOff x="0" y="0"/>
-          <a:chExt cx="0" cy="0"/>
-        </a:xfrm>
-      </p:grpSpPr>
-      <p:sp>
-        <p:nvSpPr>
-          <p:cNvPr id="2" name="Title 1">
-            <a:extLst>
-              <a:ext uri="{FF2B5EF4-FFF2-40B4-BE49-F238E27FC236}">
-                <a16:creationId xmlns:a16="http://schemas.microsoft.com/office/drawing/2014/main" id="{1B519D0E-D3AC-8D88-A03B-BFA357F08593}"/>
-              </a:ext>
-            </a:extLst>
-          </p:cNvPr>
-          <p:cNvSpPr>
-            <a:spLocks noGrp="1"/>
-          </p:cNvSpPr>
-          <p:nvPr>
-            <p:ph type="title"/>
-          </p:nvPr>
-        </p:nvSpPr>
-        <p:spPr/>
-        <p:txBody>
-          <a:bodyPr/>
-          <a:lstStyle/>
-          <a:p>
             <a:r>
               <a:rPr lang="en-US" dirty="0"/>
-              <a:t>PCA Dim </a:t>
-            </a:r>
-            <a:r>
-              <a:rPr lang="en-US" dirty="0" err="1"/>
-              <a:t>Laodings</a:t>
-            </a:r>
-            <a:endParaRPr lang="en-US" dirty="0"/>
+              <a:t>x</a:t>
+            </a:r>
           </a:p>
         </p:txBody>
       </p:sp>
       <p:sp>
         <p:nvSpPr>
-          <p:cNvPr id="5" name="TextBox 4">
-            <a:extLst>
-              <a:ext uri="{FF2B5EF4-FFF2-40B4-BE49-F238E27FC236}">
-                <a16:creationId xmlns:a16="http://schemas.microsoft.com/office/drawing/2014/main" id="{4F541360-35DF-0AA5-C9D3-0162FB354AC7}"/>
-              </a:ext>
-            </a:extLst>
-          </p:cNvPr>
-          <p:cNvSpPr txBox="1"/>
-          <p:nvPr/>
-        </p:nvSpPr>
-        <p:spPr>
-          <a:xfrm>
-            <a:off x="1959102" y="1121140"/>
-            <a:ext cx="6185916" cy="369332"/>
-          </a:xfrm>
-          <a:prstGeom prst="rect">
-            <a:avLst/>
-          </a:prstGeom>
-          <a:noFill/>
-        </p:spPr>
-        <p:txBody>
-          <a:bodyPr wrap="square">
-            <a:spAutoFit/>
-          </a:bodyPr>
-          <a:lstStyle/>
-          <a:p>
-            <a:r>
-              <a:rPr lang="en-US" dirty="0" err="1"/>
-              <a:t>VizDimLoadings</a:t>
-            </a:r>
-            <a:r>
-              <a:rPr lang="en-US" dirty="0"/>
-              <a:t>(</a:t>
-            </a:r>
-            <a:r>
-              <a:rPr lang="en-US" dirty="0" err="1"/>
-              <a:t>pbmc</a:t>
-            </a:r>
-            <a:r>
-              <a:rPr lang="en-US" dirty="0"/>
-              <a:t>, dims = 1:2, reduction = "</a:t>
-            </a:r>
-            <a:r>
-              <a:rPr lang="en-US" dirty="0" err="1"/>
-              <a:t>pca</a:t>
-            </a:r>
-            <a:r>
-              <a:rPr lang="en-US" dirty="0"/>
-              <a:t>")</a:t>
-            </a:r>
-          </a:p>
-        </p:txBody>
-      </p:sp>
-      <p:pic>
-        <p:nvPicPr>
-          <p:cNvPr id="4099" name="Picture 3">
-            <a:extLst>
-              <a:ext uri="{FF2B5EF4-FFF2-40B4-BE49-F238E27FC236}">
-                <a16:creationId xmlns:a16="http://schemas.microsoft.com/office/drawing/2014/main" id="{29F04F89-DC39-8167-C4DA-D25E1528DBA3}"/>
-              </a:ext>
-            </a:extLst>
-          </p:cNvPr>
-          <p:cNvPicPr>
-            <a:picLocks noChangeAspect="1" noChangeArrowheads="1"/>
-          </p:cNvPicPr>
-          <p:nvPr/>
-        </p:nvPicPr>
-        <p:blipFill>
-          <a:blip r:embed="rId2">
-            <a:extLst>
-              <a:ext uri="{28A0092B-C50C-407E-A947-70E740481C1C}">
-                <a14:useLocalDpi xmlns:a14="http://schemas.microsoft.com/office/drawing/2010/main" val="0"/>
-              </a:ext>
-            </a:extLst>
-          </a:blip>
-          <a:srcRect/>
-          <a:stretch>
-            <a:fillRect/>
-          </a:stretch>
-        </p:blipFill>
-        <p:spPr bwMode="auto">
-          <a:xfrm>
-            <a:off x="5476494" y="2351771"/>
-            <a:ext cx="4846320" cy="3877056"/>
-          </a:xfrm>
-          <a:prstGeom prst="rect">
-            <a:avLst/>
-          </a:prstGeom>
-          <a:noFill/>
-          <a:extLst>
-            <a:ext uri="{909E8E84-426E-40DD-AFC4-6F175D3DCCD1}">
-              <a14:hiddenFill xmlns:a14="http://schemas.microsoft.com/office/drawing/2010/main">
-                <a:solidFill>
-                  <a:srgbClr val="FFFFFF"/>
-                </a:solidFill>
-              </a14:hiddenFill>
-            </a:ext>
-          </a:extLst>
-        </p:spPr>
-      </p:pic>
-      <p:sp>
-        <p:nvSpPr>
-          <p:cNvPr id="6" name="Rectangle 5">
-            <a:extLst>
-              <a:ext uri="{FF2B5EF4-FFF2-40B4-BE49-F238E27FC236}">
-                <a16:creationId xmlns:a16="http://schemas.microsoft.com/office/drawing/2014/main" id="{2F430808-A778-B7B4-E8C8-6D88DA00DAEC}"/>
+          <p:cNvPr id="9" name="Rectangle 8">
+            <a:extLst>
+              <a:ext uri="{FF2B5EF4-FFF2-40B4-BE49-F238E27FC236}">
+                <a16:creationId xmlns:a16="http://schemas.microsoft.com/office/drawing/2014/main" id="{D1625B10-FB02-8B8A-E12A-FF6F840E92AC}"/>
               </a:ext>
             </a:extLst>
           </p:cNvPr>
@@ -7526,8 +7967,8 @@
         </p:nvSpPr>
         <p:spPr>
           <a:xfrm>
-            <a:off x="0" y="629173"/>
-            <a:ext cx="1704975" cy="3003027"/>
+            <a:off x="-1" y="2146300"/>
+            <a:ext cx="1704975" cy="4711700"/>
           </a:xfrm>
           <a:prstGeom prst="rect">
             <a:avLst/>
@@ -7562,16 +8003,282 @@
           <a:lstStyle/>
           <a:p>
             <a:pPr algn="ctr"/>
-            <a:endParaRPr lang="en-US" dirty="0"/>
+            <a:endParaRPr lang="en-US"/>
+          </a:p>
+        </p:txBody>
+      </p:sp>
+    </p:spTree>
+    <p:extLst>
+      <p:ext uri="{BB962C8B-B14F-4D97-AF65-F5344CB8AC3E}">
+        <p14:creationId xmlns:p14="http://schemas.microsoft.com/office/powerpoint/2010/main" val="2152222128"/>
+      </p:ext>
+    </p:extLst>
+  </p:cSld>
+  <p:clrMapOvr>
+    <a:masterClrMapping/>
+  </p:clrMapOvr>
+</p:sld>
+</file>
+
+<file path=ppt/slides/slide12.xml><?xml version="1.0" encoding="utf-8"?>
+<p:sld xmlns:a="http://schemas.openxmlformats.org/drawingml/2006/main" xmlns:r="http://schemas.openxmlformats.org/officeDocument/2006/relationships" xmlns:p="http://schemas.openxmlformats.org/presentationml/2006/main">
+  <p:cSld>
+    <p:spTree>
+      <p:nvGrpSpPr>
+        <p:cNvPr id="1" name=""/>
+        <p:cNvGrpSpPr/>
+        <p:nvPr/>
+      </p:nvGrpSpPr>
+      <p:grpSpPr>
+        <a:xfrm>
+          <a:off x="0" y="0"/>
+          <a:ext cx="0" cy="0"/>
+          <a:chOff x="0" y="0"/>
+          <a:chExt cx="0" cy="0"/>
+        </a:xfrm>
+      </p:grpSpPr>
+      <p:sp>
+        <p:nvSpPr>
+          <p:cNvPr id="2" name="Title 1">
+            <a:extLst>
+              <a:ext uri="{FF2B5EF4-FFF2-40B4-BE49-F238E27FC236}">
+                <a16:creationId xmlns:a16="http://schemas.microsoft.com/office/drawing/2014/main" id="{7E35A846-4BFB-02A1-AF84-4918220DDC2E}"/>
+              </a:ext>
+            </a:extLst>
+          </p:cNvPr>
+          <p:cNvSpPr>
+            <a:spLocks noGrp="1"/>
+          </p:cNvSpPr>
+          <p:nvPr>
+            <p:ph type="title"/>
+          </p:nvPr>
+        </p:nvSpPr>
+        <p:spPr/>
+        <p:txBody>
+          <a:bodyPr/>
+          <a:lstStyle/>
+          <a:p>
+            <a:r>
+              <a:rPr lang="en-US" dirty="0"/>
+              <a:t>Visualize Highly Variable Features</a:t>
+            </a:r>
           </a:p>
         </p:txBody>
       </p:sp>
       <p:sp>
         <p:nvSpPr>
-          <p:cNvPr id="7" name="Rectangle 6">
-            <a:extLst>
-              <a:ext uri="{FF2B5EF4-FFF2-40B4-BE49-F238E27FC236}">
-                <a16:creationId xmlns:a16="http://schemas.microsoft.com/office/drawing/2014/main" id="{646A99C1-0636-6FA6-B582-CFE72F0E967E}"/>
+          <p:cNvPr id="4" name="TextBox 3">
+            <a:extLst>
+              <a:ext uri="{FF2B5EF4-FFF2-40B4-BE49-F238E27FC236}">
+                <a16:creationId xmlns:a16="http://schemas.microsoft.com/office/drawing/2014/main" id="{F7E9FFDF-3964-974A-F098-AF0BEF9B7ED3}"/>
+              </a:ext>
+            </a:extLst>
+          </p:cNvPr>
+          <p:cNvSpPr txBox="1"/>
+          <p:nvPr/>
+        </p:nvSpPr>
+        <p:spPr>
+          <a:xfrm>
+            <a:off x="1831086" y="937135"/>
+            <a:ext cx="6185916" cy="2862322"/>
+          </a:xfrm>
+          <a:prstGeom prst="rect">
+            <a:avLst/>
+          </a:prstGeom>
+          <a:noFill/>
+        </p:spPr>
+        <p:txBody>
+          <a:bodyPr wrap="square">
+            <a:spAutoFit/>
+          </a:bodyPr>
+          <a:lstStyle/>
+          <a:p>
+            <a:r>
+              <a:rPr lang="en-US" dirty="0" err="1"/>
+              <a:t>pbmc</a:t>
+            </a:r>
+            <a:r>
+              <a:rPr lang="en-US" dirty="0"/>
+              <a:t> &lt;- </a:t>
+            </a:r>
+            <a:r>
+              <a:rPr lang="en-US" dirty="0" err="1"/>
+              <a:t>FindVariableFeatures</a:t>
+            </a:r>
+            <a:r>
+              <a:rPr lang="en-US" dirty="0"/>
+              <a:t>(</a:t>
+            </a:r>
+            <a:r>
+              <a:rPr lang="en-US" dirty="0" err="1"/>
+              <a:t>pbmc</a:t>
+            </a:r>
+            <a:r>
+              <a:rPr lang="en-US" dirty="0"/>
+              <a:t>, </a:t>
+            </a:r>
+            <a:r>
+              <a:rPr lang="en-US" dirty="0" err="1"/>
+              <a:t>selection.method</a:t>
+            </a:r>
+            <a:r>
+              <a:rPr lang="en-US" dirty="0"/>
+              <a:t> = "</a:t>
+            </a:r>
+            <a:r>
+              <a:rPr lang="en-US" dirty="0" err="1"/>
+              <a:t>vst</a:t>
+            </a:r>
+            <a:r>
+              <a:rPr lang="en-US" dirty="0"/>
+              <a:t>", </a:t>
+            </a:r>
+            <a:r>
+              <a:rPr lang="en-US" dirty="0" err="1"/>
+              <a:t>nfeatures</a:t>
+            </a:r>
+            <a:r>
+              <a:rPr lang="en-US" dirty="0"/>
+              <a:t> = 2000)</a:t>
+            </a:r>
+          </a:p>
+          <a:p>
+            <a:endParaRPr lang="en-US" dirty="0"/>
+          </a:p>
+          <a:p>
+            <a:r>
+              <a:rPr lang="en-US" dirty="0"/>
+              <a:t># Identify the 10 most highly variable genes</a:t>
+            </a:r>
+          </a:p>
+          <a:p>
+            <a:r>
+              <a:rPr lang="en-US" dirty="0"/>
+              <a:t>top10 &lt;- head(</a:t>
+            </a:r>
+            <a:r>
+              <a:rPr lang="en-US" dirty="0" err="1"/>
+              <a:t>VariableFeatures</a:t>
+            </a:r>
+            <a:r>
+              <a:rPr lang="en-US" dirty="0"/>
+              <a:t>(</a:t>
+            </a:r>
+            <a:r>
+              <a:rPr lang="en-US" dirty="0" err="1"/>
+              <a:t>pbmc</a:t>
+            </a:r>
+            <a:r>
+              <a:rPr lang="en-US" dirty="0"/>
+              <a:t>), 10)</a:t>
+            </a:r>
+          </a:p>
+          <a:p>
+            <a:endParaRPr lang="en-US" dirty="0"/>
+          </a:p>
+          <a:p>
+            <a:r>
+              <a:rPr lang="en-US" dirty="0"/>
+              <a:t># plot variable features with and without labels</a:t>
+            </a:r>
+          </a:p>
+          <a:p>
+            <a:r>
+              <a:rPr lang="en-US" dirty="0"/>
+              <a:t>plot1 &lt;- </a:t>
+            </a:r>
+            <a:r>
+              <a:rPr lang="en-US" dirty="0" err="1"/>
+              <a:t>VariableFeaturePlot</a:t>
+            </a:r>
+            <a:r>
+              <a:rPr lang="en-US" dirty="0"/>
+              <a:t>(</a:t>
+            </a:r>
+            <a:r>
+              <a:rPr lang="en-US" dirty="0" err="1"/>
+              <a:t>pbmc</a:t>
+            </a:r>
+            <a:r>
+              <a:rPr lang="en-US" dirty="0"/>
+              <a:t>)</a:t>
+            </a:r>
+          </a:p>
+          <a:p>
+            <a:r>
+              <a:rPr lang="en-US" dirty="0"/>
+              <a:t>plot2 &lt;- </a:t>
+            </a:r>
+            <a:r>
+              <a:rPr lang="en-US" dirty="0" err="1"/>
+              <a:t>LabelPoints</a:t>
+            </a:r>
+            <a:r>
+              <a:rPr lang="en-US" dirty="0"/>
+              <a:t>(plot = plot1, points = top10, repel = TRUE)</a:t>
+            </a:r>
+          </a:p>
+          <a:p>
+            <a:r>
+              <a:rPr lang="en-US" dirty="0"/>
+              <a:t>plot1 + plot2</a:t>
+            </a:r>
+          </a:p>
+        </p:txBody>
+      </p:sp>
+      <p:pic>
+        <p:nvPicPr>
+          <p:cNvPr id="3074" name="Picture 2">
+            <a:extLst>
+              <a:ext uri="{FF2B5EF4-FFF2-40B4-BE49-F238E27FC236}">
+                <a16:creationId xmlns:a16="http://schemas.microsoft.com/office/drawing/2014/main" id="{2C1B91E3-4812-B952-FD69-02A35D1E95B6}"/>
+              </a:ext>
+            </a:extLst>
+          </p:cNvPr>
+          <p:cNvPicPr>
+            <a:picLocks noChangeAspect="1" noChangeArrowheads="1"/>
+          </p:cNvPicPr>
+          <p:nvPr/>
+        </p:nvPicPr>
+        <p:blipFill>
+          <a:blip r:embed="rId2">
+            <a:extLst>
+              <a:ext uri="{28A0092B-C50C-407E-A947-70E740481C1C}">
+                <a14:useLocalDpi xmlns:a14="http://schemas.microsoft.com/office/drawing/2010/main" val="0"/>
+              </a:ext>
+            </a:extLst>
+          </a:blip>
+          <a:srcRect/>
+          <a:stretch>
+            <a:fillRect/>
+          </a:stretch>
+        </p:blipFill>
+        <p:spPr bwMode="auto">
+          <a:xfrm>
+            <a:off x="6464808" y="3799457"/>
+            <a:ext cx="5413248" cy="2706624"/>
+          </a:xfrm>
+          <a:prstGeom prst="rect">
+            <a:avLst/>
+          </a:prstGeom>
+          <a:noFill/>
+          <a:extLst>
+            <a:ext uri="{909E8E84-426E-40DD-AFC4-6F175D3DCCD1}">
+              <a14:hiddenFill xmlns:a14="http://schemas.microsoft.com/office/drawing/2010/main">
+                <a:solidFill>
+                  <a:srgbClr val="FFFFFF"/>
+                </a:solidFill>
+              </a14:hiddenFill>
+            </a:ext>
+          </a:extLst>
+        </p:spPr>
+      </p:pic>
+      <p:sp>
+        <p:nvSpPr>
+          <p:cNvPr id="5" name="Rectangle 4">
+            <a:extLst>
+              <a:ext uri="{FF2B5EF4-FFF2-40B4-BE49-F238E27FC236}">
+                <a16:creationId xmlns:a16="http://schemas.microsoft.com/office/drawing/2014/main" id="{1CE315ED-3843-C54E-CCEF-629047456D2D}"/>
               </a:ext>
             </a:extLst>
           </p:cNvPr>
@@ -7580,8 +8287,8 @@
         </p:nvSpPr>
         <p:spPr>
           <a:xfrm>
-            <a:off x="-1" y="4508500"/>
-            <a:ext cx="1704975" cy="2349499"/>
+            <a:off x="0" y="629173"/>
+            <a:ext cx="1704975" cy="1720327"/>
           </a:xfrm>
           <a:prstGeom prst="rect">
             <a:avLst/>
@@ -7616,168 +8323,16 @@
           <a:lstStyle/>
           <a:p>
             <a:pPr algn="ctr"/>
-            <a:endParaRPr lang="en-US"/>
-          </a:p>
-        </p:txBody>
-      </p:sp>
-    </p:spTree>
-    <p:extLst>
-      <p:ext uri="{BB962C8B-B14F-4D97-AF65-F5344CB8AC3E}">
-        <p14:creationId xmlns:p14="http://schemas.microsoft.com/office/powerpoint/2010/main" val="4025124365"/>
-      </p:ext>
-    </p:extLst>
-  </p:cSld>
-  <p:clrMapOvr>
-    <a:masterClrMapping/>
-  </p:clrMapOvr>
-</p:sld>
-</file>
-
-<file path=ppt/slides/slide12.xml><?xml version="1.0" encoding="utf-8"?>
-<p:sld xmlns:a="http://schemas.openxmlformats.org/drawingml/2006/main" xmlns:r="http://schemas.openxmlformats.org/officeDocument/2006/relationships" xmlns:p="http://schemas.openxmlformats.org/presentationml/2006/main">
-  <p:cSld>
-    <p:spTree>
-      <p:nvGrpSpPr>
-        <p:cNvPr id="1" name=""/>
-        <p:cNvGrpSpPr/>
-        <p:nvPr/>
-      </p:nvGrpSpPr>
-      <p:grpSpPr>
-        <a:xfrm>
-          <a:off x="0" y="0"/>
-          <a:ext cx="0" cy="0"/>
-          <a:chOff x="0" y="0"/>
-          <a:chExt cx="0" cy="0"/>
-        </a:xfrm>
-      </p:grpSpPr>
-      <p:sp>
-        <p:nvSpPr>
-          <p:cNvPr id="2" name="Title 1">
-            <a:extLst>
-              <a:ext uri="{FF2B5EF4-FFF2-40B4-BE49-F238E27FC236}">
-                <a16:creationId xmlns:a16="http://schemas.microsoft.com/office/drawing/2014/main" id="{A6C83907-68AF-A215-11AE-B873C8B69556}"/>
-              </a:ext>
-            </a:extLst>
-          </p:cNvPr>
-          <p:cNvSpPr>
-            <a:spLocks noGrp="1"/>
-          </p:cNvSpPr>
-          <p:nvPr>
-            <p:ph type="title"/>
-          </p:nvPr>
-        </p:nvSpPr>
-        <p:spPr/>
-        <p:txBody>
-          <a:bodyPr/>
-          <a:lstStyle/>
-          <a:p>
-            <a:r>
-              <a:rPr lang="en-US" dirty="0"/>
-              <a:t>PCA Dim loadings</a:t>
-            </a:r>
+            <a:endParaRPr lang="en-US" dirty="0"/>
           </a:p>
         </p:txBody>
       </p:sp>
       <p:sp>
         <p:nvSpPr>
-          <p:cNvPr id="7" name="TextBox 6">
-            <a:extLst>
-              <a:ext uri="{FF2B5EF4-FFF2-40B4-BE49-F238E27FC236}">
-                <a16:creationId xmlns:a16="http://schemas.microsoft.com/office/drawing/2014/main" id="{CA837A5F-3AC7-CE12-5C58-4B1E73C24A52}"/>
-              </a:ext>
-            </a:extLst>
-          </p:cNvPr>
-          <p:cNvSpPr txBox="1"/>
-          <p:nvPr/>
-        </p:nvSpPr>
-        <p:spPr>
-          <a:xfrm>
-            <a:off x="3003042" y="815839"/>
-            <a:ext cx="6185916" cy="369332"/>
-          </a:xfrm>
-          <a:prstGeom prst="rect">
-            <a:avLst/>
-          </a:prstGeom>
-          <a:noFill/>
-        </p:spPr>
-        <p:txBody>
-          <a:bodyPr wrap="square">
-            <a:spAutoFit/>
-          </a:bodyPr>
-          <a:lstStyle/>
-          <a:p>
-            <a:r>
-              <a:rPr lang="en-US" dirty="0" err="1"/>
-              <a:t>DimHeatmap</a:t>
-            </a:r>
-            <a:r>
-              <a:rPr lang="en-US" dirty="0"/>
-              <a:t>(</a:t>
-            </a:r>
-            <a:r>
-              <a:rPr lang="en-US" dirty="0" err="1"/>
-              <a:t>pbmc</a:t>
-            </a:r>
-            <a:r>
-              <a:rPr lang="en-US" dirty="0"/>
-              <a:t>, dims = 1:15, cells = 500, balanced = TRUE)</a:t>
-            </a:r>
-          </a:p>
-        </p:txBody>
-      </p:sp>
-      <p:pic>
-        <p:nvPicPr>
-          <p:cNvPr id="5126" name="Picture 6">
-            <a:extLst>
-              <a:ext uri="{FF2B5EF4-FFF2-40B4-BE49-F238E27FC236}">
-                <a16:creationId xmlns:a16="http://schemas.microsoft.com/office/drawing/2014/main" id="{52F3FEB3-CE1D-B7A3-5338-510233A9BE63}"/>
-              </a:ext>
-            </a:extLst>
-          </p:cNvPr>
-          <p:cNvPicPr>
-            <a:picLocks noChangeAspect="1" noChangeArrowheads="1"/>
-          </p:cNvPicPr>
-          <p:nvPr/>
-        </p:nvPicPr>
-        <p:blipFill>
-          <a:blip r:embed="rId2">
-            <a:extLst>
-              <a:ext uri="{28A0092B-C50C-407E-A947-70E740481C1C}">
-                <a14:useLocalDpi xmlns:a14="http://schemas.microsoft.com/office/drawing/2010/main" val="0"/>
-              </a:ext>
-            </a:extLst>
-          </a:blip>
-          <a:srcRect/>
-          <a:stretch>
-            <a:fillRect/>
-          </a:stretch>
-        </p:blipFill>
-        <p:spPr bwMode="auto">
-          <a:xfrm>
-            <a:off x="2978150" y="1185171"/>
-            <a:ext cx="8216900" cy="5477933"/>
-          </a:xfrm>
-          <a:prstGeom prst="rect">
-            <a:avLst/>
-          </a:prstGeom>
-          <a:noFill/>
-          <a:extLst>
-            <a:ext uri="{909E8E84-426E-40DD-AFC4-6F175D3DCCD1}">
-              <a14:hiddenFill xmlns:a14="http://schemas.microsoft.com/office/drawing/2010/main">
-                <a:solidFill>
-                  <a:srgbClr val="FFFFFF"/>
-                </a:solidFill>
-              </a14:hiddenFill>
-            </a:ext>
-          </a:extLst>
-        </p:spPr>
-      </p:pic>
-      <p:sp>
-        <p:nvSpPr>
-          <p:cNvPr id="8" name="Rectangle 7">
-            <a:extLst>
-              <a:ext uri="{FF2B5EF4-FFF2-40B4-BE49-F238E27FC236}">
-                <a16:creationId xmlns:a16="http://schemas.microsoft.com/office/drawing/2014/main" id="{271EE68F-B47D-C6D8-BAE3-70D40C4B601D}"/>
+          <p:cNvPr id="6" name="Rectangle 5">
+            <a:extLst>
+              <a:ext uri="{FF2B5EF4-FFF2-40B4-BE49-F238E27FC236}">
+                <a16:creationId xmlns:a16="http://schemas.microsoft.com/office/drawing/2014/main" id="{D4509E47-F905-B044-5629-2F5F3EF59AEF}"/>
               </a:ext>
             </a:extLst>
           </p:cNvPr>
@@ -7786,8 +8341,8 @@
         </p:nvSpPr>
         <p:spPr>
           <a:xfrm>
-            <a:off x="0" y="629173"/>
-            <a:ext cx="1704975" cy="3003027"/>
+            <a:off x="-1" y="2946400"/>
+            <a:ext cx="1704975" cy="3911600"/>
           </a:xfrm>
           <a:prstGeom prst="rect">
             <a:avLst/>
@@ -7822,16 +8377,181 @@
           <a:lstStyle/>
           <a:p>
             <a:pPr algn="ctr"/>
+            <a:endParaRPr lang="en-US"/>
+          </a:p>
+        </p:txBody>
+      </p:sp>
+    </p:spTree>
+    <p:extLst>
+      <p:ext uri="{BB962C8B-B14F-4D97-AF65-F5344CB8AC3E}">
+        <p14:creationId xmlns:p14="http://schemas.microsoft.com/office/powerpoint/2010/main" val="747342893"/>
+      </p:ext>
+    </p:extLst>
+  </p:cSld>
+  <p:clrMapOvr>
+    <a:masterClrMapping/>
+  </p:clrMapOvr>
+</p:sld>
+</file>
+
+<file path=ppt/slides/slide13.xml><?xml version="1.0" encoding="utf-8"?>
+<p:sld xmlns:a="http://schemas.openxmlformats.org/drawingml/2006/main" xmlns:r="http://schemas.openxmlformats.org/officeDocument/2006/relationships" xmlns:p="http://schemas.openxmlformats.org/presentationml/2006/main">
+  <p:cSld>
+    <p:spTree>
+      <p:nvGrpSpPr>
+        <p:cNvPr id="1" name=""/>
+        <p:cNvGrpSpPr/>
+        <p:nvPr/>
+      </p:nvGrpSpPr>
+      <p:grpSpPr>
+        <a:xfrm>
+          <a:off x="0" y="0"/>
+          <a:ext cx="0" cy="0"/>
+          <a:chOff x="0" y="0"/>
+          <a:chExt cx="0" cy="0"/>
+        </a:xfrm>
+      </p:grpSpPr>
+      <p:sp>
+        <p:nvSpPr>
+          <p:cNvPr id="2" name="Title 1">
+            <a:extLst>
+              <a:ext uri="{FF2B5EF4-FFF2-40B4-BE49-F238E27FC236}">
+                <a16:creationId xmlns:a16="http://schemas.microsoft.com/office/drawing/2014/main" id="{1B519D0E-D3AC-8D88-A03B-BFA357F08593}"/>
+              </a:ext>
+            </a:extLst>
+          </p:cNvPr>
+          <p:cNvSpPr>
+            <a:spLocks noGrp="1"/>
+          </p:cNvSpPr>
+          <p:nvPr>
+            <p:ph type="title"/>
+          </p:nvPr>
+        </p:nvSpPr>
+        <p:spPr/>
+        <p:txBody>
+          <a:bodyPr/>
+          <a:lstStyle/>
+          <a:p>
+            <a:r>
+              <a:rPr lang="en-US" dirty="0"/>
+              <a:t>PCA Dim </a:t>
+            </a:r>
+            <a:r>
+              <a:rPr lang="en-US" dirty="0" err="1"/>
+              <a:t>Laodings</a:t>
+            </a:r>
             <a:endParaRPr lang="en-US" dirty="0"/>
           </a:p>
         </p:txBody>
       </p:sp>
       <p:sp>
         <p:nvSpPr>
-          <p:cNvPr id="9" name="Rectangle 8">
-            <a:extLst>
-              <a:ext uri="{FF2B5EF4-FFF2-40B4-BE49-F238E27FC236}">
-                <a16:creationId xmlns:a16="http://schemas.microsoft.com/office/drawing/2014/main" id="{D81DA614-7A0D-03F1-9333-E1E26CFB60B3}"/>
+          <p:cNvPr id="5" name="TextBox 4">
+            <a:extLst>
+              <a:ext uri="{FF2B5EF4-FFF2-40B4-BE49-F238E27FC236}">
+                <a16:creationId xmlns:a16="http://schemas.microsoft.com/office/drawing/2014/main" id="{4F541360-35DF-0AA5-C9D3-0162FB354AC7}"/>
+              </a:ext>
+            </a:extLst>
+          </p:cNvPr>
+          <p:cNvSpPr txBox="1"/>
+          <p:nvPr/>
+        </p:nvSpPr>
+        <p:spPr>
+          <a:xfrm>
+            <a:off x="1959102" y="1121140"/>
+            <a:ext cx="6185916" cy="369332"/>
+          </a:xfrm>
+          <a:prstGeom prst="rect">
+            <a:avLst/>
+          </a:prstGeom>
+          <a:noFill/>
+        </p:spPr>
+        <p:txBody>
+          <a:bodyPr wrap="square">
+            <a:spAutoFit/>
+          </a:bodyPr>
+          <a:lstStyle/>
+          <a:p>
+            <a:r>
+              <a:rPr lang="en-US" dirty="0" err="1"/>
+              <a:t>VizDimLoadings</a:t>
+            </a:r>
+            <a:r>
+              <a:rPr lang="en-US" dirty="0"/>
+              <a:t>(</a:t>
+            </a:r>
+            <a:r>
+              <a:rPr lang="en-US" dirty="0" err="1"/>
+              <a:t>pbmc</a:t>
+            </a:r>
+            <a:r>
+              <a:rPr lang="en-US" dirty="0"/>
+              <a:t>, dims = 1:2, reduction = "</a:t>
+            </a:r>
+            <a:r>
+              <a:rPr lang="en-US" dirty="0" err="1"/>
+              <a:t>pca</a:t>
+            </a:r>
+            <a:r>
+              <a:rPr lang="en-US" dirty="0"/>
+              <a:t>")</a:t>
+            </a:r>
+          </a:p>
+        </p:txBody>
+      </p:sp>
+      <p:pic>
+        <p:nvPicPr>
+          <p:cNvPr id="4099" name="Picture 3">
+            <a:extLst>
+              <a:ext uri="{FF2B5EF4-FFF2-40B4-BE49-F238E27FC236}">
+                <a16:creationId xmlns:a16="http://schemas.microsoft.com/office/drawing/2014/main" id="{29F04F89-DC39-8167-C4DA-D25E1528DBA3}"/>
+              </a:ext>
+            </a:extLst>
+          </p:cNvPr>
+          <p:cNvPicPr>
+            <a:picLocks noChangeAspect="1" noChangeArrowheads="1"/>
+          </p:cNvPicPr>
+          <p:nvPr/>
+        </p:nvPicPr>
+        <p:blipFill>
+          <a:blip r:embed="rId2">
+            <a:extLst>
+              <a:ext uri="{28A0092B-C50C-407E-A947-70E740481C1C}">
+                <a14:useLocalDpi xmlns:a14="http://schemas.microsoft.com/office/drawing/2010/main" val="0"/>
+              </a:ext>
+            </a:extLst>
+          </a:blip>
+          <a:srcRect/>
+          <a:stretch>
+            <a:fillRect/>
+          </a:stretch>
+        </p:blipFill>
+        <p:spPr bwMode="auto">
+          <a:xfrm>
+            <a:off x="5476494" y="2351771"/>
+            <a:ext cx="4846320" cy="3877056"/>
+          </a:xfrm>
+          <a:prstGeom prst="rect">
+            <a:avLst/>
+          </a:prstGeom>
+          <a:noFill/>
+          <a:extLst>
+            <a:ext uri="{909E8E84-426E-40DD-AFC4-6F175D3DCCD1}">
+              <a14:hiddenFill xmlns:a14="http://schemas.microsoft.com/office/drawing/2010/main">
+                <a:solidFill>
+                  <a:srgbClr val="FFFFFF"/>
+                </a:solidFill>
+              </a14:hiddenFill>
+            </a:ext>
+          </a:extLst>
+        </p:spPr>
+      </p:pic>
+      <p:sp>
+        <p:nvSpPr>
+          <p:cNvPr id="6" name="Rectangle 5">
+            <a:extLst>
+              <a:ext uri="{FF2B5EF4-FFF2-40B4-BE49-F238E27FC236}">
+                <a16:creationId xmlns:a16="http://schemas.microsoft.com/office/drawing/2014/main" id="{2F430808-A778-B7B4-E8C8-6D88DA00DAEC}"/>
               </a:ext>
             </a:extLst>
           </p:cNvPr>
@@ -7840,8 +8560,8 @@
         </p:nvSpPr>
         <p:spPr>
           <a:xfrm>
-            <a:off x="-1" y="4508500"/>
-            <a:ext cx="1704975" cy="2349499"/>
+            <a:off x="0" y="629173"/>
+            <a:ext cx="1704975" cy="3003027"/>
           </a:xfrm>
           <a:prstGeom prst="rect">
             <a:avLst/>
@@ -7876,168 +8596,16 @@
           <a:lstStyle/>
           <a:p>
             <a:pPr algn="ctr"/>
-            <a:endParaRPr lang="en-US"/>
-          </a:p>
-        </p:txBody>
-      </p:sp>
-    </p:spTree>
-    <p:extLst>
-      <p:ext uri="{BB962C8B-B14F-4D97-AF65-F5344CB8AC3E}">
-        <p14:creationId xmlns:p14="http://schemas.microsoft.com/office/powerpoint/2010/main" val="3473530926"/>
-      </p:ext>
-    </p:extLst>
-  </p:cSld>
-  <p:clrMapOvr>
-    <a:masterClrMapping/>
-  </p:clrMapOvr>
-</p:sld>
-</file>
-
-<file path=ppt/slides/slide13.xml><?xml version="1.0" encoding="utf-8"?>
-<p:sld xmlns:a="http://schemas.openxmlformats.org/drawingml/2006/main" xmlns:r="http://schemas.openxmlformats.org/officeDocument/2006/relationships" xmlns:p="http://schemas.openxmlformats.org/presentationml/2006/main">
-  <p:cSld>
-    <p:spTree>
-      <p:nvGrpSpPr>
-        <p:cNvPr id="1" name=""/>
-        <p:cNvGrpSpPr/>
-        <p:nvPr/>
-      </p:nvGrpSpPr>
-      <p:grpSpPr>
-        <a:xfrm>
-          <a:off x="0" y="0"/>
-          <a:ext cx="0" cy="0"/>
-          <a:chOff x="0" y="0"/>
-          <a:chExt cx="0" cy="0"/>
-        </a:xfrm>
-      </p:grpSpPr>
-      <p:sp>
-        <p:nvSpPr>
-          <p:cNvPr id="2" name="Title 1">
-            <a:extLst>
-              <a:ext uri="{FF2B5EF4-FFF2-40B4-BE49-F238E27FC236}">
-                <a16:creationId xmlns:a16="http://schemas.microsoft.com/office/drawing/2014/main" id="{08A42B1C-5B54-17BB-D9AB-46D27128E957}"/>
-              </a:ext>
-            </a:extLst>
-          </p:cNvPr>
-          <p:cNvSpPr>
-            <a:spLocks noGrp="1"/>
-          </p:cNvSpPr>
-          <p:nvPr>
-            <p:ph type="title"/>
-          </p:nvPr>
-        </p:nvSpPr>
-        <p:spPr/>
-        <p:txBody>
-          <a:bodyPr/>
-          <a:lstStyle/>
-          <a:p>
-            <a:r>
-              <a:rPr lang="en-US" dirty="0"/>
-              <a:t>Specific Gene Expression in Each Cluster</a:t>
-            </a:r>
+            <a:endParaRPr lang="en-US" dirty="0"/>
           </a:p>
         </p:txBody>
       </p:sp>
       <p:sp>
         <p:nvSpPr>
-          <p:cNvPr id="4" name="TextBox 3">
-            <a:extLst>
-              <a:ext uri="{FF2B5EF4-FFF2-40B4-BE49-F238E27FC236}">
-                <a16:creationId xmlns:a16="http://schemas.microsoft.com/office/drawing/2014/main" id="{A76DA7DA-3C2F-8EFD-C083-CB79041C1CB9}"/>
-              </a:ext>
-            </a:extLst>
-          </p:cNvPr>
-          <p:cNvSpPr txBox="1"/>
-          <p:nvPr/>
-        </p:nvSpPr>
-        <p:spPr>
-          <a:xfrm>
-            <a:off x="2651125" y="850384"/>
-            <a:ext cx="6191250" cy="369332"/>
-          </a:xfrm>
-          <a:prstGeom prst="rect">
-            <a:avLst/>
-          </a:prstGeom>
-          <a:noFill/>
-        </p:spPr>
-        <p:txBody>
-          <a:bodyPr wrap="square">
-            <a:spAutoFit/>
-          </a:bodyPr>
-          <a:lstStyle/>
-          <a:p>
-            <a:r>
-              <a:rPr lang="en-US" dirty="0" err="1"/>
-              <a:t>VlnPlot</a:t>
-            </a:r>
-            <a:r>
-              <a:rPr lang="en-US" dirty="0"/>
-              <a:t>(</a:t>
-            </a:r>
-            <a:r>
-              <a:rPr lang="en-US" dirty="0" err="1"/>
-              <a:t>pbmc</a:t>
-            </a:r>
-            <a:r>
-              <a:rPr lang="en-US" dirty="0"/>
-              <a:t>, features = c("MS4A1", "CD79A"))</a:t>
-            </a:r>
-          </a:p>
-        </p:txBody>
-      </p:sp>
-      <p:pic>
-        <p:nvPicPr>
-          <p:cNvPr id="6146" name="Picture 2">
-            <a:extLst>
-              <a:ext uri="{FF2B5EF4-FFF2-40B4-BE49-F238E27FC236}">
-                <a16:creationId xmlns:a16="http://schemas.microsoft.com/office/drawing/2014/main" id="{8D286476-5EA2-0EB5-2313-2DB391E04FAA}"/>
-              </a:ext>
-            </a:extLst>
-          </p:cNvPr>
-          <p:cNvPicPr>
-            <a:picLocks noChangeAspect="1" noChangeArrowheads="1"/>
-          </p:cNvPicPr>
-          <p:nvPr/>
-        </p:nvPicPr>
-        <p:blipFill>
-          <a:blip r:embed="rId2">
-            <a:extLst>
-              <a:ext uri="{28A0092B-C50C-407E-A947-70E740481C1C}">
-                <a14:useLocalDpi xmlns:a14="http://schemas.microsoft.com/office/drawing/2010/main" val="0"/>
-              </a:ext>
-            </a:extLst>
-          </a:blip>
-          <a:srcRect/>
-          <a:stretch>
-            <a:fillRect/>
-          </a:stretch>
-        </p:blipFill>
-        <p:spPr bwMode="auto">
-          <a:xfrm>
-            <a:off x="3606800" y="2210316"/>
-            <a:ext cx="7594600" cy="3797300"/>
-          </a:xfrm>
-          <a:prstGeom prst="rect">
-            <a:avLst/>
-          </a:prstGeom>
-          <a:noFill/>
-          <a:extLst>
-            <a:ext uri="{909E8E84-426E-40DD-AFC4-6F175D3DCCD1}">
-              <a14:hiddenFill xmlns:a14="http://schemas.microsoft.com/office/drawing/2010/main">
-                <a:solidFill>
-                  <a:srgbClr val="FFFFFF"/>
-                </a:solidFill>
-              </a14:hiddenFill>
-            </a:ext>
-          </a:extLst>
-        </p:spPr>
-      </p:pic>
-      <p:sp>
-        <p:nvSpPr>
           <p:cNvPr id="7" name="Rectangle 6">
             <a:extLst>
               <a:ext uri="{FF2B5EF4-FFF2-40B4-BE49-F238E27FC236}">
-                <a16:creationId xmlns:a16="http://schemas.microsoft.com/office/drawing/2014/main" id="{249FC094-88D2-D07A-46CF-38A52E6C3AD6}"/>
+                <a16:creationId xmlns:a16="http://schemas.microsoft.com/office/drawing/2014/main" id="{646A99C1-0636-6FA6-B582-CFE72F0E967E}"/>
               </a:ext>
             </a:extLst>
           </p:cNvPr>
@@ -8046,8 +8614,8 @@
         </p:nvSpPr>
         <p:spPr>
           <a:xfrm>
-            <a:off x="0" y="629173"/>
-            <a:ext cx="1704975" cy="5230608"/>
+            <a:off x="-1" y="4508500"/>
+            <a:ext cx="1704975" cy="2349499"/>
           </a:xfrm>
           <a:prstGeom prst="rect">
             <a:avLst/>
@@ -8082,16 +8650,168 @@
           <a:lstStyle/>
           <a:p>
             <a:pPr algn="ctr"/>
-            <a:endParaRPr lang="en-US" dirty="0"/>
+            <a:endParaRPr lang="en-US"/>
+          </a:p>
+        </p:txBody>
+      </p:sp>
+    </p:spTree>
+    <p:extLst>
+      <p:ext uri="{BB962C8B-B14F-4D97-AF65-F5344CB8AC3E}">
+        <p14:creationId xmlns:p14="http://schemas.microsoft.com/office/powerpoint/2010/main" val="4025124365"/>
+      </p:ext>
+    </p:extLst>
+  </p:cSld>
+  <p:clrMapOvr>
+    <a:masterClrMapping/>
+  </p:clrMapOvr>
+</p:sld>
+</file>
+
+<file path=ppt/slides/slide14.xml><?xml version="1.0" encoding="utf-8"?>
+<p:sld xmlns:a="http://schemas.openxmlformats.org/drawingml/2006/main" xmlns:r="http://schemas.openxmlformats.org/officeDocument/2006/relationships" xmlns:p="http://schemas.openxmlformats.org/presentationml/2006/main">
+  <p:cSld>
+    <p:spTree>
+      <p:nvGrpSpPr>
+        <p:cNvPr id="1" name=""/>
+        <p:cNvGrpSpPr/>
+        <p:nvPr/>
+      </p:nvGrpSpPr>
+      <p:grpSpPr>
+        <a:xfrm>
+          <a:off x="0" y="0"/>
+          <a:ext cx="0" cy="0"/>
+          <a:chOff x="0" y="0"/>
+          <a:chExt cx="0" cy="0"/>
+        </a:xfrm>
+      </p:grpSpPr>
+      <p:sp>
+        <p:nvSpPr>
+          <p:cNvPr id="2" name="Title 1">
+            <a:extLst>
+              <a:ext uri="{FF2B5EF4-FFF2-40B4-BE49-F238E27FC236}">
+                <a16:creationId xmlns:a16="http://schemas.microsoft.com/office/drawing/2014/main" id="{A6C83907-68AF-A215-11AE-B873C8B69556}"/>
+              </a:ext>
+            </a:extLst>
+          </p:cNvPr>
+          <p:cNvSpPr>
+            <a:spLocks noGrp="1"/>
+          </p:cNvSpPr>
+          <p:nvPr>
+            <p:ph type="title"/>
+          </p:nvPr>
+        </p:nvSpPr>
+        <p:spPr/>
+        <p:txBody>
+          <a:bodyPr/>
+          <a:lstStyle/>
+          <a:p>
+            <a:r>
+              <a:rPr lang="en-US" dirty="0"/>
+              <a:t>PCA Dim loadings</a:t>
+            </a:r>
           </a:p>
         </p:txBody>
       </p:sp>
       <p:sp>
         <p:nvSpPr>
+          <p:cNvPr id="7" name="TextBox 6">
+            <a:extLst>
+              <a:ext uri="{FF2B5EF4-FFF2-40B4-BE49-F238E27FC236}">
+                <a16:creationId xmlns:a16="http://schemas.microsoft.com/office/drawing/2014/main" id="{CA837A5F-3AC7-CE12-5C58-4B1E73C24A52}"/>
+              </a:ext>
+            </a:extLst>
+          </p:cNvPr>
+          <p:cNvSpPr txBox="1"/>
+          <p:nvPr/>
+        </p:nvSpPr>
+        <p:spPr>
+          <a:xfrm>
+            <a:off x="3003042" y="815839"/>
+            <a:ext cx="6185916" cy="369332"/>
+          </a:xfrm>
+          <a:prstGeom prst="rect">
+            <a:avLst/>
+          </a:prstGeom>
+          <a:noFill/>
+        </p:spPr>
+        <p:txBody>
+          <a:bodyPr wrap="square">
+            <a:spAutoFit/>
+          </a:bodyPr>
+          <a:lstStyle/>
+          <a:p>
+            <a:r>
+              <a:rPr lang="en-US" dirty="0" err="1"/>
+              <a:t>DimHeatmap</a:t>
+            </a:r>
+            <a:r>
+              <a:rPr lang="en-US" dirty="0"/>
+              <a:t>(</a:t>
+            </a:r>
+            <a:r>
+              <a:rPr lang="en-US" dirty="0" err="1"/>
+              <a:t>pbmc</a:t>
+            </a:r>
+            <a:r>
+              <a:rPr lang="en-US" dirty="0"/>
+              <a:t>, dims = 1:15, cells = 500, balanced = TRUE)</a:t>
+            </a:r>
+          </a:p>
+        </p:txBody>
+      </p:sp>
+      <p:pic>
+        <p:nvPicPr>
+          <p:cNvPr id="5126" name="Picture 6">
+            <a:extLst>
+              <a:ext uri="{FF2B5EF4-FFF2-40B4-BE49-F238E27FC236}">
+                <a16:creationId xmlns:a16="http://schemas.microsoft.com/office/drawing/2014/main" id="{52F3FEB3-CE1D-B7A3-5338-510233A9BE63}"/>
+              </a:ext>
+            </a:extLst>
+          </p:cNvPr>
+          <p:cNvPicPr>
+            <a:picLocks noChangeAspect="1" noChangeArrowheads="1"/>
+          </p:cNvPicPr>
+          <p:nvPr/>
+        </p:nvPicPr>
+        <p:blipFill>
+          <a:blip r:embed="rId2">
+            <a:extLst>
+              <a:ext uri="{28A0092B-C50C-407E-A947-70E740481C1C}">
+                <a14:useLocalDpi xmlns:a14="http://schemas.microsoft.com/office/drawing/2010/main" val="0"/>
+              </a:ext>
+            </a:extLst>
+          </a:blip>
+          <a:srcRect/>
+          <a:stretch>
+            <a:fillRect/>
+          </a:stretch>
+        </p:blipFill>
+        <p:spPr bwMode="auto">
+          <a:xfrm>
+            <a:off x="2978150" y="1185171"/>
+            <a:ext cx="8216900" cy="5477933"/>
+          </a:xfrm>
+          <a:prstGeom prst="rect">
+            <a:avLst/>
+          </a:prstGeom>
+          <a:noFill/>
+          <a:extLst>
+            <a:ext uri="{909E8E84-426E-40DD-AFC4-6F175D3DCCD1}">
+              <a14:hiddenFill xmlns:a14="http://schemas.microsoft.com/office/drawing/2010/main">
+                <a:solidFill>
+                  <a:srgbClr val="FFFFFF"/>
+                </a:solidFill>
+              </a14:hiddenFill>
+            </a:ext>
+          </a:extLst>
+        </p:spPr>
+      </p:pic>
+      <p:sp>
+        <p:nvSpPr>
           <p:cNvPr id="8" name="Rectangle 7">
             <a:extLst>
               <a:ext uri="{FF2B5EF4-FFF2-40B4-BE49-F238E27FC236}">
-                <a16:creationId xmlns:a16="http://schemas.microsoft.com/office/drawing/2014/main" id="{E0FCD8ED-1AAF-2E08-3F50-98CF84F7E3EA}"/>
+                <a16:creationId xmlns:a16="http://schemas.microsoft.com/office/drawing/2014/main" id="{271EE68F-B47D-C6D8-BAE3-70D40C4B601D}"/>
               </a:ext>
             </a:extLst>
           </p:cNvPr>
@@ -8099,9 +8819,9 @@
           <p:nvPr/>
         </p:nvSpPr>
         <p:spPr>
-          <a:xfrm flipV="1">
-            <a:off x="-1" y="6857999"/>
-            <a:ext cx="1704975" cy="45719"/>
+          <a:xfrm>
+            <a:off x="0" y="629173"/>
+            <a:ext cx="1704975" cy="3003027"/>
           </a:xfrm>
           <a:prstGeom prst="rect">
             <a:avLst/>
@@ -8136,174 +8856,16 @@
           <a:lstStyle/>
           <a:p>
             <a:pPr algn="ctr"/>
-            <a:endParaRPr lang="en-US"/>
-          </a:p>
-        </p:txBody>
-      </p:sp>
-    </p:spTree>
-    <p:extLst>
-      <p:ext uri="{BB962C8B-B14F-4D97-AF65-F5344CB8AC3E}">
-        <p14:creationId xmlns:p14="http://schemas.microsoft.com/office/powerpoint/2010/main" val="1068518410"/>
-      </p:ext>
-    </p:extLst>
-  </p:cSld>
-  <p:clrMapOvr>
-    <a:masterClrMapping/>
-  </p:clrMapOvr>
-</p:sld>
-</file>
-
-<file path=ppt/slides/slide14.xml><?xml version="1.0" encoding="utf-8"?>
-<p:sld xmlns:a="http://schemas.openxmlformats.org/drawingml/2006/main" xmlns:r="http://schemas.openxmlformats.org/officeDocument/2006/relationships" xmlns:p="http://schemas.openxmlformats.org/presentationml/2006/main">
-  <p:cSld>
-    <p:spTree>
-      <p:nvGrpSpPr>
-        <p:cNvPr id="1" name=""/>
-        <p:cNvGrpSpPr/>
-        <p:nvPr/>
-      </p:nvGrpSpPr>
-      <p:grpSpPr>
-        <a:xfrm>
-          <a:off x="0" y="0"/>
-          <a:ext cx="0" cy="0"/>
-          <a:chOff x="0" y="0"/>
-          <a:chExt cx="0" cy="0"/>
-        </a:xfrm>
-      </p:grpSpPr>
-      <p:sp>
-        <p:nvSpPr>
-          <p:cNvPr id="2" name="Title 1">
-            <a:extLst>
-              <a:ext uri="{FF2B5EF4-FFF2-40B4-BE49-F238E27FC236}">
-                <a16:creationId xmlns:a16="http://schemas.microsoft.com/office/drawing/2014/main" id="{ABA99F01-FB34-57A1-01E1-134A455F343C}"/>
-              </a:ext>
-            </a:extLst>
-          </p:cNvPr>
-          <p:cNvSpPr>
-            <a:spLocks noGrp="1"/>
-          </p:cNvSpPr>
-          <p:nvPr>
-            <p:ph type="title"/>
-          </p:nvPr>
-        </p:nvSpPr>
-        <p:spPr/>
-        <p:txBody>
-          <a:bodyPr/>
-          <a:lstStyle/>
-          <a:p>
-            <a:r>
-              <a:rPr lang="en-US" dirty="0"/>
-              <a:t>Cell Heatmap of Gene Expression</a:t>
-            </a:r>
+            <a:endParaRPr lang="en-US" dirty="0"/>
           </a:p>
         </p:txBody>
       </p:sp>
       <p:sp>
         <p:nvSpPr>
-          <p:cNvPr id="4" name="TextBox 3">
-            <a:extLst>
-              <a:ext uri="{FF2B5EF4-FFF2-40B4-BE49-F238E27FC236}">
-                <a16:creationId xmlns:a16="http://schemas.microsoft.com/office/drawing/2014/main" id="{21424D4B-6E7C-0452-0C41-D536F93D422C}"/>
-              </a:ext>
-            </a:extLst>
-          </p:cNvPr>
-          <p:cNvSpPr txBox="1"/>
-          <p:nvPr/>
-        </p:nvSpPr>
-        <p:spPr>
-          <a:xfrm>
-            <a:off x="1698625" y="852785"/>
-            <a:ext cx="6191250" cy="923330"/>
-          </a:xfrm>
-          <a:prstGeom prst="rect">
-            <a:avLst/>
-          </a:prstGeom>
-          <a:noFill/>
-        </p:spPr>
-        <p:txBody>
-          <a:bodyPr wrap="square">
-            <a:spAutoFit/>
-          </a:bodyPr>
-          <a:lstStyle/>
-          <a:p>
-            <a:r>
-              <a:rPr lang="en-US" dirty="0" err="1"/>
-              <a:t>FeaturePlot</a:t>
-            </a:r>
-            <a:r>
-              <a:rPr lang="en-US" dirty="0"/>
-              <a:t>(</a:t>
-            </a:r>
-            <a:r>
-              <a:rPr lang="en-US" dirty="0" err="1"/>
-              <a:t>pbmc</a:t>
-            </a:r>
-            <a:r>
-              <a:rPr lang="en-US" dirty="0"/>
-              <a:t>, features = c("MS4A1", "GNLY", "CD3E", "CD14", "FCER1A", "FCGR3A", "LYZ", "PPBP",</a:t>
-            </a:r>
-          </a:p>
-          <a:p>
-            <a:r>
-              <a:rPr lang="en-US" dirty="0"/>
-              <a:t>    "CD8A"))</a:t>
-            </a:r>
-          </a:p>
-        </p:txBody>
-      </p:sp>
-      <p:pic>
-        <p:nvPicPr>
-          <p:cNvPr id="7170" name="Picture 2">
-            <a:extLst>
-              <a:ext uri="{FF2B5EF4-FFF2-40B4-BE49-F238E27FC236}">
-                <a16:creationId xmlns:a16="http://schemas.microsoft.com/office/drawing/2014/main" id="{67BFB869-8863-DE1C-8EB6-64CADA8B090E}"/>
-              </a:ext>
-            </a:extLst>
-          </p:cNvPr>
-          <p:cNvPicPr>
-            <a:picLocks noChangeAspect="1" noChangeArrowheads="1"/>
-          </p:cNvPicPr>
-          <p:nvPr/>
-        </p:nvPicPr>
-        <p:blipFill>
-          <a:blip r:embed="rId2">
-            <a:extLst>
-              <a:ext uri="{28A0092B-C50C-407E-A947-70E740481C1C}">
-                <a14:useLocalDpi xmlns:a14="http://schemas.microsoft.com/office/drawing/2010/main" val="0"/>
-              </a:ext>
-            </a:extLst>
-          </a:blip>
-          <a:srcRect/>
-          <a:stretch>
-            <a:fillRect/>
-          </a:stretch>
-        </p:blipFill>
-        <p:spPr bwMode="auto">
-          <a:xfrm>
-            <a:off x="4311650" y="1427480"/>
-            <a:ext cx="6470650" cy="5176520"/>
-          </a:xfrm>
-          <a:prstGeom prst="rect">
-            <a:avLst/>
-          </a:prstGeom>
-          <a:noFill/>
-          <a:extLst>
-            <a:ext uri="{909E8E84-426E-40DD-AFC4-6F175D3DCCD1}">
-              <a14:hiddenFill xmlns:a14="http://schemas.microsoft.com/office/drawing/2010/main">
-                <a:solidFill>
-                  <a:srgbClr val="FFFFFF"/>
-                </a:solidFill>
-              </a14:hiddenFill>
-            </a:ext>
-          </a:extLst>
-        </p:spPr>
-      </p:pic>
-      <p:sp>
-        <p:nvSpPr>
-          <p:cNvPr id="5" name="Rectangle 4">
-            <a:extLst>
-              <a:ext uri="{FF2B5EF4-FFF2-40B4-BE49-F238E27FC236}">
-                <a16:creationId xmlns:a16="http://schemas.microsoft.com/office/drawing/2014/main" id="{64F9799E-3AE5-3C7F-1957-0FCDC44810CF}"/>
+          <p:cNvPr id="9" name="Rectangle 8">
+            <a:extLst>
+              <a:ext uri="{FF2B5EF4-FFF2-40B4-BE49-F238E27FC236}">
+                <a16:creationId xmlns:a16="http://schemas.microsoft.com/office/drawing/2014/main" id="{D81DA614-7A0D-03F1-9333-E1E26CFB60B3}"/>
               </a:ext>
             </a:extLst>
           </p:cNvPr>
@@ -8312,8 +8874,8 @@
         </p:nvSpPr>
         <p:spPr>
           <a:xfrm>
-            <a:off x="0" y="629173"/>
-            <a:ext cx="1704975" cy="5230608"/>
+            <a:off x="-1" y="4508500"/>
+            <a:ext cx="1704975" cy="2349499"/>
           </a:xfrm>
           <a:prstGeom prst="rect">
             <a:avLst/>
@@ -8348,6 +8910,478 @@
           <a:lstStyle/>
           <a:p>
             <a:pPr algn="ctr"/>
+            <a:endParaRPr lang="en-US"/>
+          </a:p>
+        </p:txBody>
+      </p:sp>
+    </p:spTree>
+    <p:extLst>
+      <p:ext uri="{BB962C8B-B14F-4D97-AF65-F5344CB8AC3E}">
+        <p14:creationId xmlns:p14="http://schemas.microsoft.com/office/powerpoint/2010/main" val="3473530926"/>
+      </p:ext>
+    </p:extLst>
+  </p:cSld>
+  <p:clrMapOvr>
+    <a:masterClrMapping/>
+  </p:clrMapOvr>
+</p:sld>
+</file>
+
+<file path=ppt/slides/slide15.xml><?xml version="1.0" encoding="utf-8"?>
+<p:sld xmlns:a="http://schemas.openxmlformats.org/drawingml/2006/main" xmlns:r="http://schemas.openxmlformats.org/officeDocument/2006/relationships" xmlns:p="http://schemas.openxmlformats.org/presentationml/2006/main">
+  <p:cSld>
+    <p:spTree>
+      <p:nvGrpSpPr>
+        <p:cNvPr id="1" name=""/>
+        <p:cNvGrpSpPr/>
+        <p:nvPr/>
+      </p:nvGrpSpPr>
+      <p:grpSpPr>
+        <a:xfrm>
+          <a:off x="0" y="0"/>
+          <a:ext cx="0" cy="0"/>
+          <a:chOff x="0" y="0"/>
+          <a:chExt cx="0" cy="0"/>
+        </a:xfrm>
+      </p:grpSpPr>
+      <p:sp>
+        <p:nvSpPr>
+          <p:cNvPr id="2" name="Title 1">
+            <a:extLst>
+              <a:ext uri="{FF2B5EF4-FFF2-40B4-BE49-F238E27FC236}">
+                <a16:creationId xmlns:a16="http://schemas.microsoft.com/office/drawing/2014/main" id="{08A42B1C-5B54-17BB-D9AB-46D27128E957}"/>
+              </a:ext>
+            </a:extLst>
+          </p:cNvPr>
+          <p:cNvSpPr>
+            <a:spLocks noGrp="1"/>
+          </p:cNvSpPr>
+          <p:nvPr>
+            <p:ph type="title"/>
+          </p:nvPr>
+        </p:nvSpPr>
+        <p:spPr/>
+        <p:txBody>
+          <a:bodyPr/>
+          <a:lstStyle/>
+          <a:p>
+            <a:r>
+              <a:rPr lang="en-US" dirty="0"/>
+              <a:t>Specific Gene Expression in Each Cluster</a:t>
+            </a:r>
+          </a:p>
+        </p:txBody>
+      </p:sp>
+      <p:sp>
+        <p:nvSpPr>
+          <p:cNvPr id="4" name="TextBox 3">
+            <a:extLst>
+              <a:ext uri="{FF2B5EF4-FFF2-40B4-BE49-F238E27FC236}">
+                <a16:creationId xmlns:a16="http://schemas.microsoft.com/office/drawing/2014/main" id="{A76DA7DA-3C2F-8EFD-C083-CB79041C1CB9}"/>
+              </a:ext>
+            </a:extLst>
+          </p:cNvPr>
+          <p:cNvSpPr txBox="1"/>
+          <p:nvPr/>
+        </p:nvSpPr>
+        <p:spPr>
+          <a:xfrm>
+            <a:off x="2651125" y="850384"/>
+            <a:ext cx="6191250" cy="369332"/>
+          </a:xfrm>
+          <a:prstGeom prst="rect">
+            <a:avLst/>
+          </a:prstGeom>
+          <a:noFill/>
+        </p:spPr>
+        <p:txBody>
+          <a:bodyPr wrap="square">
+            <a:spAutoFit/>
+          </a:bodyPr>
+          <a:lstStyle/>
+          <a:p>
+            <a:r>
+              <a:rPr lang="en-US" dirty="0" err="1"/>
+              <a:t>VlnPlot</a:t>
+            </a:r>
+            <a:r>
+              <a:rPr lang="en-US" dirty="0"/>
+              <a:t>(</a:t>
+            </a:r>
+            <a:r>
+              <a:rPr lang="en-US" dirty="0" err="1"/>
+              <a:t>pbmc</a:t>
+            </a:r>
+            <a:r>
+              <a:rPr lang="en-US" dirty="0"/>
+              <a:t>, features = c("MS4A1", "CD79A"))</a:t>
+            </a:r>
+          </a:p>
+        </p:txBody>
+      </p:sp>
+      <p:pic>
+        <p:nvPicPr>
+          <p:cNvPr id="6146" name="Picture 2">
+            <a:extLst>
+              <a:ext uri="{FF2B5EF4-FFF2-40B4-BE49-F238E27FC236}">
+                <a16:creationId xmlns:a16="http://schemas.microsoft.com/office/drawing/2014/main" id="{8D286476-5EA2-0EB5-2313-2DB391E04FAA}"/>
+              </a:ext>
+            </a:extLst>
+          </p:cNvPr>
+          <p:cNvPicPr>
+            <a:picLocks noChangeAspect="1" noChangeArrowheads="1"/>
+          </p:cNvPicPr>
+          <p:nvPr/>
+        </p:nvPicPr>
+        <p:blipFill>
+          <a:blip r:embed="rId2">
+            <a:extLst>
+              <a:ext uri="{28A0092B-C50C-407E-A947-70E740481C1C}">
+                <a14:useLocalDpi xmlns:a14="http://schemas.microsoft.com/office/drawing/2010/main" val="0"/>
+              </a:ext>
+            </a:extLst>
+          </a:blip>
+          <a:srcRect/>
+          <a:stretch>
+            <a:fillRect/>
+          </a:stretch>
+        </p:blipFill>
+        <p:spPr bwMode="auto">
+          <a:xfrm>
+            <a:off x="3606800" y="2210316"/>
+            <a:ext cx="7594600" cy="3797300"/>
+          </a:xfrm>
+          <a:prstGeom prst="rect">
+            <a:avLst/>
+          </a:prstGeom>
+          <a:noFill/>
+          <a:extLst>
+            <a:ext uri="{909E8E84-426E-40DD-AFC4-6F175D3DCCD1}">
+              <a14:hiddenFill xmlns:a14="http://schemas.microsoft.com/office/drawing/2010/main">
+                <a:solidFill>
+                  <a:srgbClr val="FFFFFF"/>
+                </a:solidFill>
+              </a14:hiddenFill>
+            </a:ext>
+          </a:extLst>
+        </p:spPr>
+      </p:pic>
+      <p:sp>
+        <p:nvSpPr>
+          <p:cNvPr id="7" name="Rectangle 6">
+            <a:extLst>
+              <a:ext uri="{FF2B5EF4-FFF2-40B4-BE49-F238E27FC236}">
+                <a16:creationId xmlns:a16="http://schemas.microsoft.com/office/drawing/2014/main" id="{249FC094-88D2-D07A-46CF-38A52E6C3AD6}"/>
+              </a:ext>
+            </a:extLst>
+          </p:cNvPr>
+          <p:cNvSpPr/>
+          <p:nvPr/>
+        </p:nvSpPr>
+        <p:spPr>
+          <a:xfrm>
+            <a:off x="0" y="629173"/>
+            <a:ext cx="1704975" cy="5230608"/>
+          </a:xfrm>
+          <a:prstGeom prst="rect">
+            <a:avLst/>
+          </a:prstGeom>
+          <a:solidFill>
+            <a:srgbClr val="FFFFFF">
+              <a:alpha val="60000"/>
+            </a:srgbClr>
+          </a:solidFill>
+          <a:ln>
+            <a:noFill/>
+          </a:ln>
+        </p:spPr>
+        <p:style>
+          <a:lnRef idx="2">
+            <a:schemeClr val="accent1">
+              <a:shade val="15000"/>
+            </a:schemeClr>
+          </a:lnRef>
+          <a:fillRef idx="1">
+            <a:schemeClr val="accent1"/>
+          </a:fillRef>
+          <a:effectRef idx="0">
+            <a:schemeClr val="accent1"/>
+          </a:effectRef>
+          <a:fontRef idx="minor">
+            <a:schemeClr val="lt1"/>
+          </a:fontRef>
+        </p:style>
+        <p:txBody>
+          <a:bodyPr rtlCol="0" anchor="ctr"/>
+          <a:lstStyle/>
+          <a:p>
+            <a:pPr algn="ctr"/>
+            <a:endParaRPr lang="en-US" dirty="0"/>
+          </a:p>
+        </p:txBody>
+      </p:sp>
+      <p:sp>
+        <p:nvSpPr>
+          <p:cNvPr id="8" name="Rectangle 7">
+            <a:extLst>
+              <a:ext uri="{FF2B5EF4-FFF2-40B4-BE49-F238E27FC236}">
+                <a16:creationId xmlns:a16="http://schemas.microsoft.com/office/drawing/2014/main" id="{E0FCD8ED-1AAF-2E08-3F50-98CF84F7E3EA}"/>
+              </a:ext>
+            </a:extLst>
+          </p:cNvPr>
+          <p:cNvSpPr/>
+          <p:nvPr/>
+        </p:nvSpPr>
+        <p:spPr>
+          <a:xfrm flipV="1">
+            <a:off x="-1" y="6857999"/>
+            <a:ext cx="1704975" cy="45719"/>
+          </a:xfrm>
+          <a:prstGeom prst="rect">
+            <a:avLst/>
+          </a:prstGeom>
+          <a:solidFill>
+            <a:srgbClr val="FFFFFF">
+              <a:alpha val="60000"/>
+            </a:srgbClr>
+          </a:solidFill>
+          <a:ln>
+            <a:noFill/>
+          </a:ln>
+        </p:spPr>
+        <p:style>
+          <a:lnRef idx="2">
+            <a:schemeClr val="accent1">
+              <a:shade val="15000"/>
+            </a:schemeClr>
+          </a:lnRef>
+          <a:fillRef idx="1">
+            <a:schemeClr val="accent1"/>
+          </a:fillRef>
+          <a:effectRef idx="0">
+            <a:schemeClr val="accent1"/>
+          </a:effectRef>
+          <a:fontRef idx="minor">
+            <a:schemeClr val="lt1"/>
+          </a:fontRef>
+        </p:style>
+        <p:txBody>
+          <a:bodyPr rtlCol="0" anchor="ctr"/>
+          <a:lstStyle/>
+          <a:p>
+            <a:pPr algn="ctr"/>
+            <a:endParaRPr lang="en-US"/>
+          </a:p>
+        </p:txBody>
+      </p:sp>
+    </p:spTree>
+    <p:extLst>
+      <p:ext uri="{BB962C8B-B14F-4D97-AF65-F5344CB8AC3E}">
+        <p14:creationId xmlns:p14="http://schemas.microsoft.com/office/powerpoint/2010/main" val="1068518410"/>
+      </p:ext>
+    </p:extLst>
+  </p:cSld>
+  <p:clrMapOvr>
+    <a:masterClrMapping/>
+  </p:clrMapOvr>
+</p:sld>
+</file>
+
+<file path=ppt/slides/slide16.xml><?xml version="1.0" encoding="utf-8"?>
+<p:sld xmlns:a="http://schemas.openxmlformats.org/drawingml/2006/main" xmlns:r="http://schemas.openxmlformats.org/officeDocument/2006/relationships" xmlns:p="http://schemas.openxmlformats.org/presentationml/2006/main">
+  <p:cSld>
+    <p:spTree>
+      <p:nvGrpSpPr>
+        <p:cNvPr id="1" name=""/>
+        <p:cNvGrpSpPr/>
+        <p:nvPr/>
+      </p:nvGrpSpPr>
+      <p:grpSpPr>
+        <a:xfrm>
+          <a:off x="0" y="0"/>
+          <a:ext cx="0" cy="0"/>
+          <a:chOff x="0" y="0"/>
+          <a:chExt cx="0" cy="0"/>
+        </a:xfrm>
+      </p:grpSpPr>
+      <p:sp>
+        <p:nvSpPr>
+          <p:cNvPr id="2" name="Title 1">
+            <a:extLst>
+              <a:ext uri="{FF2B5EF4-FFF2-40B4-BE49-F238E27FC236}">
+                <a16:creationId xmlns:a16="http://schemas.microsoft.com/office/drawing/2014/main" id="{ABA99F01-FB34-57A1-01E1-134A455F343C}"/>
+              </a:ext>
+            </a:extLst>
+          </p:cNvPr>
+          <p:cNvSpPr>
+            <a:spLocks noGrp="1"/>
+          </p:cNvSpPr>
+          <p:nvPr>
+            <p:ph type="title"/>
+          </p:nvPr>
+        </p:nvSpPr>
+        <p:spPr/>
+        <p:txBody>
+          <a:bodyPr/>
+          <a:lstStyle/>
+          <a:p>
+            <a:r>
+              <a:rPr lang="en-US" dirty="0"/>
+              <a:t>Cell Heatmap of Gene Expression</a:t>
+            </a:r>
+          </a:p>
+        </p:txBody>
+      </p:sp>
+      <p:sp>
+        <p:nvSpPr>
+          <p:cNvPr id="4" name="TextBox 3">
+            <a:extLst>
+              <a:ext uri="{FF2B5EF4-FFF2-40B4-BE49-F238E27FC236}">
+                <a16:creationId xmlns:a16="http://schemas.microsoft.com/office/drawing/2014/main" id="{21424D4B-6E7C-0452-0C41-D536F93D422C}"/>
+              </a:ext>
+            </a:extLst>
+          </p:cNvPr>
+          <p:cNvSpPr txBox="1"/>
+          <p:nvPr/>
+        </p:nvSpPr>
+        <p:spPr>
+          <a:xfrm>
+            <a:off x="1698625" y="852785"/>
+            <a:ext cx="6191250" cy="923330"/>
+          </a:xfrm>
+          <a:prstGeom prst="rect">
+            <a:avLst/>
+          </a:prstGeom>
+          <a:noFill/>
+        </p:spPr>
+        <p:txBody>
+          <a:bodyPr wrap="square">
+            <a:spAutoFit/>
+          </a:bodyPr>
+          <a:lstStyle/>
+          <a:p>
+            <a:r>
+              <a:rPr lang="en-US" dirty="0" err="1"/>
+              <a:t>FeaturePlot</a:t>
+            </a:r>
+            <a:r>
+              <a:rPr lang="en-US" dirty="0"/>
+              <a:t>(</a:t>
+            </a:r>
+            <a:r>
+              <a:rPr lang="en-US" dirty="0" err="1"/>
+              <a:t>pbmc</a:t>
+            </a:r>
+            <a:r>
+              <a:rPr lang="en-US" dirty="0"/>
+              <a:t>, features = c("MS4A1", "GNLY", "CD3E", "CD14", "FCER1A", "FCGR3A", "LYZ", "PPBP",</a:t>
+            </a:r>
+          </a:p>
+          <a:p>
+            <a:r>
+              <a:rPr lang="en-US" dirty="0"/>
+              <a:t>    "CD8A"))</a:t>
+            </a:r>
+          </a:p>
+        </p:txBody>
+      </p:sp>
+      <p:pic>
+        <p:nvPicPr>
+          <p:cNvPr id="7170" name="Picture 2">
+            <a:extLst>
+              <a:ext uri="{FF2B5EF4-FFF2-40B4-BE49-F238E27FC236}">
+                <a16:creationId xmlns:a16="http://schemas.microsoft.com/office/drawing/2014/main" id="{67BFB869-8863-DE1C-8EB6-64CADA8B090E}"/>
+              </a:ext>
+            </a:extLst>
+          </p:cNvPr>
+          <p:cNvPicPr>
+            <a:picLocks noChangeAspect="1" noChangeArrowheads="1"/>
+          </p:cNvPicPr>
+          <p:nvPr/>
+        </p:nvPicPr>
+        <p:blipFill>
+          <a:blip r:embed="rId2">
+            <a:extLst>
+              <a:ext uri="{28A0092B-C50C-407E-A947-70E740481C1C}">
+                <a14:useLocalDpi xmlns:a14="http://schemas.microsoft.com/office/drawing/2010/main" val="0"/>
+              </a:ext>
+            </a:extLst>
+          </a:blip>
+          <a:srcRect/>
+          <a:stretch>
+            <a:fillRect/>
+          </a:stretch>
+        </p:blipFill>
+        <p:spPr bwMode="auto">
+          <a:xfrm>
+            <a:off x="4311650" y="1427480"/>
+            <a:ext cx="6470650" cy="5176520"/>
+          </a:xfrm>
+          <a:prstGeom prst="rect">
+            <a:avLst/>
+          </a:prstGeom>
+          <a:noFill/>
+          <a:extLst>
+            <a:ext uri="{909E8E84-426E-40DD-AFC4-6F175D3DCCD1}">
+              <a14:hiddenFill xmlns:a14="http://schemas.microsoft.com/office/drawing/2010/main">
+                <a:solidFill>
+                  <a:srgbClr val="FFFFFF"/>
+                </a:solidFill>
+              </a14:hiddenFill>
+            </a:ext>
+          </a:extLst>
+        </p:spPr>
+      </p:pic>
+      <p:sp>
+        <p:nvSpPr>
+          <p:cNvPr id="5" name="Rectangle 4">
+            <a:extLst>
+              <a:ext uri="{FF2B5EF4-FFF2-40B4-BE49-F238E27FC236}">
+                <a16:creationId xmlns:a16="http://schemas.microsoft.com/office/drawing/2014/main" id="{64F9799E-3AE5-3C7F-1957-0FCDC44810CF}"/>
+              </a:ext>
+            </a:extLst>
+          </p:cNvPr>
+          <p:cNvSpPr/>
+          <p:nvPr/>
+        </p:nvSpPr>
+        <p:spPr>
+          <a:xfrm>
+            <a:off x="0" y="629173"/>
+            <a:ext cx="1704975" cy="5230608"/>
+          </a:xfrm>
+          <a:prstGeom prst="rect">
+            <a:avLst/>
+          </a:prstGeom>
+          <a:solidFill>
+            <a:srgbClr val="FFFFFF">
+              <a:alpha val="60000"/>
+            </a:srgbClr>
+          </a:solidFill>
+          <a:ln>
+            <a:noFill/>
+          </a:ln>
+        </p:spPr>
+        <p:style>
+          <a:lnRef idx="2">
+            <a:schemeClr val="accent1">
+              <a:shade val="15000"/>
+            </a:schemeClr>
+          </a:lnRef>
+          <a:fillRef idx="1">
+            <a:schemeClr val="accent1"/>
+          </a:fillRef>
+          <a:effectRef idx="0">
+            <a:schemeClr val="accent1"/>
+          </a:effectRef>
+          <a:fontRef idx="minor">
+            <a:schemeClr val="lt1"/>
+          </a:fontRef>
+        </p:style>
+        <p:txBody>
+          <a:bodyPr rtlCol="0" anchor="ctr"/>
+          <a:lstStyle/>
+          <a:p>
+            <a:pPr algn="ctr"/>
             <a:endParaRPr lang="en-US" dirty="0"/>
           </a:p>
         </p:txBody>
@@ -8365,7 +9399,7 @@
 </p:sld>
 </file>
 
-<file path=ppt/slides/slide15.xml><?xml version="1.0" encoding="utf-8"?>
+<file path=ppt/slides/slide17.xml><?xml version="1.0" encoding="utf-8"?>
 <p:sld xmlns:a="http://schemas.openxmlformats.org/drawingml/2006/main" xmlns:r="http://schemas.openxmlformats.org/officeDocument/2006/relationships" xmlns:p="http://schemas.openxmlformats.org/presentationml/2006/main">
   <p:cSld>
     <p:spTree>
@@ -11886,7 +12920,7 @@
         </p:nvGrpSpPr>
         <p:grpSpPr>
           <a:xfrm>
-            <a:off x="8472640" y="3160600"/>
+            <a:off x="8317065" y="3171982"/>
             <a:ext cx="3649510" cy="1242486"/>
             <a:chOff x="252542" y="3093864"/>
             <a:chExt cx="2989189" cy="1017678"/>
@@ -12003,7 +13037,7 @@
           <a:p>
             <a:r>
               <a:rPr lang="en-US" dirty="0"/>
-              <a:t>Differential Gene Expression Analysis: Single Sample</a:t>
+              <a:t>Differential Gene Expression Analysis: Single Study Group</a:t>
             </a:r>
           </a:p>
         </p:txBody>
@@ -12022,7 +13056,7 @@
         </p:nvSpPr>
         <p:spPr>
           <a:xfrm>
-            <a:off x="8472640" y="5237012"/>
+            <a:off x="8472640" y="5482032"/>
             <a:ext cx="3338360" cy="769441"/>
           </a:xfrm>
           <a:prstGeom prst="rect">
@@ -12190,8 +13224,8 @@
         </p:blipFill>
         <p:spPr>
           <a:xfrm>
-            <a:off x="2574678" y="2891504"/>
-            <a:ext cx="5531475" cy="3941096"/>
+            <a:off x="2574678" y="2850527"/>
+            <a:ext cx="5627490" cy="4009505"/>
           </a:xfrm>
           <a:prstGeom prst="rect">
             <a:avLst/>
@@ -12341,6 +13375,239 @@
           <p:cNvPr id="2" name="Title 1">
             <a:extLst>
               <a:ext uri="{FF2B5EF4-FFF2-40B4-BE49-F238E27FC236}">
+                <a16:creationId xmlns:a16="http://schemas.microsoft.com/office/drawing/2014/main" id="{CDF09BBD-698F-662C-344B-BA5E81CE2147}"/>
+              </a:ext>
+            </a:extLst>
+          </p:cNvPr>
+          <p:cNvSpPr>
+            <a:spLocks noGrp="1"/>
+          </p:cNvSpPr>
+          <p:nvPr>
+            <p:ph type="title"/>
+          </p:nvPr>
+        </p:nvSpPr>
+        <p:spPr/>
+        <p:txBody>
+          <a:bodyPr/>
+          <a:lstStyle/>
+          <a:p>
+            <a:endParaRPr lang="en-US"/>
+          </a:p>
+        </p:txBody>
+      </p:sp>
+      <p:pic>
+        <p:nvPicPr>
+          <p:cNvPr id="4" name="Picture 3">
+            <a:extLst>
+              <a:ext uri="{FF2B5EF4-FFF2-40B4-BE49-F238E27FC236}">
+                <a16:creationId xmlns:a16="http://schemas.microsoft.com/office/drawing/2014/main" id="{C37AEEC3-2B43-C814-4C2C-621C1C6CCE49}"/>
+              </a:ext>
+            </a:extLst>
+          </p:cNvPr>
+          <p:cNvPicPr>
+            <a:picLocks noChangeAspect="1"/>
+          </p:cNvPicPr>
+          <p:nvPr/>
+        </p:nvPicPr>
+        <p:blipFill>
+          <a:blip r:embed="rId2"/>
+          <a:stretch>
+            <a:fillRect/>
+          </a:stretch>
+        </p:blipFill>
+        <p:spPr>
+          <a:xfrm>
+            <a:off x="3438144" y="1738260"/>
+            <a:ext cx="6016752" cy="5119740"/>
+          </a:xfrm>
+          <a:prstGeom prst="rect">
+            <a:avLst/>
+          </a:prstGeom>
+        </p:spPr>
+      </p:pic>
+      <p:pic>
+        <p:nvPicPr>
+          <p:cNvPr id="6" name="Picture 5">
+            <a:extLst>
+              <a:ext uri="{FF2B5EF4-FFF2-40B4-BE49-F238E27FC236}">
+                <a16:creationId xmlns:a16="http://schemas.microsoft.com/office/drawing/2014/main" id="{06D66ABF-86AB-97F4-124A-57879E1977CD}"/>
+              </a:ext>
+            </a:extLst>
+          </p:cNvPr>
+          <p:cNvPicPr>
+            <a:picLocks noChangeAspect="1"/>
+          </p:cNvPicPr>
+          <p:nvPr/>
+        </p:nvPicPr>
+        <p:blipFill>
+          <a:blip r:embed="rId3"/>
+          <a:stretch>
+            <a:fillRect/>
+          </a:stretch>
+        </p:blipFill>
+        <p:spPr>
+          <a:xfrm>
+            <a:off x="2679377" y="812189"/>
+            <a:ext cx="5534797" cy="743054"/>
+          </a:xfrm>
+          <a:prstGeom prst="rect">
+            <a:avLst/>
+          </a:prstGeom>
+        </p:spPr>
+      </p:pic>
+    </p:spTree>
+    <p:extLst>
+      <p:ext uri="{BB962C8B-B14F-4D97-AF65-F5344CB8AC3E}">
+        <p14:creationId xmlns:p14="http://schemas.microsoft.com/office/powerpoint/2010/main" val="3713491579"/>
+      </p:ext>
+    </p:extLst>
+  </p:cSld>
+  <p:clrMapOvr>
+    <a:masterClrMapping/>
+  </p:clrMapOvr>
+</p:sld>
+</file>
+
+<file path=ppt/slides/slide7.xml><?xml version="1.0" encoding="utf-8"?>
+<p:sld xmlns:a="http://schemas.openxmlformats.org/drawingml/2006/main" xmlns:r="http://schemas.openxmlformats.org/officeDocument/2006/relationships" xmlns:p="http://schemas.openxmlformats.org/presentationml/2006/main">
+  <p:cSld>
+    <p:spTree>
+      <p:nvGrpSpPr>
+        <p:cNvPr id="1" name=""/>
+        <p:cNvGrpSpPr/>
+        <p:nvPr/>
+      </p:nvGrpSpPr>
+      <p:grpSpPr>
+        <a:xfrm>
+          <a:off x="0" y="0"/>
+          <a:ext cx="0" cy="0"/>
+          <a:chOff x="0" y="0"/>
+          <a:chExt cx="0" cy="0"/>
+        </a:xfrm>
+      </p:grpSpPr>
+      <p:sp>
+        <p:nvSpPr>
+          <p:cNvPr id="2" name="Title 1">
+            <a:extLst>
+              <a:ext uri="{FF2B5EF4-FFF2-40B4-BE49-F238E27FC236}">
+                <a16:creationId xmlns:a16="http://schemas.microsoft.com/office/drawing/2014/main" id="{7883CDB6-371B-7D95-417A-AE684344A937}"/>
+              </a:ext>
+            </a:extLst>
+          </p:cNvPr>
+          <p:cNvSpPr>
+            <a:spLocks noGrp="1"/>
+          </p:cNvSpPr>
+          <p:nvPr>
+            <p:ph type="title"/>
+          </p:nvPr>
+        </p:nvSpPr>
+        <p:spPr/>
+        <p:txBody>
+          <a:bodyPr/>
+          <a:lstStyle/>
+          <a:p>
+            <a:r>
+              <a:rPr lang="en-US" dirty="0"/>
+              <a:t>Differential Gene Expression Analysis: Single Study Group</a:t>
+            </a:r>
+          </a:p>
+        </p:txBody>
+      </p:sp>
+      <p:pic>
+        <p:nvPicPr>
+          <p:cNvPr id="4" name="Picture 3">
+            <a:extLst>
+              <a:ext uri="{FF2B5EF4-FFF2-40B4-BE49-F238E27FC236}">
+                <a16:creationId xmlns:a16="http://schemas.microsoft.com/office/drawing/2014/main" id="{59AE25BE-DDBD-A94C-87FE-AAE0296767DF}"/>
+              </a:ext>
+            </a:extLst>
+          </p:cNvPr>
+          <p:cNvPicPr>
+            <a:picLocks noChangeAspect="1"/>
+          </p:cNvPicPr>
+          <p:nvPr/>
+        </p:nvPicPr>
+        <p:blipFill>
+          <a:blip r:embed="rId2"/>
+          <a:stretch>
+            <a:fillRect/>
+          </a:stretch>
+        </p:blipFill>
+        <p:spPr>
+          <a:xfrm>
+            <a:off x="2734057" y="1807099"/>
+            <a:ext cx="7025640" cy="5050901"/>
+          </a:xfrm>
+          <a:prstGeom prst="rect">
+            <a:avLst/>
+          </a:prstGeom>
+        </p:spPr>
+      </p:pic>
+      <p:pic>
+        <p:nvPicPr>
+          <p:cNvPr id="6" name="Picture 5">
+            <a:extLst>
+              <a:ext uri="{FF2B5EF4-FFF2-40B4-BE49-F238E27FC236}">
+                <a16:creationId xmlns:a16="http://schemas.microsoft.com/office/drawing/2014/main" id="{A4404896-6303-29B4-F05D-027FF121BE49}"/>
+              </a:ext>
+            </a:extLst>
+          </p:cNvPr>
+          <p:cNvPicPr>
+            <a:picLocks noChangeAspect="1"/>
+          </p:cNvPicPr>
+          <p:nvPr/>
+        </p:nvPicPr>
+        <p:blipFill>
+          <a:blip r:embed="rId3"/>
+          <a:stretch>
+            <a:fillRect/>
+          </a:stretch>
+        </p:blipFill>
+        <p:spPr>
+          <a:xfrm>
+            <a:off x="2482925" y="818030"/>
+            <a:ext cx="5839640" cy="800212"/>
+          </a:xfrm>
+          <a:prstGeom prst="rect">
+            <a:avLst/>
+          </a:prstGeom>
+        </p:spPr>
+      </p:pic>
+    </p:spTree>
+    <p:extLst>
+      <p:ext uri="{BB962C8B-B14F-4D97-AF65-F5344CB8AC3E}">
+        <p14:creationId xmlns:p14="http://schemas.microsoft.com/office/powerpoint/2010/main" val="1642292166"/>
+      </p:ext>
+    </p:extLst>
+  </p:cSld>
+  <p:clrMapOvr>
+    <a:masterClrMapping/>
+  </p:clrMapOvr>
+</p:sld>
+</file>
+
+<file path=ppt/slides/slide8.xml><?xml version="1.0" encoding="utf-8"?>
+<p:sld xmlns:a="http://schemas.openxmlformats.org/drawingml/2006/main" xmlns:r="http://schemas.openxmlformats.org/officeDocument/2006/relationships" xmlns:p="http://schemas.openxmlformats.org/presentationml/2006/main">
+  <p:cSld>
+    <p:spTree>
+      <p:nvGrpSpPr>
+        <p:cNvPr id="1" name=""/>
+        <p:cNvGrpSpPr/>
+        <p:nvPr/>
+      </p:nvGrpSpPr>
+      <p:grpSpPr>
+        <a:xfrm>
+          <a:off x="0" y="0"/>
+          <a:ext cx="0" cy="0"/>
+          <a:chOff x="0" y="0"/>
+          <a:chExt cx="0" cy="0"/>
+        </a:xfrm>
+      </p:grpSpPr>
+      <p:sp>
+        <p:nvSpPr>
+          <p:cNvPr id="2" name="Title 1">
+            <a:extLst>
+              <a:ext uri="{FF2B5EF4-FFF2-40B4-BE49-F238E27FC236}">
                 <a16:creationId xmlns:a16="http://schemas.microsoft.com/office/drawing/2014/main" id="{B9029C10-9787-A161-989E-4C635B029311}"/>
               </a:ext>
             </a:extLst>
@@ -12581,7 +13848,7 @@
 </p:sld>
 </file>
 
-<file path=ppt/slides/slide7.xml><?xml version="1.0" encoding="utf-8"?>
+<file path=ppt/slides/slide9.xml><?xml version="1.0" encoding="utf-8"?>
 <p:sld xmlns:a="http://schemas.openxmlformats.org/drawingml/2006/main" xmlns:r="http://schemas.openxmlformats.org/officeDocument/2006/relationships" xmlns:p="http://schemas.openxmlformats.org/presentationml/2006/main">
   <p:cSld>
     <p:spTree>
@@ -12885,1038 +14152,6 @@
     <p:extLst>
       <p:ext uri="{BB962C8B-B14F-4D97-AF65-F5344CB8AC3E}">
         <p14:creationId xmlns:p14="http://schemas.microsoft.com/office/powerpoint/2010/main" val="3481777106"/>
-      </p:ext>
-    </p:extLst>
-  </p:cSld>
-  <p:clrMapOvr>
-    <a:masterClrMapping/>
-  </p:clrMapOvr>
-</p:sld>
-</file>
-
-<file path=ppt/slides/slide8.xml><?xml version="1.0" encoding="utf-8"?>
-<p:sld xmlns:a="http://schemas.openxmlformats.org/drawingml/2006/main" xmlns:r="http://schemas.openxmlformats.org/officeDocument/2006/relationships" xmlns:p="http://schemas.openxmlformats.org/presentationml/2006/main">
-  <p:cSld>
-    <p:spTree>
-      <p:nvGrpSpPr>
-        <p:cNvPr id="1" name=""/>
-        <p:cNvGrpSpPr/>
-        <p:nvPr/>
-      </p:nvGrpSpPr>
-      <p:grpSpPr>
-        <a:xfrm>
-          <a:off x="0" y="0"/>
-          <a:ext cx="0" cy="0"/>
-          <a:chOff x="0" y="0"/>
-          <a:chExt cx="0" cy="0"/>
-        </a:xfrm>
-      </p:grpSpPr>
-      <p:sp>
-        <p:nvSpPr>
-          <p:cNvPr id="2" name="Title 1">
-            <a:extLst>
-              <a:ext uri="{FF2B5EF4-FFF2-40B4-BE49-F238E27FC236}">
-                <a16:creationId xmlns:a16="http://schemas.microsoft.com/office/drawing/2014/main" id="{4DB044FC-BD40-C353-8407-D77B973B4BB7}"/>
-              </a:ext>
-            </a:extLst>
-          </p:cNvPr>
-          <p:cNvSpPr>
-            <a:spLocks noGrp="1"/>
-          </p:cNvSpPr>
-          <p:nvPr>
-            <p:ph type="title"/>
-          </p:nvPr>
-        </p:nvSpPr>
-        <p:spPr/>
-        <p:txBody>
-          <a:bodyPr/>
-          <a:lstStyle/>
-          <a:p>
-            <a:endParaRPr lang="en-US" dirty="0"/>
-          </a:p>
-        </p:txBody>
-      </p:sp>
-      <p:sp>
-        <p:nvSpPr>
-          <p:cNvPr id="5" name="TextBox 4">
-            <a:extLst>
-              <a:ext uri="{FF2B5EF4-FFF2-40B4-BE49-F238E27FC236}">
-                <a16:creationId xmlns:a16="http://schemas.microsoft.com/office/drawing/2014/main" id="{C6FDCB72-6AFB-E5C6-EE9A-34CF2FADD720}"/>
-              </a:ext>
-            </a:extLst>
-          </p:cNvPr>
-          <p:cNvSpPr txBox="1"/>
-          <p:nvPr/>
-        </p:nvSpPr>
-        <p:spPr>
-          <a:xfrm>
-            <a:off x="2424108" y="4235272"/>
-            <a:ext cx="9239251" cy="923330"/>
-          </a:xfrm>
-          <a:prstGeom prst="rect">
-            <a:avLst/>
-          </a:prstGeom>
-          <a:noFill/>
-        </p:spPr>
-        <p:txBody>
-          <a:bodyPr wrap="square">
-            <a:spAutoFit/>
-          </a:bodyPr>
-          <a:lstStyle/>
-          <a:p>
-            <a:pPr marL="0" marR="0" lvl="0" indent="0" algn="l" defTabSz="914400" rtl="0" eaLnBrk="0" fontAlgn="base" latinLnBrk="0" hangingPunct="0">
-              <a:lnSpc>
-                <a:spcPct val="100000"/>
-              </a:lnSpc>
-              <a:spcBef>
-                <a:spcPct val="0"/>
-              </a:spcBef>
-              <a:spcAft>
-                <a:spcPct val="0"/>
-              </a:spcAft>
-              <a:buClrTx/>
-              <a:buSzTx/>
-              <a:buFontTx/>
-              <a:buNone/>
-              <a:tabLst/>
-            </a:pPr>
-            <a:r>
-              <a:rPr kumimoji="0" lang="en-US" altLang="en-US" sz="1800" b="1" i="0" u="none" strike="noStrike" cap="none" normalizeH="0" baseline="0" dirty="0" err="1">
-                <a:ln>
-                  <a:noFill/>
-                </a:ln>
-                <a:solidFill>
-                  <a:srgbClr val="000000"/>
-                </a:solidFill>
-                <a:effectLst/>
-                <a:latin typeface="Consolas" panose="020B0609020204030204" pitchFamily="49" charset="0"/>
-                <a:cs typeface="Arial" panose="020B0604020202020204" pitchFamily="34" charset="0"/>
-              </a:rPr>
-              <a:t>FindConservedMarkers</a:t>
-            </a:r>
-            <a:r>
-              <a:rPr kumimoji="0" lang="en-US" altLang="en-US" sz="1800" b="0" i="0" u="none" strike="noStrike" cap="none" normalizeH="0" baseline="0" dirty="0">
-                <a:ln>
-                  <a:noFill/>
-                </a:ln>
-                <a:solidFill>
-                  <a:srgbClr val="000000"/>
-                </a:solidFill>
-                <a:effectLst/>
-                <a:latin typeface="Consolas" panose="020B0609020204030204" pitchFamily="49" charset="0"/>
-                <a:cs typeface="Arial" panose="020B0604020202020204" pitchFamily="34" charset="0"/>
-              </a:rPr>
-              <a:t>:</a:t>
-            </a:r>
-            <a:r>
-              <a:rPr kumimoji="0" lang="en-US" altLang="en-US" sz="1800" b="0" i="0" u="none" strike="noStrike" cap="none" normalizeH="0" baseline="0" dirty="0">
-                <a:ln>
-                  <a:noFill/>
-                </a:ln>
-                <a:solidFill>
-                  <a:srgbClr val="333333"/>
-                </a:solidFill>
-                <a:effectLst/>
-                <a:latin typeface="Arial" panose="020B0604020202020204" pitchFamily="34" charset="0"/>
-                <a:cs typeface="Arial" panose="020B0604020202020204" pitchFamily="34" charset="0"/>
-              </a:rPr>
-              <a:t> will find markers that are conserved between two groups. It means they are differentially expressed compared to other groups, but have similar expression between the two groups you're actually comparing.</a:t>
-            </a:r>
-            <a:endParaRPr kumimoji="0" lang="en-US" altLang="en-US" sz="4000" b="0" i="0" u="none" strike="noStrike" cap="none" normalizeH="0" baseline="0" dirty="0">
-              <a:ln>
-                <a:noFill/>
-              </a:ln>
-              <a:solidFill>
-                <a:schemeClr val="tx1"/>
-              </a:solidFill>
-              <a:effectLst/>
-              <a:latin typeface="Arial" panose="020B0604020202020204" pitchFamily="34" charset="0"/>
-            </a:endParaRPr>
-          </a:p>
-        </p:txBody>
-      </p:sp>
-      <p:sp>
-        <p:nvSpPr>
-          <p:cNvPr id="7" name="TextBox 6">
-            <a:extLst>
-              <a:ext uri="{FF2B5EF4-FFF2-40B4-BE49-F238E27FC236}">
-                <a16:creationId xmlns:a16="http://schemas.microsoft.com/office/drawing/2014/main" id="{3DC427A8-7E77-42D6-2764-F48BDC531D18}"/>
-              </a:ext>
-            </a:extLst>
-          </p:cNvPr>
-          <p:cNvSpPr txBox="1"/>
-          <p:nvPr/>
-        </p:nvSpPr>
-        <p:spPr>
-          <a:xfrm>
-            <a:off x="2424108" y="2721720"/>
-            <a:ext cx="9239251" cy="923330"/>
-          </a:xfrm>
-          <a:prstGeom prst="rect">
-            <a:avLst/>
-          </a:prstGeom>
-          <a:noFill/>
-        </p:spPr>
-        <p:txBody>
-          <a:bodyPr wrap="square">
-            <a:spAutoFit/>
-          </a:bodyPr>
-          <a:lstStyle/>
-          <a:p>
-            <a:pPr marL="0" marR="0" lvl="0" indent="0" algn="l" defTabSz="914400" rtl="0" eaLnBrk="0" fontAlgn="base" latinLnBrk="0" hangingPunct="0">
-              <a:lnSpc>
-                <a:spcPct val="100000"/>
-              </a:lnSpc>
-              <a:spcBef>
-                <a:spcPct val="0"/>
-              </a:spcBef>
-              <a:spcAft>
-                <a:spcPct val="0"/>
-              </a:spcAft>
-              <a:buClrTx/>
-              <a:buSzTx/>
-              <a:buFontTx/>
-              <a:buNone/>
-              <a:tabLst/>
-            </a:pPr>
-            <a:r>
-              <a:rPr kumimoji="0" lang="en-US" altLang="en-US" sz="1800" b="1" i="0" u="none" strike="noStrike" cap="none" normalizeH="0" baseline="0" dirty="0" err="1">
-                <a:ln>
-                  <a:noFill/>
-                </a:ln>
-                <a:solidFill>
-                  <a:srgbClr val="000000"/>
-                </a:solidFill>
-                <a:effectLst/>
-                <a:latin typeface="Consolas" panose="020B0609020204030204" pitchFamily="49" charset="0"/>
-                <a:cs typeface="Arial" panose="020B0604020202020204" pitchFamily="34" charset="0"/>
-              </a:rPr>
-              <a:t>FindAllMarkers</a:t>
-            </a:r>
-            <a:r>
-              <a:rPr kumimoji="0" lang="en-US" altLang="en-US" sz="1800" b="0" i="0" u="none" strike="noStrike" cap="none" normalizeH="0" baseline="0" dirty="0">
-                <a:ln>
-                  <a:noFill/>
-                </a:ln>
-                <a:solidFill>
-                  <a:srgbClr val="000000"/>
-                </a:solidFill>
-                <a:effectLst/>
-                <a:latin typeface="Consolas" panose="020B0609020204030204" pitchFamily="49" charset="0"/>
-                <a:cs typeface="Arial" panose="020B0604020202020204" pitchFamily="34" charset="0"/>
-              </a:rPr>
-              <a:t>:</a:t>
-            </a:r>
-            <a:r>
-              <a:rPr kumimoji="0" lang="en-US" altLang="en-US" sz="1800" b="0" i="0" u="none" strike="noStrike" cap="none" normalizeH="0" baseline="0" dirty="0">
-                <a:ln>
-                  <a:noFill/>
-                </a:ln>
-                <a:solidFill>
-                  <a:srgbClr val="333333"/>
-                </a:solidFill>
-                <a:effectLst/>
-                <a:latin typeface="Arial" panose="020B0604020202020204" pitchFamily="34" charset="0"/>
-                <a:cs typeface="Arial" panose="020B0604020202020204" pitchFamily="34" charset="0"/>
-              </a:rPr>
-              <a:t> will find markers differentially expressed </a:t>
-            </a:r>
-            <a:r>
-              <a:rPr kumimoji="0" lang="en-US" altLang="en-US" sz="1800" b="1" i="0" u="none" strike="noStrike" cap="none" normalizeH="0" baseline="0" dirty="0">
-                <a:ln>
-                  <a:noFill/>
-                </a:ln>
-                <a:solidFill>
-                  <a:srgbClr val="333333"/>
-                </a:solidFill>
-                <a:effectLst/>
-                <a:latin typeface="Arial" panose="020B0604020202020204" pitchFamily="34" charset="0"/>
-                <a:cs typeface="Arial" panose="020B0604020202020204" pitchFamily="34" charset="0"/>
-              </a:rPr>
-              <a:t>in each identity group </a:t>
-            </a:r>
-            <a:r>
-              <a:rPr kumimoji="0" lang="en-US" altLang="en-US" sz="1800" b="0" i="0" u="none" strike="noStrike" cap="none" normalizeH="0" baseline="0" dirty="0">
-                <a:ln>
-                  <a:noFill/>
-                </a:ln>
-                <a:solidFill>
-                  <a:srgbClr val="333333"/>
-                </a:solidFill>
-                <a:effectLst/>
-                <a:latin typeface="Arial" panose="020B0604020202020204" pitchFamily="34" charset="0"/>
-                <a:cs typeface="Arial" panose="020B0604020202020204" pitchFamily="34" charset="0"/>
-              </a:rPr>
-              <a:t>by comparing it to </a:t>
-            </a:r>
-            <a:r>
-              <a:rPr kumimoji="0" lang="en-US" altLang="en-US" sz="1800" b="1" i="0" u="none" strike="noStrike" cap="none" normalizeH="0" baseline="0" dirty="0">
-                <a:ln>
-                  <a:noFill/>
-                </a:ln>
-                <a:solidFill>
-                  <a:srgbClr val="333333"/>
-                </a:solidFill>
-                <a:effectLst/>
-                <a:latin typeface="Arial" panose="020B0604020202020204" pitchFamily="34" charset="0"/>
-                <a:cs typeface="Arial" panose="020B0604020202020204" pitchFamily="34" charset="0"/>
-              </a:rPr>
-              <a:t>all of the others </a:t>
-            </a:r>
-            <a:r>
-              <a:rPr kumimoji="0" lang="en-US" altLang="en-US" sz="1800" b="0" i="0" u="none" strike="noStrike" cap="none" normalizeH="0" baseline="0" dirty="0">
-                <a:ln>
-                  <a:noFill/>
-                </a:ln>
-                <a:solidFill>
-                  <a:srgbClr val="333333"/>
-                </a:solidFill>
-                <a:effectLst/>
-                <a:latin typeface="Arial" panose="020B0604020202020204" pitchFamily="34" charset="0"/>
-                <a:cs typeface="Arial" panose="020B0604020202020204" pitchFamily="34" charset="0"/>
-              </a:rPr>
-              <a:t>- you don't have to manually define anything. </a:t>
-            </a:r>
-            <a:r>
-              <a:rPr lang="en-US" altLang="en-US" dirty="0">
-                <a:solidFill>
-                  <a:srgbClr val="333333"/>
-                </a:solidFill>
-                <a:latin typeface="Arial" panose="020B0604020202020204" pitchFamily="34" charset="0"/>
-                <a:cs typeface="Arial" panose="020B0604020202020204" pitchFamily="34" charset="0"/>
-              </a:rPr>
-              <a:t>Markers are not forced to be unique to only one group.</a:t>
-            </a:r>
-            <a:endParaRPr kumimoji="0" lang="en-US" altLang="en-US" sz="1800" b="0" i="0" u="none" strike="noStrike" cap="none" normalizeH="0" baseline="0" dirty="0">
-              <a:ln>
-                <a:noFill/>
-              </a:ln>
-              <a:solidFill>
-                <a:srgbClr val="333333"/>
-              </a:solidFill>
-              <a:effectLst/>
-              <a:latin typeface="Arial" panose="020B0604020202020204" pitchFamily="34" charset="0"/>
-              <a:cs typeface="Arial" panose="020B0604020202020204" pitchFamily="34" charset="0"/>
-            </a:endParaRPr>
-          </a:p>
-        </p:txBody>
-      </p:sp>
-      <p:sp>
-        <p:nvSpPr>
-          <p:cNvPr id="9" name="TextBox 8">
-            <a:extLst>
-              <a:ext uri="{FF2B5EF4-FFF2-40B4-BE49-F238E27FC236}">
-                <a16:creationId xmlns:a16="http://schemas.microsoft.com/office/drawing/2014/main" id="{DA45A9B8-78CD-A157-E38C-883001F7CDAB}"/>
-              </a:ext>
-            </a:extLst>
-          </p:cNvPr>
-          <p:cNvSpPr txBox="1"/>
-          <p:nvPr/>
-        </p:nvSpPr>
-        <p:spPr>
-          <a:xfrm>
-            <a:off x="2424108" y="1216068"/>
-            <a:ext cx="9363075" cy="646331"/>
-          </a:xfrm>
-          <a:prstGeom prst="rect">
-            <a:avLst/>
-          </a:prstGeom>
-          <a:noFill/>
-        </p:spPr>
-        <p:txBody>
-          <a:bodyPr wrap="square">
-            <a:spAutoFit/>
-          </a:bodyPr>
-          <a:lstStyle/>
-          <a:p>
-            <a:pPr marL="0" marR="0" lvl="0" indent="0" algn="l" defTabSz="914400" rtl="0" eaLnBrk="0" fontAlgn="base" latinLnBrk="0" hangingPunct="0">
-              <a:lnSpc>
-                <a:spcPct val="100000"/>
-              </a:lnSpc>
-              <a:spcBef>
-                <a:spcPct val="0"/>
-              </a:spcBef>
-              <a:spcAft>
-                <a:spcPct val="0"/>
-              </a:spcAft>
-              <a:buClrTx/>
-              <a:buSzTx/>
-              <a:buFontTx/>
-              <a:buNone/>
-              <a:tabLst/>
-            </a:pPr>
-            <a:r>
-              <a:rPr kumimoji="0" lang="en-US" altLang="en-US" sz="1800" b="1" i="0" u="none" strike="noStrike" cap="none" normalizeH="0" baseline="0" dirty="0" err="1">
-                <a:ln>
-                  <a:noFill/>
-                </a:ln>
-                <a:solidFill>
-                  <a:srgbClr val="000000"/>
-                </a:solidFill>
-                <a:effectLst/>
-                <a:latin typeface="Consolas" panose="020B0609020204030204" pitchFamily="49" charset="0"/>
-              </a:rPr>
-              <a:t>FindMarkers</a:t>
-            </a:r>
-            <a:r>
-              <a:rPr kumimoji="0" lang="en-US" altLang="en-US" sz="1800" b="0" i="0" u="none" strike="noStrike" cap="none" normalizeH="0" baseline="0" dirty="0">
-                <a:ln>
-                  <a:noFill/>
-                </a:ln>
-                <a:solidFill>
-                  <a:srgbClr val="000000"/>
-                </a:solidFill>
-                <a:effectLst/>
-                <a:latin typeface="Consolas" panose="020B0609020204030204" pitchFamily="49" charset="0"/>
-              </a:rPr>
-              <a:t>:</a:t>
-            </a:r>
-            <a:r>
-              <a:rPr kumimoji="0" lang="en-US" altLang="en-US" sz="1800" b="0" i="0" u="none" strike="noStrike" cap="none" normalizeH="0" baseline="0" dirty="0">
-                <a:ln>
-                  <a:noFill/>
-                </a:ln>
-                <a:solidFill>
-                  <a:srgbClr val="333333"/>
-                </a:solidFill>
-                <a:effectLst/>
-                <a:latin typeface="Arial" panose="020B0604020202020204" pitchFamily="34" charset="0"/>
-              </a:rPr>
-              <a:t> will find markers between </a:t>
-            </a:r>
-            <a:r>
-              <a:rPr kumimoji="0" lang="en-US" altLang="en-US" sz="1800" b="1" i="0" u="none" strike="noStrike" cap="none" normalizeH="0" baseline="0" dirty="0">
-                <a:ln>
-                  <a:noFill/>
-                </a:ln>
-                <a:solidFill>
-                  <a:srgbClr val="333333"/>
-                </a:solidFill>
-                <a:effectLst/>
-                <a:latin typeface="Arial" panose="020B0604020202020204" pitchFamily="34" charset="0"/>
-              </a:rPr>
-              <a:t>two different identity groups </a:t>
-            </a:r>
-            <a:r>
-              <a:rPr kumimoji="0" lang="en-US" altLang="en-US" sz="1800" b="0" i="0" u="none" strike="noStrike" cap="none" normalizeH="0" baseline="0" dirty="0">
-                <a:ln>
-                  <a:noFill/>
-                </a:ln>
-                <a:solidFill>
-                  <a:srgbClr val="333333"/>
-                </a:solidFill>
-                <a:effectLst/>
-                <a:latin typeface="Arial" panose="020B0604020202020204" pitchFamily="34" charset="0"/>
-              </a:rPr>
-              <a:t>- you have to specify both identity groups. </a:t>
-            </a:r>
-            <a:endParaRPr kumimoji="0" lang="en-US" altLang="en-US" sz="1400" b="0" i="0" u="none" strike="noStrike" cap="none" normalizeH="0" baseline="0" dirty="0">
-              <a:ln>
-                <a:noFill/>
-              </a:ln>
-              <a:solidFill>
-                <a:schemeClr val="tx1"/>
-              </a:solidFill>
-              <a:effectLst/>
-            </a:endParaRPr>
-          </a:p>
-        </p:txBody>
-      </p:sp>
-      <p:pic>
-        <p:nvPicPr>
-          <p:cNvPr id="11" name="Picture 10">
-            <a:extLst>
-              <a:ext uri="{FF2B5EF4-FFF2-40B4-BE49-F238E27FC236}">
-                <a16:creationId xmlns:a16="http://schemas.microsoft.com/office/drawing/2014/main" id="{1D735602-FEEC-ACC4-BF34-2844F8594267}"/>
-              </a:ext>
-            </a:extLst>
-          </p:cNvPr>
-          <p:cNvPicPr>
-            <a:picLocks noChangeAspect="1"/>
-          </p:cNvPicPr>
-          <p:nvPr/>
-        </p:nvPicPr>
-        <p:blipFill>
-          <a:blip r:embed="rId2"/>
-          <a:stretch>
-            <a:fillRect/>
-          </a:stretch>
-        </p:blipFill>
-        <p:spPr>
-          <a:xfrm>
-            <a:off x="2803802" y="6074407"/>
-            <a:ext cx="579478" cy="604313"/>
-          </a:xfrm>
-          <a:prstGeom prst="rect">
-            <a:avLst/>
-          </a:prstGeom>
-        </p:spPr>
-      </p:pic>
-      <p:sp>
-        <p:nvSpPr>
-          <p:cNvPr id="13" name="TextBox 12">
-            <a:extLst>
-              <a:ext uri="{FF2B5EF4-FFF2-40B4-BE49-F238E27FC236}">
-                <a16:creationId xmlns:a16="http://schemas.microsoft.com/office/drawing/2014/main" id="{7651324D-B1B7-7079-FEB6-7EB996747620}"/>
-              </a:ext>
-            </a:extLst>
-          </p:cNvPr>
-          <p:cNvSpPr txBox="1"/>
-          <p:nvPr/>
-        </p:nvSpPr>
-        <p:spPr>
-          <a:xfrm>
-            <a:off x="3450812" y="6122918"/>
-            <a:ext cx="2407444" cy="400110"/>
-          </a:xfrm>
-          <a:prstGeom prst="rect">
-            <a:avLst/>
-          </a:prstGeom>
-          <a:noFill/>
-        </p:spPr>
-        <p:txBody>
-          <a:bodyPr wrap="square">
-            <a:spAutoFit/>
-          </a:bodyPr>
-          <a:lstStyle/>
-          <a:p>
-            <a:r>
-              <a:rPr lang="en-US" sz="1000" dirty="0"/>
-              <a:t>Source</a:t>
-            </a:r>
-          </a:p>
-          <a:p>
-            <a:r>
-              <a:rPr lang="en-US" sz="1000" dirty="0"/>
-              <a:t>https://www.biostars.org/p/409790/</a:t>
-            </a:r>
-          </a:p>
-        </p:txBody>
-      </p:sp>
-      <p:sp>
-        <p:nvSpPr>
-          <p:cNvPr id="14" name="Rectangle 13">
-            <a:extLst>
-              <a:ext uri="{FF2B5EF4-FFF2-40B4-BE49-F238E27FC236}">
-                <a16:creationId xmlns:a16="http://schemas.microsoft.com/office/drawing/2014/main" id="{97A82735-4B5A-4290-2931-A310DED028A0}"/>
-              </a:ext>
-            </a:extLst>
-          </p:cNvPr>
-          <p:cNvSpPr/>
-          <p:nvPr/>
-        </p:nvSpPr>
-        <p:spPr>
-          <a:xfrm>
-            <a:off x="0" y="767072"/>
-            <a:ext cx="1892300" cy="5755956"/>
-          </a:xfrm>
-          <a:prstGeom prst="rect">
-            <a:avLst/>
-          </a:prstGeom>
-          <a:solidFill>
-            <a:srgbClr val="FFFFFF">
-              <a:alpha val="60000"/>
-            </a:srgbClr>
-          </a:solidFill>
-          <a:ln>
-            <a:noFill/>
-          </a:ln>
-        </p:spPr>
-        <p:style>
-          <a:lnRef idx="2">
-            <a:schemeClr val="accent1">
-              <a:shade val="15000"/>
-            </a:schemeClr>
-          </a:lnRef>
-          <a:fillRef idx="1">
-            <a:schemeClr val="accent1"/>
-          </a:fillRef>
-          <a:effectRef idx="0">
-            <a:schemeClr val="accent1"/>
-          </a:effectRef>
-          <a:fontRef idx="minor">
-            <a:schemeClr val="lt1"/>
-          </a:fontRef>
-        </p:style>
-        <p:txBody>
-          <a:bodyPr rtlCol="0" anchor="ctr"/>
-          <a:lstStyle/>
-          <a:p>
-            <a:pPr algn="ctr"/>
-            <a:endParaRPr lang="en-US"/>
-          </a:p>
-        </p:txBody>
-      </p:sp>
-    </p:spTree>
-    <p:extLst>
-      <p:ext uri="{BB962C8B-B14F-4D97-AF65-F5344CB8AC3E}">
-        <p14:creationId xmlns:p14="http://schemas.microsoft.com/office/powerpoint/2010/main" val="972860526"/>
-      </p:ext>
-    </p:extLst>
-  </p:cSld>
-  <p:clrMapOvr>
-    <a:masterClrMapping/>
-  </p:clrMapOvr>
-</p:sld>
-</file>
-
-<file path=ppt/slides/slide9.xml><?xml version="1.0" encoding="utf-8"?>
-<p:sld xmlns:a="http://schemas.openxmlformats.org/drawingml/2006/main" xmlns:r="http://schemas.openxmlformats.org/officeDocument/2006/relationships" xmlns:p="http://schemas.openxmlformats.org/presentationml/2006/main">
-  <p:cSld>
-    <p:spTree>
-      <p:nvGrpSpPr>
-        <p:cNvPr id="1" name=""/>
-        <p:cNvGrpSpPr/>
-        <p:nvPr/>
-      </p:nvGrpSpPr>
-      <p:grpSpPr>
-        <a:xfrm>
-          <a:off x="0" y="0"/>
-          <a:ext cx="0" cy="0"/>
-          <a:chOff x="0" y="0"/>
-          <a:chExt cx="0" cy="0"/>
-        </a:xfrm>
-      </p:grpSpPr>
-      <p:sp>
-        <p:nvSpPr>
-          <p:cNvPr id="2" name="Title 1">
-            <a:extLst>
-              <a:ext uri="{FF2B5EF4-FFF2-40B4-BE49-F238E27FC236}">
-                <a16:creationId xmlns:a16="http://schemas.microsoft.com/office/drawing/2014/main" id="{81C07A40-8DFE-BE6A-F4F0-6ECC768FE6AA}"/>
-              </a:ext>
-            </a:extLst>
-          </p:cNvPr>
-          <p:cNvSpPr>
-            <a:spLocks noGrp="1"/>
-          </p:cNvSpPr>
-          <p:nvPr>
-            <p:ph type="title"/>
-          </p:nvPr>
-        </p:nvSpPr>
-        <p:spPr/>
-        <p:txBody>
-          <a:bodyPr/>
-          <a:lstStyle/>
-          <a:p>
-            <a:r>
-              <a:rPr lang="en-US" dirty="0"/>
-              <a:t>Visualizing Data import thresholds</a:t>
-            </a:r>
-          </a:p>
-        </p:txBody>
-      </p:sp>
-      <p:pic>
-        <p:nvPicPr>
-          <p:cNvPr id="2050" name="Picture 2">
-            <a:extLst>
-              <a:ext uri="{FF2B5EF4-FFF2-40B4-BE49-F238E27FC236}">
-                <a16:creationId xmlns:a16="http://schemas.microsoft.com/office/drawing/2014/main" id="{477B77B6-0B3C-8223-2AFA-1AD5B37F4E90}"/>
-              </a:ext>
-            </a:extLst>
-          </p:cNvPr>
-          <p:cNvPicPr>
-            <a:picLocks noChangeAspect="1" noChangeArrowheads="1"/>
-          </p:cNvPicPr>
-          <p:nvPr/>
-        </p:nvPicPr>
-        <p:blipFill>
-          <a:blip r:embed="rId2">
-            <a:extLst>
-              <a:ext uri="{28A0092B-C50C-407E-A947-70E740481C1C}">
-                <a14:useLocalDpi xmlns:a14="http://schemas.microsoft.com/office/drawing/2010/main" val="0"/>
-              </a:ext>
-            </a:extLst>
-          </a:blip>
-          <a:srcRect/>
-          <a:stretch>
-            <a:fillRect/>
-          </a:stretch>
-        </p:blipFill>
-        <p:spPr bwMode="auto">
-          <a:xfrm>
-            <a:off x="7212819" y="1114951"/>
-            <a:ext cx="4700016" cy="2530542"/>
-          </a:xfrm>
-          <a:prstGeom prst="rect">
-            <a:avLst/>
-          </a:prstGeom>
-          <a:noFill/>
-          <a:extLst>
-            <a:ext uri="{909E8E84-426E-40DD-AFC4-6F175D3DCCD1}">
-              <a14:hiddenFill xmlns:a14="http://schemas.microsoft.com/office/drawing/2010/main">
-                <a:solidFill>
-                  <a:srgbClr val="FFFFFF"/>
-                </a:solidFill>
-              </a14:hiddenFill>
-            </a:ext>
-          </a:extLst>
-        </p:spPr>
-      </p:pic>
-      <p:sp>
-        <p:nvSpPr>
-          <p:cNvPr id="5" name="TextBox 4">
-            <a:extLst>
-              <a:ext uri="{FF2B5EF4-FFF2-40B4-BE49-F238E27FC236}">
-                <a16:creationId xmlns:a16="http://schemas.microsoft.com/office/drawing/2014/main" id="{A61B3F3D-639B-D96B-896F-4975C6A1A6BE}"/>
-              </a:ext>
-            </a:extLst>
-          </p:cNvPr>
-          <p:cNvSpPr txBox="1"/>
-          <p:nvPr/>
-        </p:nvSpPr>
-        <p:spPr>
-          <a:xfrm>
-            <a:off x="2289630" y="1689695"/>
-            <a:ext cx="6185916" cy="923330"/>
-          </a:xfrm>
-          <a:prstGeom prst="rect">
-            <a:avLst/>
-          </a:prstGeom>
-          <a:noFill/>
-        </p:spPr>
-        <p:txBody>
-          <a:bodyPr wrap="square">
-            <a:spAutoFit/>
-          </a:bodyPr>
-          <a:lstStyle/>
-          <a:p>
-            <a:r>
-              <a:rPr lang="en-US" dirty="0"/>
-              <a:t># Visualize QC metrics as a violin plot</a:t>
-            </a:r>
-          </a:p>
-          <a:p>
-            <a:r>
-              <a:rPr lang="en-US" dirty="0" err="1"/>
-              <a:t>VlnPlot</a:t>
-            </a:r>
-            <a:r>
-              <a:rPr lang="en-US" dirty="0"/>
-              <a:t>(</a:t>
-            </a:r>
-            <a:r>
-              <a:rPr lang="en-US" dirty="0" err="1"/>
-              <a:t>pbmc</a:t>
-            </a:r>
-            <a:r>
-              <a:rPr lang="en-US" dirty="0"/>
-              <a:t>, features = c("</a:t>
-            </a:r>
-            <a:r>
-              <a:rPr lang="en-US" dirty="0" err="1"/>
-              <a:t>nFeature_RNA</a:t>
-            </a:r>
-            <a:r>
-              <a:rPr lang="en-US" dirty="0"/>
-              <a:t>", "</a:t>
-            </a:r>
-            <a:r>
-              <a:rPr lang="en-US" dirty="0" err="1"/>
-              <a:t>nCount_RNA</a:t>
-            </a:r>
-            <a:r>
-              <a:rPr lang="en-US" dirty="0"/>
-              <a:t>", "percent.mt"), </a:t>
-            </a:r>
-            <a:r>
-              <a:rPr lang="en-US" dirty="0" err="1"/>
-              <a:t>ncol</a:t>
-            </a:r>
-            <a:r>
-              <a:rPr lang="en-US" dirty="0"/>
-              <a:t> = 3)</a:t>
-            </a:r>
-          </a:p>
-        </p:txBody>
-      </p:sp>
-      <p:sp>
-        <p:nvSpPr>
-          <p:cNvPr id="7" name="TextBox 6">
-            <a:extLst>
-              <a:ext uri="{FF2B5EF4-FFF2-40B4-BE49-F238E27FC236}">
-                <a16:creationId xmlns:a16="http://schemas.microsoft.com/office/drawing/2014/main" id="{6BB589B6-9E1D-A435-5ED0-C2E5F7B5EF5F}"/>
-              </a:ext>
-            </a:extLst>
-          </p:cNvPr>
-          <p:cNvSpPr txBox="1"/>
-          <p:nvPr/>
-        </p:nvSpPr>
-        <p:spPr>
-          <a:xfrm>
-            <a:off x="7212819" y="4727386"/>
-            <a:ext cx="5218938" cy="1015663"/>
-          </a:xfrm>
-          <a:prstGeom prst="rect">
-            <a:avLst/>
-          </a:prstGeom>
-          <a:noFill/>
-        </p:spPr>
-        <p:txBody>
-          <a:bodyPr wrap="square">
-            <a:spAutoFit/>
-          </a:bodyPr>
-          <a:lstStyle/>
-          <a:p>
-            <a:r>
-              <a:rPr lang="en-US" sz="1000" dirty="0"/>
-              <a:t># </a:t>
-            </a:r>
-            <a:r>
-              <a:rPr lang="en-US" sz="1000" dirty="0" err="1"/>
-              <a:t>FeatureScatter</a:t>
-            </a:r>
-            <a:r>
-              <a:rPr lang="en-US" sz="1000" dirty="0"/>
-              <a:t> is typically used to visualize feature-feature relationships, but can be used</a:t>
-            </a:r>
-          </a:p>
-          <a:p>
-            <a:r>
-              <a:rPr lang="en-US" sz="1000" dirty="0"/>
-              <a:t># for anything calculated by the object, i.e. columns in object metadata, PC scores etc.</a:t>
-            </a:r>
-          </a:p>
-          <a:p>
-            <a:endParaRPr lang="en-US" sz="1000" dirty="0"/>
-          </a:p>
-          <a:p>
-            <a:r>
-              <a:rPr lang="en-US" sz="1000" dirty="0"/>
-              <a:t>plot1 &lt;- </a:t>
-            </a:r>
-            <a:r>
-              <a:rPr lang="en-US" sz="1000" dirty="0" err="1"/>
-              <a:t>FeatureScatter</a:t>
-            </a:r>
-            <a:r>
-              <a:rPr lang="en-US" sz="1000" dirty="0"/>
-              <a:t>(</a:t>
-            </a:r>
-            <a:r>
-              <a:rPr lang="en-US" sz="1000" dirty="0" err="1"/>
-              <a:t>pbmc</a:t>
-            </a:r>
-            <a:r>
-              <a:rPr lang="en-US" sz="1000" dirty="0"/>
-              <a:t>, feature1 = "</a:t>
-            </a:r>
-            <a:r>
-              <a:rPr lang="en-US" sz="1000" dirty="0" err="1"/>
-              <a:t>nCount_RNA</a:t>
-            </a:r>
-            <a:r>
-              <a:rPr lang="en-US" sz="1000" dirty="0"/>
-              <a:t>", feature2 = "percent.mt")</a:t>
-            </a:r>
-          </a:p>
-          <a:p>
-            <a:r>
-              <a:rPr lang="en-US" sz="1000" dirty="0"/>
-              <a:t>plot2 &lt;- </a:t>
-            </a:r>
-            <a:r>
-              <a:rPr lang="en-US" sz="1000" dirty="0" err="1"/>
-              <a:t>FeatureScatter</a:t>
-            </a:r>
-            <a:r>
-              <a:rPr lang="en-US" sz="1000" dirty="0"/>
-              <a:t>(</a:t>
-            </a:r>
-            <a:r>
-              <a:rPr lang="en-US" sz="1000" dirty="0" err="1"/>
-              <a:t>pbmc</a:t>
-            </a:r>
-            <a:r>
-              <a:rPr lang="en-US" sz="1000" dirty="0"/>
-              <a:t>, feature1 = "</a:t>
-            </a:r>
-            <a:r>
-              <a:rPr lang="en-US" sz="1000" dirty="0" err="1"/>
-              <a:t>nCount_RNA</a:t>
-            </a:r>
-            <a:r>
-              <a:rPr lang="en-US" sz="1000" dirty="0"/>
-              <a:t>", feature2 = "</a:t>
-            </a:r>
-            <a:r>
-              <a:rPr lang="en-US" sz="1000" dirty="0" err="1"/>
-              <a:t>nFeature_RNA</a:t>
-            </a:r>
-            <a:r>
-              <a:rPr lang="en-US" sz="1000" dirty="0"/>
-              <a:t>")</a:t>
-            </a:r>
-          </a:p>
-          <a:p>
-            <a:r>
-              <a:rPr lang="en-US" sz="1000" dirty="0"/>
-              <a:t>plot1 + plot2</a:t>
-            </a:r>
-          </a:p>
-        </p:txBody>
-      </p:sp>
-      <p:pic>
-        <p:nvPicPr>
-          <p:cNvPr id="2053" name="Picture 5">
-            <a:extLst>
-              <a:ext uri="{FF2B5EF4-FFF2-40B4-BE49-F238E27FC236}">
-                <a16:creationId xmlns:a16="http://schemas.microsoft.com/office/drawing/2014/main" id="{B2D4F5CE-A525-503E-BBD7-77BC62C9FC9B}"/>
-              </a:ext>
-            </a:extLst>
-          </p:cNvPr>
-          <p:cNvPicPr>
-            <a:picLocks noChangeAspect="1" noChangeArrowheads="1"/>
-          </p:cNvPicPr>
-          <p:nvPr/>
-        </p:nvPicPr>
-        <p:blipFill>
-          <a:blip r:embed="rId3">
-            <a:extLst>
-              <a:ext uri="{28A0092B-C50C-407E-A947-70E740481C1C}">
-                <a14:useLocalDpi xmlns:a14="http://schemas.microsoft.com/office/drawing/2010/main" val="0"/>
-              </a:ext>
-            </a:extLst>
-          </a:blip>
-          <a:srcRect/>
-          <a:stretch>
-            <a:fillRect/>
-          </a:stretch>
-        </p:blipFill>
-        <p:spPr bwMode="auto">
-          <a:xfrm>
-            <a:off x="2083525" y="4244975"/>
-            <a:ext cx="4750743" cy="2557854"/>
-          </a:xfrm>
-          <a:prstGeom prst="rect">
-            <a:avLst/>
-          </a:prstGeom>
-          <a:noFill/>
-          <a:extLst>
-            <a:ext uri="{909E8E84-426E-40DD-AFC4-6F175D3DCCD1}">
-              <a14:hiddenFill xmlns:a14="http://schemas.microsoft.com/office/drawing/2010/main">
-                <a:solidFill>
-                  <a:srgbClr val="FFFFFF"/>
-                </a:solidFill>
-              </a14:hiddenFill>
-            </a:ext>
-          </a:extLst>
-        </p:spPr>
-      </p:pic>
-      <p:sp>
-        <p:nvSpPr>
-          <p:cNvPr id="8" name="Rectangle 7">
-            <a:extLst>
-              <a:ext uri="{FF2B5EF4-FFF2-40B4-BE49-F238E27FC236}">
-                <a16:creationId xmlns:a16="http://schemas.microsoft.com/office/drawing/2014/main" id="{CE09C42A-37E6-3768-369D-BA1252B05C75}"/>
-              </a:ext>
-            </a:extLst>
-          </p:cNvPr>
-          <p:cNvSpPr/>
-          <p:nvPr/>
-        </p:nvSpPr>
-        <p:spPr>
-          <a:xfrm>
-            <a:off x="0" y="629173"/>
-            <a:ext cx="1704975" cy="1021827"/>
-          </a:xfrm>
-          <a:prstGeom prst="rect">
-            <a:avLst/>
-          </a:prstGeom>
-          <a:solidFill>
-            <a:srgbClr val="FFFFFF">
-              <a:alpha val="60000"/>
-            </a:srgbClr>
-          </a:solidFill>
-          <a:ln>
-            <a:noFill/>
-          </a:ln>
-        </p:spPr>
-        <p:style>
-          <a:lnRef idx="2">
-            <a:schemeClr val="accent1">
-              <a:shade val="15000"/>
-            </a:schemeClr>
-          </a:lnRef>
-          <a:fillRef idx="1">
-            <a:schemeClr val="accent1"/>
-          </a:fillRef>
-          <a:effectRef idx="0">
-            <a:schemeClr val="accent1"/>
-          </a:effectRef>
-          <a:fontRef idx="minor">
-            <a:schemeClr val="lt1"/>
-          </a:fontRef>
-        </p:style>
-        <p:txBody>
-          <a:bodyPr rtlCol="0" anchor="ctr"/>
-          <a:lstStyle/>
-          <a:p>
-            <a:pPr algn="ctr"/>
-            <a:r>
-              <a:rPr lang="en-US" dirty="0"/>
-              <a:t>x</a:t>
-            </a:r>
-          </a:p>
-        </p:txBody>
-      </p:sp>
-      <p:sp>
-        <p:nvSpPr>
-          <p:cNvPr id="9" name="Rectangle 8">
-            <a:extLst>
-              <a:ext uri="{FF2B5EF4-FFF2-40B4-BE49-F238E27FC236}">
-                <a16:creationId xmlns:a16="http://schemas.microsoft.com/office/drawing/2014/main" id="{D1625B10-FB02-8B8A-E12A-FF6F840E92AC}"/>
-              </a:ext>
-            </a:extLst>
-          </p:cNvPr>
-          <p:cNvSpPr/>
-          <p:nvPr/>
-        </p:nvSpPr>
-        <p:spPr>
-          <a:xfrm>
-            <a:off x="-1" y="2146300"/>
-            <a:ext cx="1704975" cy="4711700"/>
-          </a:xfrm>
-          <a:prstGeom prst="rect">
-            <a:avLst/>
-          </a:prstGeom>
-          <a:solidFill>
-            <a:srgbClr val="FFFFFF">
-              <a:alpha val="60000"/>
-            </a:srgbClr>
-          </a:solidFill>
-          <a:ln>
-            <a:noFill/>
-          </a:ln>
-        </p:spPr>
-        <p:style>
-          <a:lnRef idx="2">
-            <a:schemeClr val="accent1">
-              <a:shade val="15000"/>
-            </a:schemeClr>
-          </a:lnRef>
-          <a:fillRef idx="1">
-            <a:schemeClr val="accent1"/>
-          </a:fillRef>
-          <a:effectRef idx="0">
-            <a:schemeClr val="accent1"/>
-          </a:effectRef>
-          <a:fontRef idx="minor">
-            <a:schemeClr val="lt1"/>
-          </a:fontRef>
-        </p:style>
-        <p:txBody>
-          <a:bodyPr rtlCol="0" anchor="ctr"/>
-          <a:lstStyle/>
-          <a:p>
-            <a:pPr algn="ctr"/>
-            <a:endParaRPr lang="en-US"/>
-          </a:p>
-        </p:txBody>
-      </p:sp>
-    </p:spTree>
-    <p:extLst>
-      <p:ext uri="{BB962C8B-B14F-4D97-AF65-F5344CB8AC3E}">
-        <p14:creationId xmlns:p14="http://schemas.microsoft.com/office/powerpoint/2010/main" val="2152222128"/>
       </p:ext>
     </p:extLst>
   </p:cSld>

</xml_diff>

<commit_message>
Completed first draft of M5.
</commit_message>
<xml_diff>
--- a/M5_Seurat_DGE_and_Exploratory/M5_Seurat_DGE_Exploratory.pptx
+++ b/M5_Seurat_DGE_and_Exploratory/M5_Seurat_DGE_Exploratory.pptx
@@ -7599,303 +7599,6 @@
           </a:p>
         </p:txBody>
       </p:sp>
-      <p:pic>
-        <p:nvPicPr>
-          <p:cNvPr id="2050" name="Picture 2">
-            <a:extLst>
-              <a:ext uri="{FF2B5EF4-FFF2-40B4-BE49-F238E27FC236}">
-                <a16:creationId xmlns:a16="http://schemas.microsoft.com/office/drawing/2014/main" id="{477B77B6-0B3C-8223-2AFA-1AD5B37F4E90}"/>
-              </a:ext>
-            </a:extLst>
-          </p:cNvPr>
-          <p:cNvPicPr>
-            <a:picLocks noChangeAspect="1" noChangeArrowheads="1"/>
-          </p:cNvPicPr>
-          <p:nvPr/>
-        </p:nvPicPr>
-        <p:blipFill>
-          <a:blip r:embed="rId2">
-            <a:extLst>
-              <a:ext uri="{28A0092B-C50C-407E-A947-70E740481C1C}">
-                <a14:useLocalDpi xmlns:a14="http://schemas.microsoft.com/office/drawing/2010/main" val="0"/>
-              </a:ext>
-            </a:extLst>
-          </a:blip>
-          <a:srcRect/>
-          <a:stretch>
-            <a:fillRect/>
-          </a:stretch>
-        </p:blipFill>
-        <p:spPr bwMode="auto">
-          <a:xfrm>
-            <a:off x="7212819" y="1114951"/>
-            <a:ext cx="4700016" cy="2530542"/>
-          </a:xfrm>
-          <a:prstGeom prst="rect">
-            <a:avLst/>
-          </a:prstGeom>
-          <a:noFill/>
-          <a:extLst>
-            <a:ext uri="{909E8E84-426E-40DD-AFC4-6F175D3DCCD1}">
-              <a14:hiddenFill xmlns:a14="http://schemas.microsoft.com/office/drawing/2010/main">
-                <a:solidFill>
-                  <a:srgbClr val="FFFFFF"/>
-                </a:solidFill>
-              </a14:hiddenFill>
-            </a:ext>
-          </a:extLst>
-        </p:spPr>
-      </p:pic>
-      <p:sp>
-        <p:nvSpPr>
-          <p:cNvPr id="5" name="TextBox 4">
-            <a:extLst>
-              <a:ext uri="{FF2B5EF4-FFF2-40B4-BE49-F238E27FC236}">
-                <a16:creationId xmlns:a16="http://schemas.microsoft.com/office/drawing/2014/main" id="{A61B3F3D-639B-D96B-896F-4975C6A1A6BE}"/>
-              </a:ext>
-            </a:extLst>
-          </p:cNvPr>
-          <p:cNvSpPr txBox="1"/>
-          <p:nvPr/>
-        </p:nvSpPr>
-        <p:spPr>
-          <a:xfrm>
-            <a:off x="2289630" y="1689695"/>
-            <a:ext cx="6185916" cy="923330"/>
-          </a:xfrm>
-          <a:prstGeom prst="rect">
-            <a:avLst/>
-          </a:prstGeom>
-          <a:noFill/>
-        </p:spPr>
-        <p:txBody>
-          <a:bodyPr wrap="square">
-            <a:spAutoFit/>
-          </a:bodyPr>
-          <a:lstStyle/>
-          <a:p>
-            <a:r>
-              <a:rPr lang="en-US" dirty="0"/>
-              <a:t># Visualize QC metrics as a violin plot</a:t>
-            </a:r>
-          </a:p>
-          <a:p>
-            <a:r>
-              <a:rPr lang="en-US" dirty="0" err="1"/>
-              <a:t>VlnPlot</a:t>
-            </a:r>
-            <a:r>
-              <a:rPr lang="en-US" dirty="0"/>
-              <a:t>(</a:t>
-            </a:r>
-            <a:r>
-              <a:rPr lang="en-US" dirty="0" err="1"/>
-              <a:t>pbmc</a:t>
-            </a:r>
-            <a:r>
-              <a:rPr lang="en-US" dirty="0"/>
-              <a:t>, features = c("</a:t>
-            </a:r>
-            <a:r>
-              <a:rPr lang="en-US" dirty="0" err="1"/>
-              <a:t>nFeature_RNA</a:t>
-            </a:r>
-            <a:r>
-              <a:rPr lang="en-US" dirty="0"/>
-              <a:t>", "</a:t>
-            </a:r>
-            <a:r>
-              <a:rPr lang="en-US" dirty="0" err="1"/>
-              <a:t>nCount_RNA</a:t>
-            </a:r>
-            <a:r>
-              <a:rPr lang="en-US" dirty="0"/>
-              <a:t>", "percent.mt"), </a:t>
-            </a:r>
-            <a:r>
-              <a:rPr lang="en-US" dirty="0" err="1"/>
-              <a:t>ncol</a:t>
-            </a:r>
-            <a:r>
-              <a:rPr lang="en-US" dirty="0"/>
-              <a:t> = 3)</a:t>
-            </a:r>
-          </a:p>
-        </p:txBody>
-      </p:sp>
-      <p:sp>
-        <p:nvSpPr>
-          <p:cNvPr id="7" name="TextBox 6">
-            <a:extLst>
-              <a:ext uri="{FF2B5EF4-FFF2-40B4-BE49-F238E27FC236}">
-                <a16:creationId xmlns:a16="http://schemas.microsoft.com/office/drawing/2014/main" id="{6BB589B6-9E1D-A435-5ED0-C2E5F7B5EF5F}"/>
-              </a:ext>
-            </a:extLst>
-          </p:cNvPr>
-          <p:cNvSpPr txBox="1"/>
-          <p:nvPr/>
-        </p:nvSpPr>
-        <p:spPr>
-          <a:xfrm>
-            <a:off x="7212819" y="4727386"/>
-            <a:ext cx="5218938" cy="1015663"/>
-          </a:xfrm>
-          <a:prstGeom prst="rect">
-            <a:avLst/>
-          </a:prstGeom>
-          <a:noFill/>
-        </p:spPr>
-        <p:txBody>
-          <a:bodyPr wrap="square">
-            <a:spAutoFit/>
-          </a:bodyPr>
-          <a:lstStyle/>
-          <a:p>
-            <a:r>
-              <a:rPr lang="en-US" sz="1000" dirty="0"/>
-              <a:t># </a:t>
-            </a:r>
-            <a:r>
-              <a:rPr lang="en-US" sz="1000" dirty="0" err="1"/>
-              <a:t>FeatureScatter</a:t>
-            </a:r>
-            <a:r>
-              <a:rPr lang="en-US" sz="1000" dirty="0"/>
-              <a:t> is typically used to visualize feature-feature relationships, but can be used</a:t>
-            </a:r>
-          </a:p>
-          <a:p>
-            <a:r>
-              <a:rPr lang="en-US" sz="1000" dirty="0"/>
-              <a:t># for anything calculated by the object, i.e. columns in object metadata, PC scores etc.</a:t>
-            </a:r>
-          </a:p>
-          <a:p>
-            <a:endParaRPr lang="en-US" sz="1000" dirty="0"/>
-          </a:p>
-          <a:p>
-            <a:r>
-              <a:rPr lang="en-US" sz="1000" dirty="0"/>
-              <a:t>plot1 &lt;- </a:t>
-            </a:r>
-            <a:r>
-              <a:rPr lang="en-US" sz="1000" dirty="0" err="1"/>
-              <a:t>FeatureScatter</a:t>
-            </a:r>
-            <a:r>
-              <a:rPr lang="en-US" sz="1000" dirty="0"/>
-              <a:t>(</a:t>
-            </a:r>
-            <a:r>
-              <a:rPr lang="en-US" sz="1000" dirty="0" err="1"/>
-              <a:t>pbmc</a:t>
-            </a:r>
-            <a:r>
-              <a:rPr lang="en-US" sz="1000" dirty="0"/>
-              <a:t>, feature1 = "</a:t>
-            </a:r>
-            <a:r>
-              <a:rPr lang="en-US" sz="1000" dirty="0" err="1"/>
-              <a:t>nCount_RNA</a:t>
-            </a:r>
-            <a:r>
-              <a:rPr lang="en-US" sz="1000" dirty="0"/>
-              <a:t>", feature2 = "percent.mt")</a:t>
-            </a:r>
-          </a:p>
-          <a:p>
-            <a:r>
-              <a:rPr lang="en-US" sz="1000" dirty="0"/>
-              <a:t>plot2 &lt;- </a:t>
-            </a:r>
-            <a:r>
-              <a:rPr lang="en-US" sz="1000" dirty="0" err="1"/>
-              <a:t>FeatureScatter</a:t>
-            </a:r>
-            <a:r>
-              <a:rPr lang="en-US" sz="1000" dirty="0"/>
-              <a:t>(</a:t>
-            </a:r>
-            <a:r>
-              <a:rPr lang="en-US" sz="1000" dirty="0" err="1"/>
-              <a:t>pbmc</a:t>
-            </a:r>
-            <a:r>
-              <a:rPr lang="en-US" sz="1000" dirty="0"/>
-              <a:t>, feature1 = "</a:t>
-            </a:r>
-            <a:r>
-              <a:rPr lang="en-US" sz="1000" dirty="0" err="1"/>
-              <a:t>nCount_RNA</a:t>
-            </a:r>
-            <a:r>
-              <a:rPr lang="en-US" sz="1000" dirty="0"/>
-              <a:t>", feature2 = "</a:t>
-            </a:r>
-            <a:r>
-              <a:rPr lang="en-US" sz="1000" dirty="0" err="1"/>
-              <a:t>nFeature_RNA</a:t>
-            </a:r>
-            <a:r>
-              <a:rPr lang="en-US" sz="1000" dirty="0"/>
-              <a:t>")</a:t>
-            </a:r>
-          </a:p>
-          <a:p>
-            <a:r>
-              <a:rPr lang="en-US" sz="1000" dirty="0"/>
-              <a:t>plot1 + plot2</a:t>
-            </a:r>
-          </a:p>
-        </p:txBody>
-      </p:sp>
-      <p:pic>
-        <p:nvPicPr>
-          <p:cNvPr id="2053" name="Picture 5">
-            <a:extLst>
-              <a:ext uri="{FF2B5EF4-FFF2-40B4-BE49-F238E27FC236}">
-                <a16:creationId xmlns:a16="http://schemas.microsoft.com/office/drawing/2014/main" id="{B2D4F5CE-A525-503E-BBD7-77BC62C9FC9B}"/>
-              </a:ext>
-            </a:extLst>
-          </p:cNvPr>
-          <p:cNvPicPr>
-            <a:picLocks noChangeAspect="1" noChangeArrowheads="1"/>
-          </p:cNvPicPr>
-          <p:nvPr/>
-        </p:nvPicPr>
-        <p:blipFill>
-          <a:blip r:embed="rId3">
-            <a:extLst>
-              <a:ext uri="{28A0092B-C50C-407E-A947-70E740481C1C}">
-                <a14:useLocalDpi xmlns:a14="http://schemas.microsoft.com/office/drawing/2010/main" val="0"/>
-              </a:ext>
-            </a:extLst>
-          </a:blip>
-          <a:srcRect/>
-          <a:stretch>
-            <a:fillRect/>
-          </a:stretch>
-        </p:blipFill>
-        <p:spPr bwMode="auto">
-          <a:xfrm>
-            <a:off x="2083525" y="4244975"/>
-            <a:ext cx="4750743" cy="2557854"/>
-          </a:xfrm>
-          <a:prstGeom prst="rect">
-            <a:avLst/>
-          </a:prstGeom>
-          <a:noFill/>
-          <a:extLst>
-            <a:ext uri="{909E8E84-426E-40DD-AFC4-6F175D3DCCD1}">
-              <a14:hiddenFill xmlns:a14="http://schemas.microsoft.com/office/drawing/2010/main">
-                <a:solidFill>
-                  <a:srgbClr val="FFFFFF"/>
-                </a:solidFill>
-              </a14:hiddenFill>
-            </a:ext>
-          </a:extLst>
-        </p:spPr>
-      </p:pic>
       <p:sp>
         <p:nvSpPr>
           <p:cNvPr id="8" name="Rectangle 7">
@@ -8007,6 +7710,125 @@
           </a:p>
         </p:txBody>
       </p:sp>
+      <p:pic>
+        <p:nvPicPr>
+          <p:cNvPr id="10" name="Picture 9">
+            <a:extLst>
+              <a:ext uri="{FF2B5EF4-FFF2-40B4-BE49-F238E27FC236}">
+                <a16:creationId xmlns:a16="http://schemas.microsoft.com/office/drawing/2014/main" id="{D30D0556-C14A-C2E8-4DD6-AF59C73394B5}"/>
+              </a:ext>
+            </a:extLst>
+          </p:cNvPr>
+          <p:cNvPicPr>
+            <a:picLocks noChangeAspect="1"/>
+          </p:cNvPicPr>
+          <p:nvPr/>
+        </p:nvPicPr>
+        <p:blipFill rotWithShape="1">
+          <a:blip r:embed="rId2"/>
+          <a:srcRect r="9874"/>
+          <a:stretch/>
+        </p:blipFill>
+        <p:spPr>
+          <a:xfrm>
+            <a:off x="1806721" y="1174478"/>
+            <a:ext cx="5554946" cy="1095528"/>
+          </a:xfrm>
+          <a:prstGeom prst="rect">
+            <a:avLst/>
+          </a:prstGeom>
+        </p:spPr>
+      </p:pic>
+      <p:pic>
+        <p:nvPicPr>
+          <p:cNvPr id="4" name="Picture 3">
+            <a:extLst>
+              <a:ext uri="{FF2B5EF4-FFF2-40B4-BE49-F238E27FC236}">
+                <a16:creationId xmlns:a16="http://schemas.microsoft.com/office/drawing/2014/main" id="{43E6BAAE-6F02-0C07-AF9D-856526CDF706}"/>
+              </a:ext>
+            </a:extLst>
+          </p:cNvPr>
+          <p:cNvPicPr>
+            <a:picLocks noChangeAspect="1"/>
+          </p:cNvPicPr>
+          <p:nvPr/>
+        </p:nvPicPr>
+        <p:blipFill>
+          <a:blip r:embed="rId3"/>
+          <a:stretch>
+            <a:fillRect/>
+          </a:stretch>
+        </p:blipFill>
+        <p:spPr>
+          <a:xfrm>
+            <a:off x="7628972" y="780447"/>
+            <a:ext cx="4386631" cy="2551220"/>
+          </a:xfrm>
+          <a:prstGeom prst="rect">
+            <a:avLst/>
+          </a:prstGeom>
+        </p:spPr>
+      </p:pic>
+      <p:pic>
+        <p:nvPicPr>
+          <p:cNvPr id="12" name="Picture 11">
+            <a:extLst>
+              <a:ext uri="{FF2B5EF4-FFF2-40B4-BE49-F238E27FC236}">
+                <a16:creationId xmlns:a16="http://schemas.microsoft.com/office/drawing/2014/main" id="{19567878-B8B9-26F0-28E0-6DF5B2831F15}"/>
+              </a:ext>
+            </a:extLst>
+          </p:cNvPr>
+          <p:cNvPicPr>
+            <a:picLocks noChangeAspect="1"/>
+          </p:cNvPicPr>
+          <p:nvPr/>
+        </p:nvPicPr>
+        <p:blipFill>
+          <a:blip r:embed="rId4"/>
+          <a:stretch>
+            <a:fillRect/>
+          </a:stretch>
+        </p:blipFill>
+        <p:spPr>
+          <a:xfrm>
+            <a:off x="1951862" y="3575304"/>
+            <a:ext cx="4823903" cy="2819739"/>
+          </a:xfrm>
+          <a:prstGeom prst="rect">
+            <a:avLst/>
+          </a:prstGeom>
+        </p:spPr>
+      </p:pic>
+      <p:pic>
+        <p:nvPicPr>
+          <p:cNvPr id="14" name="Picture 13">
+            <a:extLst>
+              <a:ext uri="{FF2B5EF4-FFF2-40B4-BE49-F238E27FC236}">
+                <a16:creationId xmlns:a16="http://schemas.microsoft.com/office/drawing/2014/main" id="{7253B9CF-C3B5-96D0-B1F6-1E41F87EE724}"/>
+              </a:ext>
+            </a:extLst>
+          </p:cNvPr>
+          <p:cNvPicPr>
+            <a:picLocks noChangeAspect="1"/>
+          </p:cNvPicPr>
+          <p:nvPr/>
+        </p:nvPicPr>
+        <p:blipFill>
+          <a:blip r:embed="rId5"/>
+          <a:stretch>
+            <a:fillRect/>
+          </a:stretch>
+        </p:blipFill>
+        <p:spPr>
+          <a:xfrm>
+            <a:off x="7519244" y="4089773"/>
+            <a:ext cx="4324954" cy="1019317"/>
+          </a:xfrm>
+          <a:prstGeom prst="rect">
+            <a:avLst/>
+          </a:prstGeom>
+        </p:spPr>
+      </p:pic>
     </p:spTree>
     <p:extLst>
       <p:ext uri="{BB962C8B-B14F-4D97-AF65-F5344CB8AC3E}">
@@ -8067,214 +7889,6 @@
       </p:sp>
       <p:sp>
         <p:nvSpPr>
-          <p:cNvPr id="4" name="TextBox 3">
-            <a:extLst>
-              <a:ext uri="{FF2B5EF4-FFF2-40B4-BE49-F238E27FC236}">
-                <a16:creationId xmlns:a16="http://schemas.microsoft.com/office/drawing/2014/main" id="{F7E9FFDF-3964-974A-F098-AF0BEF9B7ED3}"/>
-              </a:ext>
-            </a:extLst>
-          </p:cNvPr>
-          <p:cNvSpPr txBox="1"/>
-          <p:nvPr/>
-        </p:nvSpPr>
-        <p:spPr>
-          <a:xfrm>
-            <a:off x="1831086" y="937135"/>
-            <a:ext cx="6185916" cy="2862322"/>
-          </a:xfrm>
-          <a:prstGeom prst="rect">
-            <a:avLst/>
-          </a:prstGeom>
-          <a:noFill/>
-        </p:spPr>
-        <p:txBody>
-          <a:bodyPr wrap="square">
-            <a:spAutoFit/>
-          </a:bodyPr>
-          <a:lstStyle/>
-          <a:p>
-            <a:r>
-              <a:rPr lang="en-US" dirty="0" err="1"/>
-              <a:t>pbmc</a:t>
-            </a:r>
-            <a:r>
-              <a:rPr lang="en-US" dirty="0"/>
-              <a:t> &lt;- </a:t>
-            </a:r>
-            <a:r>
-              <a:rPr lang="en-US" dirty="0" err="1"/>
-              <a:t>FindVariableFeatures</a:t>
-            </a:r>
-            <a:r>
-              <a:rPr lang="en-US" dirty="0"/>
-              <a:t>(</a:t>
-            </a:r>
-            <a:r>
-              <a:rPr lang="en-US" dirty="0" err="1"/>
-              <a:t>pbmc</a:t>
-            </a:r>
-            <a:r>
-              <a:rPr lang="en-US" dirty="0"/>
-              <a:t>, </a:t>
-            </a:r>
-            <a:r>
-              <a:rPr lang="en-US" dirty="0" err="1"/>
-              <a:t>selection.method</a:t>
-            </a:r>
-            <a:r>
-              <a:rPr lang="en-US" dirty="0"/>
-              <a:t> = "</a:t>
-            </a:r>
-            <a:r>
-              <a:rPr lang="en-US" dirty="0" err="1"/>
-              <a:t>vst</a:t>
-            </a:r>
-            <a:r>
-              <a:rPr lang="en-US" dirty="0"/>
-              <a:t>", </a:t>
-            </a:r>
-            <a:r>
-              <a:rPr lang="en-US" dirty="0" err="1"/>
-              <a:t>nfeatures</a:t>
-            </a:r>
-            <a:r>
-              <a:rPr lang="en-US" dirty="0"/>
-              <a:t> = 2000)</a:t>
-            </a:r>
-          </a:p>
-          <a:p>
-            <a:endParaRPr lang="en-US" dirty="0"/>
-          </a:p>
-          <a:p>
-            <a:r>
-              <a:rPr lang="en-US" dirty="0"/>
-              <a:t># Identify the 10 most highly variable genes</a:t>
-            </a:r>
-          </a:p>
-          <a:p>
-            <a:r>
-              <a:rPr lang="en-US" dirty="0"/>
-              <a:t>top10 &lt;- head(</a:t>
-            </a:r>
-            <a:r>
-              <a:rPr lang="en-US" dirty="0" err="1"/>
-              <a:t>VariableFeatures</a:t>
-            </a:r>
-            <a:r>
-              <a:rPr lang="en-US" dirty="0"/>
-              <a:t>(</a:t>
-            </a:r>
-            <a:r>
-              <a:rPr lang="en-US" dirty="0" err="1"/>
-              <a:t>pbmc</a:t>
-            </a:r>
-            <a:r>
-              <a:rPr lang="en-US" dirty="0"/>
-              <a:t>), 10)</a:t>
-            </a:r>
-          </a:p>
-          <a:p>
-            <a:endParaRPr lang="en-US" dirty="0"/>
-          </a:p>
-          <a:p>
-            <a:r>
-              <a:rPr lang="en-US" dirty="0"/>
-              <a:t># plot variable features with and without labels</a:t>
-            </a:r>
-          </a:p>
-          <a:p>
-            <a:r>
-              <a:rPr lang="en-US" dirty="0"/>
-              <a:t>plot1 &lt;- </a:t>
-            </a:r>
-            <a:r>
-              <a:rPr lang="en-US" dirty="0" err="1"/>
-              <a:t>VariableFeaturePlot</a:t>
-            </a:r>
-            <a:r>
-              <a:rPr lang="en-US" dirty="0"/>
-              <a:t>(</a:t>
-            </a:r>
-            <a:r>
-              <a:rPr lang="en-US" dirty="0" err="1"/>
-              <a:t>pbmc</a:t>
-            </a:r>
-            <a:r>
-              <a:rPr lang="en-US" dirty="0"/>
-              <a:t>)</a:t>
-            </a:r>
-          </a:p>
-          <a:p>
-            <a:r>
-              <a:rPr lang="en-US" dirty="0"/>
-              <a:t>plot2 &lt;- </a:t>
-            </a:r>
-            <a:r>
-              <a:rPr lang="en-US" dirty="0" err="1"/>
-              <a:t>LabelPoints</a:t>
-            </a:r>
-            <a:r>
-              <a:rPr lang="en-US" dirty="0"/>
-              <a:t>(plot = plot1, points = top10, repel = TRUE)</a:t>
-            </a:r>
-          </a:p>
-          <a:p>
-            <a:r>
-              <a:rPr lang="en-US" dirty="0"/>
-              <a:t>plot1 + plot2</a:t>
-            </a:r>
-          </a:p>
-        </p:txBody>
-      </p:sp>
-      <p:pic>
-        <p:nvPicPr>
-          <p:cNvPr id="3074" name="Picture 2">
-            <a:extLst>
-              <a:ext uri="{FF2B5EF4-FFF2-40B4-BE49-F238E27FC236}">
-                <a16:creationId xmlns:a16="http://schemas.microsoft.com/office/drawing/2014/main" id="{2C1B91E3-4812-B952-FD69-02A35D1E95B6}"/>
-              </a:ext>
-            </a:extLst>
-          </p:cNvPr>
-          <p:cNvPicPr>
-            <a:picLocks noChangeAspect="1" noChangeArrowheads="1"/>
-          </p:cNvPicPr>
-          <p:nvPr/>
-        </p:nvPicPr>
-        <p:blipFill>
-          <a:blip r:embed="rId2">
-            <a:extLst>
-              <a:ext uri="{28A0092B-C50C-407E-A947-70E740481C1C}">
-                <a14:useLocalDpi xmlns:a14="http://schemas.microsoft.com/office/drawing/2010/main" val="0"/>
-              </a:ext>
-            </a:extLst>
-          </a:blip>
-          <a:srcRect/>
-          <a:stretch>
-            <a:fillRect/>
-          </a:stretch>
-        </p:blipFill>
-        <p:spPr bwMode="auto">
-          <a:xfrm>
-            <a:off x="6464808" y="3799457"/>
-            <a:ext cx="5413248" cy="2706624"/>
-          </a:xfrm>
-          <a:prstGeom prst="rect">
-            <a:avLst/>
-          </a:prstGeom>
-          <a:noFill/>
-          <a:extLst>
-            <a:ext uri="{909E8E84-426E-40DD-AFC4-6F175D3DCCD1}">
-              <a14:hiddenFill xmlns:a14="http://schemas.microsoft.com/office/drawing/2010/main">
-                <a:solidFill>
-                  <a:srgbClr val="FFFFFF"/>
-                </a:solidFill>
-              </a14:hiddenFill>
-            </a:ext>
-          </a:extLst>
-        </p:spPr>
-      </p:pic>
-      <p:sp>
-        <p:nvSpPr>
           <p:cNvPr id="5" name="Rectangle 4">
             <a:extLst>
               <a:ext uri="{FF2B5EF4-FFF2-40B4-BE49-F238E27FC236}">
@@ -8381,6 +7995,96 @@
           </a:p>
         </p:txBody>
       </p:sp>
+      <p:pic>
+        <p:nvPicPr>
+          <p:cNvPr id="9" name="Picture 8">
+            <a:extLst>
+              <a:ext uri="{FF2B5EF4-FFF2-40B4-BE49-F238E27FC236}">
+                <a16:creationId xmlns:a16="http://schemas.microsoft.com/office/drawing/2014/main" id="{6979DB23-EE22-55D9-571B-E616B17A87DE}"/>
+              </a:ext>
+            </a:extLst>
+          </p:cNvPr>
+          <p:cNvPicPr>
+            <a:picLocks noChangeAspect="1"/>
+          </p:cNvPicPr>
+          <p:nvPr/>
+        </p:nvPicPr>
+        <p:blipFill>
+          <a:blip r:embed="rId2"/>
+          <a:stretch>
+            <a:fillRect/>
+          </a:stretch>
+        </p:blipFill>
+        <p:spPr>
+          <a:xfrm>
+            <a:off x="7216003" y="2341746"/>
+            <a:ext cx="4862713" cy="3676153"/>
+          </a:xfrm>
+          <a:prstGeom prst="rect">
+            <a:avLst/>
+          </a:prstGeom>
+        </p:spPr>
+      </p:pic>
+      <p:pic>
+        <p:nvPicPr>
+          <p:cNvPr id="11" name="Picture 10">
+            <a:extLst>
+              <a:ext uri="{FF2B5EF4-FFF2-40B4-BE49-F238E27FC236}">
+                <a16:creationId xmlns:a16="http://schemas.microsoft.com/office/drawing/2014/main" id="{12E95C2F-E129-0950-2681-C1AFBF2C4788}"/>
+              </a:ext>
+            </a:extLst>
+          </p:cNvPr>
+          <p:cNvPicPr>
+            <a:picLocks noChangeAspect="1"/>
+          </p:cNvPicPr>
+          <p:nvPr/>
+        </p:nvPicPr>
+        <p:blipFill>
+          <a:blip r:embed="rId3"/>
+          <a:stretch>
+            <a:fillRect/>
+          </a:stretch>
+        </p:blipFill>
+        <p:spPr>
+          <a:xfrm>
+            <a:off x="2241232" y="2454741"/>
+            <a:ext cx="4817936" cy="3450165"/>
+          </a:xfrm>
+          <a:prstGeom prst="rect">
+            <a:avLst/>
+          </a:prstGeom>
+        </p:spPr>
+      </p:pic>
+      <p:pic>
+        <p:nvPicPr>
+          <p:cNvPr id="13" name="Picture 12">
+            <a:extLst>
+              <a:ext uri="{FF2B5EF4-FFF2-40B4-BE49-F238E27FC236}">
+                <a16:creationId xmlns:a16="http://schemas.microsoft.com/office/drawing/2014/main" id="{4B32E17C-52EA-DEB4-6251-DC1AD11B4B25}"/>
+              </a:ext>
+            </a:extLst>
+          </p:cNvPr>
+          <p:cNvPicPr>
+            <a:picLocks noChangeAspect="1"/>
+          </p:cNvPicPr>
+          <p:nvPr/>
+        </p:nvPicPr>
+        <p:blipFill>
+          <a:blip r:embed="rId4"/>
+          <a:stretch>
+            <a:fillRect/>
+          </a:stretch>
+        </p:blipFill>
+        <p:spPr>
+          <a:xfrm>
+            <a:off x="3683877" y="1095873"/>
+            <a:ext cx="5963482" cy="1152686"/>
+          </a:xfrm>
+          <a:prstGeom prst="rect">
+            <a:avLst/>
+          </a:prstGeom>
+        </p:spPr>
+      </p:pic>
     </p:spTree>
     <p:extLst>
       <p:ext uri="{BB962C8B-B14F-4D97-AF65-F5344CB8AC3E}">
@@ -8446,108 +8150,6 @@
       </p:sp>
       <p:sp>
         <p:nvSpPr>
-          <p:cNvPr id="5" name="TextBox 4">
-            <a:extLst>
-              <a:ext uri="{FF2B5EF4-FFF2-40B4-BE49-F238E27FC236}">
-                <a16:creationId xmlns:a16="http://schemas.microsoft.com/office/drawing/2014/main" id="{4F541360-35DF-0AA5-C9D3-0162FB354AC7}"/>
-              </a:ext>
-            </a:extLst>
-          </p:cNvPr>
-          <p:cNvSpPr txBox="1"/>
-          <p:nvPr/>
-        </p:nvSpPr>
-        <p:spPr>
-          <a:xfrm>
-            <a:off x="1959102" y="1121140"/>
-            <a:ext cx="6185916" cy="369332"/>
-          </a:xfrm>
-          <a:prstGeom prst="rect">
-            <a:avLst/>
-          </a:prstGeom>
-          <a:noFill/>
-        </p:spPr>
-        <p:txBody>
-          <a:bodyPr wrap="square">
-            <a:spAutoFit/>
-          </a:bodyPr>
-          <a:lstStyle/>
-          <a:p>
-            <a:r>
-              <a:rPr lang="en-US" dirty="0" err="1"/>
-              <a:t>VizDimLoadings</a:t>
-            </a:r>
-            <a:r>
-              <a:rPr lang="en-US" dirty="0"/>
-              <a:t>(</a:t>
-            </a:r>
-            <a:r>
-              <a:rPr lang="en-US" dirty="0" err="1"/>
-              <a:t>pbmc</a:t>
-            </a:r>
-            <a:r>
-              <a:rPr lang="en-US" dirty="0"/>
-              <a:t>, dims = 1:2, reduction = "</a:t>
-            </a:r>
-            <a:r>
-              <a:rPr lang="en-US" dirty="0" err="1"/>
-              <a:t>pca</a:t>
-            </a:r>
-            <a:r>
-              <a:rPr lang="en-US" dirty="0"/>
-              <a:t>")</a:t>
-            </a:r>
-          </a:p>
-        </p:txBody>
-      </p:sp>
-      <p:pic>
-        <p:nvPicPr>
-          <p:cNvPr id="4099" name="Picture 3">
-            <a:extLst>
-              <a:ext uri="{FF2B5EF4-FFF2-40B4-BE49-F238E27FC236}">
-                <a16:creationId xmlns:a16="http://schemas.microsoft.com/office/drawing/2014/main" id="{29F04F89-DC39-8167-C4DA-D25E1528DBA3}"/>
-              </a:ext>
-            </a:extLst>
-          </p:cNvPr>
-          <p:cNvPicPr>
-            <a:picLocks noChangeAspect="1" noChangeArrowheads="1"/>
-          </p:cNvPicPr>
-          <p:nvPr/>
-        </p:nvPicPr>
-        <p:blipFill>
-          <a:blip r:embed="rId2">
-            <a:extLst>
-              <a:ext uri="{28A0092B-C50C-407E-A947-70E740481C1C}">
-                <a14:useLocalDpi xmlns:a14="http://schemas.microsoft.com/office/drawing/2010/main" val="0"/>
-              </a:ext>
-            </a:extLst>
-          </a:blip>
-          <a:srcRect/>
-          <a:stretch>
-            <a:fillRect/>
-          </a:stretch>
-        </p:blipFill>
-        <p:spPr bwMode="auto">
-          <a:xfrm>
-            <a:off x="5476494" y="2351771"/>
-            <a:ext cx="4846320" cy="3877056"/>
-          </a:xfrm>
-          <a:prstGeom prst="rect">
-            <a:avLst/>
-          </a:prstGeom>
-          <a:noFill/>
-          <a:extLst>
-            <a:ext uri="{909E8E84-426E-40DD-AFC4-6F175D3DCCD1}">
-              <a14:hiddenFill xmlns:a14="http://schemas.microsoft.com/office/drawing/2010/main">
-                <a:solidFill>
-                  <a:srgbClr val="FFFFFF"/>
-                </a:solidFill>
-              </a14:hiddenFill>
-            </a:ext>
-          </a:extLst>
-        </p:spPr>
-      </p:pic>
-      <p:sp>
-        <p:nvSpPr>
           <p:cNvPr id="6" name="Rectangle 5">
             <a:extLst>
               <a:ext uri="{FF2B5EF4-FFF2-40B4-BE49-F238E27FC236}">
@@ -8654,6 +8256,66 @@
           </a:p>
         </p:txBody>
       </p:sp>
+      <p:pic>
+        <p:nvPicPr>
+          <p:cNvPr id="9" name="Picture 8">
+            <a:extLst>
+              <a:ext uri="{FF2B5EF4-FFF2-40B4-BE49-F238E27FC236}">
+                <a16:creationId xmlns:a16="http://schemas.microsoft.com/office/drawing/2014/main" id="{3811ED7A-065B-6814-A15F-EAC2850BEFBE}"/>
+              </a:ext>
+            </a:extLst>
+          </p:cNvPr>
+          <p:cNvPicPr>
+            <a:picLocks noChangeAspect="1"/>
+          </p:cNvPicPr>
+          <p:nvPr/>
+        </p:nvPicPr>
+        <p:blipFill>
+          <a:blip r:embed="rId2"/>
+          <a:stretch>
+            <a:fillRect/>
+          </a:stretch>
+        </p:blipFill>
+        <p:spPr>
+          <a:xfrm>
+            <a:off x="3781299" y="1662609"/>
+            <a:ext cx="5530262" cy="4302269"/>
+          </a:xfrm>
+          <a:prstGeom prst="rect">
+            <a:avLst/>
+          </a:prstGeom>
+        </p:spPr>
+      </p:pic>
+      <p:pic>
+        <p:nvPicPr>
+          <p:cNvPr id="11" name="Picture 10">
+            <a:extLst>
+              <a:ext uri="{FF2B5EF4-FFF2-40B4-BE49-F238E27FC236}">
+                <a16:creationId xmlns:a16="http://schemas.microsoft.com/office/drawing/2014/main" id="{182EC99A-AF75-84F0-975A-6FB5F4393BB8}"/>
+              </a:ext>
+            </a:extLst>
+          </p:cNvPr>
+          <p:cNvPicPr>
+            <a:picLocks noChangeAspect="1"/>
+          </p:cNvPicPr>
+          <p:nvPr/>
+        </p:nvPicPr>
+        <p:blipFill>
+          <a:blip r:embed="rId3"/>
+          <a:stretch>
+            <a:fillRect/>
+          </a:stretch>
+        </p:blipFill>
+        <p:spPr>
+          <a:xfrm>
+            <a:off x="2215805" y="964890"/>
+            <a:ext cx="4029637" cy="362001"/>
+          </a:xfrm>
+          <a:prstGeom prst="rect">
+            <a:avLst/>
+          </a:prstGeom>
+        </p:spPr>
+      </p:pic>
     </p:spTree>
     <p:extLst>
       <p:ext uri="{BB962C8B-B14F-4D97-AF65-F5344CB8AC3E}">
@@ -8714,100 +8376,6 @@
       </p:sp>
       <p:sp>
         <p:nvSpPr>
-          <p:cNvPr id="7" name="TextBox 6">
-            <a:extLst>
-              <a:ext uri="{FF2B5EF4-FFF2-40B4-BE49-F238E27FC236}">
-                <a16:creationId xmlns:a16="http://schemas.microsoft.com/office/drawing/2014/main" id="{CA837A5F-3AC7-CE12-5C58-4B1E73C24A52}"/>
-              </a:ext>
-            </a:extLst>
-          </p:cNvPr>
-          <p:cNvSpPr txBox="1"/>
-          <p:nvPr/>
-        </p:nvSpPr>
-        <p:spPr>
-          <a:xfrm>
-            <a:off x="3003042" y="815839"/>
-            <a:ext cx="6185916" cy="369332"/>
-          </a:xfrm>
-          <a:prstGeom prst="rect">
-            <a:avLst/>
-          </a:prstGeom>
-          <a:noFill/>
-        </p:spPr>
-        <p:txBody>
-          <a:bodyPr wrap="square">
-            <a:spAutoFit/>
-          </a:bodyPr>
-          <a:lstStyle/>
-          <a:p>
-            <a:r>
-              <a:rPr lang="en-US" dirty="0" err="1"/>
-              <a:t>DimHeatmap</a:t>
-            </a:r>
-            <a:r>
-              <a:rPr lang="en-US" dirty="0"/>
-              <a:t>(</a:t>
-            </a:r>
-            <a:r>
-              <a:rPr lang="en-US" dirty="0" err="1"/>
-              <a:t>pbmc</a:t>
-            </a:r>
-            <a:r>
-              <a:rPr lang="en-US" dirty="0"/>
-              <a:t>, dims = 1:15, cells = 500, balanced = TRUE)</a:t>
-            </a:r>
-          </a:p>
-        </p:txBody>
-      </p:sp>
-      <p:pic>
-        <p:nvPicPr>
-          <p:cNvPr id="5126" name="Picture 6">
-            <a:extLst>
-              <a:ext uri="{FF2B5EF4-FFF2-40B4-BE49-F238E27FC236}">
-                <a16:creationId xmlns:a16="http://schemas.microsoft.com/office/drawing/2014/main" id="{52F3FEB3-CE1D-B7A3-5338-510233A9BE63}"/>
-              </a:ext>
-            </a:extLst>
-          </p:cNvPr>
-          <p:cNvPicPr>
-            <a:picLocks noChangeAspect="1" noChangeArrowheads="1"/>
-          </p:cNvPicPr>
-          <p:nvPr/>
-        </p:nvPicPr>
-        <p:blipFill>
-          <a:blip r:embed="rId2">
-            <a:extLst>
-              <a:ext uri="{28A0092B-C50C-407E-A947-70E740481C1C}">
-                <a14:useLocalDpi xmlns:a14="http://schemas.microsoft.com/office/drawing/2010/main" val="0"/>
-              </a:ext>
-            </a:extLst>
-          </a:blip>
-          <a:srcRect/>
-          <a:stretch>
-            <a:fillRect/>
-          </a:stretch>
-        </p:blipFill>
-        <p:spPr bwMode="auto">
-          <a:xfrm>
-            <a:off x="2978150" y="1185171"/>
-            <a:ext cx="8216900" cy="5477933"/>
-          </a:xfrm>
-          <a:prstGeom prst="rect">
-            <a:avLst/>
-          </a:prstGeom>
-          <a:noFill/>
-          <a:extLst>
-            <a:ext uri="{909E8E84-426E-40DD-AFC4-6F175D3DCCD1}">
-              <a14:hiddenFill xmlns:a14="http://schemas.microsoft.com/office/drawing/2010/main">
-                <a:solidFill>
-                  <a:srgbClr val="FFFFFF"/>
-                </a:solidFill>
-              </a14:hiddenFill>
-            </a:ext>
-          </a:extLst>
-        </p:spPr>
-      </p:pic>
-      <p:sp>
-        <p:nvSpPr>
           <p:cNvPr id="8" name="Rectangle 7">
             <a:extLst>
               <a:ext uri="{FF2B5EF4-FFF2-40B4-BE49-F238E27FC236}">
@@ -8914,6 +8482,66 @@
           </a:p>
         </p:txBody>
       </p:sp>
+      <p:pic>
+        <p:nvPicPr>
+          <p:cNvPr id="4" name="Picture 3">
+            <a:extLst>
+              <a:ext uri="{FF2B5EF4-FFF2-40B4-BE49-F238E27FC236}">
+                <a16:creationId xmlns:a16="http://schemas.microsoft.com/office/drawing/2014/main" id="{1E0DDEC4-FC52-BD21-130F-4B3B74F7C1B8}"/>
+              </a:ext>
+            </a:extLst>
+          </p:cNvPr>
+          <p:cNvPicPr>
+            <a:picLocks noChangeAspect="1"/>
+          </p:cNvPicPr>
+          <p:nvPr/>
+        </p:nvPicPr>
+        <p:blipFill>
+          <a:blip r:embed="rId2"/>
+          <a:stretch>
+            <a:fillRect/>
+          </a:stretch>
+        </p:blipFill>
+        <p:spPr>
+          <a:xfrm>
+            <a:off x="3255975" y="1305404"/>
+            <a:ext cx="6791930" cy="5214112"/>
+          </a:xfrm>
+          <a:prstGeom prst="rect">
+            <a:avLst/>
+          </a:prstGeom>
+        </p:spPr>
+      </p:pic>
+      <p:pic>
+        <p:nvPicPr>
+          <p:cNvPr id="6" name="Picture 5">
+            <a:extLst>
+              <a:ext uri="{FF2B5EF4-FFF2-40B4-BE49-F238E27FC236}">
+                <a16:creationId xmlns:a16="http://schemas.microsoft.com/office/drawing/2014/main" id="{A247B2A3-C31B-CEF5-6CD4-940869B5AB7F}"/>
+              </a:ext>
+            </a:extLst>
+          </p:cNvPr>
+          <p:cNvPicPr>
+            <a:picLocks noChangeAspect="1"/>
+          </p:cNvPicPr>
+          <p:nvPr/>
+        </p:nvPicPr>
+        <p:blipFill>
+          <a:blip r:embed="rId3"/>
+          <a:stretch>
+            <a:fillRect/>
+          </a:stretch>
+        </p:blipFill>
+        <p:spPr>
+          <a:xfrm>
+            <a:off x="2325119" y="914824"/>
+            <a:ext cx="4505954" cy="390580"/>
+          </a:xfrm>
+          <a:prstGeom prst="rect">
+            <a:avLst/>
+          </a:prstGeom>
+        </p:spPr>
+      </p:pic>
     </p:spTree>
     <p:extLst>
       <p:ext uri="{BB962C8B-B14F-4D97-AF65-F5344CB8AC3E}">
@@ -8974,100 +8602,6 @@
       </p:sp>
       <p:sp>
         <p:nvSpPr>
-          <p:cNvPr id="4" name="TextBox 3">
-            <a:extLst>
-              <a:ext uri="{FF2B5EF4-FFF2-40B4-BE49-F238E27FC236}">
-                <a16:creationId xmlns:a16="http://schemas.microsoft.com/office/drawing/2014/main" id="{A76DA7DA-3C2F-8EFD-C083-CB79041C1CB9}"/>
-              </a:ext>
-            </a:extLst>
-          </p:cNvPr>
-          <p:cNvSpPr txBox="1"/>
-          <p:nvPr/>
-        </p:nvSpPr>
-        <p:spPr>
-          <a:xfrm>
-            <a:off x="2651125" y="850384"/>
-            <a:ext cx="6191250" cy="369332"/>
-          </a:xfrm>
-          <a:prstGeom prst="rect">
-            <a:avLst/>
-          </a:prstGeom>
-          <a:noFill/>
-        </p:spPr>
-        <p:txBody>
-          <a:bodyPr wrap="square">
-            <a:spAutoFit/>
-          </a:bodyPr>
-          <a:lstStyle/>
-          <a:p>
-            <a:r>
-              <a:rPr lang="en-US" dirty="0" err="1"/>
-              <a:t>VlnPlot</a:t>
-            </a:r>
-            <a:r>
-              <a:rPr lang="en-US" dirty="0"/>
-              <a:t>(</a:t>
-            </a:r>
-            <a:r>
-              <a:rPr lang="en-US" dirty="0" err="1"/>
-              <a:t>pbmc</a:t>
-            </a:r>
-            <a:r>
-              <a:rPr lang="en-US" dirty="0"/>
-              <a:t>, features = c("MS4A1", "CD79A"))</a:t>
-            </a:r>
-          </a:p>
-        </p:txBody>
-      </p:sp>
-      <p:pic>
-        <p:nvPicPr>
-          <p:cNvPr id="6146" name="Picture 2">
-            <a:extLst>
-              <a:ext uri="{FF2B5EF4-FFF2-40B4-BE49-F238E27FC236}">
-                <a16:creationId xmlns:a16="http://schemas.microsoft.com/office/drawing/2014/main" id="{8D286476-5EA2-0EB5-2313-2DB391E04FAA}"/>
-              </a:ext>
-            </a:extLst>
-          </p:cNvPr>
-          <p:cNvPicPr>
-            <a:picLocks noChangeAspect="1" noChangeArrowheads="1"/>
-          </p:cNvPicPr>
-          <p:nvPr/>
-        </p:nvPicPr>
-        <p:blipFill>
-          <a:blip r:embed="rId2">
-            <a:extLst>
-              <a:ext uri="{28A0092B-C50C-407E-A947-70E740481C1C}">
-                <a14:useLocalDpi xmlns:a14="http://schemas.microsoft.com/office/drawing/2010/main" val="0"/>
-              </a:ext>
-            </a:extLst>
-          </a:blip>
-          <a:srcRect/>
-          <a:stretch>
-            <a:fillRect/>
-          </a:stretch>
-        </p:blipFill>
-        <p:spPr bwMode="auto">
-          <a:xfrm>
-            <a:off x="3606800" y="2210316"/>
-            <a:ext cx="7594600" cy="3797300"/>
-          </a:xfrm>
-          <a:prstGeom prst="rect">
-            <a:avLst/>
-          </a:prstGeom>
-          <a:noFill/>
-          <a:extLst>
-            <a:ext uri="{909E8E84-426E-40DD-AFC4-6F175D3DCCD1}">
-              <a14:hiddenFill xmlns:a14="http://schemas.microsoft.com/office/drawing/2010/main">
-                <a:solidFill>
-                  <a:srgbClr val="FFFFFF"/>
-                </a:solidFill>
-              </a14:hiddenFill>
-            </a:ext>
-          </a:extLst>
-        </p:spPr>
-      </p:pic>
-      <p:sp>
-        <p:nvSpPr>
           <p:cNvPr id="7" name="Rectangle 6">
             <a:extLst>
               <a:ext uri="{FF2B5EF4-FFF2-40B4-BE49-F238E27FC236}">
@@ -9174,6 +8708,66 @@
           </a:p>
         </p:txBody>
       </p:sp>
+      <p:pic>
+        <p:nvPicPr>
+          <p:cNvPr id="5" name="Picture 4">
+            <a:extLst>
+              <a:ext uri="{FF2B5EF4-FFF2-40B4-BE49-F238E27FC236}">
+                <a16:creationId xmlns:a16="http://schemas.microsoft.com/office/drawing/2014/main" id="{C94F2F40-11DC-0F13-B925-FF77A1AAF919}"/>
+              </a:ext>
+            </a:extLst>
+          </p:cNvPr>
+          <p:cNvPicPr>
+            <a:picLocks noChangeAspect="1"/>
+          </p:cNvPicPr>
+          <p:nvPr/>
+        </p:nvPicPr>
+        <p:blipFill>
+          <a:blip r:embed="rId2"/>
+          <a:stretch>
+            <a:fillRect/>
+          </a:stretch>
+        </p:blipFill>
+        <p:spPr>
+          <a:xfrm>
+            <a:off x="2246200" y="1108919"/>
+            <a:ext cx="5249008" cy="371527"/>
+          </a:xfrm>
+          <a:prstGeom prst="rect">
+            <a:avLst/>
+          </a:prstGeom>
+        </p:spPr>
+      </p:pic>
+      <p:pic>
+        <p:nvPicPr>
+          <p:cNvPr id="9" name="Picture 8">
+            <a:extLst>
+              <a:ext uri="{FF2B5EF4-FFF2-40B4-BE49-F238E27FC236}">
+                <a16:creationId xmlns:a16="http://schemas.microsoft.com/office/drawing/2014/main" id="{F8D90225-859C-BDED-A8D7-23A0C9CDC543}"/>
+              </a:ext>
+            </a:extLst>
+          </p:cNvPr>
+          <p:cNvPicPr>
+            <a:picLocks noChangeAspect="1"/>
+          </p:cNvPicPr>
+          <p:nvPr/>
+        </p:nvPicPr>
+        <p:blipFill>
+          <a:blip r:embed="rId3"/>
+          <a:stretch>
+            <a:fillRect/>
+          </a:stretch>
+        </p:blipFill>
+        <p:spPr>
+          <a:xfrm>
+            <a:off x="3708412" y="2331720"/>
+            <a:ext cx="6498166" cy="4022675"/>
+          </a:xfrm>
+          <a:prstGeom prst="rect">
+            <a:avLst/>
+          </a:prstGeom>
+        </p:spPr>
+      </p:pic>
     </p:spTree>
     <p:extLst>
       <p:ext uri="{BB962C8B-B14F-4D97-AF65-F5344CB8AC3E}">
@@ -9234,106 +8828,6 @@
       </p:sp>
       <p:sp>
         <p:nvSpPr>
-          <p:cNvPr id="4" name="TextBox 3">
-            <a:extLst>
-              <a:ext uri="{FF2B5EF4-FFF2-40B4-BE49-F238E27FC236}">
-                <a16:creationId xmlns:a16="http://schemas.microsoft.com/office/drawing/2014/main" id="{21424D4B-6E7C-0452-0C41-D536F93D422C}"/>
-              </a:ext>
-            </a:extLst>
-          </p:cNvPr>
-          <p:cNvSpPr txBox="1"/>
-          <p:nvPr/>
-        </p:nvSpPr>
-        <p:spPr>
-          <a:xfrm>
-            <a:off x="1698625" y="852785"/>
-            <a:ext cx="6191250" cy="923330"/>
-          </a:xfrm>
-          <a:prstGeom prst="rect">
-            <a:avLst/>
-          </a:prstGeom>
-          <a:noFill/>
-        </p:spPr>
-        <p:txBody>
-          <a:bodyPr wrap="square">
-            <a:spAutoFit/>
-          </a:bodyPr>
-          <a:lstStyle/>
-          <a:p>
-            <a:r>
-              <a:rPr lang="en-US" dirty="0" err="1"/>
-              <a:t>FeaturePlot</a:t>
-            </a:r>
-            <a:r>
-              <a:rPr lang="en-US" dirty="0"/>
-              <a:t>(</a:t>
-            </a:r>
-            <a:r>
-              <a:rPr lang="en-US" dirty="0" err="1"/>
-              <a:t>pbmc</a:t>
-            </a:r>
-            <a:r>
-              <a:rPr lang="en-US" dirty="0"/>
-              <a:t>, features = c("MS4A1", "GNLY", "CD3E", "CD14", "FCER1A", "FCGR3A", "LYZ", "PPBP",</a:t>
-            </a:r>
-          </a:p>
-          <a:p>
-            <a:r>
-              <a:rPr lang="en-US" dirty="0"/>
-              <a:t>    "CD8A"))</a:t>
-            </a:r>
-          </a:p>
-        </p:txBody>
-      </p:sp>
-      <p:pic>
-        <p:nvPicPr>
-          <p:cNvPr id="7170" name="Picture 2">
-            <a:extLst>
-              <a:ext uri="{FF2B5EF4-FFF2-40B4-BE49-F238E27FC236}">
-                <a16:creationId xmlns:a16="http://schemas.microsoft.com/office/drawing/2014/main" id="{67BFB869-8863-DE1C-8EB6-64CADA8B090E}"/>
-              </a:ext>
-            </a:extLst>
-          </p:cNvPr>
-          <p:cNvPicPr>
-            <a:picLocks noChangeAspect="1" noChangeArrowheads="1"/>
-          </p:cNvPicPr>
-          <p:nvPr/>
-        </p:nvPicPr>
-        <p:blipFill>
-          <a:blip r:embed="rId2">
-            <a:extLst>
-              <a:ext uri="{28A0092B-C50C-407E-A947-70E740481C1C}">
-                <a14:useLocalDpi xmlns:a14="http://schemas.microsoft.com/office/drawing/2010/main" val="0"/>
-              </a:ext>
-            </a:extLst>
-          </a:blip>
-          <a:srcRect/>
-          <a:stretch>
-            <a:fillRect/>
-          </a:stretch>
-        </p:blipFill>
-        <p:spPr bwMode="auto">
-          <a:xfrm>
-            <a:off x="4311650" y="1427480"/>
-            <a:ext cx="6470650" cy="5176520"/>
-          </a:xfrm>
-          <a:prstGeom prst="rect">
-            <a:avLst/>
-          </a:prstGeom>
-          <a:noFill/>
-          <a:extLst>
-            <a:ext uri="{909E8E84-426E-40DD-AFC4-6F175D3DCCD1}">
-              <a14:hiddenFill xmlns:a14="http://schemas.microsoft.com/office/drawing/2010/main">
-                <a:solidFill>
-                  <a:srgbClr val="FFFFFF"/>
-                </a:solidFill>
-              </a14:hiddenFill>
-            </a:ext>
-          </a:extLst>
-        </p:spPr>
-      </p:pic>
-      <p:sp>
-        <p:nvSpPr>
           <p:cNvPr id="5" name="Rectangle 4">
             <a:extLst>
               <a:ext uri="{FF2B5EF4-FFF2-40B4-BE49-F238E27FC236}">
@@ -9386,6 +8880,66 @@
           </a:p>
         </p:txBody>
       </p:sp>
+      <p:pic>
+        <p:nvPicPr>
+          <p:cNvPr id="6" name="Picture 5">
+            <a:extLst>
+              <a:ext uri="{FF2B5EF4-FFF2-40B4-BE49-F238E27FC236}">
+                <a16:creationId xmlns:a16="http://schemas.microsoft.com/office/drawing/2014/main" id="{C281A0B5-2E14-BC57-F4F0-2732DD7C1FCB}"/>
+              </a:ext>
+            </a:extLst>
+          </p:cNvPr>
+          <p:cNvPicPr>
+            <a:picLocks noChangeAspect="1"/>
+          </p:cNvPicPr>
+          <p:nvPr/>
+        </p:nvPicPr>
+        <p:blipFill>
+          <a:blip r:embed="rId2"/>
+          <a:stretch>
+            <a:fillRect/>
+          </a:stretch>
+        </p:blipFill>
+        <p:spPr>
+          <a:xfrm>
+            <a:off x="3530371" y="1299850"/>
+            <a:ext cx="6937833" cy="5558150"/>
+          </a:xfrm>
+          <a:prstGeom prst="rect">
+            <a:avLst/>
+          </a:prstGeom>
+        </p:spPr>
+      </p:pic>
+      <p:pic>
+        <p:nvPicPr>
+          <p:cNvPr id="9" name="Picture 8">
+            <a:extLst>
+              <a:ext uri="{FF2B5EF4-FFF2-40B4-BE49-F238E27FC236}">
+                <a16:creationId xmlns:a16="http://schemas.microsoft.com/office/drawing/2014/main" id="{4A9329FB-272E-224F-5E3A-1D72556CECCB}"/>
+              </a:ext>
+            </a:extLst>
+          </p:cNvPr>
+          <p:cNvPicPr>
+            <a:picLocks noChangeAspect="1"/>
+          </p:cNvPicPr>
+          <p:nvPr/>
+        </p:nvPicPr>
+        <p:blipFill>
+          <a:blip r:embed="rId3"/>
+          <a:stretch>
+            <a:fillRect/>
+          </a:stretch>
+        </p:blipFill>
+        <p:spPr>
+          <a:xfrm>
+            <a:off x="2699812" y="807504"/>
+            <a:ext cx="5706271" cy="562053"/>
+          </a:xfrm>
+          <a:prstGeom prst="rect">
+            <a:avLst/>
+          </a:prstGeom>
+        </p:spPr>
+      </p:pic>
     </p:spTree>
     <p:extLst>
       <p:ext uri="{BB962C8B-B14F-4D97-AF65-F5344CB8AC3E}">
@@ -9446,166 +9000,6 @@
       </p:sp>
       <p:sp>
         <p:nvSpPr>
-          <p:cNvPr id="4" name="TextBox 3">
-            <a:extLst>
-              <a:ext uri="{FF2B5EF4-FFF2-40B4-BE49-F238E27FC236}">
-                <a16:creationId xmlns:a16="http://schemas.microsoft.com/office/drawing/2014/main" id="{ABE6C891-32AD-12C0-22BE-C9AB6412BD67}"/>
-              </a:ext>
-            </a:extLst>
-          </p:cNvPr>
-          <p:cNvSpPr txBox="1"/>
-          <p:nvPr/>
-        </p:nvSpPr>
-        <p:spPr>
-          <a:xfrm>
-            <a:off x="8575675" y="0"/>
-            <a:ext cx="6203950" cy="1754326"/>
-          </a:xfrm>
-          <a:prstGeom prst="rect">
-            <a:avLst/>
-          </a:prstGeom>
-          <a:noFill/>
-        </p:spPr>
-        <p:txBody>
-          <a:bodyPr wrap="square">
-            <a:spAutoFit/>
-          </a:bodyPr>
-          <a:lstStyle/>
-          <a:p>
-            <a:r>
-              <a:rPr lang="en-US" dirty="0" err="1"/>
-              <a:t>pbmc.markers</a:t>
-            </a:r>
-            <a:r>
-              <a:rPr lang="en-US" dirty="0"/>
-              <a:t> %&gt;%</a:t>
-            </a:r>
-          </a:p>
-          <a:p>
-            <a:r>
-              <a:rPr lang="en-US" dirty="0"/>
-              <a:t>    </a:t>
-            </a:r>
-            <a:r>
-              <a:rPr lang="en-US" dirty="0" err="1"/>
-              <a:t>group_by</a:t>
-            </a:r>
-            <a:r>
-              <a:rPr lang="en-US" dirty="0"/>
-              <a:t>(cluster) %&gt;%</a:t>
-            </a:r>
-          </a:p>
-          <a:p>
-            <a:r>
-              <a:rPr lang="en-US" dirty="0"/>
-              <a:t>    </a:t>
-            </a:r>
-            <a:r>
-              <a:rPr lang="en-US" dirty="0" err="1"/>
-              <a:t>dplyr</a:t>
-            </a:r>
-            <a:r>
-              <a:rPr lang="en-US" dirty="0"/>
-              <a:t>::filter(avg_log2FC &gt; 1) %&gt;%</a:t>
-            </a:r>
-          </a:p>
-          <a:p>
-            <a:r>
-              <a:rPr lang="en-US" dirty="0"/>
-              <a:t>    </a:t>
-            </a:r>
-            <a:r>
-              <a:rPr lang="en-US" dirty="0" err="1"/>
-              <a:t>slice_head</a:t>
-            </a:r>
-            <a:r>
-              <a:rPr lang="en-US" dirty="0"/>
-              <a:t>(n = 10) %&gt;%</a:t>
-            </a:r>
-          </a:p>
-          <a:p>
-            <a:r>
-              <a:rPr lang="en-US" dirty="0"/>
-              <a:t>    ungroup() -&gt; top10</a:t>
-            </a:r>
-          </a:p>
-          <a:p>
-            <a:r>
-              <a:rPr lang="en-US" dirty="0" err="1"/>
-              <a:t>DoHeatmap</a:t>
-            </a:r>
-            <a:r>
-              <a:rPr lang="en-US" dirty="0"/>
-              <a:t>(</a:t>
-            </a:r>
-            <a:r>
-              <a:rPr lang="en-US" dirty="0" err="1"/>
-              <a:t>pbmc</a:t>
-            </a:r>
-            <a:r>
-              <a:rPr lang="en-US" dirty="0"/>
-              <a:t>, features = top10$gene) + </a:t>
-            </a:r>
-            <a:r>
-              <a:rPr lang="en-US" dirty="0" err="1"/>
-              <a:t>NoLegend</a:t>
-            </a:r>
-            <a:r>
-              <a:rPr lang="en-US" dirty="0"/>
-              <a:t>()</a:t>
-            </a:r>
-          </a:p>
-        </p:txBody>
-      </p:sp>
-      <p:pic>
-        <p:nvPicPr>
-          <p:cNvPr id="8194" name="Picture 2">
-            <a:extLst>
-              <a:ext uri="{FF2B5EF4-FFF2-40B4-BE49-F238E27FC236}">
-                <a16:creationId xmlns:a16="http://schemas.microsoft.com/office/drawing/2014/main" id="{4D98E1A4-3099-679E-91F2-5FD1CE208AF3}"/>
-              </a:ext>
-            </a:extLst>
-          </p:cNvPr>
-          <p:cNvPicPr>
-            <a:picLocks noChangeAspect="1" noChangeArrowheads="1"/>
-          </p:cNvPicPr>
-          <p:nvPr/>
-        </p:nvPicPr>
-        <p:blipFill>
-          <a:blip r:embed="rId2">
-            <a:extLst>
-              <a:ext uri="{28A0092B-C50C-407E-A947-70E740481C1C}">
-                <a14:useLocalDpi xmlns:a14="http://schemas.microsoft.com/office/drawing/2010/main" val="0"/>
-              </a:ext>
-            </a:extLst>
-          </a:blip>
-          <a:srcRect/>
-          <a:stretch>
-            <a:fillRect/>
-          </a:stretch>
-        </p:blipFill>
-        <p:spPr bwMode="auto">
-          <a:xfrm>
-            <a:off x="2317750" y="444500"/>
-            <a:ext cx="8572500" cy="6858000"/>
-          </a:xfrm>
-          <a:prstGeom prst="rect">
-            <a:avLst/>
-          </a:prstGeom>
-          <a:noFill/>
-          <a:extLst>
-            <a:ext uri="{909E8E84-426E-40DD-AFC4-6F175D3DCCD1}">
-              <a14:hiddenFill xmlns:a14="http://schemas.microsoft.com/office/drawing/2010/main">
-                <a:solidFill>
-                  <a:srgbClr val="FFFFFF"/>
-                </a:solidFill>
-              </a14:hiddenFill>
-            </a:ext>
-          </a:extLst>
-        </p:spPr>
-      </p:pic>
-      <p:sp>
-        <p:nvSpPr>
           <p:cNvPr id="5" name="Rectangle 4">
             <a:extLst>
               <a:ext uri="{FF2B5EF4-FFF2-40B4-BE49-F238E27FC236}">
@@ -9658,6 +9052,66 @@
           </a:p>
         </p:txBody>
       </p:sp>
+      <p:pic>
+        <p:nvPicPr>
+          <p:cNvPr id="8" name="Picture 7">
+            <a:extLst>
+              <a:ext uri="{FF2B5EF4-FFF2-40B4-BE49-F238E27FC236}">
+                <a16:creationId xmlns:a16="http://schemas.microsoft.com/office/drawing/2014/main" id="{CA1BCA59-9CB5-A062-5C37-791D01B7A9DE}"/>
+              </a:ext>
+            </a:extLst>
+          </p:cNvPr>
+          <p:cNvPicPr>
+            <a:picLocks noChangeAspect="1"/>
+          </p:cNvPicPr>
+          <p:nvPr/>
+        </p:nvPicPr>
+        <p:blipFill>
+          <a:blip r:embed="rId2"/>
+          <a:stretch>
+            <a:fillRect/>
+          </a:stretch>
+        </p:blipFill>
+        <p:spPr>
+          <a:xfrm>
+            <a:off x="1666875" y="768873"/>
+            <a:ext cx="7339601" cy="5664347"/>
+          </a:xfrm>
+          <a:prstGeom prst="rect">
+            <a:avLst/>
+          </a:prstGeom>
+        </p:spPr>
+      </p:pic>
+      <p:pic>
+        <p:nvPicPr>
+          <p:cNvPr id="12" name="Picture 11">
+            <a:extLst>
+              <a:ext uri="{FF2B5EF4-FFF2-40B4-BE49-F238E27FC236}">
+                <a16:creationId xmlns:a16="http://schemas.microsoft.com/office/drawing/2014/main" id="{4AA8D7C4-79F8-E87C-F1D8-50475A054914}"/>
+              </a:ext>
+            </a:extLst>
+          </p:cNvPr>
+          <p:cNvPicPr>
+            <a:picLocks noChangeAspect="1"/>
+          </p:cNvPicPr>
+          <p:nvPr/>
+        </p:nvPicPr>
+        <p:blipFill>
+          <a:blip r:embed="rId3"/>
+          <a:stretch>
+            <a:fillRect/>
+          </a:stretch>
+        </p:blipFill>
+        <p:spPr>
+          <a:xfrm>
+            <a:off x="9045148" y="2762157"/>
+            <a:ext cx="3057952" cy="1333686"/>
+          </a:xfrm>
+          <a:prstGeom prst="rect">
+            <a:avLst/>
+          </a:prstGeom>
+        </p:spPr>
+      </p:pic>
     </p:spTree>
     <p:extLst>
       <p:ext uri="{BB962C8B-B14F-4D97-AF65-F5344CB8AC3E}">
@@ -9799,8 +9253,8 @@
         </p:nvSpPr>
         <p:spPr>
           <a:xfrm>
-            <a:off x="2213769" y="3000489"/>
-            <a:ext cx="6946899" cy="646331"/>
+            <a:off x="2174168" y="3000894"/>
+            <a:ext cx="6560649" cy="646331"/>
           </a:xfrm>
           <a:prstGeom prst="rect">
             <a:avLst/>
@@ -9831,11 +9285,11 @@
             </a:r>
             <a:r>
               <a:rPr lang="en-US" dirty="0"/>
-              <a:t> between </a:t>
+              <a:t> between a </a:t>
             </a:r>
             <a:r>
               <a:rPr lang="en-US" u="sng" dirty="0"/>
-              <a:t>two given clusters </a:t>
+              <a:t>pair of clusters </a:t>
             </a:r>
             <a:r>
               <a:rPr lang="en-US" dirty="0"/>
@@ -9874,7 +9328,7 @@
         </p:nvSpPr>
         <p:spPr>
           <a:xfrm>
-            <a:off x="2213769" y="4509312"/>
+            <a:off x="2204516" y="4398708"/>
             <a:ext cx="5216524" cy="646331"/>
           </a:xfrm>
           <a:prstGeom prst="rect">
@@ -9973,7 +9427,7 @@
         </p:nvGrpSpPr>
         <p:grpSpPr>
           <a:xfrm>
-            <a:off x="8169274" y="906934"/>
+            <a:off x="8155844" y="679254"/>
             <a:ext cx="1584325" cy="1584325"/>
             <a:chOff x="8335962" y="850967"/>
             <a:chExt cx="1584325" cy="1584325"/>
@@ -10342,7 +9796,7 @@
         </p:nvGrpSpPr>
         <p:grpSpPr>
           <a:xfrm>
-            <a:off x="8845087" y="2813879"/>
+            <a:off x="8845087" y="2691959"/>
             <a:ext cx="1209343" cy="1209343"/>
             <a:chOff x="8335962" y="850967"/>
             <a:chExt cx="1584325" cy="1584325"/>
@@ -10724,7 +10178,7 @@
         </p:blipFill>
         <p:spPr bwMode="auto">
           <a:xfrm>
-            <a:off x="10369490" y="2811222"/>
+            <a:off x="10369490" y="2689302"/>
             <a:ext cx="1209343" cy="1209343"/>
           </a:xfrm>
           <a:prstGeom prst="rect">
@@ -10758,7 +10212,7 @@
         </p:nvCxnSpPr>
         <p:spPr>
           <a:xfrm>
-            <a:off x="9267825" y="2928065"/>
+            <a:off x="9267825" y="2806145"/>
             <a:ext cx="1266825" cy="12700"/>
           </a:xfrm>
           <a:prstGeom prst="line">
@@ -10815,7 +10269,7 @@
         </p:blipFill>
         <p:spPr bwMode="auto">
           <a:xfrm>
-            <a:off x="7604918" y="4440165"/>
+            <a:off x="7604918" y="4280145"/>
             <a:ext cx="1209343" cy="1209343"/>
           </a:xfrm>
           <a:prstGeom prst="rect">
@@ -10862,7 +10316,7 @@
         </p:blipFill>
         <p:spPr bwMode="auto">
           <a:xfrm>
-            <a:off x="9168692" y="4440765"/>
+            <a:off x="9168692" y="4280745"/>
             <a:ext cx="1209343" cy="1209343"/>
           </a:xfrm>
           <a:prstGeom prst="rect">
@@ -10896,7 +10350,7 @@
         </p:nvCxnSpPr>
         <p:spPr>
           <a:xfrm>
-            <a:off x="8026400" y="4556772"/>
+            <a:off x="8026400" y="4396752"/>
             <a:ext cx="1317625" cy="0"/>
           </a:xfrm>
           <a:prstGeom prst="line">
@@ -10904,9 +10358,9 @@
           </a:prstGeom>
           <a:ln w="12700">
             <a:solidFill>
-              <a:schemeClr val="tx1"/>
+              <a:srgbClr val="000000"/>
             </a:solidFill>
-            <a:prstDash val="sysDot"/>
+            <a:prstDash val="solid"/>
           </a:ln>
         </p:spPr>
         <p:style>
@@ -10940,7 +10394,7 @@
         </p:nvCxnSpPr>
         <p:spPr>
           <a:xfrm>
-            <a:off x="8551068" y="4766322"/>
+            <a:off x="8551068" y="4606302"/>
             <a:ext cx="1412082" cy="0"/>
           </a:xfrm>
           <a:prstGeom prst="line">
@@ -10948,9 +10402,9 @@
           </a:prstGeom>
           <a:ln w="12700">
             <a:solidFill>
-              <a:schemeClr val="tx1"/>
+              <a:srgbClr val="000000"/>
             </a:solidFill>
-            <a:prstDash val="sysDot"/>
+            <a:prstDash val="solid"/>
           </a:ln>
         </p:spPr>
         <p:style>
@@ -10984,17 +10438,17 @@
         </p:nvCxnSpPr>
         <p:spPr>
           <a:xfrm flipV="1">
-            <a:off x="8687593" y="4908550"/>
-            <a:ext cx="1266032" cy="3822"/>
+            <a:off x="8687593" y="4748530"/>
+            <a:ext cx="1266032" cy="0"/>
           </a:xfrm>
           <a:prstGeom prst="line">
             <a:avLst/>
           </a:prstGeom>
           <a:ln w="12700">
             <a:solidFill>
-              <a:schemeClr val="tx1"/>
+              <a:srgbClr val="000000"/>
             </a:solidFill>
-            <a:prstDash val="sysDot"/>
+            <a:prstDash val="solid"/>
           </a:ln>
         </p:spPr>
         <p:style>
@@ -11028,17 +10482,17 @@
         </p:nvCxnSpPr>
         <p:spPr>
           <a:xfrm flipV="1">
-            <a:off x="7894115" y="5041900"/>
-            <a:ext cx="1399110" cy="2935"/>
+            <a:off x="7894115" y="4881880"/>
+            <a:ext cx="1399110" cy="0"/>
           </a:xfrm>
           <a:prstGeom prst="line">
             <a:avLst/>
           </a:prstGeom>
           <a:ln w="12700">
             <a:solidFill>
-              <a:schemeClr val="tx1"/>
+              <a:srgbClr val="000000"/>
             </a:solidFill>
-            <a:prstDash val="sysDot"/>
+            <a:prstDash val="solid"/>
           </a:ln>
         </p:spPr>
         <p:style>
@@ -11072,7 +10526,7 @@
         </p:nvCxnSpPr>
         <p:spPr>
           <a:xfrm>
-            <a:off x="7942794" y="5164928"/>
+            <a:off x="7942794" y="5004908"/>
             <a:ext cx="1401231" cy="0"/>
           </a:xfrm>
           <a:prstGeom prst="line">
@@ -11080,9 +10534,9 @@
           </a:prstGeom>
           <a:ln w="12700">
             <a:solidFill>
-              <a:schemeClr val="tx1"/>
+              <a:srgbClr val="000000"/>
             </a:solidFill>
-            <a:prstDash val="sysDot"/>
+            <a:prstDash val="solid"/>
           </a:ln>
         </p:spPr>
         <p:style>
@@ -11116,7 +10570,7 @@
         </p:nvCxnSpPr>
         <p:spPr>
           <a:xfrm>
-            <a:off x="7981421" y="5304628"/>
+            <a:off x="7981421" y="5144608"/>
             <a:ext cx="1401231" cy="0"/>
           </a:xfrm>
           <a:prstGeom prst="line">
@@ -11124,9 +10578,9 @@
           </a:prstGeom>
           <a:ln w="12700">
             <a:solidFill>
-              <a:schemeClr val="tx1"/>
+              <a:srgbClr val="000000"/>
             </a:solidFill>
-            <a:prstDash val="sysDot"/>
+            <a:prstDash val="solid"/>
           </a:ln>
         </p:spPr>
         <p:style>
@@ -11160,7 +10614,7 @@
         </p:nvCxnSpPr>
         <p:spPr>
           <a:xfrm>
-            <a:off x="8105246" y="5406228"/>
+            <a:off x="8105246" y="5246208"/>
             <a:ext cx="1401231" cy="0"/>
           </a:xfrm>
           <a:prstGeom prst="line">
@@ -11168,9 +10622,9 @@
           </a:prstGeom>
           <a:ln w="12700">
             <a:solidFill>
-              <a:schemeClr val="tx1"/>
+              <a:srgbClr val="000000"/>
             </a:solidFill>
-            <a:prstDash val="sysDot"/>
+            <a:prstDash val="solid"/>
           </a:ln>
         </p:spPr>
         <p:style>
@@ -11202,7 +10656,7 @@
         </p:nvSpPr>
         <p:spPr>
           <a:xfrm>
-            <a:off x="9303297" y="2595618"/>
+            <a:off x="9303297" y="2473698"/>
             <a:ext cx="379413" cy="246221"/>
           </a:xfrm>
           <a:prstGeom prst="rect">
@@ -11243,7 +10697,7 @@
         </p:nvSpPr>
         <p:spPr>
           <a:xfrm>
-            <a:off x="10760622" y="2592498"/>
+            <a:off x="10760622" y="2470578"/>
             <a:ext cx="379413" cy="246221"/>
           </a:xfrm>
           <a:prstGeom prst="rect">
@@ -11284,7 +10738,7 @@
         </p:nvSpPr>
         <p:spPr>
           <a:xfrm>
-            <a:off x="8093138" y="4168429"/>
+            <a:off x="8093138" y="4008409"/>
             <a:ext cx="379413" cy="246221"/>
           </a:xfrm>
           <a:prstGeom prst="rect">
@@ -11325,7 +10779,7 @@
         </p:nvSpPr>
         <p:spPr>
           <a:xfrm>
-            <a:off x="9550463" y="4165309"/>
+            <a:off x="9550463" y="4005289"/>
             <a:ext cx="379413" cy="246221"/>
           </a:xfrm>
           <a:prstGeom prst="rect">

</xml_diff>